<commit_message>
front page of the presentation
</commit_message>
<xml_diff>
--- a/Linked_List.pptx
+++ b/Linked_List.pptx
@@ -4,6 +4,9 @@
   <p:sldMasterIdLst>
     <p:sldMasterId id="2147483648" r:id="rId1"/>
   </p:sldMasterIdLst>
+  <p:sldIdLst>
+    <p:sldId id="256" r:id="rId2"/>
+  </p:sldIdLst>
   <p:sldSz cx="12192000" cy="6858000"/>
   <p:notesSz cx="6858000" cy="9144000"/>
   <p:defaultTextStyle>
@@ -101,6 +104,11 @@
       </a:defRPr>
     </a:lvl9pPr>
   </p:defaultTextStyle>
+  <p:extLst>
+    <p:ext uri="{EFAFB233-063F-42B5-8137-9DF3F51BA10A}">
+      <p15:sldGuideLst xmlns:p15="http://schemas.microsoft.com/office/powerpoint/2012/main"/>
+    </p:ext>
+  </p:extLst>
 </p:presentation>
 </file>
 
@@ -307,7 +315,7 @@
           <a:p>
             <a:fld id="{2D2E3C72-60F0-4B29-9473-543FD151B733}" type="slidenum">
               <a:rPr lang="de-AT" smtClean="0"/>
-              <a:t>‹Nr.›</a:t>
+              <a:t>‹#›</a:t>
             </a:fld>
             <a:endParaRPr lang="de-AT"/>
           </a:p>
@@ -507,7 +515,7 @@
           <a:p>
             <a:fld id="{2D2E3C72-60F0-4B29-9473-543FD151B733}" type="slidenum">
               <a:rPr lang="de-AT" smtClean="0"/>
-              <a:t>‹Nr.›</a:t>
+              <a:t>‹#›</a:t>
             </a:fld>
             <a:endParaRPr lang="de-AT"/>
           </a:p>
@@ -717,7 +725,7 @@
           <a:p>
             <a:fld id="{2D2E3C72-60F0-4B29-9473-543FD151B733}" type="slidenum">
               <a:rPr lang="de-AT" smtClean="0"/>
-              <a:t>‹Nr.›</a:t>
+              <a:t>‹#›</a:t>
             </a:fld>
             <a:endParaRPr lang="de-AT"/>
           </a:p>
@@ -917,7 +925,7 @@
           <a:p>
             <a:fld id="{2D2E3C72-60F0-4B29-9473-543FD151B733}" type="slidenum">
               <a:rPr lang="de-AT" smtClean="0"/>
-              <a:t>‹Nr.›</a:t>
+              <a:t>‹#›</a:t>
             </a:fld>
             <a:endParaRPr lang="de-AT"/>
           </a:p>
@@ -1193,7 +1201,7 @@
           <a:p>
             <a:fld id="{2D2E3C72-60F0-4B29-9473-543FD151B733}" type="slidenum">
               <a:rPr lang="de-AT" smtClean="0"/>
-              <a:t>‹Nr.›</a:t>
+              <a:t>‹#›</a:t>
             </a:fld>
             <a:endParaRPr lang="de-AT"/>
           </a:p>
@@ -1461,7 +1469,7 @@
           <a:p>
             <a:fld id="{2D2E3C72-60F0-4B29-9473-543FD151B733}" type="slidenum">
               <a:rPr lang="de-AT" smtClean="0"/>
-              <a:t>‹Nr.›</a:t>
+              <a:t>‹#›</a:t>
             </a:fld>
             <a:endParaRPr lang="de-AT"/>
           </a:p>
@@ -1876,7 +1884,7 @@
           <a:p>
             <a:fld id="{2D2E3C72-60F0-4B29-9473-543FD151B733}" type="slidenum">
               <a:rPr lang="de-AT" smtClean="0"/>
-              <a:t>‹Nr.›</a:t>
+              <a:t>‹#›</a:t>
             </a:fld>
             <a:endParaRPr lang="de-AT"/>
           </a:p>
@@ -2018,7 +2026,7 @@
           <a:p>
             <a:fld id="{2D2E3C72-60F0-4B29-9473-543FD151B733}" type="slidenum">
               <a:rPr lang="de-AT" smtClean="0"/>
-              <a:t>‹Nr.›</a:t>
+              <a:t>‹#›</a:t>
             </a:fld>
             <a:endParaRPr lang="de-AT"/>
           </a:p>
@@ -2131,7 +2139,7 @@
           <a:p>
             <a:fld id="{2D2E3C72-60F0-4B29-9473-543FD151B733}" type="slidenum">
               <a:rPr lang="de-AT" smtClean="0"/>
-              <a:t>‹Nr.›</a:t>
+              <a:t>‹#›</a:t>
             </a:fld>
             <a:endParaRPr lang="de-AT"/>
           </a:p>
@@ -2444,7 +2452,7 @@
           <a:p>
             <a:fld id="{2D2E3C72-60F0-4B29-9473-543FD151B733}" type="slidenum">
               <a:rPr lang="de-AT" smtClean="0"/>
-              <a:t>‹Nr.›</a:t>
+              <a:t>‹#›</a:t>
             </a:fld>
             <a:endParaRPr lang="de-AT"/>
           </a:p>
@@ -2733,7 +2741,7 @@
           <a:p>
             <a:fld id="{2D2E3C72-60F0-4B29-9473-543FD151B733}" type="slidenum">
               <a:rPr lang="de-AT" smtClean="0"/>
-              <a:t>‹Nr.›</a:t>
+              <a:t>‹#›</a:t>
             </a:fld>
             <a:endParaRPr lang="de-AT"/>
           </a:p>
@@ -3012,7 +3020,7 @@
           <a:p>
             <a:fld id="{2D2E3C72-60F0-4B29-9473-543FD151B733}" type="slidenum">
               <a:rPr lang="de-AT" smtClean="0"/>
-              <a:t>‹Nr.›</a:t>
+              <a:t>‹#›</a:t>
             </a:fld>
             <a:endParaRPr lang="de-AT"/>
           </a:p>
@@ -3322,6 +3330,473 @@
 </p:sldMaster>
 </file>
 
+<file path=ppt/slides/slide1.xml><?xml version="1.0" encoding="utf-8"?>
+<p:sld xmlns:a="http://schemas.openxmlformats.org/drawingml/2006/main" xmlns:r="http://schemas.openxmlformats.org/officeDocument/2006/relationships" xmlns:p="http://schemas.openxmlformats.org/presentationml/2006/main">
+  <p:cSld>
+    <p:spTree>
+      <p:nvGrpSpPr>
+        <p:cNvPr id="1" name=""/>
+        <p:cNvGrpSpPr/>
+        <p:nvPr/>
+      </p:nvGrpSpPr>
+      <p:grpSpPr>
+        <a:xfrm>
+          <a:off x="0" y="0"/>
+          <a:ext cx="0" cy="0"/>
+          <a:chOff x="0" y="0"/>
+          <a:chExt cx="0" cy="0"/>
+        </a:xfrm>
+      </p:grpSpPr>
+      <p:sp>
+        <p:nvSpPr>
+          <p:cNvPr id="2" name="Title 1">
+            <a:extLst>
+              <a:ext uri="{FF2B5EF4-FFF2-40B4-BE49-F238E27FC236}">
+                <a16:creationId xmlns:a16="http://schemas.microsoft.com/office/drawing/2014/main" id="{FC6C45D6-33D1-4561-8377-B6E693C0FE31}"/>
+              </a:ext>
+            </a:extLst>
+          </p:cNvPr>
+          <p:cNvSpPr>
+            <a:spLocks noGrp="1"/>
+          </p:cNvSpPr>
+          <p:nvPr>
+            <p:ph type="ctrTitle"/>
+          </p:nvPr>
+        </p:nvSpPr>
+        <p:spPr/>
+        <p:txBody>
+          <a:bodyPr/>
+          <a:lstStyle/>
+          <a:p>
+            <a:r>
+              <a:rPr lang="en-GB" dirty="0"/>
+              <a:t>Linked Lists</a:t>
+            </a:r>
+            <a:endParaRPr lang="LID4096" dirty="0"/>
+          </a:p>
+        </p:txBody>
+      </p:sp>
+      <p:sp>
+        <p:nvSpPr>
+          <p:cNvPr id="3" name="Subtitle 2">
+            <a:extLst>
+              <a:ext uri="{FF2B5EF4-FFF2-40B4-BE49-F238E27FC236}">
+                <a16:creationId xmlns:a16="http://schemas.microsoft.com/office/drawing/2014/main" id="{6BB5D9A8-E35F-484B-A642-051EA5A53583}"/>
+              </a:ext>
+            </a:extLst>
+          </p:cNvPr>
+          <p:cNvSpPr>
+            <a:spLocks noGrp="1"/>
+          </p:cNvSpPr>
+          <p:nvPr>
+            <p:ph type="subTitle" idx="1"/>
+          </p:nvPr>
+        </p:nvSpPr>
+        <p:spPr/>
+        <p:txBody>
+          <a:bodyPr/>
+          <a:lstStyle/>
+          <a:p>
+            <a:r>
+              <a:rPr lang="en-GB" dirty="0"/>
+              <a:t>Von Yanis Ferecean und Noah </a:t>
+            </a:r>
+            <a:r>
+              <a:rPr lang="en-GB" dirty="0" err="1"/>
+              <a:t>Grundner</a:t>
+            </a:r>
+            <a:endParaRPr lang="LID4096" dirty="0"/>
+          </a:p>
+        </p:txBody>
+      </p:sp>
+      <p:sp>
+        <p:nvSpPr>
+          <p:cNvPr id="4" name="Rectangle 3">
+            <a:extLst>
+              <a:ext uri="{FF2B5EF4-FFF2-40B4-BE49-F238E27FC236}">
+                <a16:creationId xmlns:a16="http://schemas.microsoft.com/office/drawing/2014/main" id="{6AC5D23A-EB6C-47D3-BD66-ACA3A2C8DF11}"/>
+              </a:ext>
+            </a:extLst>
+          </p:cNvPr>
+          <p:cNvSpPr/>
+          <p:nvPr/>
+        </p:nvSpPr>
+        <p:spPr>
+          <a:xfrm>
+            <a:off x="1524000" y="924233"/>
+            <a:ext cx="1858297" cy="817563"/>
+          </a:xfrm>
+          <a:prstGeom prst="rect">
+            <a:avLst/>
+          </a:prstGeom>
+        </p:spPr>
+        <p:style>
+          <a:lnRef idx="2">
+            <a:schemeClr val="accent1">
+              <a:shade val="50000"/>
+            </a:schemeClr>
+          </a:lnRef>
+          <a:fillRef idx="1">
+            <a:schemeClr val="accent1"/>
+          </a:fillRef>
+          <a:effectRef idx="0">
+            <a:schemeClr val="accent1"/>
+          </a:effectRef>
+          <a:fontRef idx="minor">
+            <a:schemeClr val="lt1"/>
+          </a:fontRef>
+        </p:style>
+        <p:txBody>
+          <a:bodyPr rtlCol="0" anchor="ctr"/>
+          <a:lstStyle/>
+          <a:p>
+            <a:pPr algn="ctr"/>
+            <a:endParaRPr lang="LID4096"/>
+          </a:p>
+        </p:txBody>
+      </p:sp>
+      <p:cxnSp>
+        <p:nvCxnSpPr>
+          <p:cNvPr id="6" name="Straight Arrow Connector 5">
+            <a:extLst>
+              <a:ext uri="{FF2B5EF4-FFF2-40B4-BE49-F238E27FC236}">
+                <a16:creationId xmlns:a16="http://schemas.microsoft.com/office/drawing/2014/main" id="{24FC58E4-9DB0-4970-A88A-F7C213287C98}"/>
+              </a:ext>
+            </a:extLst>
+          </p:cNvPr>
+          <p:cNvCxnSpPr>
+            <a:stCxn id="4" idx="3"/>
+          </p:cNvCxnSpPr>
+          <p:nvPr/>
+        </p:nvCxnSpPr>
+        <p:spPr>
+          <a:xfrm flipV="1">
+            <a:off x="3382297" y="1317523"/>
+            <a:ext cx="1759974" cy="15492"/>
+          </a:xfrm>
+          <a:prstGeom prst="straightConnector1">
+            <a:avLst/>
+          </a:prstGeom>
+          <a:ln>
+            <a:tailEnd type="triangle"/>
+          </a:ln>
+        </p:spPr>
+        <p:style>
+          <a:lnRef idx="1">
+            <a:schemeClr val="accent1"/>
+          </a:lnRef>
+          <a:fillRef idx="0">
+            <a:schemeClr val="accent1"/>
+          </a:fillRef>
+          <a:effectRef idx="0">
+            <a:schemeClr val="accent1"/>
+          </a:effectRef>
+          <a:fontRef idx="minor">
+            <a:schemeClr val="tx1"/>
+          </a:fontRef>
+        </p:style>
+      </p:cxnSp>
+      <p:sp>
+        <p:nvSpPr>
+          <p:cNvPr id="7" name="Rectangle 6">
+            <a:extLst>
+              <a:ext uri="{FF2B5EF4-FFF2-40B4-BE49-F238E27FC236}">
+                <a16:creationId xmlns:a16="http://schemas.microsoft.com/office/drawing/2014/main" id="{ED497616-A11D-4E77-BF58-2FAF9EA9CDC5}"/>
+              </a:ext>
+            </a:extLst>
+          </p:cNvPr>
+          <p:cNvSpPr/>
+          <p:nvPr/>
+        </p:nvSpPr>
+        <p:spPr>
+          <a:xfrm>
+            <a:off x="5142271" y="924233"/>
+            <a:ext cx="1936955" cy="817563"/>
+          </a:xfrm>
+          <a:prstGeom prst="rect">
+            <a:avLst/>
+          </a:prstGeom>
+        </p:spPr>
+        <p:style>
+          <a:lnRef idx="2">
+            <a:schemeClr val="accent1">
+              <a:shade val="50000"/>
+            </a:schemeClr>
+          </a:lnRef>
+          <a:fillRef idx="1">
+            <a:schemeClr val="accent1"/>
+          </a:fillRef>
+          <a:effectRef idx="0">
+            <a:schemeClr val="accent1"/>
+          </a:effectRef>
+          <a:fontRef idx="minor">
+            <a:schemeClr val="lt1"/>
+          </a:fontRef>
+        </p:style>
+        <p:txBody>
+          <a:bodyPr rtlCol="0" anchor="ctr"/>
+          <a:lstStyle/>
+          <a:p>
+            <a:pPr algn="ctr"/>
+            <a:endParaRPr lang="LID4096"/>
+          </a:p>
+        </p:txBody>
+      </p:sp>
+      <p:cxnSp>
+        <p:nvCxnSpPr>
+          <p:cNvPr id="9" name="Straight Arrow Connector 8">
+            <a:extLst>
+              <a:ext uri="{FF2B5EF4-FFF2-40B4-BE49-F238E27FC236}">
+                <a16:creationId xmlns:a16="http://schemas.microsoft.com/office/drawing/2014/main" id="{B40E232B-901C-4F33-85CD-B8E7C2071717}"/>
+              </a:ext>
+            </a:extLst>
+          </p:cNvPr>
+          <p:cNvCxnSpPr>
+            <a:stCxn id="7" idx="3"/>
+          </p:cNvCxnSpPr>
+          <p:nvPr/>
+        </p:nvCxnSpPr>
+        <p:spPr>
+          <a:xfrm flipV="1">
+            <a:off x="7079226" y="1333014"/>
+            <a:ext cx="1877961" cy="1"/>
+          </a:xfrm>
+          <a:prstGeom prst="straightConnector1">
+            <a:avLst/>
+          </a:prstGeom>
+          <a:ln>
+            <a:tailEnd type="triangle"/>
+          </a:ln>
+        </p:spPr>
+        <p:style>
+          <a:lnRef idx="1">
+            <a:schemeClr val="accent1"/>
+          </a:lnRef>
+          <a:fillRef idx="0">
+            <a:schemeClr val="accent1"/>
+          </a:fillRef>
+          <a:effectRef idx="0">
+            <a:schemeClr val="accent1"/>
+          </a:effectRef>
+          <a:fontRef idx="minor">
+            <a:schemeClr val="tx1"/>
+          </a:fontRef>
+        </p:style>
+      </p:cxnSp>
+      <p:sp>
+        <p:nvSpPr>
+          <p:cNvPr id="10" name="Rectangle 9">
+            <a:extLst>
+              <a:ext uri="{FF2B5EF4-FFF2-40B4-BE49-F238E27FC236}">
+                <a16:creationId xmlns:a16="http://schemas.microsoft.com/office/drawing/2014/main" id="{13883304-3F81-4F95-B8BF-0A453B8FB529}"/>
+              </a:ext>
+            </a:extLst>
+          </p:cNvPr>
+          <p:cNvSpPr/>
+          <p:nvPr/>
+        </p:nvSpPr>
+        <p:spPr>
+          <a:xfrm>
+            <a:off x="8957186" y="924233"/>
+            <a:ext cx="1877961" cy="817540"/>
+          </a:xfrm>
+          <a:prstGeom prst="rect">
+            <a:avLst/>
+          </a:prstGeom>
+        </p:spPr>
+        <p:style>
+          <a:lnRef idx="2">
+            <a:schemeClr val="accent1">
+              <a:shade val="50000"/>
+            </a:schemeClr>
+          </a:lnRef>
+          <a:fillRef idx="1">
+            <a:schemeClr val="accent1"/>
+          </a:fillRef>
+          <a:effectRef idx="0">
+            <a:schemeClr val="accent1"/>
+          </a:effectRef>
+          <a:fontRef idx="minor">
+            <a:schemeClr val="lt1"/>
+          </a:fontRef>
+        </p:style>
+        <p:txBody>
+          <a:bodyPr rtlCol="0" anchor="ctr"/>
+          <a:lstStyle/>
+          <a:p>
+            <a:pPr algn="ctr"/>
+            <a:endParaRPr lang="LID4096"/>
+          </a:p>
+        </p:txBody>
+      </p:sp>
+      <p:cxnSp>
+        <p:nvCxnSpPr>
+          <p:cNvPr id="12" name="Straight Connector 11">
+            <a:extLst>
+              <a:ext uri="{FF2B5EF4-FFF2-40B4-BE49-F238E27FC236}">
+                <a16:creationId xmlns:a16="http://schemas.microsoft.com/office/drawing/2014/main" id="{3E4F3B85-1299-4165-8B3D-5E5A685CB337}"/>
+              </a:ext>
+            </a:extLst>
+          </p:cNvPr>
+          <p:cNvCxnSpPr>
+            <a:stCxn id="4" idx="0"/>
+          </p:cNvCxnSpPr>
+          <p:nvPr/>
+        </p:nvCxnSpPr>
+        <p:spPr>
+          <a:xfrm>
+            <a:off x="2453148" y="924233"/>
+            <a:ext cx="914400" cy="914400"/>
+          </a:xfrm>
+          <a:prstGeom prst="line">
+            <a:avLst/>
+          </a:prstGeom>
+        </p:spPr>
+        <p:style>
+          <a:lnRef idx="1">
+            <a:schemeClr val="accent1"/>
+          </a:lnRef>
+          <a:fillRef idx="0">
+            <a:schemeClr val="accent1"/>
+          </a:fillRef>
+          <a:effectRef idx="0">
+            <a:schemeClr val="accent1"/>
+          </a:effectRef>
+          <a:fontRef idx="minor">
+            <a:schemeClr val="tx1"/>
+          </a:fontRef>
+        </p:style>
+      </p:cxnSp>
+      <p:cxnSp>
+        <p:nvCxnSpPr>
+          <p:cNvPr id="14" name="Straight Connector 13">
+            <a:extLst>
+              <a:ext uri="{FF2B5EF4-FFF2-40B4-BE49-F238E27FC236}">
+                <a16:creationId xmlns:a16="http://schemas.microsoft.com/office/drawing/2014/main" id="{105A7EC1-C7B7-4453-80B3-E75C954C50FF}"/>
+              </a:ext>
+            </a:extLst>
+          </p:cNvPr>
+          <p:cNvCxnSpPr>
+            <a:stCxn id="4" idx="0"/>
+            <a:endCxn id="4" idx="2"/>
+          </p:cNvCxnSpPr>
+          <p:nvPr/>
+        </p:nvCxnSpPr>
+        <p:spPr>
+          <a:xfrm>
+            <a:off x="2453149" y="924233"/>
+            <a:ext cx="0" cy="817563"/>
+          </a:xfrm>
+          <a:prstGeom prst="line">
+            <a:avLst/>
+          </a:prstGeom>
+        </p:spPr>
+        <p:style>
+          <a:lnRef idx="1">
+            <a:schemeClr val="dk1"/>
+          </a:lnRef>
+          <a:fillRef idx="0">
+            <a:schemeClr val="dk1"/>
+          </a:fillRef>
+          <a:effectRef idx="0">
+            <a:schemeClr val="dk1"/>
+          </a:effectRef>
+          <a:fontRef idx="minor">
+            <a:schemeClr val="tx1"/>
+          </a:fontRef>
+        </p:style>
+      </p:cxnSp>
+      <p:cxnSp>
+        <p:nvCxnSpPr>
+          <p:cNvPr id="16" name="Straight Connector 15">
+            <a:extLst>
+              <a:ext uri="{FF2B5EF4-FFF2-40B4-BE49-F238E27FC236}">
+                <a16:creationId xmlns:a16="http://schemas.microsoft.com/office/drawing/2014/main" id="{5DC0F4AF-396B-4193-A6FF-4BA83105E76F}"/>
+              </a:ext>
+            </a:extLst>
+          </p:cNvPr>
+          <p:cNvCxnSpPr>
+            <a:stCxn id="7" idx="0"/>
+            <a:endCxn id="7" idx="2"/>
+          </p:cNvCxnSpPr>
+          <p:nvPr/>
+        </p:nvCxnSpPr>
+        <p:spPr>
+          <a:xfrm>
+            <a:off x="6110749" y="924233"/>
+            <a:ext cx="0" cy="817563"/>
+          </a:xfrm>
+          <a:prstGeom prst="line">
+            <a:avLst/>
+          </a:prstGeom>
+        </p:spPr>
+        <p:style>
+          <a:lnRef idx="1">
+            <a:schemeClr val="dk1"/>
+          </a:lnRef>
+          <a:fillRef idx="0">
+            <a:schemeClr val="dk1"/>
+          </a:fillRef>
+          <a:effectRef idx="0">
+            <a:schemeClr val="dk1"/>
+          </a:effectRef>
+          <a:fontRef idx="minor">
+            <a:schemeClr val="tx1"/>
+          </a:fontRef>
+        </p:style>
+      </p:cxnSp>
+      <p:cxnSp>
+        <p:nvCxnSpPr>
+          <p:cNvPr id="18" name="Straight Connector 17">
+            <a:extLst>
+              <a:ext uri="{FF2B5EF4-FFF2-40B4-BE49-F238E27FC236}">
+                <a16:creationId xmlns:a16="http://schemas.microsoft.com/office/drawing/2014/main" id="{E024B1BC-04DA-4E17-83AD-AC97BE2A7224}"/>
+              </a:ext>
+            </a:extLst>
+          </p:cNvPr>
+          <p:cNvCxnSpPr>
+            <a:stCxn id="10" idx="0"/>
+            <a:endCxn id="10" idx="2"/>
+          </p:cNvCxnSpPr>
+          <p:nvPr/>
+        </p:nvCxnSpPr>
+        <p:spPr>
+          <a:xfrm>
+            <a:off x="9896167" y="924233"/>
+            <a:ext cx="0" cy="817540"/>
+          </a:xfrm>
+          <a:prstGeom prst="line">
+            <a:avLst/>
+          </a:prstGeom>
+        </p:spPr>
+        <p:style>
+          <a:lnRef idx="1">
+            <a:schemeClr val="dk1"/>
+          </a:lnRef>
+          <a:fillRef idx="0">
+            <a:schemeClr val="dk1"/>
+          </a:fillRef>
+          <a:effectRef idx="0">
+            <a:schemeClr val="dk1"/>
+          </a:effectRef>
+          <a:fontRef idx="minor">
+            <a:schemeClr val="tx1"/>
+          </a:fontRef>
+        </p:style>
+      </p:cxnSp>
+    </p:spTree>
+    <p:extLst>
+      <p:ext uri="{BB962C8B-B14F-4D97-AF65-F5344CB8AC3E}">
+        <p14:creationId xmlns:p14="http://schemas.microsoft.com/office/powerpoint/2010/main" val="3409292903"/>
+      </p:ext>
+    </p:extLst>
+  </p:cSld>
+  <p:clrMapOvr>
+    <a:masterClrMapping/>
+  </p:clrMapOvr>
+</p:sld>
+</file>
+
 <file path=ppt/theme/theme1.xml><?xml version="1.0" encoding="utf-8"?>
 <a:theme xmlns:a="http://schemas.openxmlformats.org/drawingml/2006/main" name="Office">
   <a:themeElements>

</xml_diff>

<commit_message>
added some content to the powerpoint
</commit_message>
<xml_diff>
--- a/Linked_List.pptx
+++ b/Linked_List.pptx
@@ -6,6 +6,8 @@
   </p:sldMasterIdLst>
   <p:sldIdLst>
     <p:sldId id="256" r:id="rId2"/>
+    <p:sldId id="257" r:id="rId3"/>
+    <p:sldId id="258" r:id="rId4"/>
   </p:sldIdLst>
   <p:sldSz cx="12192000" cy="6858000"/>
   <p:notesSz cx="6858000" cy="9144000"/>
@@ -261,7 +263,7 @@
           <a:p>
             <a:fld id="{259D4BC2-8679-4FD1-863A-C8C72E7822AE}" type="datetimeFigureOut">
               <a:rPr lang="de-AT" smtClean="0"/>
-              <a:t>25.04.2022</a:t>
+              <a:t>26.04.2022</a:t>
             </a:fld>
             <a:endParaRPr lang="de-AT"/>
           </a:p>
@@ -461,7 +463,7 @@
           <a:p>
             <a:fld id="{259D4BC2-8679-4FD1-863A-C8C72E7822AE}" type="datetimeFigureOut">
               <a:rPr lang="de-AT" smtClean="0"/>
-              <a:t>25.04.2022</a:t>
+              <a:t>26.04.2022</a:t>
             </a:fld>
             <a:endParaRPr lang="de-AT"/>
           </a:p>
@@ -671,7 +673,7 @@
           <a:p>
             <a:fld id="{259D4BC2-8679-4FD1-863A-C8C72E7822AE}" type="datetimeFigureOut">
               <a:rPr lang="de-AT" smtClean="0"/>
-              <a:t>25.04.2022</a:t>
+              <a:t>26.04.2022</a:t>
             </a:fld>
             <a:endParaRPr lang="de-AT"/>
           </a:p>
@@ -871,7 +873,7 @@
           <a:p>
             <a:fld id="{259D4BC2-8679-4FD1-863A-C8C72E7822AE}" type="datetimeFigureOut">
               <a:rPr lang="de-AT" smtClean="0"/>
-              <a:t>25.04.2022</a:t>
+              <a:t>26.04.2022</a:t>
             </a:fld>
             <a:endParaRPr lang="de-AT"/>
           </a:p>
@@ -1147,7 +1149,7 @@
           <a:p>
             <a:fld id="{259D4BC2-8679-4FD1-863A-C8C72E7822AE}" type="datetimeFigureOut">
               <a:rPr lang="de-AT" smtClean="0"/>
-              <a:t>25.04.2022</a:t>
+              <a:t>26.04.2022</a:t>
             </a:fld>
             <a:endParaRPr lang="de-AT"/>
           </a:p>
@@ -1415,7 +1417,7 @@
           <a:p>
             <a:fld id="{259D4BC2-8679-4FD1-863A-C8C72E7822AE}" type="datetimeFigureOut">
               <a:rPr lang="de-AT" smtClean="0"/>
-              <a:t>25.04.2022</a:t>
+              <a:t>26.04.2022</a:t>
             </a:fld>
             <a:endParaRPr lang="de-AT"/>
           </a:p>
@@ -1830,7 +1832,7 @@
           <a:p>
             <a:fld id="{259D4BC2-8679-4FD1-863A-C8C72E7822AE}" type="datetimeFigureOut">
               <a:rPr lang="de-AT" smtClean="0"/>
-              <a:t>25.04.2022</a:t>
+              <a:t>26.04.2022</a:t>
             </a:fld>
             <a:endParaRPr lang="de-AT"/>
           </a:p>
@@ -1972,7 +1974,7 @@
           <a:p>
             <a:fld id="{259D4BC2-8679-4FD1-863A-C8C72E7822AE}" type="datetimeFigureOut">
               <a:rPr lang="de-AT" smtClean="0"/>
-              <a:t>25.04.2022</a:t>
+              <a:t>26.04.2022</a:t>
             </a:fld>
             <a:endParaRPr lang="de-AT"/>
           </a:p>
@@ -2085,7 +2087,7 @@
           <a:p>
             <a:fld id="{259D4BC2-8679-4FD1-863A-C8C72E7822AE}" type="datetimeFigureOut">
               <a:rPr lang="de-AT" smtClean="0"/>
-              <a:t>25.04.2022</a:t>
+              <a:t>26.04.2022</a:t>
             </a:fld>
             <a:endParaRPr lang="de-AT"/>
           </a:p>
@@ -2398,7 +2400,7 @@
           <a:p>
             <a:fld id="{259D4BC2-8679-4FD1-863A-C8C72E7822AE}" type="datetimeFigureOut">
               <a:rPr lang="de-AT" smtClean="0"/>
-              <a:t>25.04.2022</a:t>
+              <a:t>26.04.2022</a:t>
             </a:fld>
             <a:endParaRPr lang="de-AT"/>
           </a:p>
@@ -2687,7 +2689,7 @@
           <a:p>
             <a:fld id="{259D4BC2-8679-4FD1-863A-C8C72E7822AE}" type="datetimeFigureOut">
               <a:rPr lang="de-AT" smtClean="0"/>
-              <a:t>25.04.2022</a:t>
+              <a:t>26.04.2022</a:t>
             </a:fld>
             <a:endParaRPr lang="de-AT"/>
           </a:p>
@@ -2930,7 +2932,7 @@
           <a:p>
             <a:fld id="{259D4BC2-8679-4FD1-863A-C8C72E7822AE}" type="datetimeFigureOut">
               <a:rPr lang="de-AT" smtClean="0"/>
-              <a:t>25.04.2022</a:t>
+              <a:t>26.04.2022</a:t>
             </a:fld>
             <a:endParaRPr lang="de-AT"/>
           </a:p>
@@ -3455,47 +3457,6 @@
           </a:p>
         </p:txBody>
       </p:sp>
-      <p:cxnSp>
-        <p:nvCxnSpPr>
-          <p:cNvPr id="6" name="Straight Arrow Connector 5">
-            <a:extLst>
-              <a:ext uri="{FF2B5EF4-FFF2-40B4-BE49-F238E27FC236}">
-                <a16:creationId xmlns:a16="http://schemas.microsoft.com/office/drawing/2014/main" id="{24FC58E4-9DB0-4970-A88A-F7C213287C98}"/>
-              </a:ext>
-            </a:extLst>
-          </p:cNvPr>
-          <p:cNvCxnSpPr>
-            <a:stCxn id="4" idx="3"/>
-          </p:cNvCxnSpPr>
-          <p:nvPr/>
-        </p:nvCxnSpPr>
-        <p:spPr>
-          <a:xfrm flipV="1">
-            <a:off x="3382297" y="1317523"/>
-            <a:ext cx="1759974" cy="15492"/>
-          </a:xfrm>
-          <a:prstGeom prst="straightConnector1">
-            <a:avLst/>
-          </a:prstGeom>
-          <a:ln>
-            <a:tailEnd type="triangle"/>
-          </a:ln>
-        </p:spPr>
-        <p:style>
-          <a:lnRef idx="1">
-            <a:schemeClr val="accent1"/>
-          </a:lnRef>
-          <a:fillRef idx="0">
-            <a:schemeClr val="accent1"/>
-          </a:fillRef>
-          <a:effectRef idx="0">
-            <a:schemeClr val="accent1"/>
-          </a:effectRef>
-          <a:fontRef idx="minor">
-            <a:schemeClr val="tx1"/>
-          </a:fontRef>
-        </p:style>
-      </p:cxnSp>
       <p:sp>
         <p:nvSpPr>
           <p:cNvPr id="7" name="Rectangle 6">
@@ -3542,47 +3503,6 @@
           </a:p>
         </p:txBody>
       </p:sp>
-      <p:cxnSp>
-        <p:nvCxnSpPr>
-          <p:cNvPr id="9" name="Straight Arrow Connector 8">
-            <a:extLst>
-              <a:ext uri="{FF2B5EF4-FFF2-40B4-BE49-F238E27FC236}">
-                <a16:creationId xmlns:a16="http://schemas.microsoft.com/office/drawing/2014/main" id="{B40E232B-901C-4F33-85CD-B8E7C2071717}"/>
-              </a:ext>
-            </a:extLst>
-          </p:cNvPr>
-          <p:cNvCxnSpPr>
-            <a:stCxn id="7" idx="3"/>
-          </p:cNvCxnSpPr>
-          <p:nvPr/>
-        </p:nvCxnSpPr>
-        <p:spPr>
-          <a:xfrm flipV="1">
-            <a:off x="7079226" y="1333014"/>
-            <a:ext cx="1877961" cy="1"/>
-          </a:xfrm>
-          <a:prstGeom prst="straightConnector1">
-            <a:avLst/>
-          </a:prstGeom>
-          <a:ln>
-            <a:tailEnd type="triangle"/>
-          </a:ln>
-        </p:spPr>
-        <p:style>
-          <a:lnRef idx="1">
-            <a:schemeClr val="accent1"/>
-          </a:lnRef>
-          <a:fillRef idx="0">
-            <a:schemeClr val="accent1"/>
-          </a:fillRef>
-          <a:effectRef idx="0">
-            <a:schemeClr val="accent1"/>
-          </a:effectRef>
-          <a:fontRef idx="minor">
-            <a:schemeClr val="tx1"/>
-          </a:fontRef>
-        </p:style>
-      </p:cxnSp>
       <p:sp>
         <p:nvSpPr>
           <p:cNvPr id="10" name="Rectangle 9">
@@ -3597,7 +3517,7 @@
         </p:nvSpPr>
         <p:spPr>
           <a:xfrm>
-            <a:off x="8957186" y="924233"/>
+            <a:off x="8824454" y="924256"/>
             <a:ext cx="1877961" cy="817540"/>
           </a:xfrm>
           <a:prstGeom prst="rect">
@@ -3629,44 +3549,6 @@
           </a:p>
         </p:txBody>
       </p:sp>
-      <p:cxnSp>
-        <p:nvCxnSpPr>
-          <p:cNvPr id="12" name="Straight Connector 11">
-            <a:extLst>
-              <a:ext uri="{FF2B5EF4-FFF2-40B4-BE49-F238E27FC236}">
-                <a16:creationId xmlns:a16="http://schemas.microsoft.com/office/drawing/2014/main" id="{3E4F3B85-1299-4165-8B3D-5E5A685CB337}"/>
-              </a:ext>
-            </a:extLst>
-          </p:cNvPr>
-          <p:cNvCxnSpPr>
-            <a:stCxn id="4" idx="0"/>
-          </p:cNvCxnSpPr>
-          <p:nvPr/>
-        </p:nvCxnSpPr>
-        <p:spPr>
-          <a:xfrm>
-            <a:off x="2453148" y="924233"/>
-            <a:ext cx="914400" cy="914400"/>
-          </a:xfrm>
-          <a:prstGeom prst="line">
-            <a:avLst/>
-          </a:prstGeom>
-        </p:spPr>
-        <p:style>
-          <a:lnRef idx="1">
-            <a:schemeClr val="accent1"/>
-          </a:lnRef>
-          <a:fillRef idx="0">
-            <a:schemeClr val="accent1"/>
-          </a:fillRef>
-          <a:effectRef idx="0">
-            <a:schemeClr val="accent1"/>
-          </a:effectRef>
-          <a:fontRef idx="minor">
-            <a:schemeClr val="tx1"/>
-          </a:fontRef>
-        </p:style>
-      </p:cxnSp>
       <p:cxnSp>
         <p:nvCxnSpPr>
           <p:cNvPr id="14" name="Straight Connector 13">
@@ -3762,7 +3644,7 @@
         </p:nvCxnSpPr>
         <p:spPr>
           <a:xfrm>
-            <a:off x="9896167" y="924233"/>
+            <a:off x="9763435" y="924256"/>
             <a:ext cx="0" cy="817540"/>
           </a:xfrm>
           <a:prstGeom prst="line">
@@ -3784,10 +3666,1943 @@
           </a:fontRef>
         </p:style>
       </p:cxnSp>
+      <p:sp>
+        <p:nvSpPr>
+          <p:cNvPr id="5" name="TextBox 4">
+            <a:extLst>
+              <a:ext uri="{FF2B5EF4-FFF2-40B4-BE49-F238E27FC236}">
+                <a16:creationId xmlns:a16="http://schemas.microsoft.com/office/drawing/2014/main" id="{ADFFCBD2-7D7A-4A8E-A414-A79A4062A958}"/>
+              </a:ext>
+            </a:extLst>
+          </p:cNvPr>
+          <p:cNvSpPr txBox="1"/>
+          <p:nvPr/>
+        </p:nvSpPr>
+        <p:spPr>
+          <a:xfrm>
+            <a:off x="1607576" y="1148337"/>
+            <a:ext cx="938979" cy="369332"/>
+          </a:xfrm>
+          <a:prstGeom prst="rect">
+            <a:avLst/>
+          </a:prstGeom>
+          <a:noFill/>
+        </p:spPr>
+        <p:txBody>
+          <a:bodyPr wrap="square" rtlCol="0">
+            <a:spAutoFit/>
+          </a:bodyPr>
+          <a:lstStyle/>
+          <a:p>
+            <a:r>
+              <a:rPr lang="en-GB" dirty="0"/>
+              <a:t>Data 1</a:t>
+            </a:r>
+            <a:endParaRPr lang="LID4096" dirty="0"/>
+          </a:p>
+        </p:txBody>
+      </p:sp>
+      <p:sp>
+        <p:nvSpPr>
+          <p:cNvPr id="8" name="Arrow: Right 7">
+            <a:extLst>
+              <a:ext uri="{FF2B5EF4-FFF2-40B4-BE49-F238E27FC236}">
+                <a16:creationId xmlns:a16="http://schemas.microsoft.com/office/drawing/2014/main" id="{4BA404DC-0318-4F92-8F43-324CB919DFAB}"/>
+              </a:ext>
+            </a:extLst>
+          </p:cNvPr>
+          <p:cNvSpPr/>
+          <p:nvPr/>
+        </p:nvSpPr>
+        <p:spPr>
+          <a:xfrm>
+            <a:off x="3389671" y="1122363"/>
+            <a:ext cx="1745225" cy="408770"/>
+          </a:xfrm>
+          <a:prstGeom prst="rightArrow">
+            <a:avLst/>
+          </a:prstGeom>
+        </p:spPr>
+        <p:style>
+          <a:lnRef idx="1">
+            <a:schemeClr val="dk1"/>
+          </a:lnRef>
+          <a:fillRef idx="2">
+            <a:schemeClr val="dk1"/>
+          </a:fillRef>
+          <a:effectRef idx="1">
+            <a:schemeClr val="dk1"/>
+          </a:effectRef>
+          <a:fontRef idx="minor">
+            <a:schemeClr val="dk1"/>
+          </a:fontRef>
+        </p:style>
+        <p:txBody>
+          <a:bodyPr rtlCol="0" anchor="ctr"/>
+          <a:lstStyle/>
+          <a:p>
+            <a:pPr algn="ctr"/>
+            <a:endParaRPr lang="LID4096"/>
+          </a:p>
+        </p:txBody>
+      </p:sp>
+      <p:pic>
+        <p:nvPicPr>
+          <p:cNvPr id="11" name="Picture 10">
+            <a:extLst>
+              <a:ext uri="{FF2B5EF4-FFF2-40B4-BE49-F238E27FC236}">
+                <a16:creationId xmlns:a16="http://schemas.microsoft.com/office/drawing/2014/main" id="{14F1C2A8-BF80-4F9C-8C59-28AD01D9C643}"/>
+              </a:ext>
+            </a:extLst>
+          </p:cNvPr>
+          <p:cNvPicPr>
+            <a:picLocks noChangeAspect="1"/>
+          </p:cNvPicPr>
+          <p:nvPr/>
+        </p:nvPicPr>
+        <p:blipFill>
+          <a:blip r:embed="rId2"/>
+          <a:stretch>
+            <a:fillRect/>
+          </a:stretch>
+        </p:blipFill>
+        <p:spPr>
+          <a:xfrm>
+            <a:off x="7086601" y="1113601"/>
+            <a:ext cx="1755800" cy="426757"/>
+          </a:xfrm>
+          <a:prstGeom prst="rect">
+            <a:avLst/>
+          </a:prstGeom>
+        </p:spPr>
+      </p:pic>
+      <p:sp>
+        <p:nvSpPr>
+          <p:cNvPr id="17" name="TextBox 16">
+            <a:extLst>
+              <a:ext uri="{FF2B5EF4-FFF2-40B4-BE49-F238E27FC236}">
+                <a16:creationId xmlns:a16="http://schemas.microsoft.com/office/drawing/2014/main" id="{B1FCF8EF-567D-4E55-8307-89595C1F5703}"/>
+              </a:ext>
+            </a:extLst>
+          </p:cNvPr>
+          <p:cNvSpPr txBox="1"/>
+          <p:nvPr/>
+        </p:nvSpPr>
+        <p:spPr>
+          <a:xfrm>
+            <a:off x="5229420" y="1142082"/>
+            <a:ext cx="805501" cy="369332"/>
+          </a:xfrm>
+          <a:prstGeom prst="rect">
+            <a:avLst/>
+          </a:prstGeom>
+          <a:noFill/>
+        </p:spPr>
+        <p:txBody>
+          <a:bodyPr wrap="square" rtlCol="0">
+            <a:spAutoFit/>
+          </a:bodyPr>
+          <a:lstStyle/>
+          <a:p>
+            <a:r>
+              <a:rPr lang="en-GB" dirty="0"/>
+              <a:t>Data 2</a:t>
+            </a:r>
+            <a:endParaRPr lang="LID4096" dirty="0"/>
+          </a:p>
+        </p:txBody>
+      </p:sp>
+      <p:sp>
+        <p:nvSpPr>
+          <p:cNvPr id="19" name="TextBox 18">
+            <a:extLst>
+              <a:ext uri="{FF2B5EF4-FFF2-40B4-BE49-F238E27FC236}">
+                <a16:creationId xmlns:a16="http://schemas.microsoft.com/office/drawing/2014/main" id="{DC804176-AF8A-4E7E-8628-08CE57392427}"/>
+              </a:ext>
+            </a:extLst>
+          </p:cNvPr>
+          <p:cNvSpPr txBox="1"/>
+          <p:nvPr/>
+        </p:nvSpPr>
+        <p:spPr>
+          <a:xfrm>
+            <a:off x="2553074" y="1003582"/>
+            <a:ext cx="752161" cy="646331"/>
+          </a:xfrm>
+          <a:prstGeom prst="rect">
+            <a:avLst/>
+          </a:prstGeom>
+          <a:noFill/>
+        </p:spPr>
+        <p:txBody>
+          <a:bodyPr wrap="square" rtlCol="0">
+            <a:spAutoFit/>
+          </a:bodyPr>
+          <a:lstStyle/>
+          <a:p>
+            <a:r>
+              <a:rPr lang="en-GB" dirty="0"/>
+              <a:t>Next Node</a:t>
+            </a:r>
+            <a:endParaRPr lang="LID4096" dirty="0"/>
+          </a:p>
+        </p:txBody>
+      </p:sp>
+      <p:sp>
+        <p:nvSpPr>
+          <p:cNvPr id="20" name="TextBox 19">
+            <a:extLst>
+              <a:ext uri="{FF2B5EF4-FFF2-40B4-BE49-F238E27FC236}">
+                <a16:creationId xmlns:a16="http://schemas.microsoft.com/office/drawing/2014/main" id="{04BBD96A-BD40-4A55-8B32-E9BA0FEBD621}"/>
+              </a:ext>
+            </a:extLst>
+          </p:cNvPr>
+          <p:cNvSpPr txBox="1"/>
+          <p:nvPr/>
+        </p:nvSpPr>
+        <p:spPr>
+          <a:xfrm>
+            <a:off x="6245339" y="1003582"/>
+            <a:ext cx="921036" cy="646331"/>
+          </a:xfrm>
+          <a:prstGeom prst="rect">
+            <a:avLst/>
+          </a:prstGeom>
+          <a:noFill/>
+        </p:spPr>
+        <p:txBody>
+          <a:bodyPr wrap="square" rtlCol="0">
+            <a:spAutoFit/>
+          </a:bodyPr>
+          <a:lstStyle/>
+          <a:p>
+            <a:r>
+              <a:rPr lang="en-GB" dirty="0"/>
+              <a:t>Next Node</a:t>
+            </a:r>
+            <a:endParaRPr lang="LID4096" dirty="0"/>
+          </a:p>
+        </p:txBody>
+      </p:sp>
+      <p:sp>
+        <p:nvSpPr>
+          <p:cNvPr id="21" name="TextBox 20">
+            <a:extLst>
+              <a:ext uri="{FF2B5EF4-FFF2-40B4-BE49-F238E27FC236}">
+                <a16:creationId xmlns:a16="http://schemas.microsoft.com/office/drawing/2014/main" id="{4E143BD7-21CB-4D9E-A3E1-8BF1216A93BB}"/>
+              </a:ext>
+            </a:extLst>
+          </p:cNvPr>
+          <p:cNvSpPr txBox="1"/>
+          <p:nvPr/>
+        </p:nvSpPr>
+        <p:spPr>
+          <a:xfrm>
+            <a:off x="9832743" y="1012344"/>
+            <a:ext cx="911085" cy="646331"/>
+          </a:xfrm>
+          <a:prstGeom prst="rect">
+            <a:avLst/>
+          </a:prstGeom>
+          <a:noFill/>
+        </p:spPr>
+        <p:txBody>
+          <a:bodyPr wrap="square" rtlCol="0">
+            <a:spAutoFit/>
+          </a:bodyPr>
+          <a:lstStyle/>
+          <a:p>
+            <a:r>
+              <a:rPr lang="en-GB" dirty="0"/>
+              <a:t>Next Node</a:t>
+            </a:r>
+            <a:endParaRPr lang="LID4096" dirty="0"/>
+          </a:p>
+        </p:txBody>
+      </p:sp>
+      <p:sp>
+        <p:nvSpPr>
+          <p:cNvPr id="22" name="TextBox 21">
+            <a:extLst>
+              <a:ext uri="{FF2B5EF4-FFF2-40B4-BE49-F238E27FC236}">
+                <a16:creationId xmlns:a16="http://schemas.microsoft.com/office/drawing/2014/main" id="{F3FC1726-99F4-428F-9E92-8014B580A446}"/>
+              </a:ext>
+            </a:extLst>
+          </p:cNvPr>
+          <p:cNvSpPr txBox="1"/>
+          <p:nvPr/>
+        </p:nvSpPr>
+        <p:spPr>
+          <a:xfrm>
+            <a:off x="8901640" y="1142081"/>
+            <a:ext cx="896449" cy="369332"/>
+          </a:xfrm>
+          <a:prstGeom prst="rect">
+            <a:avLst/>
+          </a:prstGeom>
+          <a:noFill/>
+        </p:spPr>
+        <p:txBody>
+          <a:bodyPr wrap="square" rtlCol="0">
+            <a:spAutoFit/>
+          </a:bodyPr>
+          <a:lstStyle/>
+          <a:p>
+            <a:r>
+              <a:rPr lang="en-GB" dirty="0"/>
+              <a:t>Data 3</a:t>
+            </a:r>
+            <a:endParaRPr lang="LID4096" dirty="0"/>
+          </a:p>
+        </p:txBody>
+      </p:sp>
+      <p:cxnSp>
+        <p:nvCxnSpPr>
+          <p:cNvPr id="24" name="Straight Arrow Connector 23">
+            <a:extLst>
+              <a:ext uri="{FF2B5EF4-FFF2-40B4-BE49-F238E27FC236}">
+                <a16:creationId xmlns:a16="http://schemas.microsoft.com/office/drawing/2014/main" id="{48031B70-56B3-45D5-8BB2-EF938E494B17}"/>
+              </a:ext>
+            </a:extLst>
+          </p:cNvPr>
+          <p:cNvCxnSpPr>
+            <a:cxnSpLocks/>
+            <a:endCxn id="4" idx="1"/>
+          </p:cNvCxnSpPr>
+          <p:nvPr/>
+        </p:nvCxnSpPr>
+        <p:spPr>
+          <a:xfrm>
+            <a:off x="1097830" y="832158"/>
+            <a:ext cx="426170" cy="500857"/>
+          </a:xfrm>
+          <a:prstGeom prst="straightConnector1">
+            <a:avLst/>
+          </a:prstGeom>
+          <a:ln>
+            <a:tailEnd type="triangle"/>
+          </a:ln>
+        </p:spPr>
+        <p:style>
+          <a:lnRef idx="1">
+            <a:schemeClr val="accent1"/>
+          </a:lnRef>
+          <a:fillRef idx="0">
+            <a:schemeClr val="accent1"/>
+          </a:fillRef>
+          <a:effectRef idx="0">
+            <a:schemeClr val="accent1"/>
+          </a:effectRef>
+          <a:fontRef idx="minor">
+            <a:schemeClr val="tx1"/>
+          </a:fontRef>
+        </p:style>
+      </p:cxnSp>
+      <p:sp>
+        <p:nvSpPr>
+          <p:cNvPr id="26" name="TextBox 25">
+            <a:extLst>
+              <a:ext uri="{FF2B5EF4-FFF2-40B4-BE49-F238E27FC236}">
+                <a16:creationId xmlns:a16="http://schemas.microsoft.com/office/drawing/2014/main" id="{96355BA7-4471-4883-BACE-8B066F422E29}"/>
+              </a:ext>
+            </a:extLst>
+          </p:cNvPr>
+          <p:cNvSpPr txBox="1"/>
+          <p:nvPr/>
+        </p:nvSpPr>
+        <p:spPr>
+          <a:xfrm>
+            <a:off x="690717" y="493662"/>
+            <a:ext cx="1386348" cy="370042"/>
+          </a:xfrm>
+          <a:prstGeom prst="rect">
+            <a:avLst/>
+          </a:prstGeom>
+          <a:noFill/>
+        </p:spPr>
+        <p:txBody>
+          <a:bodyPr wrap="square" rtlCol="0">
+            <a:spAutoFit/>
+          </a:bodyPr>
+          <a:lstStyle/>
+          <a:p>
+            <a:r>
+              <a:rPr lang="en-GB" dirty="0"/>
+              <a:t>_head</a:t>
+            </a:r>
+            <a:endParaRPr lang="LID4096" dirty="0"/>
+          </a:p>
+        </p:txBody>
+      </p:sp>
+      <p:sp>
+        <p:nvSpPr>
+          <p:cNvPr id="29" name="Rectangle 28">
+            <a:extLst>
+              <a:ext uri="{FF2B5EF4-FFF2-40B4-BE49-F238E27FC236}">
+                <a16:creationId xmlns:a16="http://schemas.microsoft.com/office/drawing/2014/main" id="{326E4D36-2378-4536-AF48-0225B5AE682E}"/>
+              </a:ext>
+            </a:extLst>
+          </p:cNvPr>
+          <p:cNvSpPr/>
+          <p:nvPr/>
+        </p:nvSpPr>
+        <p:spPr>
+          <a:xfrm>
+            <a:off x="0" y="6145161"/>
+            <a:ext cx="12192000" cy="712839"/>
+          </a:xfrm>
+          <a:prstGeom prst="rect">
+            <a:avLst/>
+          </a:prstGeom>
+        </p:spPr>
+        <p:style>
+          <a:lnRef idx="2">
+            <a:schemeClr val="dk1">
+              <a:shade val="50000"/>
+            </a:schemeClr>
+          </a:lnRef>
+          <a:fillRef idx="1">
+            <a:schemeClr val="dk1"/>
+          </a:fillRef>
+          <a:effectRef idx="0">
+            <a:schemeClr val="dk1"/>
+          </a:effectRef>
+          <a:fontRef idx="minor">
+            <a:schemeClr val="lt1"/>
+          </a:fontRef>
+        </p:style>
+        <p:txBody>
+          <a:bodyPr rtlCol="0" anchor="ctr"/>
+          <a:lstStyle/>
+          <a:p>
+            <a:pPr algn="ctr"/>
+            <a:endParaRPr lang="LID4096"/>
+          </a:p>
+        </p:txBody>
+      </p:sp>
+      <p:pic>
+        <p:nvPicPr>
+          <p:cNvPr id="28" name="Picture 27">
+            <a:extLst>
+              <a:ext uri="{FF2B5EF4-FFF2-40B4-BE49-F238E27FC236}">
+                <a16:creationId xmlns:a16="http://schemas.microsoft.com/office/drawing/2014/main" id="{85943DC5-B3B7-4C10-921E-EA4414B87B17}"/>
+              </a:ext>
+            </a:extLst>
+          </p:cNvPr>
+          <p:cNvPicPr>
+            <a:picLocks noChangeAspect="1"/>
+          </p:cNvPicPr>
+          <p:nvPr/>
+        </p:nvPicPr>
+        <p:blipFill rotWithShape="1">
+          <a:blip r:embed="rId3"/>
+          <a:srcRect l="2258" t="40288" r="-2258" b="40501"/>
+          <a:stretch/>
+        </p:blipFill>
+        <p:spPr>
+          <a:xfrm>
+            <a:off x="3017460" y="6183452"/>
+            <a:ext cx="6034921" cy="636255"/>
+          </a:xfrm>
+          <a:prstGeom prst="rect">
+            <a:avLst/>
+          </a:prstGeom>
+        </p:spPr>
+      </p:pic>
     </p:spTree>
     <p:extLst>
       <p:ext uri="{BB962C8B-B14F-4D97-AF65-F5344CB8AC3E}">
         <p14:creationId xmlns:p14="http://schemas.microsoft.com/office/powerpoint/2010/main" val="3409292903"/>
+      </p:ext>
+    </p:extLst>
+  </p:cSld>
+  <p:clrMapOvr>
+    <a:masterClrMapping/>
+  </p:clrMapOvr>
+</p:sld>
+</file>
+
+<file path=ppt/slides/slide2.xml><?xml version="1.0" encoding="utf-8"?>
+<p:sld xmlns:a="http://schemas.openxmlformats.org/drawingml/2006/main" xmlns:r="http://schemas.openxmlformats.org/officeDocument/2006/relationships" xmlns:p="http://schemas.openxmlformats.org/presentationml/2006/main">
+  <p:cSld>
+    <p:spTree>
+      <p:nvGrpSpPr>
+        <p:cNvPr id="1" name=""/>
+        <p:cNvGrpSpPr/>
+        <p:nvPr/>
+      </p:nvGrpSpPr>
+      <p:grpSpPr>
+        <a:xfrm>
+          <a:off x="0" y="0"/>
+          <a:ext cx="0" cy="0"/>
+          <a:chOff x="0" y="0"/>
+          <a:chExt cx="0" cy="0"/>
+        </a:xfrm>
+      </p:grpSpPr>
+      <p:sp>
+        <p:nvSpPr>
+          <p:cNvPr id="2" name="Title 1">
+            <a:extLst>
+              <a:ext uri="{FF2B5EF4-FFF2-40B4-BE49-F238E27FC236}">
+                <a16:creationId xmlns:a16="http://schemas.microsoft.com/office/drawing/2014/main" id="{7C54D2FD-3E79-4B84-866C-A7F1B2EEA9A0}"/>
+              </a:ext>
+            </a:extLst>
+          </p:cNvPr>
+          <p:cNvSpPr>
+            <a:spLocks noGrp="1"/>
+          </p:cNvSpPr>
+          <p:nvPr>
+            <p:ph type="title"/>
+          </p:nvPr>
+        </p:nvSpPr>
+        <p:spPr/>
+        <p:txBody>
+          <a:bodyPr/>
+          <a:lstStyle/>
+          <a:p>
+            <a:r>
+              <a:rPr lang="en-GB" dirty="0"/>
+              <a:t>Linked Lists - Basics</a:t>
+            </a:r>
+            <a:endParaRPr lang="LID4096" dirty="0"/>
+          </a:p>
+        </p:txBody>
+      </p:sp>
+      <p:sp>
+        <p:nvSpPr>
+          <p:cNvPr id="3" name="Content Placeholder 2">
+            <a:extLst>
+              <a:ext uri="{FF2B5EF4-FFF2-40B4-BE49-F238E27FC236}">
+                <a16:creationId xmlns:a16="http://schemas.microsoft.com/office/drawing/2014/main" id="{D0BB9C76-0BA4-4E86-9E44-AA705B0EBF82}"/>
+              </a:ext>
+            </a:extLst>
+          </p:cNvPr>
+          <p:cNvSpPr>
+            <a:spLocks noGrp="1"/>
+          </p:cNvSpPr>
+          <p:nvPr>
+            <p:ph idx="1"/>
+          </p:nvPr>
+        </p:nvSpPr>
+        <p:spPr>
+          <a:xfrm>
+            <a:off x="838200" y="1695452"/>
+            <a:ext cx="10515600" cy="4351338"/>
+          </a:xfrm>
+        </p:spPr>
+        <p:txBody>
+          <a:bodyPr/>
+          <a:lstStyle/>
+          <a:p>
+            <a:r>
+              <a:rPr lang="en-GB" dirty="0"/>
+              <a:t>A Linked Lists is a </a:t>
+            </a:r>
+            <a:r>
+              <a:rPr lang="en-GB" b="1" dirty="0"/>
+              <a:t>data structure</a:t>
+            </a:r>
+            <a:r>
+              <a:rPr lang="en-GB" dirty="0"/>
+              <a:t>, which saves its data non-sequentially</a:t>
+            </a:r>
+            <a:endParaRPr lang="en-US" b="0" i="0" dirty="0">
+              <a:solidFill>
+                <a:srgbClr val="4A4A4A"/>
+              </a:solidFill>
+              <a:effectLst/>
+              <a:latin typeface="Open Sans" panose="020B0604020202020204" pitchFamily="34" charset="0"/>
+            </a:endParaRPr>
+          </a:p>
+          <a:p>
+            <a:r>
+              <a:rPr lang="en-GB" dirty="0"/>
+              <a:t>The beginning of the List is the </a:t>
+            </a:r>
+            <a:r>
+              <a:rPr lang="en-GB" b="1" dirty="0"/>
+              <a:t>head</a:t>
+            </a:r>
+            <a:r>
+              <a:rPr lang="en-GB" dirty="0"/>
+              <a:t> (_head)</a:t>
+            </a:r>
+          </a:p>
+          <a:p>
+            <a:r>
+              <a:rPr lang="en-GB" dirty="0"/>
+              <a:t>Each node of the list contains the address of the </a:t>
+            </a:r>
+            <a:r>
+              <a:rPr lang="en-GB" b="1" dirty="0"/>
+              <a:t>next</a:t>
+            </a:r>
+            <a:r>
+              <a:rPr lang="en-GB" dirty="0"/>
+              <a:t> </a:t>
+            </a:r>
+            <a:r>
+              <a:rPr lang="en-GB" b="1" dirty="0"/>
+              <a:t>node</a:t>
+            </a:r>
+            <a:r>
+              <a:rPr lang="en-GB" dirty="0"/>
+              <a:t> and the </a:t>
+            </a:r>
+            <a:r>
+              <a:rPr lang="en-GB" b="1" dirty="0"/>
+              <a:t>data</a:t>
+            </a:r>
+            <a:r>
+              <a:rPr lang="en-GB" dirty="0"/>
+              <a:t> of the node</a:t>
+            </a:r>
+          </a:p>
+          <a:p>
+            <a:r>
+              <a:rPr lang="en-GB" dirty="0"/>
+              <a:t>The next-node of the last node is null (list-end)</a:t>
+            </a:r>
+          </a:p>
+          <a:p>
+            <a:endParaRPr lang="LID4096" dirty="0"/>
+          </a:p>
+        </p:txBody>
+      </p:sp>
+      <p:sp>
+        <p:nvSpPr>
+          <p:cNvPr id="4" name="Rectangle 3">
+            <a:extLst>
+              <a:ext uri="{FF2B5EF4-FFF2-40B4-BE49-F238E27FC236}">
+                <a16:creationId xmlns:a16="http://schemas.microsoft.com/office/drawing/2014/main" id="{1F6A5520-3E5F-49F2-87CF-77ACAFE2ADDE}"/>
+              </a:ext>
+            </a:extLst>
+          </p:cNvPr>
+          <p:cNvSpPr/>
+          <p:nvPr/>
+        </p:nvSpPr>
+        <p:spPr>
+          <a:xfrm>
+            <a:off x="1669026" y="5229227"/>
+            <a:ext cx="1858297" cy="817563"/>
+          </a:xfrm>
+          <a:prstGeom prst="rect">
+            <a:avLst/>
+          </a:prstGeom>
+        </p:spPr>
+        <p:style>
+          <a:lnRef idx="2">
+            <a:schemeClr val="accent1">
+              <a:shade val="50000"/>
+            </a:schemeClr>
+          </a:lnRef>
+          <a:fillRef idx="1">
+            <a:schemeClr val="accent1"/>
+          </a:fillRef>
+          <a:effectRef idx="0">
+            <a:schemeClr val="accent1"/>
+          </a:effectRef>
+          <a:fontRef idx="minor">
+            <a:schemeClr val="lt1"/>
+          </a:fontRef>
+        </p:style>
+        <p:txBody>
+          <a:bodyPr rtlCol="0" anchor="ctr"/>
+          <a:lstStyle/>
+          <a:p>
+            <a:pPr algn="ctr"/>
+            <a:endParaRPr lang="LID4096"/>
+          </a:p>
+        </p:txBody>
+      </p:sp>
+      <p:sp>
+        <p:nvSpPr>
+          <p:cNvPr id="5" name="Rectangle 4">
+            <a:extLst>
+              <a:ext uri="{FF2B5EF4-FFF2-40B4-BE49-F238E27FC236}">
+                <a16:creationId xmlns:a16="http://schemas.microsoft.com/office/drawing/2014/main" id="{B5E9E561-61C3-411A-9F39-D0C914A84531}"/>
+              </a:ext>
+            </a:extLst>
+          </p:cNvPr>
+          <p:cNvSpPr/>
+          <p:nvPr/>
+        </p:nvSpPr>
+        <p:spPr>
+          <a:xfrm>
+            <a:off x="5272548" y="5214914"/>
+            <a:ext cx="1936955" cy="817563"/>
+          </a:xfrm>
+          <a:prstGeom prst="rect">
+            <a:avLst/>
+          </a:prstGeom>
+        </p:spPr>
+        <p:style>
+          <a:lnRef idx="2">
+            <a:schemeClr val="accent1">
+              <a:shade val="50000"/>
+            </a:schemeClr>
+          </a:lnRef>
+          <a:fillRef idx="1">
+            <a:schemeClr val="accent1"/>
+          </a:fillRef>
+          <a:effectRef idx="0">
+            <a:schemeClr val="accent1"/>
+          </a:effectRef>
+          <a:fontRef idx="minor">
+            <a:schemeClr val="lt1"/>
+          </a:fontRef>
+        </p:style>
+        <p:txBody>
+          <a:bodyPr rtlCol="0" anchor="ctr"/>
+          <a:lstStyle/>
+          <a:p>
+            <a:pPr algn="ctr"/>
+            <a:endParaRPr lang="LID4096"/>
+          </a:p>
+        </p:txBody>
+      </p:sp>
+      <p:sp>
+        <p:nvSpPr>
+          <p:cNvPr id="6" name="Rectangle 5">
+            <a:extLst>
+              <a:ext uri="{FF2B5EF4-FFF2-40B4-BE49-F238E27FC236}">
+                <a16:creationId xmlns:a16="http://schemas.microsoft.com/office/drawing/2014/main" id="{88E81054-FA50-4F0E-A6B5-D3549A93C769}"/>
+              </a:ext>
+            </a:extLst>
+          </p:cNvPr>
+          <p:cNvSpPr/>
+          <p:nvPr/>
+        </p:nvSpPr>
+        <p:spPr>
+          <a:xfrm>
+            <a:off x="8944894" y="5229250"/>
+            <a:ext cx="1877961" cy="817540"/>
+          </a:xfrm>
+          <a:prstGeom prst="rect">
+            <a:avLst/>
+          </a:prstGeom>
+        </p:spPr>
+        <p:style>
+          <a:lnRef idx="2">
+            <a:schemeClr val="accent1">
+              <a:shade val="50000"/>
+            </a:schemeClr>
+          </a:lnRef>
+          <a:fillRef idx="1">
+            <a:schemeClr val="accent1"/>
+          </a:fillRef>
+          <a:effectRef idx="0">
+            <a:schemeClr val="accent1"/>
+          </a:effectRef>
+          <a:fontRef idx="minor">
+            <a:schemeClr val="lt1"/>
+          </a:fontRef>
+        </p:style>
+        <p:txBody>
+          <a:bodyPr rtlCol="0" anchor="ctr"/>
+          <a:lstStyle/>
+          <a:p>
+            <a:pPr algn="ctr"/>
+            <a:endParaRPr lang="LID4096"/>
+          </a:p>
+        </p:txBody>
+      </p:sp>
+      <p:cxnSp>
+        <p:nvCxnSpPr>
+          <p:cNvPr id="7" name="Straight Connector 6">
+            <a:extLst>
+              <a:ext uri="{FF2B5EF4-FFF2-40B4-BE49-F238E27FC236}">
+                <a16:creationId xmlns:a16="http://schemas.microsoft.com/office/drawing/2014/main" id="{A45FC753-2B11-4BE4-B9E5-28AE5E8DFBEF}"/>
+              </a:ext>
+            </a:extLst>
+          </p:cNvPr>
+          <p:cNvCxnSpPr>
+            <a:stCxn id="4" idx="0"/>
+            <a:endCxn id="4" idx="2"/>
+          </p:cNvCxnSpPr>
+          <p:nvPr/>
+        </p:nvCxnSpPr>
+        <p:spPr>
+          <a:xfrm>
+            <a:off x="2598175" y="5229227"/>
+            <a:ext cx="0" cy="817563"/>
+          </a:xfrm>
+          <a:prstGeom prst="line">
+            <a:avLst/>
+          </a:prstGeom>
+        </p:spPr>
+        <p:style>
+          <a:lnRef idx="1">
+            <a:schemeClr val="dk1"/>
+          </a:lnRef>
+          <a:fillRef idx="0">
+            <a:schemeClr val="dk1"/>
+          </a:fillRef>
+          <a:effectRef idx="0">
+            <a:schemeClr val="dk1"/>
+          </a:effectRef>
+          <a:fontRef idx="minor">
+            <a:schemeClr val="tx1"/>
+          </a:fontRef>
+        </p:style>
+      </p:cxnSp>
+      <p:cxnSp>
+        <p:nvCxnSpPr>
+          <p:cNvPr id="8" name="Straight Connector 7">
+            <a:extLst>
+              <a:ext uri="{FF2B5EF4-FFF2-40B4-BE49-F238E27FC236}">
+                <a16:creationId xmlns:a16="http://schemas.microsoft.com/office/drawing/2014/main" id="{7477257F-BD9A-49AD-AF54-E35B82739D6F}"/>
+              </a:ext>
+            </a:extLst>
+          </p:cNvPr>
+          <p:cNvCxnSpPr>
+            <a:stCxn id="5" idx="0"/>
+            <a:endCxn id="5" idx="2"/>
+          </p:cNvCxnSpPr>
+          <p:nvPr/>
+        </p:nvCxnSpPr>
+        <p:spPr>
+          <a:xfrm>
+            <a:off x="6241026" y="5214914"/>
+            <a:ext cx="0" cy="817563"/>
+          </a:xfrm>
+          <a:prstGeom prst="line">
+            <a:avLst/>
+          </a:prstGeom>
+        </p:spPr>
+        <p:style>
+          <a:lnRef idx="1">
+            <a:schemeClr val="dk1"/>
+          </a:lnRef>
+          <a:fillRef idx="0">
+            <a:schemeClr val="dk1"/>
+          </a:fillRef>
+          <a:effectRef idx="0">
+            <a:schemeClr val="dk1"/>
+          </a:effectRef>
+          <a:fontRef idx="minor">
+            <a:schemeClr val="tx1"/>
+          </a:fontRef>
+        </p:style>
+      </p:cxnSp>
+      <p:cxnSp>
+        <p:nvCxnSpPr>
+          <p:cNvPr id="9" name="Straight Connector 8">
+            <a:extLst>
+              <a:ext uri="{FF2B5EF4-FFF2-40B4-BE49-F238E27FC236}">
+                <a16:creationId xmlns:a16="http://schemas.microsoft.com/office/drawing/2014/main" id="{A5FAD3CA-CFC2-4597-9CE7-9569E08E3F98}"/>
+              </a:ext>
+            </a:extLst>
+          </p:cNvPr>
+          <p:cNvCxnSpPr>
+            <a:stCxn id="6" idx="0"/>
+            <a:endCxn id="6" idx="2"/>
+          </p:cNvCxnSpPr>
+          <p:nvPr/>
+        </p:nvCxnSpPr>
+        <p:spPr>
+          <a:xfrm>
+            <a:off x="9883875" y="5229250"/>
+            <a:ext cx="0" cy="817540"/>
+          </a:xfrm>
+          <a:prstGeom prst="line">
+            <a:avLst/>
+          </a:prstGeom>
+        </p:spPr>
+        <p:style>
+          <a:lnRef idx="1">
+            <a:schemeClr val="dk1"/>
+          </a:lnRef>
+          <a:fillRef idx="0">
+            <a:schemeClr val="dk1"/>
+          </a:fillRef>
+          <a:effectRef idx="0">
+            <a:schemeClr val="dk1"/>
+          </a:effectRef>
+          <a:fontRef idx="minor">
+            <a:schemeClr val="tx1"/>
+          </a:fontRef>
+        </p:style>
+      </p:cxnSp>
+      <p:sp>
+        <p:nvSpPr>
+          <p:cNvPr id="10" name="TextBox 9">
+            <a:extLst>
+              <a:ext uri="{FF2B5EF4-FFF2-40B4-BE49-F238E27FC236}">
+                <a16:creationId xmlns:a16="http://schemas.microsoft.com/office/drawing/2014/main" id="{C37BD078-AC6E-4956-AD05-B0043B3C68F8}"/>
+              </a:ext>
+            </a:extLst>
+          </p:cNvPr>
+          <p:cNvSpPr txBox="1"/>
+          <p:nvPr/>
+        </p:nvSpPr>
+        <p:spPr>
+          <a:xfrm>
+            <a:off x="1766123" y="5444995"/>
+            <a:ext cx="938979" cy="369332"/>
+          </a:xfrm>
+          <a:prstGeom prst="rect">
+            <a:avLst/>
+          </a:prstGeom>
+          <a:noFill/>
+        </p:spPr>
+        <p:txBody>
+          <a:bodyPr wrap="square" rtlCol="0">
+            <a:spAutoFit/>
+          </a:bodyPr>
+          <a:lstStyle/>
+          <a:p>
+            <a:r>
+              <a:rPr lang="en-GB" dirty="0"/>
+              <a:t>Data 1</a:t>
+            </a:r>
+            <a:endParaRPr lang="LID4096" dirty="0"/>
+          </a:p>
+        </p:txBody>
+      </p:sp>
+      <p:sp>
+        <p:nvSpPr>
+          <p:cNvPr id="11" name="Arrow: Right 10">
+            <a:extLst>
+              <a:ext uri="{FF2B5EF4-FFF2-40B4-BE49-F238E27FC236}">
+                <a16:creationId xmlns:a16="http://schemas.microsoft.com/office/drawing/2014/main" id="{37443014-7A22-4DDC-8FC5-A3758D50863A}"/>
+              </a:ext>
+            </a:extLst>
+          </p:cNvPr>
+          <p:cNvSpPr/>
+          <p:nvPr/>
+        </p:nvSpPr>
+        <p:spPr>
+          <a:xfrm>
+            <a:off x="3527323" y="5433623"/>
+            <a:ext cx="1745225" cy="408770"/>
+          </a:xfrm>
+          <a:prstGeom prst="rightArrow">
+            <a:avLst/>
+          </a:prstGeom>
+        </p:spPr>
+        <p:style>
+          <a:lnRef idx="1">
+            <a:schemeClr val="dk1"/>
+          </a:lnRef>
+          <a:fillRef idx="2">
+            <a:schemeClr val="dk1"/>
+          </a:fillRef>
+          <a:effectRef idx="1">
+            <a:schemeClr val="dk1"/>
+          </a:effectRef>
+          <a:fontRef idx="minor">
+            <a:schemeClr val="dk1"/>
+          </a:fontRef>
+        </p:style>
+        <p:txBody>
+          <a:bodyPr rtlCol="0" anchor="ctr"/>
+          <a:lstStyle/>
+          <a:p>
+            <a:pPr algn="ctr"/>
+            <a:endParaRPr lang="LID4096"/>
+          </a:p>
+        </p:txBody>
+      </p:sp>
+      <p:pic>
+        <p:nvPicPr>
+          <p:cNvPr id="12" name="Picture 11">
+            <a:extLst>
+              <a:ext uri="{FF2B5EF4-FFF2-40B4-BE49-F238E27FC236}">
+                <a16:creationId xmlns:a16="http://schemas.microsoft.com/office/drawing/2014/main" id="{45CA6EBD-CAF0-4524-824B-992D43ED068D}"/>
+              </a:ext>
+            </a:extLst>
+          </p:cNvPr>
+          <p:cNvPicPr>
+            <a:picLocks noChangeAspect="1"/>
+          </p:cNvPicPr>
+          <p:nvPr/>
+        </p:nvPicPr>
+        <p:blipFill>
+          <a:blip r:embed="rId2"/>
+          <a:stretch>
+            <a:fillRect/>
+          </a:stretch>
+        </p:blipFill>
+        <p:spPr>
+          <a:xfrm>
+            <a:off x="7209503" y="5406888"/>
+            <a:ext cx="1755800" cy="426757"/>
+          </a:xfrm>
+          <a:prstGeom prst="rect">
+            <a:avLst/>
+          </a:prstGeom>
+        </p:spPr>
+      </p:pic>
+      <p:sp>
+        <p:nvSpPr>
+          <p:cNvPr id="13" name="TextBox 12">
+            <a:extLst>
+              <a:ext uri="{FF2B5EF4-FFF2-40B4-BE49-F238E27FC236}">
+                <a16:creationId xmlns:a16="http://schemas.microsoft.com/office/drawing/2014/main" id="{4E8A9E84-2127-464C-A9A5-71A1B31FAC5A}"/>
+              </a:ext>
+            </a:extLst>
+          </p:cNvPr>
+          <p:cNvSpPr txBox="1"/>
+          <p:nvPr/>
+        </p:nvSpPr>
+        <p:spPr>
+          <a:xfrm>
+            <a:off x="5354035" y="5445388"/>
+            <a:ext cx="805501" cy="369332"/>
+          </a:xfrm>
+          <a:prstGeom prst="rect">
+            <a:avLst/>
+          </a:prstGeom>
+          <a:noFill/>
+        </p:spPr>
+        <p:txBody>
+          <a:bodyPr wrap="square" rtlCol="0">
+            <a:spAutoFit/>
+          </a:bodyPr>
+          <a:lstStyle/>
+          <a:p>
+            <a:r>
+              <a:rPr lang="en-GB" dirty="0"/>
+              <a:t>Data 2</a:t>
+            </a:r>
+            <a:endParaRPr lang="LID4096" dirty="0"/>
+          </a:p>
+        </p:txBody>
+      </p:sp>
+      <p:sp>
+        <p:nvSpPr>
+          <p:cNvPr id="14" name="TextBox 13">
+            <a:extLst>
+              <a:ext uri="{FF2B5EF4-FFF2-40B4-BE49-F238E27FC236}">
+                <a16:creationId xmlns:a16="http://schemas.microsoft.com/office/drawing/2014/main" id="{5F1BAAE1-71BD-42D3-891A-37D11D5F49FF}"/>
+              </a:ext>
+            </a:extLst>
+          </p:cNvPr>
+          <p:cNvSpPr txBox="1"/>
+          <p:nvPr/>
+        </p:nvSpPr>
+        <p:spPr>
+          <a:xfrm>
+            <a:off x="2725259" y="5314842"/>
+            <a:ext cx="752161" cy="646331"/>
+          </a:xfrm>
+          <a:prstGeom prst="rect">
+            <a:avLst/>
+          </a:prstGeom>
+          <a:noFill/>
+        </p:spPr>
+        <p:txBody>
+          <a:bodyPr wrap="square" rtlCol="0">
+            <a:spAutoFit/>
+          </a:bodyPr>
+          <a:lstStyle/>
+          <a:p>
+            <a:r>
+              <a:rPr lang="en-GB" dirty="0"/>
+              <a:t>Next Node</a:t>
+            </a:r>
+            <a:endParaRPr lang="LID4096" dirty="0"/>
+          </a:p>
+        </p:txBody>
+      </p:sp>
+      <p:sp>
+        <p:nvSpPr>
+          <p:cNvPr id="15" name="TextBox 14">
+            <a:extLst>
+              <a:ext uri="{FF2B5EF4-FFF2-40B4-BE49-F238E27FC236}">
+                <a16:creationId xmlns:a16="http://schemas.microsoft.com/office/drawing/2014/main" id="{760EE8A3-D4AF-4122-A9B2-78B522899710}"/>
+              </a:ext>
+            </a:extLst>
+          </p:cNvPr>
+          <p:cNvSpPr txBox="1"/>
+          <p:nvPr/>
+        </p:nvSpPr>
+        <p:spPr>
+          <a:xfrm>
+            <a:off x="6379416" y="5297100"/>
+            <a:ext cx="921036" cy="646331"/>
+          </a:xfrm>
+          <a:prstGeom prst="rect">
+            <a:avLst/>
+          </a:prstGeom>
+          <a:noFill/>
+        </p:spPr>
+        <p:txBody>
+          <a:bodyPr wrap="square" rtlCol="0">
+            <a:spAutoFit/>
+          </a:bodyPr>
+          <a:lstStyle/>
+          <a:p>
+            <a:r>
+              <a:rPr lang="en-GB" dirty="0"/>
+              <a:t>Next Node</a:t>
+            </a:r>
+            <a:endParaRPr lang="LID4096" dirty="0"/>
+          </a:p>
+        </p:txBody>
+      </p:sp>
+      <p:sp>
+        <p:nvSpPr>
+          <p:cNvPr id="16" name="TextBox 15">
+            <a:extLst>
+              <a:ext uri="{FF2B5EF4-FFF2-40B4-BE49-F238E27FC236}">
+                <a16:creationId xmlns:a16="http://schemas.microsoft.com/office/drawing/2014/main" id="{19AFA8AB-9FD8-4C4A-8CF3-640F2422CF66}"/>
+              </a:ext>
+            </a:extLst>
+          </p:cNvPr>
+          <p:cNvSpPr txBox="1"/>
+          <p:nvPr/>
+        </p:nvSpPr>
+        <p:spPr>
+          <a:xfrm>
+            <a:off x="10065774" y="5314842"/>
+            <a:ext cx="911085" cy="646331"/>
+          </a:xfrm>
+          <a:prstGeom prst="rect">
+            <a:avLst/>
+          </a:prstGeom>
+          <a:noFill/>
+        </p:spPr>
+        <p:txBody>
+          <a:bodyPr wrap="square" rtlCol="0">
+            <a:spAutoFit/>
+          </a:bodyPr>
+          <a:lstStyle/>
+          <a:p>
+            <a:r>
+              <a:rPr lang="en-GB" dirty="0"/>
+              <a:t>Next Node</a:t>
+            </a:r>
+            <a:endParaRPr lang="LID4096" dirty="0"/>
+          </a:p>
+        </p:txBody>
+      </p:sp>
+      <p:sp>
+        <p:nvSpPr>
+          <p:cNvPr id="17" name="TextBox 16">
+            <a:extLst>
+              <a:ext uri="{FF2B5EF4-FFF2-40B4-BE49-F238E27FC236}">
+                <a16:creationId xmlns:a16="http://schemas.microsoft.com/office/drawing/2014/main" id="{1974AB3E-4702-442B-A2EA-7CF3AD6D7955}"/>
+              </a:ext>
+            </a:extLst>
+          </p:cNvPr>
+          <p:cNvSpPr txBox="1"/>
+          <p:nvPr/>
+        </p:nvSpPr>
+        <p:spPr>
+          <a:xfrm>
+            <a:off x="9037330" y="5444995"/>
+            <a:ext cx="896449" cy="369332"/>
+          </a:xfrm>
+          <a:prstGeom prst="rect">
+            <a:avLst/>
+          </a:prstGeom>
+          <a:noFill/>
+        </p:spPr>
+        <p:txBody>
+          <a:bodyPr wrap="square" rtlCol="0">
+            <a:spAutoFit/>
+          </a:bodyPr>
+          <a:lstStyle/>
+          <a:p>
+            <a:r>
+              <a:rPr lang="en-GB" dirty="0"/>
+              <a:t>Data 3</a:t>
+            </a:r>
+            <a:endParaRPr lang="LID4096" dirty="0"/>
+          </a:p>
+        </p:txBody>
+      </p:sp>
+      <p:cxnSp>
+        <p:nvCxnSpPr>
+          <p:cNvPr id="18" name="Straight Arrow Connector 17">
+            <a:extLst>
+              <a:ext uri="{FF2B5EF4-FFF2-40B4-BE49-F238E27FC236}">
+                <a16:creationId xmlns:a16="http://schemas.microsoft.com/office/drawing/2014/main" id="{CF184D06-C925-4611-8BD3-A6043C414ED0}"/>
+              </a:ext>
+            </a:extLst>
+          </p:cNvPr>
+          <p:cNvCxnSpPr>
+            <a:cxnSpLocks/>
+            <a:endCxn id="4" idx="1"/>
+          </p:cNvCxnSpPr>
+          <p:nvPr/>
+        </p:nvCxnSpPr>
+        <p:spPr>
+          <a:xfrm>
+            <a:off x="1242856" y="5137152"/>
+            <a:ext cx="426170" cy="500857"/>
+          </a:xfrm>
+          <a:prstGeom prst="straightConnector1">
+            <a:avLst/>
+          </a:prstGeom>
+          <a:ln>
+            <a:tailEnd type="triangle"/>
+          </a:ln>
+        </p:spPr>
+        <p:style>
+          <a:lnRef idx="1">
+            <a:schemeClr val="accent1"/>
+          </a:lnRef>
+          <a:fillRef idx="0">
+            <a:schemeClr val="accent1"/>
+          </a:fillRef>
+          <a:effectRef idx="0">
+            <a:schemeClr val="accent1"/>
+          </a:effectRef>
+          <a:fontRef idx="minor">
+            <a:schemeClr val="tx1"/>
+          </a:fontRef>
+        </p:style>
+      </p:cxnSp>
+      <p:sp>
+        <p:nvSpPr>
+          <p:cNvPr id="19" name="TextBox 18">
+            <a:extLst>
+              <a:ext uri="{FF2B5EF4-FFF2-40B4-BE49-F238E27FC236}">
+                <a16:creationId xmlns:a16="http://schemas.microsoft.com/office/drawing/2014/main" id="{E1854FE9-B604-4749-BD08-4ADB10956640}"/>
+              </a:ext>
+            </a:extLst>
+          </p:cNvPr>
+          <p:cNvSpPr txBox="1"/>
+          <p:nvPr/>
+        </p:nvSpPr>
+        <p:spPr>
+          <a:xfrm>
+            <a:off x="838200" y="4859185"/>
+            <a:ext cx="1386348" cy="370042"/>
+          </a:xfrm>
+          <a:prstGeom prst="rect">
+            <a:avLst/>
+          </a:prstGeom>
+          <a:noFill/>
+        </p:spPr>
+        <p:txBody>
+          <a:bodyPr wrap="square" rtlCol="0">
+            <a:spAutoFit/>
+          </a:bodyPr>
+          <a:lstStyle/>
+          <a:p>
+            <a:r>
+              <a:rPr lang="en-GB" dirty="0"/>
+              <a:t>_head</a:t>
+            </a:r>
+            <a:endParaRPr lang="LID4096" dirty="0"/>
+          </a:p>
+        </p:txBody>
+      </p:sp>
+    </p:spTree>
+    <p:extLst>
+      <p:ext uri="{BB962C8B-B14F-4D97-AF65-F5344CB8AC3E}">
+        <p14:creationId xmlns:p14="http://schemas.microsoft.com/office/powerpoint/2010/main" val="663322808"/>
+      </p:ext>
+    </p:extLst>
+  </p:cSld>
+  <p:clrMapOvr>
+    <a:masterClrMapping/>
+  </p:clrMapOvr>
+</p:sld>
+</file>
+
+<file path=ppt/slides/slide3.xml><?xml version="1.0" encoding="utf-8"?>
+<p:sld xmlns:a="http://schemas.openxmlformats.org/drawingml/2006/main" xmlns:r="http://schemas.openxmlformats.org/officeDocument/2006/relationships" xmlns:p="http://schemas.openxmlformats.org/presentationml/2006/main">
+  <p:cSld>
+    <p:spTree>
+      <p:nvGrpSpPr>
+        <p:cNvPr id="1" name=""/>
+        <p:cNvGrpSpPr/>
+        <p:nvPr/>
+      </p:nvGrpSpPr>
+      <p:grpSpPr>
+        <a:xfrm>
+          <a:off x="0" y="0"/>
+          <a:ext cx="0" cy="0"/>
+          <a:chOff x="0" y="0"/>
+          <a:chExt cx="0" cy="0"/>
+        </a:xfrm>
+      </p:grpSpPr>
+      <p:sp>
+        <p:nvSpPr>
+          <p:cNvPr id="2" name="Title 1">
+            <a:extLst>
+              <a:ext uri="{FF2B5EF4-FFF2-40B4-BE49-F238E27FC236}">
+                <a16:creationId xmlns:a16="http://schemas.microsoft.com/office/drawing/2014/main" id="{AAFED6BC-56AC-4FB5-B455-0797A7AD0EBA}"/>
+              </a:ext>
+            </a:extLst>
+          </p:cNvPr>
+          <p:cNvSpPr>
+            <a:spLocks noGrp="1"/>
+          </p:cNvSpPr>
+          <p:nvPr>
+            <p:ph type="title"/>
+          </p:nvPr>
+        </p:nvSpPr>
+        <p:spPr/>
+        <p:txBody>
+          <a:bodyPr/>
+          <a:lstStyle/>
+          <a:p>
+            <a:r>
+              <a:rPr lang="en-GB" dirty="0"/>
+              <a:t>Linked List – Unidirectional</a:t>
+            </a:r>
+            <a:endParaRPr lang="LID4096" dirty="0"/>
+          </a:p>
+        </p:txBody>
+      </p:sp>
+      <p:sp>
+        <p:nvSpPr>
+          <p:cNvPr id="3" name="Content Placeholder 2">
+            <a:extLst>
+              <a:ext uri="{FF2B5EF4-FFF2-40B4-BE49-F238E27FC236}">
+                <a16:creationId xmlns:a16="http://schemas.microsoft.com/office/drawing/2014/main" id="{96BA4CF0-22AC-4AA3-B220-491CB134DF89}"/>
+              </a:ext>
+            </a:extLst>
+          </p:cNvPr>
+          <p:cNvSpPr>
+            <a:spLocks noGrp="1"/>
+          </p:cNvSpPr>
+          <p:nvPr>
+            <p:ph idx="1"/>
+          </p:nvPr>
+        </p:nvSpPr>
+        <p:spPr/>
+        <p:txBody>
+          <a:bodyPr/>
+          <a:lstStyle/>
+          <a:p>
+            <a:endParaRPr lang="LID4096" dirty="0"/>
+          </a:p>
+        </p:txBody>
+      </p:sp>
+      <p:sp>
+        <p:nvSpPr>
+          <p:cNvPr id="7" name="Rectangle 6">
+            <a:extLst>
+              <a:ext uri="{FF2B5EF4-FFF2-40B4-BE49-F238E27FC236}">
+                <a16:creationId xmlns:a16="http://schemas.microsoft.com/office/drawing/2014/main" id="{A3EE36B2-0296-4B54-8C97-54E3D2AF2C66}"/>
+              </a:ext>
+            </a:extLst>
+          </p:cNvPr>
+          <p:cNvSpPr/>
+          <p:nvPr/>
+        </p:nvSpPr>
+        <p:spPr>
+          <a:xfrm>
+            <a:off x="1669026" y="5229227"/>
+            <a:ext cx="1858297" cy="817563"/>
+          </a:xfrm>
+          <a:prstGeom prst="rect">
+            <a:avLst/>
+          </a:prstGeom>
+        </p:spPr>
+        <p:style>
+          <a:lnRef idx="2">
+            <a:schemeClr val="accent1">
+              <a:shade val="50000"/>
+            </a:schemeClr>
+          </a:lnRef>
+          <a:fillRef idx="1">
+            <a:schemeClr val="accent1"/>
+          </a:fillRef>
+          <a:effectRef idx="0">
+            <a:schemeClr val="accent1"/>
+          </a:effectRef>
+          <a:fontRef idx="minor">
+            <a:schemeClr val="lt1"/>
+          </a:fontRef>
+        </p:style>
+        <p:txBody>
+          <a:bodyPr rtlCol="0" anchor="ctr"/>
+          <a:lstStyle/>
+          <a:p>
+            <a:pPr algn="ctr"/>
+            <a:endParaRPr lang="LID4096"/>
+          </a:p>
+        </p:txBody>
+      </p:sp>
+      <p:sp>
+        <p:nvSpPr>
+          <p:cNvPr id="8" name="Rectangle 7">
+            <a:extLst>
+              <a:ext uri="{FF2B5EF4-FFF2-40B4-BE49-F238E27FC236}">
+                <a16:creationId xmlns:a16="http://schemas.microsoft.com/office/drawing/2014/main" id="{741CC32F-5956-4FE1-B79E-075804653E64}"/>
+              </a:ext>
+            </a:extLst>
+          </p:cNvPr>
+          <p:cNvSpPr/>
+          <p:nvPr/>
+        </p:nvSpPr>
+        <p:spPr>
+          <a:xfrm>
+            <a:off x="5272548" y="5214914"/>
+            <a:ext cx="1936955" cy="817563"/>
+          </a:xfrm>
+          <a:prstGeom prst="rect">
+            <a:avLst/>
+          </a:prstGeom>
+        </p:spPr>
+        <p:style>
+          <a:lnRef idx="2">
+            <a:schemeClr val="accent1">
+              <a:shade val="50000"/>
+            </a:schemeClr>
+          </a:lnRef>
+          <a:fillRef idx="1">
+            <a:schemeClr val="accent1"/>
+          </a:fillRef>
+          <a:effectRef idx="0">
+            <a:schemeClr val="accent1"/>
+          </a:effectRef>
+          <a:fontRef idx="minor">
+            <a:schemeClr val="lt1"/>
+          </a:fontRef>
+        </p:style>
+        <p:txBody>
+          <a:bodyPr rtlCol="0" anchor="ctr"/>
+          <a:lstStyle/>
+          <a:p>
+            <a:pPr algn="ctr"/>
+            <a:endParaRPr lang="LID4096"/>
+          </a:p>
+        </p:txBody>
+      </p:sp>
+      <p:sp>
+        <p:nvSpPr>
+          <p:cNvPr id="9" name="Rectangle 8">
+            <a:extLst>
+              <a:ext uri="{FF2B5EF4-FFF2-40B4-BE49-F238E27FC236}">
+                <a16:creationId xmlns:a16="http://schemas.microsoft.com/office/drawing/2014/main" id="{155D4AC0-BEB3-49AD-82B0-E40C14CC613B}"/>
+              </a:ext>
+            </a:extLst>
+          </p:cNvPr>
+          <p:cNvSpPr/>
+          <p:nvPr/>
+        </p:nvSpPr>
+        <p:spPr>
+          <a:xfrm>
+            <a:off x="8944894" y="5229250"/>
+            <a:ext cx="1877961" cy="817540"/>
+          </a:xfrm>
+          <a:prstGeom prst="rect">
+            <a:avLst/>
+          </a:prstGeom>
+        </p:spPr>
+        <p:style>
+          <a:lnRef idx="2">
+            <a:schemeClr val="accent1">
+              <a:shade val="50000"/>
+            </a:schemeClr>
+          </a:lnRef>
+          <a:fillRef idx="1">
+            <a:schemeClr val="accent1"/>
+          </a:fillRef>
+          <a:effectRef idx="0">
+            <a:schemeClr val="accent1"/>
+          </a:effectRef>
+          <a:fontRef idx="minor">
+            <a:schemeClr val="lt1"/>
+          </a:fontRef>
+        </p:style>
+        <p:txBody>
+          <a:bodyPr rtlCol="0" anchor="ctr"/>
+          <a:lstStyle/>
+          <a:p>
+            <a:pPr algn="ctr"/>
+            <a:endParaRPr lang="LID4096"/>
+          </a:p>
+        </p:txBody>
+      </p:sp>
+      <p:cxnSp>
+        <p:nvCxnSpPr>
+          <p:cNvPr id="10" name="Straight Connector 9">
+            <a:extLst>
+              <a:ext uri="{FF2B5EF4-FFF2-40B4-BE49-F238E27FC236}">
+                <a16:creationId xmlns:a16="http://schemas.microsoft.com/office/drawing/2014/main" id="{5FAB432D-32A0-4327-B9A4-8CF45D04BBC3}"/>
+              </a:ext>
+            </a:extLst>
+          </p:cNvPr>
+          <p:cNvCxnSpPr>
+            <a:stCxn id="7" idx="0"/>
+            <a:endCxn id="7" idx="2"/>
+          </p:cNvCxnSpPr>
+          <p:nvPr/>
+        </p:nvCxnSpPr>
+        <p:spPr>
+          <a:xfrm>
+            <a:off x="2598175" y="5229227"/>
+            <a:ext cx="0" cy="817563"/>
+          </a:xfrm>
+          <a:prstGeom prst="line">
+            <a:avLst/>
+          </a:prstGeom>
+        </p:spPr>
+        <p:style>
+          <a:lnRef idx="1">
+            <a:schemeClr val="dk1"/>
+          </a:lnRef>
+          <a:fillRef idx="0">
+            <a:schemeClr val="dk1"/>
+          </a:fillRef>
+          <a:effectRef idx="0">
+            <a:schemeClr val="dk1"/>
+          </a:effectRef>
+          <a:fontRef idx="minor">
+            <a:schemeClr val="tx1"/>
+          </a:fontRef>
+        </p:style>
+      </p:cxnSp>
+      <p:cxnSp>
+        <p:nvCxnSpPr>
+          <p:cNvPr id="11" name="Straight Connector 10">
+            <a:extLst>
+              <a:ext uri="{FF2B5EF4-FFF2-40B4-BE49-F238E27FC236}">
+                <a16:creationId xmlns:a16="http://schemas.microsoft.com/office/drawing/2014/main" id="{D8F8F0D3-3192-48F3-A464-1B479C69038D}"/>
+              </a:ext>
+            </a:extLst>
+          </p:cNvPr>
+          <p:cNvCxnSpPr>
+            <a:stCxn id="8" idx="0"/>
+            <a:endCxn id="8" idx="2"/>
+          </p:cNvCxnSpPr>
+          <p:nvPr/>
+        </p:nvCxnSpPr>
+        <p:spPr>
+          <a:xfrm>
+            <a:off x="6241026" y="5214914"/>
+            <a:ext cx="0" cy="817563"/>
+          </a:xfrm>
+          <a:prstGeom prst="line">
+            <a:avLst/>
+          </a:prstGeom>
+        </p:spPr>
+        <p:style>
+          <a:lnRef idx="1">
+            <a:schemeClr val="dk1"/>
+          </a:lnRef>
+          <a:fillRef idx="0">
+            <a:schemeClr val="dk1"/>
+          </a:fillRef>
+          <a:effectRef idx="0">
+            <a:schemeClr val="dk1"/>
+          </a:effectRef>
+          <a:fontRef idx="minor">
+            <a:schemeClr val="tx1"/>
+          </a:fontRef>
+        </p:style>
+      </p:cxnSp>
+      <p:cxnSp>
+        <p:nvCxnSpPr>
+          <p:cNvPr id="12" name="Straight Connector 11">
+            <a:extLst>
+              <a:ext uri="{FF2B5EF4-FFF2-40B4-BE49-F238E27FC236}">
+                <a16:creationId xmlns:a16="http://schemas.microsoft.com/office/drawing/2014/main" id="{1B057356-4355-4537-BEDC-5EEBC753C256}"/>
+              </a:ext>
+            </a:extLst>
+          </p:cNvPr>
+          <p:cNvCxnSpPr>
+            <a:stCxn id="9" idx="0"/>
+            <a:endCxn id="9" idx="2"/>
+          </p:cNvCxnSpPr>
+          <p:nvPr/>
+        </p:nvCxnSpPr>
+        <p:spPr>
+          <a:xfrm>
+            <a:off x="9883875" y="5229250"/>
+            <a:ext cx="0" cy="817540"/>
+          </a:xfrm>
+          <a:prstGeom prst="line">
+            <a:avLst/>
+          </a:prstGeom>
+        </p:spPr>
+        <p:style>
+          <a:lnRef idx="1">
+            <a:schemeClr val="dk1"/>
+          </a:lnRef>
+          <a:fillRef idx="0">
+            <a:schemeClr val="dk1"/>
+          </a:fillRef>
+          <a:effectRef idx="0">
+            <a:schemeClr val="dk1"/>
+          </a:effectRef>
+          <a:fontRef idx="minor">
+            <a:schemeClr val="tx1"/>
+          </a:fontRef>
+        </p:style>
+      </p:cxnSp>
+      <p:sp>
+        <p:nvSpPr>
+          <p:cNvPr id="13" name="TextBox 12">
+            <a:extLst>
+              <a:ext uri="{FF2B5EF4-FFF2-40B4-BE49-F238E27FC236}">
+                <a16:creationId xmlns:a16="http://schemas.microsoft.com/office/drawing/2014/main" id="{B360274D-E129-47E9-904C-37157E09F241}"/>
+              </a:ext>
+            </a:extLst>
+          </p:cNvPr>
+          <p:cNvSpPr txBox="1"/>
+          <p:nvPr/>
+        </p:nvSpPr>
+        <p:spPr>
+          <a:xfrm>
+            <a:off x="1796109" y="5444995"/>
+            <a:ext cx="938979" cy="369332"/>
+          </a:xfrm>
+          <a:prstGeom prst="rect">
+            <a:avLst/>
+          </a:prstGeom>
+          <a:noFill/>
+        </p:spPr>
+        <p:txBody>
+          <a:bodyPr wrap="square" rtlCol="0">
+            <a:spAutoFit/>
+          </a:bodyPr>
+          <a:lstStyle/>
+          <a:p>
+            <a:r>
+              <a:rPr lang="en-GB" dirty="0"/>
+              <a:t>“my”</a:t>
+            </a:r>
+            <a:endParaRPr lang="LID4096" dirty="0"/>
+          </a:p>
+        </p:txBody>
+      </p:sp>
+      <p:sp>
+        <p:nvSpPr>
+          <p:cNvPr id="14" name="Arrow: Right 13">
+            <a:extLst>
+              <a:ext uri="{FF2B5EF4-FFF2-40B4-BE49-F238E27FC236}">
+                <a16:creationId xmlns:a16="http://schemas.microsoft.com/office/drawing/2014/main" id="{10E9F720-350B-446D-9592-AB280510C70A}"/>
+              </a:ext>
+            </a:extLst>
+          </p:cNvPr>
+          <p:cNvSpPr/>
+          <p:nvPr/>
+        </p:nvSpPr>
+        <p:spPr>
+          <a:xfrm>
+            <a:off x="3527323" y="5433623"/>
+            <a:ext cx="1745225" cy="408770"/>
+          </a:xfrm>
+          <a:prstGeom prst="rightArrow">
+            <a:avLst/>
+          </a:prstGeom>
+        </p:spPr>
+        <p:style>
+          <a:lnRef idx="1">
+            <a:schemeClr val="dk1"/>
+          </a:lnRef>
+          <a:fillRef idx="2">
+            <a:schemeClr val="dk1"/>
+          </a:fillRef>
+          <a:effectRef idx="1">
+            <a:schemeClr val="dk1"/>
+          </a:effectRef>
+          <a:fontRef idx="minor">
+            <a:schemeClr val="dk1"/>
+          </a:fontRef>
+        </p:style>
+        <p:txBody>
+          <a:bodyPr rtlCol="0" anchor="ctr"/>
+          <a:lstStyle/>
+          <a:p>
+            <a:pPr algn="ctr"/>
+            <a:endParaRPr lang="LID4096"/>
+          </a:p>
+        </p:txBody>
+      </p:sp>
+      <p:pic>
+        <p:nvPicPr>
+          <p:cNvPr id="15" name="Picture 14">
+            <a:extLst>
+              <a:ext uri="{FF2B5EF4-FFF2-40B4-BE49-F238E27FC236}">
+                <a16:creationId xmlns:a16="http://schemas.microsoft.com/office/drawing/2014/main" id="{BBA95F3F-3AD3-49B3-BCE1-67FCC2361C8D}"/>
+              </a:ext>
+            </a:extLst>
+          </p:cNvPr>
+          <p:cNvPicPr>
+            <a:picLocks noChangeAspect="1"/>
+          </p:cNvPicPr>
+          <p:nvPr/>
+        </p:nvPicPr>
+        <p:blipFill>
+          <a:blip r:embed="rId2"/>
+          <a:stretch>
+            <a:fillRect/>
+          </a:stretch>
+        </p:blipFill>
+        <p:spPr>
+          <a:xfrm>
+            <a:off x="7209503" y="5406888"/>
+            <a:ext cx="1755800" cy="426757"/>
+          </a:xfrm>
+          <a:prstGeom prst="rect">
+            <a:avLst/>
+          </a:prstGeom>
+        </p:spPr>
+      </p:pic>
+      <p:sp>
+        <p:nvSpPr>
+          <p:cNvPr id="16" name="TextBox 15">
+            <a:extLst>
+              <a:ext uri="{FF2B5EF4-FFF2-40B4-BE49-F238E27FC236}">
+                <a16:creationId xmlns:a16="http://schemas.microsoft.com/office/drawing/2014/main" id="{E2CCCCCD-F63E-4E08-8076-63F1D4E4C138}"/>
+              </a:ext>
+            </a:extLst>
+          </p:cNvPr>
+          <p:cNvSpPr txBox="1"/>
+          <p:nvPr/>
+        </p:nvSpPr>
+        <p:spPr>
+          <a:xfrm>
+            <a:off x="5285886" y="5444995"/>
+            <a:ext cx="934432" cy="369332"/>
+          </a:xfrm>
+          <a:prstGeom prst="rect">
+            <a:avLst/>
+          </a:prstGeom>
+          <a:noFill/>
+        </p:spPr>
+        <p:txBody>
+          <a:bodyPr wrap="square" rtlCol="0">
+            <a:spAutoFit/>
+          </a:bodyPr>
+          <a:lstStyle/>
+          <a:p>
+            <a:r>
+              <a:rPr lang="en-GB" dirty="0"/>
+              <a:t>“Name”</a:t>
+            </a:r>
+            <a:endParaRPr lang="LID4096" dirty="0"/>
+          </a:p>
+        </p:txBody>
+      </p:sp>
+      <p:sp>
+        <p:nvSpPr>
+          <p:cNvPr id="17" name="TextBox 16">
+            <a:extLst>
+              <a:ext uri="{FF2B5EF4-FFF2-40B4-BE49-F238E27FC236}">
+                <a16:creationId xmlns:a16="http://schemas.microsoft.com/office/drawing/2014/main" id="{23B34C07-4412-4854-9E93-7F03413D48AC}"/>
+              </a:ext>
+            </a:extLst>
+          </p:cNvPr>
+          <p:cNvSpPr txBox="1"/>
+          <p:nvPr/>
+        </p:nvSpPr>
+        <p:spPr>
+          <a:xfrm>
+            <a:off x="2723298" y="5464313"/>
+            <a:ext cx="752161" cy="369332"/>
+          </a:xfrm>
+          <a:prstGeom prst="rect">
+            <a:avLst/>
+          </a:prstGeom>
+          <a:noFill/>
+        </p:spPr>
+        <p:txBody>
+          <a:bodyPr wrap="square" rtlCol="0">
+            <a:spAutoFit/>
+          </a:bodyPr>
+          <a:lstStyle/>
+          <a:p>
+            <a:r>
+              <a:rPr lang="en-GB" dirty="0"/>
+              <a:t>1921</a:t>
+            </a:r>
+            <a:endParaRPr lang="LID4096" dirty="0"/>
+          </a:p>
+        </p:txBody>
+      </p:sp>
+      <p:sp>
+        <p:nvSpPr>
+          <p:cNvPr id="18" name="TextBox 17">
+            <a:extLst>
+              <a:ext uri="{FF2B5EF4-FFF2-40B4-BE49-F238E27FC236}">
+                <a16:creationId xmlns:a16="http://schemas.microsoft.com/office/drawing/2014/main" id="{3177D793-9AF6-483A-8B2C-DA03AC4C586D}"/>
+              </a:ext>
+            </a:extLst>
+          </p:cNvPr>
+          <p:cNvSpPr txBox="1"/>
+          <p:nvPr/>
+        </p:nvSpPr>
+        <p:spPr>
+          <a:xfrm>
+            <a:off x="6313231" y="5444995"/>
+            <a:ext cx="921036" cy="369332"/>
+          </a:xfrm>
+          <a:prstGeom prst="rect">
+            <a:avLst/>
+          </a:prstGeom>
+          <a:noFill/>
+        </p:spPr>
+        <p:txBody>
+          <a:bodyPr wrap="square" rtlCol="0">
+            <a:spAutoFit/>
+          </a:bodyPr>
+          <a:lstStyle/>
+          <a:p>
+            <a:r>
+              <a:rPr lang="en-GB" dirty="0"/>
+              <a:t>89122</a:t>
+            </a:r>
+            <a:endParaRPr lang="LID4096" dirty="0"/>
+          </a:p>
+        </p:txBody>
+      </p:sp>
+      <p:sp>
+        <p:nvSpPr>
+          <p:cNvPr id="19" name="TextBox 18">
+            <a:extLst>
+              <a:ext uri="{FF2B5EF4-FFF2-40B4-BE49-F238E27FC236}">
+                <a16:creationId xmlns:a16="http://schemas.microsoft.com/office/drawing/2014/main" id="{48911CC7-57B8-443F-B55C-4CC82F4F4680}"/>
+              </a:ext>
+            </a:extLst>
+          </p:cNvPr>
+          <p:cNvSpPr txBox="1"/>
+          <p:nvPr/>
+        </p:nvSpPr>
+        <p:spPr>
+          <a:xfrm>
+            <a:off x="9935864" y="5453342"/>
+            <a:ext cx="911085" cy="369332"/>
+          </a:xfrm>
+          <a:prstGeom prst="rect">
+            <a:avLst/>
+          </a:prstGeom>
+          <a:noFill/>
+        </p:spPr>
+        <p:txBody>
+          <a:bodyPr wrap="square" rtlCol="0">
+            <a:spAutoFit/>
+          </a:bodyPr>
+          <a:lstStyle/>
+          <a:p>
+            <a:r>
+              <a:rPr lang="en-GB" dirty="0"/>
+              <a:t>172891</a:t>
+            </a:r>
+            <a:endParaRPr lang="LID4096" dirty="0"/>
+          </a:p>
+        </p:txBody>
+      </p:sp>
+      <p:sp>
+        <p:nvSpPr>
+          <p:cNvPr id="20" name="TextBox 19">
+            <a:extLst>
+              <a:ext uri="{FF2B5EF4-FFF2-40B4-BE49-F238E27FC236}">
+                <a16:creationId xmlns:a16="http://schemas.microsoft.com/office/drawing/2014/main" id="{1F473750-0592-4BD9-A0A1-D2FCB803F1E3}"/>
+              </a:ext>
+            </a:extLst>
+          </p:cNvPr>
+          <p:cNvSpPr txBox="1"/>
+          <p:nvPr/>
+        </p:nvSpPr>
+        <p:spPr>
+          <a:xfrm>
+            <a:off x="9017291" y="5453342"/>
+            <a:ext cx="896449" cy="369332"/>
+          </a:xfrm>
+          <a:prstGeom prst="rect">
+            <a:avLst/>
+          </a:prstGeom>
+          <a:noFill/>
+        </p:spPr>
+        <p:txBody>
+          <a:bodyPr wrap="square" rtlCol="0">
+            <a:spAutoFit/>
+          </a:bodyPr>
+          <a:lstStyle/>
+          <a:p>
+            <a:r>
+              <a:rPr lang="en-GB" dirty="0"/>
+              <a:t>“Yanis”</a:t>
+            </a:r>
+            <a:endParaRPr lang="LID4096" dirty="0"/>
+          </a:p>
+        </p:txBody>
+      </p:sp>
+      <p:cxnSp>
+        <p:nvCxnSpPr>
+          <p:cNvPr id="21" name="Straight Arrow Connector 20">
+            <a:extLst>
+              <a:ext uri="{FF2B5EF4-FFF2-40B4-BE49-F238E27FC236}">
+                <a16:creationId xmlns:a16="http://schemas.microsoft.com/office/drawing/2014/main" id="{3CAA8190-1F8C-4217-B88D-4DAA24242C5B}"/>
+              </a:ext>
+            </a:extLst>
+          </p:cNvPr>
+          <p:cNvCxnSpPr>
+            <a:cxnSpLocks/>
+            <a:endCxn id="7" idx="1"/>
+          </p:cNvCxnSpPr>
+          <p:nvPr/>
+        </p:nvCxnSpPr>
+        <p:spPr>
+          <a:xfrm>
+            <a:off x="1242856" y="5137152"/>
+            <a:ext cx="426170" cy="500857"/>
+          </a:xfrm>
+          <a:prstGeom prst="straightConnector1">
+            <a:avLst/>
+          </a:prstGeom>
+          <a:ln>
+            <a:tailEnd type="triangle"/>
+          </a:ln>
+        </p:spPr>
+        <p:style>
+          <a:lnRef idx="1">
+            <a:schemeClr val="accent1"/>
+          </a:lnRef>
+          <a:fillRef idx="0">
+            <a:schemeClr val="accent1"/>
+          </a:fillRef>
+          <a:effectRef idx="0">
+            <a:schemeClr val="accent1"/>
+          </a:effectRef>
+          <a:fontRef idx="minor">
+            <a:schemeClr val="tx1"/>
+          </a:fontRef>
+        </p:style>
+      </p:cxnSp>
+      <p:sp>
+        <p:nvSpPr>
+          <p:cNvPr id="22" name="TextBox 21">
+            <a:extLst>
+              <a:ext uri="{FF2B5EF4-FFF2-40B4-BE49-F238E27FC236}">
+                <a16:creationId xmlns:a16="http://schemas.microsoft.com/office/drawing/2014/main" id="{87A8139A-35A0-4FEA-876C-9C5AC50960D4}"/>
+              </a:ext>
+            </a:extLst>
+          </p:cNvPr>
+          <p:cNvSpPr txBox="1"/>
+          <p:nvPr/>
+        </p:nvSpPr>
+        <p:spPr>
+          <a:xfrm>
+            <a:off x="838200" y="4859185"/>
+            <a:ext cx="1386348" cy="370042"/>
+          </a:xfrm>
+          <a:prstGeom prst="rect">
+            <a:avLst/>
+          </a:prstGeom>
+          <a:noFill/>
+        </p:spPr>
+        <p:txBody>
+          <a:bodyPr wrap="square" rtlCol="0">
+            <a:spAutoFit/>
+          </a:bodyPr>
+          <a:lstStyle/>
+          <a:p>
+            <a:r>
+              <a:rPr lang="en-GB" dirty="0"/>
+              <a:t>_head</a:t>
+            </a:r>
+            <a:endParaRPr lang="LID4096" dirty="0"/>
+          </a:p>
+        </p:txBody>
+      </p:sp>
+    </p:spTree>
+    <p:extLst>
+      <p:ext uri="{BB962C8B-B14F-4D97-AF65-F5344CB8AC3E}">
+        <p14:creationId xmlns:p14="http://schemas.microsoft.com/office/powerpoint/2010/main" val="1328981361"/>
       </p:ext>
     </p:extLst>
   </p:cSld>

</xml_diff>

<commit_message>
added a style for the PowerPoint
</commit_message>
<xml_diff>
--- a/Linked_List.pptx
+++ b/Linked_List.pptx
@@ -317,7 +317,7 @@
           <a:p>
             <a:fld id="{2D2E3C72-60F0-4B29-9473-543FD151B733}" type="slidenum">
               <a:rPr lang="de-AT" smtClean="0"/>
-              <a:t>‹#›</a:t>
+              <a:t>‹Nr.›</a:t>
             </a:fld>
             <a:endParaRPr lang="de-AT"/>
           </a:p>
@@ -517,7 +517,7 @@
           <a:p>
             <a:fld id="{2D2E3C72-60F0-4B29-9473-543FD151B733}" type="slidenum">
               <a:rPr lang="de-AT" smtClean="0"/>
-              <a:t>‹#›</a:t>
+              <a:t>‹Nr.›</a:t>
             </a:fld>
             <a:endParaRPr lang="de-AT"/>
           </a:p>
@@ -727,7 +727,7 @@
           <a:p>
             <a:fld id="{2D2E3C72-60F0-4B29-9473-543FD151B733}" type="slidenum">
               <a:rPr lang="de-AT" smtClean="0"/>
-              <a:t>‹#›</a:t>
+              <a:t>‹Nr.›</a:t>
             </a:fld>
             <a:endParaRPr lang="de-AT"/>
           </a:p>
@@ -927,7 +927,7 @@
           <a:p>
             <a:fld id="{2D2E3C72-60F0-4B29-9473-543FD151B733}" type="slidenum">
               <a:rPr lang="de-AT" smtClean="0"/>
-              <a:t>‹#›</a:t>
+              <a:t>‹Nr.›</a:t>
             </a:fld>
             <a:endParaRPr lang="de-AT"/>
           </a:p>
@@ -1203,7 +1203,7 @@
           <a:p>
             <a:fld id="{2D2E3C72-60F0-4B29-9473-543FD151B733}" type="slidenum">
               <a:rPr lang="de-AT" smtClean="0"/>
-              <a:t>‹#›</a:t>
+              <a:t>‹Nr.›</a:t>
             </a:fld>
             <a:endParaRPr lang="de-AT"/>
           </a:p>
@@ -1471,7 +1471,7 @@
           <a:p>
             <a:fld id="{2D2E3C72-60F0-4B29-9473-543FD151B733}" type="slidenum">
               <a:rPr lang="de-AT" smtClean="0"/>
-              <a:t>‹#›</a:t>
+              <a:t>‹Nr.›</a:t>
             </a:fld>
             <a:endParaRPr lang="de-AT"/>
           </a:p>
@@ -1886,7 +1886,7 @@
           <a:p>
             <a:fld id="{2D2E3C72-60F0-4B29-9473-543FD151B733}" type="slidenum">
               <a:rPr lang="de-AT" smtClean="0"/>
-              <a:t>‹#›</a:t>
+              <a:t>‹Nr.›</a:t>
             </a:fld>
             <a:endParaRPr lang="de-AT"/>
           </a:p>
@@ -2028,7 +2028,7 @@
           <a:p>
             <a:fld id="{2D2E3C72-60F0-4B29-9473-543FD151B733}" type="slidenum">
               <a:rPr lang="de-AT" smtClean="0"/>
-              <a:t>‹#›</a:t>
+              <a:t>‹Nr.›</a:t>
             </a:fld>
             <a:endParaRPr lang="de-AT"/>
           </a:p>
@@ -2141,7 +2141,7 @@
           <a:p>
             <a:fld id="{2D2E3C72-60F0-4B29-9473-543FD151B733}" type="slidenum">
               <a:rPr lang="de-AT" smtClean="0"/>
-              <a:t>‹#›</a:t>
+              <a:t>‹Nr.›</a:t>
             </a:fld>
             <a:endParaRPr lang="de-AT"/>
           </a:p>
@@ -2454,7 +2454,7 @@
           <a:p>
             <a:fld id="{2D2E3C72-60F0-4B29-9473-543FD151B733}" type="slidenum">
               <a:rPr lang="de-AT" smtClean="0"/>
-              <a:t>‹#›</a:t>
+              <a:t>‹Nr.›</a:t>
             </a:fld>
             <a:endParaRPr lang="de-AT"/>
           </a:p>
@@ -2743,7 +2743,7 @@
           <a:p>
             <a:fld id="{2D2E3C72-60F0-4B29-9473-543FD151B733}" type="slidenum">
               <a:rPr lang="de-AT" smtClean="0"/>
-              <a:t>‹#›</a:t>
+              <a:t>‹Nr.›</a:t>
             </a:fld>
             <a:endParaRPr lang="de-AT"/>
           </a:p>
@@ -3022,12 +3022,87 @@
           <a:p>
             <a:fld id="{2D2E3C72-60F0-4B29-9473-543FD151B733}" type="slidenum">
               <a:rPr lang="de-AT" smtClean="0"/>
-              <a:t>‹#›</a:t>
+              <a:t>‹Nr.›</a:t>
             </a:fld>
             <a:endParaRPr lang="de-AT"/>
           </a:p>
         </p:txBody>
       </p:sp>
+      <p:sp>
+        <p:nvSpPr>
+          <p:cNvPr id="7" name="Rectangle 28">
+            <a:extLst>
+              <a:ext uri="{FF2B5EF4-FFF2-40B4-BE49-F238E27FC236}">
+                <a16:creationId xmlns:a16="http://schemas.microsoft.com/office/drawing/2014/main" id="{9FFA911D-9DFE-475C-904F-3DE3874990FB}"/>
+              </a:ext>
+            </a:extLst>
+          </p:cNvPr>
+          <p:cNvSpPr/>
+          <p:nvPr userDrawn="1"/>
+        </p:nvSpPr>
+        <p:spPr>
+          <a:xfrm>
+            <a:off x="0" y="6224241"/>
+            <a:ext cx="12192000" cy="712839"/>
+          </a:xfrm>
+          <a:prstGeom prst="rect">
+            <a:avLst/>
+          </a:prstGeom>
+        </p:spPr>
+        <p:style>
+          <a:lnRef idx="2">
+            <a:schemeClr val="dk1">
+              <a:shade val="50000"/>
+            </a:schemeClr>
+          </a:lnRef>
+          <a:fillRef idx="1">
+            <a:schemeClr val="dk1"/>
+          </a:fillRef>
+          <a:effectRef idx="0">
+            <a:schemeClr val="dk1"/>
+          </a:effectRef>
+          <a:fontRef idx="minor">
+            <a:schemeClr val="lt1"/>
+          </a:fontRef>
+        </p:style>
+        <p:txBody>
+          <a:bodyPr rtlCol="0" anchor="ctr"/>
+          <a:lstStyle/>
+          <a:p>
+            <a:pPr algn="ctr"/>
+            <a:endParaRPr lang="LID4096"/>
+          </a:p>
+        </p:txBody>
+      </p:sp>
+      <p:pic>
+        <p:nvPicPr>
+          <p:cNvPr id="8" name="Picture 27">
+            <a:extLst>
+              <a:ext uri="{FF2B5EF4-FFF2-40B4-BE49-F238E27FC236}">
+                <a16:creationId xmlns:a16="http://schemas.microsoft.com/office/drawing/2014/main" id="{D25AA57D-0130-466F-B2F2-6E4A27F0BC88}"/>
+              </a:ext>
+            </a:extLst>
+          </p:cNvPr>
+          <p:cNvPicPr>
+            <a:picLocks noChangeAspect="1"/>
+          </p:cNvPicPr>
+          <p:nvPr userDrawn="1"/>
+        </p:nvPicPr>
+        <p:blipFill rotWithShape="1">
+          <a:blip r:embed="rId13"/>
+          <a:srcRect l="2258" t="40288" r="-2258" b="40501"/>
+          <a:stretch/>
+        </p:blipFill>
+        <p:spPr>
+          <a:xfrm>
+            <a:off x="3017460" y="6249441"/>
+            <a:ext cx="6034921" cy="636255"/>
+          </a:xfrm>
+          <a:prstGeom prst="rect">
+            <a:avLst/>
+          </a:prstGeom>
+        </p:spPr>
+      </p:pic>
     </p:spTree>
     <p:extLst>
       <p:ext uri="{BB962C8B-B14F-4D97-AF65-F5344CB8AC3E}">
@@ -4048,7 +4123,7 @@
         </p:nvSpPr>
         <p:spPr>
           <a:xfrm>
-            <a:off x="0" y="6145161"/>
+            <a:off x="0" y="6195961"/>
             <a:ext cx="12192000" cy="712839"/>
           </a:xfrm>
           <a:prstGeom prst="rect">
@@ -4101,7 +4176,7 @@
         </p:blipFill>
         <p:spPr>
           <a:xfrm>
-            <a:off x="3017460" y="6183452"/>
+            <a:off x="3017460" y="6234252"/>
             <a:ext cx="6034921" cy="636255"/>
           </a:xfrm>
           <a:prstGeom prst="rect">

</xml_diff>

<commit_message>
added more content to the powerpoint and a screenshot of the init of a node
</commit_message>
<xml_diff>
--- a/Linked_List.pptx
+++ b/Linked_List.pptx
@@ -8,6 +8,7 @@
     <p:sldId id="256" r:id="rId2"/>
     <p:sldId id="257" r:id="rId3"/>
     <p:sldId id="258" r:id="rId4"/>
+    <p:sldId id="259" r:id="rId5"/>
   </p:sldIdLst>
   <p:sldSz cx="12192000" cy="6858000"/>
   <p:notesSz cx="6858000" cy="9144000"/>
@@ -3433,16 +3434,14 @@
           </a:prstGeom>
         </p:spPr>
         <p:style>
-          <a:lnRef idx="2">
-            <a:schemeClr val="accent1">
-              <a:shade val="50000"/>
-            </a:schemeClr>
+          <a:lnRef idx="0">
+            <a:schemeClr val="accent3"/>
           </a:lnRef>
-          <a:fillRef idx="1">
-            <a:schemeClr val="accent1"/>
+          <a:fillRef idx="3">
+            <a:schemeClr val="accent3"/>
           </a:fillRef>
-          <a:effectRef idx="0">
-            <a:schemeClr val="accent1"/>
+          <a:effectRef idx="3">
+            <a:schemeClr val="accent3"/>
           </a:effectRef>
           <a:fontRef idx="minor">
             <a:schemeClr val="lt1"/>
@@ -3479,16 +3478,14 @@
           </a:prstGeom>
         </p:spPr>
         <p:style>
-          <a:lnRef idx="2">
-            <a:schemeClr val="accent1">
-              <a:shade val="50000"/>
-            </a:schemeClr>
+          <a:lnRef idx="0">
+            <a:schemeClr val="accent3"/>
           </a:lnRef>
-          <a:fillRef idx="1">
-            <a:schemeClr val="accent1"/>
+          <a:fillRef idx="3">
+            <a:schemeClr val="accent3"/>
           </a:fillRef>
-          <a:effectRef idx="0">
-            <a:schemeClr val="accent1"/>
+          <a:effectRef idx="3">
+            <a:schemeClr val="accent3"/>
           </a:effectRef>
           <a:fontRef idx="minor">
             <a:schemeClr val="lt1"/>
@@ -3525,16 +3522,14 @@
           </a:prstGeom>
         </p:spPr>
         <p:style>
-          <a:lnRef idx="2">
-            <a:schemeClr val="accent1">
-              <a:shade val="50000"/>
-            </a:schemeClr>
+          <a:lnRef idx="0">
+            <a:schemeClr val="accent3"/>
           </a:lnRef>
-          <a:fillRef idx="1">
-            <a:schemeClr val="accent1"/>
+          <a:fillRef idx="3">
+            <a:schemeClr val="accent3"/>
           </a:fillRef>
-          <a:effectRef idx="0">
-            <a:schemeClr val="accent1"/>
+          <a:effectRef idx="3">
+            <a:schemeClr val="accent3"/>
           </a:effectRef>
           <a:fontRef idx="minor">
             <a:schemeClr val="lt1"/>
@@ -3724,13 +3719,13 @@
           </a:prstGeom>
         </p:spPr>
         <p:style>
-          <a:lnRef idx="1">
+          <a:lnRef idx="2">
             <a:schemeClr val="dk1"/>
           </a:lnRef>
-          <a:fillRef idx="2">
-            <a:schemeClr val="dk1"/>
+          <a:fillRef idx="1">
+            <a:schemeClr val="lt1"/>
           </a:fillRef>
-          <a:effectRef idx="1">
+          <a:effectRef idx="0">
             <a:schemeClr val="dk1"/>
           </a:effectRef>
           <a:fontRef idx="minor">
@@ -3746,36 +3741,6 @@
           </a:p>
         </p:txBody>
       </p:sp>
-      <p:pic>
-        <p:nvPicPr>
-          <p:cNvPr id="11" name="Picture 10">
-            <a:extLst>
-              <a:ext uri="{FF2B5EF4-FFF2-40B4-BE49-F238E27FC236}">
-                <a16:creationId xmlns:a16="http://schemas.microsoft.com/office/drawing/2014/main" id="{14F1C2A8-BF80-4F9C-8C59-28AD01D9C643}"/>
-              </a:ext>
-            </a:extLst>
-          </p:cNvPr>
-          <p:cNvPicPr>
-            <a:picLocks noChangeAspect="1"/>
-          </p:cNvPicPr>
-          <p:nvPr/>
-        </p:nvPicPr>
-        <p:blipFill>
-          <a:blip r:embed="rId2"/>
-          <a:stretch>
-            <a:fillRect/>
-          </a:stretch>
-        </p:blipFill>
-        <p:spPr>
-          <a:xfrm>
-            <a:off x="7086601" y="1113601"/>
-            <a:ext cx="1755800" cy="426757"/>
-          </a:xfrm>
-          <a:prstGeom prst="rect">
-            <a:avLst/>
-          </a:prstGeom>
-        </p:spPr>
-      </p:pic>
       <p:sp>
         <p:nvSpPr>
           <p:cNvPr id="17" name="TextBox 16">
@@ -4095,7 +4060,7 @@
           <p:nvPr/>
         </p:nvPicPr>
         <p:blipFill rotWithShape="1">
-          <a:blip r:embed="rId3"/>
+          <a:blip r:embed="rId2"/>
           <a:srcRect l="2258" t="40288" r="-2258" b="40501"/>
           <a:stretch/>
         </p:blipFill>
@@ -4109,6 +4074,50 @@
           </a:prstGeom>
         </p:spPr>
       </p:pic>
+      <p:sp>
+        <p:nvSpPr>
+          <p:cNvPr id="32" name="Arrow: Right 31">
+            <a:extLst>
+              <a:ext uri="{FF2B5EF4-FFF2-40B4-BE49-F238E27FC236}">
+                <a16:creationId xmlns:a16="http://schemas.microsoft.com/office/drawing/2014/main" id="{9B8F92D1-51A4-48B0-A95B-0067B7266BC6}"/>
+              </a:ext>
+            </a:extLst>
+          </p:cNvPr>
+          <p:cNvSpPr/>
+          <p:nvPr/>
+        </p:nvSpPr>
+        <p:spPr>
+          <a:xfrm>
+            <a:off x="7084985" y="1131124"/>
+            <a:ext cx="1745225" cy="408770"/>
+          </a:xfrm>
+          <a:prstGeom prst="rightArrow">
+            <a:avLst/>
+          </a:prstGeom>
+        </p:spPr>
+        <p:style>
+          <a:lnRef idx="2">
+            <a:schemeClr val="dk1"/>
+          </a:lnRef>
+          <a:fillRef idx="1">
+            <a:schemeClr val="lt1"/>
+          </a:fillRef>
+          <a:effectRef idx="0">
+            <a:schemeClr val="dk1"/>
+          </a:effectRef>
+          <a:fontRef idx="minor">
+            <a:schemeClr val="dk1"/>
+          </a:fontRef>
+        </p:style>
+        <p:txBody>
+          <a:bodyPr rtlCol="0" anchor="ctr"/>
+          <a:lstStyle/>
+          <a:p>
+            <a:pPr algn="ctr"/>
+            <a:endParaRPr lang="LID4096"/>
+          </a:p>
+        </p:txBody>
+      </p:sp>
     </p:spTree>
     <p:extLst>
       <p:ext uri="{BB962C8B-B14F-4D97-AF65-F5344CB8AC3E}">
@@ -4225,7 +4234,7 @@
             </a:r>
             <a:r>
               <a:rPr lang="en-GB" dirty="0"/>
-              <a:t> (_head)</a:t>
+              <a:t> (list-start)</a:t>
             </a:r>
           </a:p>
           <a:p>
@@ -4261,7 +4270,7 @@
           <a:p>
             <a:r>
               <a:rPr lang="en-GB" dirty="0"/>
-              <a:t>The next-node of the last node is null (list-end)</a:t>
+              <a:t>The next-node of the last node is NULL (list-end)</a:t>
             </a:r>
           </a:p>
           <a:p>
@@ -4291,16 +4300,14 @@
           </a:prstGeom>
         </p:spPr>
         <p:style>
-          <a:lnRef idx="2">
-            <a:schemeClr val="accent1">
-              <a:shade val="50000"/>
-            </a:schemeClr>
+          <a:lnRef idx="0">
+            <a:schemeClr val="accent3"/>
           </a:lnRef>
-          <a:fillRef idx="1">
-            <a:schemeClr val="accent1"/>
+          <a:fillRef idx="3">
+            <a:schemeClr val="accent3"/>
           </a:fillRef>
-          <a:effectRef idx="0">
-            <a:schemeClr val="accent1"/>
+          <a:effectRef idx="3">
+            <a:schemeClr val="accent3"/>
           </a:effectRef>
           <a:fontRef idx="minor">
             <a:schemeClr val="lt1"/>
@@ -4337,16 +4344,14 @@
           </a:prstGeom>
         </p:spPr>
         <p:style>
-          <a:lnRef idx="2">
-            <a:schemeClr val="accent1">
-              <a:shade val="50000"/>
-            </a:schemeClr>
+          <a:lnRef idx="0">
+            <a:schemeClr val="accent3"/>
           </a:lnRef>
-          <a:fillRef idx="1">
-            <a:schemeClr val="accent1"/>
+          <a:fillRef idx="3">
+            <a:schemeClr val="accent3"/>
           </a:fillRef>
-          <a:effectRef idx="0">
-            <a:schemeClr val="accent1"/>
+          <a:effectRef idx="3">
+            <a:schemeClr val="accent3"/>
           </a:effectRef>
           <a:fontRef idx="minor">
             <a:schemeClr val="lt1"/>
@@ -4375,7 +4380,7 @@
         </p:nvSpPr>
         <p:spPr>
           <a:xfrm>
-            <a:off x="8944894" y="5229250"/>
+            <a:off x="8972789" y="5229250"/>
             <a:ext cx="1877961" cy="817540"/>
           </a:xfrm>
           <a:prstGeom prst="rect">
@@ -4383,16 +4388,14 @@
           </a:prstGeom>
         </p:spPr>
         <p:style>
-          <a:lnRef idx="2">
-            <a:schemeClr val="accent1">
-              <a:shade val="50000"/>
-            </a:schemeClr>
+          <a:lnRef idx="0">
+            <a:schemeClr val="accent3"/>
           </a:lnRef>
-          <a:fillRef idx="1">
-            <a:schemeClr val="accent1"/>
+          <a:fillRef idx="3">
+            <a:schemeClr val="accent3"/>
           </a:fillRef>
-          <a:effectRef idx="0">
-            <a:schemeClr val="accent1"/>
+          <a:effectRef idx="3">
+            <a:schemeClr val="accent3"/>
           </a:effectRef>
           <a:fontRef idx="minor">
             <a:schemeClr val="lt1"/>
@@ -4502,7 +4505,7 @@
         </p:nvCxnSpPr>
         <p:spPr>
           <a:xfrm>
-            <a:off x="9883875" y="5229250"/>
+            <a:off x="9911770" y="5229250"/>
             <a:ext cx="0" cy="817540"/>
           </a:xfrm>
           <a:prstGeom prst="line">
@@ -4582,13 +4585,13 @@
           </a:prstGeom>
         </p:spPr>
         <p:style>
-          <a:lnRef idx="1">
+          <a:lnRef idx="2">
             <a:schemeClr val="dk1"/>
           </a:lnRef>
-          <a:fillRef idx="2">
-            <a:schemeClr val="dk1"/>
+          <a:fillRef idx="1">
+            <a:schemeClr val="lt1"/>
           </a:fillRef>
-          <a:effectRef idx="1">
+          <a:effectRef idx="0">
             <a:schemeClr val="dk1"/>
           </a:effectRef>
           <a:fontRef idx="minor">
@@ -4604,36 +4607,6 @@
           </a:p>
         </p:txBody>
       </p:sp>
-      <p:pic>
-        <p:nvPicPr>
-          <p:cNvPr id="12" name="Picture 11">
-            <a:extLst>
-              <a:ext uri="{FF2B5EF4-FFF2-40B4-BE49-F238E27FC236}">
-                <a16:creationId xmlns:a16="http://schemas.microsoft.com/office/drawing/2014/main" id="{45CA6EBD-CAF0-4524-824B-992D43ED068D}"/>
-              </a:ext>
-            </a:extLst>
-          </p:cNvPr>
-          <p:cNvPicPr>
-            <a:picLocks noChangeAspect="1"/>
-          </p:cNvPicPr>
-          <p:nvPr/>
-        </p:nvPicPr>
-        <p:blipFill>
-          <a:blip r:embed="rId2"/>
-          <a:stretch>
-            <a:fillRect/>
-          </a:stretch>
-        </p:blipFill>
-        <p:spPr>
-          <a:xfrm>
-            <a:off x="7209503" y="5406888"/>
-            <a:ext cx="1755800" cy="426757"/>
-          </a:xfrm>
-          <a:prstGeom prst="rect">
-            <a:avLst/>
-          </a:prstGeom>
-        </p:spPr>
-      </p:pic>
       <p:sp>
         <p:nvSpPr>
           <p:cNvPr id="13" name="TextBox 12">
@@ -4889,6 +4862,51 @@
               <a:t>_head</a:t>
             </a:r>
             <a:endParaRPr lang="LID4096" dirty="0"/>
+          </a:p>
+        </p:txBody>
+      </p:sp>
+      <p:sp>
+        <p:nvSpPr>
+          <p:cNvPr id="23" name="Arrow: Right 22">
+            <a:extLst>
+              <a:ext uri="{FF2B5EF4-FFF2-40B4-BE49-F238E27FC236}">
+                <a16:creationId xmlns:a16="http://schemas.microsoft.com/office/drawing/2014/main" id="{CF347BAF-2EB9-4D40-880A-6397C2C2BD8F}"/>
+              </a:ext>
+            </a:extLst>
+          </p:cNvPr>
+          <p:cNvSpPr/>
+          <p:nvPr/>
+        </p:nvSpPr>
+        <p:spPr>
+          <a:xfrm>
+            <a:off x="7205984" y="5433623"/>
+            <a:ext cx="1745224" cy="408770"/>
+          </a:xfrm>
+          <a:prstGeom prst="rightArrow">
+            <a:avLst/>
+          </a:prstGeom>
+          <a:ln/>
+        </p:spPr>
+        <p:style>
+          <a:lnRef idx="2">
+            <a:schemeClr val="dk1"/>
+          </a:lnRef>
+          <a:fillRef idx="1">
+            <a:schemeClr val="lt1"/>
+          </a:fillRef>
+          <a:effectRef idx="0">
+            <a:schemeClr val="dk1"/>
+          </a:effectRef>
+          <a:fontRef idx="minor">
+            <a:schemeClr val="dk1"/>
+          </a:fontRef>
+        </p:style>
+        <p:txBody>
+          <a:bodyPr rtlCol="0" anchor="ctr"/>
+          <a:lstStyle/>
+          <a:p>
+            <a:pPr algn="ctr"/>
+            <a:endParaRPr lang="LID4096"/>
           </a:p>
         </p:txBody>
       </p:sp>
@@ -4967,12 +4985,56 @@
             <p:ph idx="1"/>
           </p:nvPr>
         </p:nvSpPr>
-        <p:spPr/>
-        <p:txBody>
-          <a:bodyPr/>
-          <a:lstStyle/>
-          <a:p>
-            <a:endParaRPr lang="LID4096" dirty="0"/>
+        <p:spPr>
+          <a:xfrm>
+            <a:off x="838200" y="1794453"/>
+            <a:ext cx="10415155" cy="4351338"/>
+          </a:xfrm>
+        </p:spPr>
+        <p:txBody>
+          <a:bodyPr>
+            <a:normAutofit/>
+          </a:bodyPr>
+          <a:lstStyle/>
+          <a:p>
+            <a:pPr marL="0" indent="0">
+              <a:buNone/>
+            </a:pPr>
+            <a:r>
+              <a:rPr lang="en-GB" sz="2400" dirty="0"/>
+              <a:t>How create a unidirectional Linked-List:</a:t>
+            </a:r>
+          </a:p>
+          <a:p>
+            <a:pPr marL="514350" indent="-514350">
+              <a:buFont typeface="+mj-lt"/>
+              <a:buAutoNum type="arabicPeriod"/>
+            </a:pPr>
+            <a:r>
+              <a:rPr lang="en-GB" sz="2400" dirty="0"/>
+              <a:t>Create a struct named “node”</a:t>
+            </a:r>
+          </a:p>
+          <a:p>
+            <a:pPr marL="514350" indent="-514350">
+              <a:buFont typeface="+mj-lt"/>
+              <a:buAutoNum type="arabicPeriod"/>
+            </a:pPr>
+            <a:r>
+              <a:rPr lang="en-GB" sz="2400" dirty="0"/>
+              <a:t>Create the variables “data” and “next”</a:t>
+            </a:r>
+          </a:p>
+          <a:p>
+            <a:pPr marL="514350" indent="-514350">
+              <a:buFont typeface="+mj-lt"/>
+              <a:buAutoNum type="arabicPeriod"/>
+            </a:pPr>
+            <a:r>
+              <a:rPr lang="en-GB" sz="2400" dirty="0"/>
+              <a:t>Implement a starting node named “head” and assign it to NULL (this will be the first node of the list) </a:t>
+            </a:r>
+            <a:endParaRPr lang="LID4096" sz="2400" dirty="0"/>
           </a:p>
         </p:txBody>
       </p:sp>
@@ -4991,23 +5053,21 @@
         <p:spPr>
           <a:xfrm>
             <a:off x="1669026" y="5229227"/>
-            <a:ext cx="1858297" cy="817563"/>
+            <a:ext cx="1893569" cy="818282"/>
           </a:xfrm>
           <a:prstGeom prst="rect">
             <a:avLst/>
           </a:prstGeom>
         </p:spPr>
         <p:style>
-          <a:lnRef idx="2">
-            <a:schemeClr val="accent1">
-              <a:shade val="50000"/>
-            </a:schemeClr>
+          <a:lnRef idx="0">
+            <a:schemeClr val="accent3"/>
           </a:lnRef>
-          <a:fillRef idx="1">
-            <a:schemeClr val="accent1"/>
+          <a:fillRef idx="3">
+            <a:schemeClr val="accent3"/>
           </a:fillRef>
-          <a:effectRef idx="0">
-            <a:schemeClr val="accent1"/>
+          <a:effectRef idx="3">
+            <a:schemeClr val="accent3"/>
           </a:effectRef>
           <a:fontRef idx="minor">
             <a:schemeClr val="lt1"/>
@@ -5037,23 +5097,21 @@
         <p:spPr>
           <a:xfrm>
             <a:off x="5272548" y="5214914"/>
-            <a:ext cx="1936955" cy="817563"/>
+            <a:ext cx="1973720" cy="818282"/>
           </a:xfrm>
           <a:prstGeom prst="rect">
             <a:avLst/>
           </a:prstGeom>
         </p:spPr>
         <p:style>
-          <a:lnRef idx="2">
-            <a:schemeClr val="accent1">
-              <a:shade val="50000"/>
-            </a:schemeClr>
+          <a:lnRef idx="0">
+            <a:schemeClr val="accent3"/>
           </a:lnRef>
-          <a:fillRef idx="1">
-            <a:schemeClr val="accent1"/>
+          <a:fillRef idx="3">
+            <a:schemeClr val="accent3"/>
           </a:fillRef>
-          <a:effectRef idx="0">
-            <a:schemeClr val="accent1"/>
+          <a:effectRef idx="3">
+            <a:schemeClr val="accent3"/>
           </a:effectRef>
           <a:fontRef idx="minor">
             <a:schemeClr val="lt1"/>
@@ -5064,7 +5122,13 @@
           <a:lstStyle/>
           <a:p>
             <a:pPr algn="ctr"/>
-            <a:endParaRPr lang="LID4096"/>
+            <a:endParaRPr lang="LID4096">
+              <a:solidFill>
+                <a:schemeClr val="tx2">
+                  <a:lumMod val="50000"/>
+                </a:schemeClr>
+              </a:solidFill>
+            </a:endParaRPr>
           </a:p>
         </p:txBody>
       </p:sp>
@@ -5082,24 +5146,22 @@
         </p:nvSpPr>
         <p:spPr>
           <a:xfrm>
-            <a:off x="8944894" y="5229250"/>
-            <a:ext cx="1877961" cy="817540"/>
+            <a:off x="8944894" y="5229249"/>
+            <a:ext cx="1913606" cy="818259"/>
           </a:xfrm>
           <a:prstGeom prst="rect">
             <a:avLst/>
           </a:prstGeom>
         </p:spPr>
         <p:style>
-          <a:lnRef idx="2">
-            <a:schemeClr val="accent1">
-              <a:shade val="50000"/>
-            </a:schemeClr>
+          <a:lnRef idx="0">
+            <a:schemeClr val="accent3"/>
           </a:lnRef>
-          <a:fillRef idx="1">
-            <a:schemeClr val="accent1"/>
+          <a:fillRef idx="3">
+            <a:schemeClr val="accent3"/>
           </a:fillRef>
-          <a:effectRef idx="0">
-            <a:schemeClr val="accent1"/>
+          <a:effectRef idx="3">
+            <a:schemeClr val="accent3"/>
           </a:effectRef>
           <a:fontRef idx="minor">
             <a:schemeClr val="lt1"/>
@@ -5131,8 +5193,8 @@
         </p:nvCxnSpPr>
         <p:spPr>
           <a:xfrm>
-            <a:off x="2598175" y="5229227"/>
-            <a:ext cx="0" cy="817563"/>
+            <a:off x="2615811" y="5229227"/>
+            <a:ext cx="0" cy="818282"/>
           </a:xfrm>
           <a:prstGeom prst="line">
             <a:avLst/>
@@ -5170,8 +5232,8 @@
         </p:nvCxnSpPr>
         <p:spPr>
           <a:xfrm>
-            <a:off x="6241026" y="5214914"/>
-            <a:ext cx="0" cy="817563"/>
+            <a:off x="6259408" y="5214914"/>
+            <a:ext cx="0" cy="818282"/>
           </a:xfrm>
           <a:prstGeom prst="line">
             <a:avLst/>
@@ -5209,8 +5271,8 @@
         </p:nvCxnSpPr>
         <p:spPr>
           <a:xfrm>
-            <a:off x="9883875" y="5229250"/>
-            <a:ext cx="0" cy="817540"/>
+            <a:off x="9901697" y="5229249"/>
+            <a:ext cx="0" cy="818259"/>
           </a:xfrm>
           <a:prstGeom prst="line">
             <a:avLst/>
@@ -5245,8 +5307,8 @@
         </p:nvSpPr>
         <p:spPr>
           <a:xfrm>
-            <a:off x="1796109" y="5444995"/>
-            <a:ext cx="938979" cy="369332"/>
+            <a:off x="1796109" y="5444994"/>
+            <a:ext cx="956801" cy="369332"/>
           </a:xfrm>
           <a:prstGeom prst="rect">
             <a:avLst/>
@@ -5282,20 +5344,20 @@
         <p:spPr>
           <a:xfrm>
             <a:off x="3527323" y="5433623"/>
-            <a:ext cx="1745225" cy="408770"/>
+            <a:ext cx="1778351" cy="409130"/>
           </a:xfrm>
           <a:prstGeom prst="rightArrow">
             <a:avLst/>
           </a:prstGeom>
         </p:spPr>
         <p:style>
-          <a:lnRef idx="1">
+          <a:lnRef idx="2">
             <a:schemeClr val="dk1"/>
           </a:lnRef>
-          <a:fillRef idx="2">
-            <a:schemeClr val="dk1"/>
+          <a:fillRef idx="1">
+            <a:schemeClr val="lt1"/>
           </a:fillRef>
-          <a:effectRef idx="1">
+          <a:effectRef idx="0">
             <a:schemeClr val="dk1"/>
           </a:effectRef>
           <a:fontRef idx="minor">
@@ -5311,36 +5373,6 @@
           </a:p>
         </p:txBody>
       </p:sp>
-      <p:pic>
-        <p:nvPicPr>
-          <p:cNvPr id="15" name="Picture 14">
-            <a:extLst>
-              <a:ext uri="{FF2B5EF4-FFF2-40B4-BE49-F238E27FC236}">
-                <a16:creationId xmlns:a16="http://schemas.microsoft.com/office/drawing/2014/main" id="{BBA95F3F-3AD3-49B3-BCE1-67FCC2361C8D}"/>
-              </a:ext>
-            </a:extLst>
-          </p:cNvPr>
-          <p:cNvPicPr>
-            <a:picLocks noChangeAspect="1"/>
-          </p:cNvPicPr>
-          <p:nvPr/>
-        </p:nvPicPr>
-        <p:blipFill>
-          <a:blip r:embed="rId2"/>
-          <a:stretch>
-            <a:fillRect/>
-          </a:stretch>
-        </p:blipFill>
-        <p:spPr>
-          <a:xfrm>
-            <a:off x="7209503" y="5406888"/>
-            <a:ext cx="1755800" cy="426757"/>
-          </a:xfrm>
-          <a:prstGeom prst="rect">
-            <a:avLst/>
-          </a:prstGeom>
-        </p:spPr>
-      </p:pic>
       <p:sp>
         <p:nvSpPr>
           <p:cNvPr id="16" name="TextBox 15">
@@ -5355,8 +5387,8 @@
         </p:nvSpPr>
         <p:spPr>
           <a:xfrm>
-            <a:off x="5285886" y="5444995"/>
-            <a:ext cx="934432" cy="369332"/>
+            <a:off x="5285886" y="5444994"/>
+            <a:ext cx="952168" cy="369332"/>
           </a:xfrm>
           <a:prstGeom prst="rect">
             <a:avLst/>
@@ -5391,8 +5423,8 @@
         </p:nvSpPr>
         <p:spPr>
           <a:xfrm>
-            <a:off x="2723298" y="5464313"/>
-            <a:ext cx="752161" cy="369332"/>
+            <a:off x="2723298" y="5464312"/>
+            <a:ext cx="766438" cy="369657"/>
           </a:xfrm>
           <a:prstGeom prst="rect">
             <a:avLst/>
@@ -5427,8 +5459,8 @@
         </p:nvSpPr>
         <p:spPr>
           <a:xfrm>
-            <a:off x="6313231" y="5444995"/>
-            <a:ext cx="921036" cy="369332"/>
+            <a:off x="6313231" y="5444994"/>
+            <a:ext cx="938518" cy="369657"/>
           </a:xfrm>
           <a:prstGeom prst="rect">
             <a:avLst/>
@@ -5463,8 +5495,8 @@
         </p:nvSpPr>
         <p:spPr>
           <a:xfrm>
-            <a:off x="9935864" y="5453342"/>
-            <a:ext cx="911085" cy="369332"/>
+            <a:off x="9935864" y="5453341"/>
+            <a:ext cx="928378" cy="369657"/>
           </a:xfrm>
           <a:prstGeom prst="rect">
             <a:avLst/>
@@ -5499,8 +5531,8 @@
         </p:nvSpPr>
         <p:spPr>
           <a:xfrm>
-            <a:off x="9017291" y="5453342"/>
-            <a:ext cx="896449" cy="369332"/>
+            <a:off x="9017291" y="5453341"/>
+            <a:ext cx="913464" cy="369657"/>
           </a:xfrm>
           <a:prstGeom prst="rect">
             <a:avLst/>
@@ -5539,7 +5571,7 @@
         <p:spPr>
           <a:xfrm>
             <a:off x="1242856" y="5137152"/>
-            <a:ext cx="426170" cy="500857"/>
+            <a:ext cx="426170" cy="501216"/>
           </a:xfrm>
           <a:prstGeom prst="straightConnector1">
             <a:avLst/>
@@ -5599,10 +5631,169 @@
           </a:p>
         </p:txBody>
       </p:sp>
+      <p:sp>
+        <p:nvSpPr>
+          <p:cNvPr id="23" name="Arrow: Right 22">
+            <a:extLst>
+              <a:ext uri="{FF2B5EF4-FFF2-40B4-BE49-F238E27FC236}">
+                <a16:creationId xmlns:a16="http://schemas.microsoft.com/office/drawing/2014/main" id="{A8EFB2DD-6E94-46C8-BF82-A54D75CE7A53}"/>
+              </a:ext>
+            </a:extLst>
+          </p:cNvPr>
+          <p:cNvSpPr/>
+          <p:nvPr/>
+        </p:nvSpPr>
+        <p:spPr>
+          <a:xfrm>
+            <a:off x="7210246" y="5427577"/>
+            <a:ext cx="1778351" cy="409130"/>
+          </a:xfrm>
+          <a:prstGeom prst="rightArrow">
+            <a:avLst/>
+          </a:prstGeom>
+        </p:spPr>
+        <p:style>
+          <a:lnRef idx="2">
+            <a:schemeClr val="dk1"/>
+          </a:lnRef>
+          <a:fillRef idx="1">
+            <a:schemeClr val="lt1"/>
+          </a:fillRef>
+          <a:effectRef idx="0">
+            <a:schemeClr val="dk1"/>
+          </a:effectRef>
+          <a:fontRef idx="minor">
+            <a:schemeClr val="dk1"/>
+          </a:fontRef>
+        </p:style>
+        <p:txBody>
+          <a:bodyPr rtlCol="0" anchor="ctr"/>
+          <a:lstStyle/>
+          <a:p>
+            <a:pPr algn="ctr"/>
+            <a:endParaRPr lang="LID4096"/>
+          </a:p>
+        </p:txBody>
+      </p:sp>
+      <p:pic>
+        <p:nvPicPr>
+          <p:cNvPr id="27" name="Picture 26">
+            <a:extLst>
+              <a:ext uri="{FF2B5EF4-FFF2-40B4-BE49-F238E27FC236}">
+                <a16:creationId xmlns:a16="http://schemas.microsoft.com/office/drawing/2014/main" id="{3FCE05F9-4FC2-4975-BE65-E78064FA9435}"/>
+              </a:ext>
+            </a:extLst>
+          </p:cNvPr>
+          <p:cNvPicPr>
+            <a:picLocks noChangeAspect="1"/>
+          </p:cNvPicPr>
+          <p:nvPr/>
+        </p:nvPicPr>
+        <p:blipFill>
+          <a:blip r:embed="rId2"/>
+          <a:stretch>
+            <a:fillRect/>
+          </a:stretch>
+        </p:blipFill>
+        <p:spPr>
+          <a:xfrm>
+            <a:off x="8099421" y="0"/>
+            <a:ext cx="4096867" cy="1944793"/>
+          </a:xfrm>
+          <a:prstGeom prst="rect">
+            <a:avLst/>
+          </a:prstGeom>
+        </p:spPr>
+      </p:pic>
     </p:spTree>
     <p:extLst>
       <p:ext uri="{BB962C8B-B14F-4D97-AF65-F5344CB8AC3E}">
         <p14:creationId xmlns:p14="http://schemas.microsoft.com/office/powerpoint/2010/main" val="1328981361"/>
+      </p:ext>
+    </p:extLst>
+  </p:cSld>
+  <p:clrMapOvr>
+    <a:masterClrMapping/>
+  </p:clrMapOvr>
+</p:sld>
+</file>
+
+<file path=ppt/slides/slide4.xml><?xml version="1.0" encoding="utf-8"?>
+<p:sld xmlns:a="http://schemas.openxmlformats.org/drawingml/2006/main" xmlns:r="http://schemas.openxmlformats.org/officeDocument/2006/relationships" xmlns:p="http://schemas.openxmlformats.org/presentationml/2006/main">
+  <p:cSld>
+    <p:spTree>
+      <p:nvGrpSpPr>
+        <p:cNvPr id="1" name=""/>
+        <p:cNvGrpSpPr/>
+        <p:nvPr/>
+      </p:nvGrpSpPr>
+      <p:grpSpPr>
+        <a:xfrm>
+          <a:off x="0" y="0"/>
+          <a:ext cx="0" cy="0"/>
+          <a:chOff x="0" y="0"/>
+          <a:chExt cx="0" cy="0"/>
+        </a:xfrm>
+      </p:grpSpPr>
+      <p:sp>
+        <p:nvSpPr>
+          <p:cNvPr id="9" name="Content Placeholder 8">
+            <a:extLst>
+              <a:ext uri="{FF2B5EF4-FFF2-40B4-BE49-F238E27FC236}">
+                <a16:creationId xmlns:a16="http://schemas.microsoft.com/office/drawing/2014/main" id="{8C859944-3629-47E9-8581-9F293B77A8A8}"/>
+              </a:ext>
+            </a:extLst>
+          </p:cNvPr>
+          <p:cNvSpPr>
+            <a:spLocks noGrp="1"/>
+          </p:cNvSpPr>
+          <p:nvPr>
+            <p:ph idx="1"/>
+          </p:nvPr>
+        </p:nvSpPr>
+        <p:spPr/>
+        <p:txBody>
+          <a:bodyPr/>
+          <a:lstStyle/>
+          <a:p>
+            <a:endParaRPr lang="LID4096"/>
+          </a:p>
+        </p:txBody>
+      </p:sp>
+      <p:pic>
+        <p:nvPicPr>
+          <p:cNvPr id="10" name="Picture 9">
+            <a:extLst>
+              <a:ext uri="{FF2B5EF4-FFF2-40B4-BE49-F238E27FC236}">
+                <a16:creationId xmlns:a16="http://schemas.microsoft.com/office/drawing/2014/main" id="{F052E9EE-6669-47D9-ABF2-F21AAD2AEFE3}"/>
+              </a:ext>
+            </a:extLst>
+          </p:cNvPr>
+          <p:cNvPicPr>
+            <a:picLocks noChangeAspect="1"/>
+          </p:cNvPicPr>
+          <p:nvPr/>
+        </p:nvPicPr>
+        <p:blipFill>
+          <a:blip r:embed="rId2"/>
+          <a:stretch>
+            <a:fillRect/>
+          </a:stretch>
+        </p:blipFill>
+        <p:spPr>
+          <a:xfrm>
+            <a:off x="4047566" y="2459652"/>
+            <a:ext cx="4096867" cy="1938696"/>
+          </a:xfrm>
+          <a:prstGeom prst="rect">
+            <a:avLst/>
+          </a:prstGeom>
+        </p:spPr>
+      </p:pic>
+    </p:spTree>
+    <p:extLst>
+      <p:ext uri="{BB962C8B-B14F-4D97-AF65-F5344CB8AC3E}">
+        <p14:creationId xmlns:p14="http://schemas.microsoft.com/office/powerpoint/2010/main" val="865444554"/>
       </p:ext>
     </p:extLst>
   </p:cSld>
@@ -5897,7 +6088,27 @@
       </a:bgFillStyleLst>
     </a:fmtScheme>
   </a:themeElements>
-  <a:objectDefaults/>
+  <a:objectDefaults>
+    <a:spDef>
+      <a:spPr/>
+      <a:bodyPr/>
+      <a:lstStyle/>
+      <a:style>
+        <a:lnRef idx="0">
+          <a:schemeClr val="accent3"/>
+        </a:lnRef>
+        <a:fillRef idx="3">
+          <a:schemeClr val="accent3"/>
+        </a:fillRef>
+        <a:effectRef idx="3">
+          <a:schemeClr val="accent3"/>
+        </a:effectRef>
+        <a:fontRef idx="minor">
+          <a:schemeClr val="lt1"/>
+        </a:fontRef>
+      </a:style>
+    </a:spDef>
+  </a:objectDefaults>
   <a:extraClrSchemeLst/>
   <a:extLst>
     <a:ext uri="{05A4C25C-085E-4340-85A3-A5531E510DB2}">

</xml_diff>

<commit_message>
added new content to the pptx(Insert methods)
</commit_message>
<xml_diff>
--- a/Linked_List.pptx
+++ b/Linked_List.pptx
@@ -9,6 +9,9 @@
     <p:sldId id="257" r:id="rId3"/>
     <p:sldId id="258" r:id="rId4"/>
     <p:sldId id="259" r:id="rId5"/>
+    <p:sldId id="260" r:id="rId6"/>
+    <p:sldId id="261" r:id="rId7"/>
+    <p:sldId id="262" r:id="rId8"/>
   </p:sldIdLst>
   <p:sldSz cx="12192000" cy="6858000"/>
   <p:notesSz cx="6858000" cy="9144000"/>
@@ -3029,6 +3032,81 @@
           </a:p>
         </p:txBody>
       </p:sp>
+      <p:sp>
+        <p:nvSpPr>
+          <p:cNvPr id="7" name="Rectangle 6">
+            <a:extLst>
+              <a:ext uri="{FF2B5EF4-FFF2-40B4-BE49-F238E27FC236}">
+                <a16:creationId xmlns:a16="http://schemas.microsoft.com/office/drawing/2014/main" id="{108E8AEE-472C-48FB-8A06-68252B80F04D}"/>
+              </a:ext>
+            </a:extLst>
+          </p:cNvPr>
+          <p:cNvSpPr/>
+          <p:nvPr userDrawn="1"/>
+        </p:nvSpPr>
+        <p:spPr>
+          <a:xfrm>
+            <a:off x="0" y="6256669"/>
+            <a:ext cx="12192000" cy="712839"/>
+          </a:xfrm>
+          <a:prstGeom prst="rect">
+            <a:avLst/>
+          </a:prstGeom>
+        </p:spPr>
+        <p:style>
+          <a:lnRef idx="2">
+            <a:schemeClr val="dk1">
+              <a:shade val="50000"/>
+            </a:schemeClr>
+          </a:lnRef>
+          <a:fillRef idx="1">
+            <a:schemeClr val="dk1"/>
+          </a:fillRef>
+          <a:effectRef idx="0">
+            <a:schemeClr val="dk1"/>
+          </a:effectRef>
+          <a:fontRef idx="minor">
+            <a:schemeClr val="lt1"/>
+          </a:fontRef>
+        </p:style>
+        <p:txBody>
+          <a:bodyPr rtlCol="0" anchor="ctr"/>
+          <a:lstStyle/>
+          <a:p>
+            <a:pPr algn="ctr"/>
+            <a:endParaRPr lang="LID4096"/>
+          </a:p>
+        </p:txBody>
+      </p:sp>
+      <p:pic>
+        <p:nvPicPr>
+          <p:cNvPr id="8" name="Picture 7">
+            <a:extLst>
+              <a:ext uri="{FF2B5EF4-FFF2-40B4-BE49-F238E27FC236}">
+                <a16:creationId xmlns:a16="http://schemas.microsoft.com/office/drawing/2014/main" id="{06E7B470-2347-4274-9746-7A72D7D9681E}"/>
+              </a:ext>
+            </a:extLst>
+          </p:cNvPr>
+          <p:cNvPicPr>
+            <a:picLocks noChangeAspect="1"/>
+          </p:cNvPicPr>
+          <p:nvPr userDrawn="1"/>
+        </p:nvPicPr>
+        <p:blipFill rotWithShape="1">
+          <a:blip r:embed="rId13"/>
+          <a:srcRect l="2258" t="40288" r="-2258" b="40501"/>
+          <a:stretch/>
+        </p:blipFill>
+        <p:spPr>
+          <a:xfrm>
+            <a:off x="3017460" y="6280095"/>
+            <a:ext cx="6034921" cy="636255"/>
+          </a:xfrm>
+          <a:prstGeom prst="rect">
+            <a:avLst/>
+          </a:prstGeom>
+        </p:spPr>
+      </p:pic>
     </p:spTree>
     <p:extLst>
       <p:ext uri="{BB962C8B-B14F-4D97-AF65-F5344CB8AC3E}">
@@ -4001,81 +4079,6 @@
       </p:sp>
       <p:sp>
         <p:nvSpPr>
-          <p:cNvPr id="29" name="Rectangle 28">
-            <a:extLst>
-              <a:ext uri="{FF2B5EF4-FFF2-40B4-BE49-F238E27FC236}">
-                <a16:creationId xmlns:a16="http://schemas.microsoft.com/office/drawing/2014/main" id="{326E4D36-2378-4536-AF48-0225B5AE682E}"/>
-              </a:ext>
-            </a:extLst>
-          </p:cNvPr>
-          <p:cNvSpPr/>
-          <p:nvPr/>
-        </p:nvSpPr>
-        <p:spPr>
-          <a:xfrm>
-            <a:off x="0" y="6145161"/>
-            <a:ext cx="12192000" cy="712839"/>
-          </a:xfrm>
-          <a:prstGeom prst="rect">
-            <a:avLst/>
-          </a:prstGeom>
-        </p:spPr>
-        <p:style>
-          <a:lnRef idx="2">
-            <a:schemeClr val="dk1">
-              <a:shade val="50000"/>
-            </a:schemeClr>
-          </a:lnRef>
-          <a:fillRef idx="1">
-            <a:schemeClr val="dk1"/>
-          </a:fillRef>
-          <a:effectRef idx="0">
-            <a:schemeClr val="dk1"/>
-          </a:effectRef>
-          <a:fontRef idx="minor">
-            <a:schemeClr val="lt1"/>
-          </a:fontRef>
-        </p:style>
-        <p:txBody>
-          <a:bodyPr rtlCol="0" anchor="ctr"/>
-          <a:lstStyle/>
-          <a:p>
-            <a:pPr algn="ctr"/>
-            <a:endParaRPr lang="LID4096"/>
-          </a:p>
-        </p:txBody>
-      </p:sp>
-      <p:pic>
-        <p:nvPicPr>
-          <p:cNvPr id="28" name="Picture 27">
-            <a:extLst>
-              <a:ext uri="{FF2B5EF4-FFF2-40B4-BE49-F238E27FC236}">
-                <a16:creationId xmlns:a16="http://schemas.microsoft.com/office/drawing/2014/main" id="{85943DC5-B3B7-4C10-921E-EA4414B87B17}"/>
-              </a:ext>
-            </a:extLst>
-          </p:cNvPr>
-          <p:cNvPicPr>
-            <a:picLocks noChangeAspect="1"/>
-          </p:cNvPicPr>
-          <p:nvPr/>
-        </p:nvPicPr>
-        <p:blipFill rotWithShape="1">
-          <a:blip r:embed="rId2"/>
-          <a:srcRect l="2258" t="40288" r="-2258" b="40501"/>
-          <a:stretch/>
-        </p:blipFill>
-        <p:spPr>
-          <a:xfrm>
-            <a:off x="3017460" y="6183452"/>
-            <a:ext cx="6034921" cy="636255"/>
-          </a:xfrm>
-          <a:prstGeom prst="rect">
-            <a:avLst/>
-          </a:prstGeom>
-        </p:spPr>
-      </p:pic>
-      <p:sp>
-        <p:nvSpPr>
           <p:cNvPr id="32" name="Arrow: Right 31">
             <a:extLst>
               <a:ext uri="{FF2B5EF4-FFF2-40B4-BE49-F238E27FC236}">
@@ -5737,10 +5740,10 @@
       </p:grpSpPr>
       <p:sp>
         <p:nvSpPr>
-          <p:cNvPr id="9" name="Content Placeholder 8">
-            <a:extLst>
-              <a:ext uri="{FF2B5EF4-FFF2-40B4-BE49-F238E27FC236}">
-                <a16:creationId xmlns:a16="http://schemas.microsoft.com/office/drawing/2014/main" id="{8C859944-3629-47E9-8581-9F293B77A8A8}"/>
+          <p:cNvPr id="2" name="Title 1">
+            <a:extLst>
+              <a:ext uri="{FF2B5EF4-FFF2-40B4-BE49-F238E27FC236}">
+                <a16:creationId xmlns:a16="http://schemas.microsoft.com/office/drawing/2014/main" id="{99B416AB-F636-4308-92E6-C1BE0BBDEC6F}"/>
               </a:ext>
             </a:extLst>
           </p:cNvPr>
@@ -5748,7 +5751,7 @@
             <a:spLocks noGrp="1"/>
           </p:cNvSpPr>
           <p:nvPr>
-            <p:ph idx="1"/>
+            <p:ph type="title"/>
           </p:nvPr>
         </p:nvSpPr>
         <p:spPr/>
@@ -5756,44 +5759,1250 @@
           <a:bodyPr/>
           <a:lstStyle/>
           <a:p>
+            <a:r>
+              <a:rPr lang="en-GB" dirty="0"/>
+              <a:t>Linked Lists - Insert</a:t>
+            </a:r>
+            <a:endParaRPr lang="LID4096" dirty="0"/>
+          </a:p>
+        </p:txBody>
+      </p:sp>
+      <p:sp>
+        <p:nvSpPr>
+          <p:cNvPr id="4" name="Rectangle 3">
+            <a:extLst>
+              <a:ext uri="{FF2B5EF4-FFF2-40B4-BE49-F238E27FC236}">
+                <a16:creationId xmlns:a16="http://schemas.microsoft.com/office/drawing/2014/main" id="{D5825612-114D-47E9-B625-779D2C968434}"/>
+              </a:ext>
+            </a:extLst>
+          </p:cNvPr>
+          <p:cNvSpPr/>
+          <p:nvPr/>
+        </p:nvSpPr>
+        <p:spPr>
+          <a:xfrm>
+            <a:off x="1731085" y="3527118"/>
+            <a:ext cx="1893569" cy="818282"/>
+          </a:xfrm>
+          <a:prstGeom prst="rect">
+            <a:avLst/>
+          </a:prstGeom>
+        </p:spPr>
+        <p:style>
+          <a:lnRef idx="0">
+            <a:schemeClr val="accent3"/>
+          </a:lnRef>
+          <a:fillRef idx="3">
+            <a:schemeClr val="accent3"/>
+          </a:fillRef>
+          <a:effectRef idx="3">
+            <a:schemeClr val="accent3"/>
+          </a:effectRef>
+          <a:fontRef idx="minor">
+            <a:schemeClr val="lt1"/>
+          </a:fontRef>
+        </p:style>
+        <p:txBody>
+          <a:bodyPr rtlCol="0" anchor="ctr"/>
+          <a:lstStyle/>
+          <a:p>
+            <a:pPr algn="ctr"/>
             <a:endParaRPr lang="LID4096"/>
+          </a:p>
+        </p:txBody>
+      </p:sp>
+      <p:sp>
+        <p:nvSpPr>
+          <p:cNvPr id="5" name="Rectangle 4">
+            <a:extLst>
+              <a:ext uri="{FF2B5EF4-FFF2-40B4-BE49-F238E27FC236}">
+                <a16:creationId xmlns:a16="http://schemas.microsoft.com/office/drawing/2014/main" id="{91AE9920-85EF-4DF6-935C-3FE242AB689B}"/>
+              </a:ext>
+            </a:extLst>
+          </p:cNvPr>
+          <p:cNvSpPr/>
+          <p:nvPr/>
+        </p:nvSpPr>
+        <p:spPr>
+          <a:xfrm>
+            <a:off x="5334607" y="3512805"/>
+            <a:ext cx="1973720" cy="818282"/>
+          </a:xfrm>
+          <a:prstGeom prst="rect">
+            <a:avLst/>
+          </a:prstGeom>
+        </p:spPr>
+        <p:style>
+          <a:lnRef idx="0">
+            <a:schemeClr val="accent3"/>
+          </a:lnRef>
+          <a:fillRef idx="3">
+            <a:schemeClr val="accent3"/>
+          </a:fillRef>
+          <a:effectRef idx="3">
+            <a:schemeClr val="accent3"/>
+          </a:effectRef>
+          <a:fontRef idx="minor">
+            <a:schemeClr val="lt1"/>
+          </a:fontRef>
+        </p:style>
+        <p:txBody>
+          <a:bodyPr rtlCol="0" anchor="ctr"/>
+          <a:lstStyle/>
+          <a:p>
+            <a:pPr algn="ctr"/>
+            <a:endParaRPr lang="LID4096">
+              <a:solidFill>
+                <a:schemeClr val="tx2">
+                  <a:lumMod val="50000"/>
+                </a:schemeClr>
+              </a:solidFill>
+            </a:endParaRPr>
+          </a:p>
+        </p:txBody>
+      </p:sp>
+      <p:sp>
+        <p:nvSpPr>
+          <p:cNvPr id="6" name="Rectangle 5">
+            <a:extLst>
+              <a:ext uri="{FF2B5EF4-FFF2-40B4-BE49-F238E27FC236}">
+                <a16:creationId xmlns:a16="http://schemas.microsoft.com/office/drawing/2014/main" id="{9E13C1BD-69F0-48D9-996F-38B69DC47930}"/>
+              </a:ext>
+            </a:extLst>
+          </p:cNvPr>
+          <p:cNvSpPr/>
+          <p:nvPr/>
+        </p:nvSpPr>
+        <p:spPr>
+          <a:xfrm>
+            <a:off x="9006953" y="3527140"/>
+            <a:ext cx="1913606" cy="818259"/>
+          </a:xfrm>
+          <a:prstGeom prst="rect">
+            <a:avLst/>
+          </a:prstGeom>
+        </p:spPr>
+        <p:style>
+          <a:lnRef idx="0">
+            <a:schemeClr val="accent3"/>
+          </a:lnRef>
+          <a:fillRef idx="3">
+            <a:schemeClr val="accent3"/>
+          </a:fillRef>
+          <a:effectRef idx="3">
+            <a:schemeClr val="accent3"/>
+          </a:effectRef>
+          <a:fontRef idx="minor">
+            <a:schemeClr val="lt1"/>
+          </a:fontRef>
+        </p:style>
+        <p:txBody>
+          <a:bodyPr rtlCol="0" anchor="ctr"/>
+          <a:lstStyle/>
+          <a:p>
+            <a:pPr algn="ctr"/>
+            <a:endParaRPr lang="LID4096"/>
+          </a:p>
+        </p:txBody>
+      </p:sp>
+      <p:cxnSp>
+        <p:nvCxnSpPr>
+          <p:cNvPr id="7" name="Straight Connector 6">
+            <a:extLst>
+              <a:ext uri="{FF2B5EF4-FFF2-40B4-BE49-F238E27FC236}">
+                <a16:creationId xmlns:a16="http://schemas.microsoft.com/office/drawing/2014/main" id="{D9AE8F72-A383-4868-BA92-1331B20A9ECC}"/>
+              </a:ext>
+            </a:extLst>
+          </p:cNvPr>
+          <p:cNvCxnSpPr>
+            <a:stCxn id="4" idx="0"/>
+            <a:endCxn id="4" idx="2"/>
+          </p:cNvCxnSpPr>
+          <p:nvPr/>
+        </p:nvCxnSpPr>
+        <p:spPr>
+          <a:xfrm>
+            <a:off x="2677870" y="3527118"/>
+            <a:ext cx="0" cy="818282"/>
+          </a:xfrm>
+          <a:prstGeom prst="line">
+            <a:avLst/>
+          </a:prstGeom>
+        </p:spPr>
+        <p:style>
+          <a:lnRef idx="1">
+            <a:schemeClr val="dk1"/>
+          </a:lnRef>
+          <a:fillRef idx="0">
+            <a:schemeClr val="dk1"/>
+          </a:fillRef>
+          <a:effectRef idx="0">
+            <a:schemeClr val="dk1"/>
+          </a:effectRef>
+          <a:fontRef idx="minor">
+            <a:schemeClr val="tx1"/>
+          </a:fontRef>
+        </p:style>
+      </p:cxnSp>
+      <p:cxnSp>
+        <p:nvCxnSpPr>
+          <p:cNvPr id="8" name="Straight Connector 7">
+            <a:extLst>
+              <a:ext uri="{FF2B5EF4-FFF2-40B4-BE49-F238E27FC236}">
+                <a16:creationId xmlns:a16="http://schemas.microsoft.com/office/drawing/2014/main" id="{DFF3A091-1846-42E6-B622-98B4A188E4AF}"/>
+              </a:ext>
+            </a:extLst>
+          </p:cNvPr>
+          <p:cNvCxnSpPr>
+            <a:stCxn id="5" idx="0"/>
+            <a:endCxn id="5" idx="2"/>
+          </p:cNvCxnSpPr>
+          <p:nvPr/>
+        </p:nvCxnSpPr>
+        <p:spPr>
+          <a:xfrm>
+            <a:off x="6321467" y="3512805"/>
+            <a:ext cx="0" cy="818282"/>
+          </a:xfrm>
+          <a:prstGeom prst="line">
+            <a:avLst/>
+          </a:prstGeom>
+        </p:spPr>
+        <p:style>
+          <a:lnRef idx="1">
+            <a:schemeClr val="dk1"/>
+          </a:lnRef>
+          <a:fillRef idx="0">
+            <a:schemeClr val="dk1"/>
+          </a:fillRef>
+          <a:effectRef idx="0">
+            <a:schemeClr val="dk1"/>
+          </a:effectRef>
+          <a:fontRef idx="minor">
+            <a:schemeClr val="tx1"/>
+          </a:fontRef>
+        </p:style>
+      </p:cxnSp>
+      <p:cxnSp>
+        <p:nvCxnSpPr>
+          <p:cNvPr id="9" name="Straight Connector 8">
+            <a:extLst>
+              <a:ext uri="{FF2B5EF4-FFF2-40B4-BE49-F238E27FC236}">
+                <a16:creationId xmlns:a16="http://schemas.microsoft.com/office/drawing/2014/main" id="{21F2C9F8-484E-4A2F-A092-3CACB1148A79}"/>
+              </a:ext>
+            </a:extLst>
+          </p:cNvPr>
+          <p:cNvCxnSpPr>
+            <a:stCxn id="6" idx="0"/>
+            <a:endCxn id="6" idx="2"/>
+          </p:cNvCxnSpPr>
+          <p:nvPr/>
+        </p:nvCxnSpPr>
+        <p:spPr>
+          <a:xfrm>
+            <a:off x="9963756" y="3527140"/>
+            <a:ext cx="0" cy="818259"/>
+          </a:xfrm>
+          <a:prstGeom prst="line">
+            <a:avLst/>
+          </a:prstGeom>
+        </p:spPr>
+        <p:style>
+          <a:lnRef idx="1">
+            <a:schemeClr val="dk1"/>
+          </a:lnRef>
+          <a:fillRef idx="0">
+            <a:schemeClr val="dk1"/>
+          </a:fillRef>
+          <a:effectRef idx="0">
+            <a:schemeClr val="dk1"/>
+          </a:effectRef>
+          <a:fontRef idx="minor">
+            <a:schemeClr val="tx1"/>
+          </a:fontRef>
+        </p:style>
+      </p:cxnSp>
+      <p:sp>
+        <p:nvSpPr>
+          <p:cNvPr id="10" name="TextBox 9">
+            <a:extLst>
+              <a:ext uri="{FF2B5EF4-FFF2-40B4-BE49-F238E27FC236}">
+                <a16:creationId xmlns:a16="http://schemas.microsoft.com/office/drawing/2014/main" id="{9F99B38B-D275-4E3B-9485-62A81F7E2634}"/>
+              </a:ext>
+            </a:extLst>
+          </p:cNvPr>
+          <p:cNvSpPr txBox="1"/>
+          <p:nvPr/>
+        </p:nvSpPr>
+        <p:spPr>
+          <a:xfrm>
+            <a:off x="1858168" y="3742885"/>
+            <a:ext cx="956801" cy="369332"/>
+          </a:xfrm>
+          <a:prstGeom prst="rect">
+            <a:avLst/>
+          </a:prstGeom>
+          <a:noFill/>
+        </p:spPr>
+        <p:txBody>
+          <a:bodyPr wrap="square" rtlCol="0">
+            <a:spAutoFit/>
+          </a:bodyPr>
+          <a:lstStyle/>
+          <a:p>
+            <a:r>
+              <a:rPr lang="en-GB" dirty="0"/>
+              <a:t>“my”</a:t>
+            </a:r>
+            <a:endParaRPr lang="LID4096" dirty="0"/>
+          </a:p>
+        </p:txBody>
+      </p:sp>
+      <p:sp>
+        <p:nvSpPr>
+          <p:cNvPr id="11" name="Arrow: Right 10">
+            <a:extLst>
+              <a:ext uri="{FF2B5EF4-FFF2-40B4-BE49-F238E27FC236}">
+                <a16:creationId xmlns:a16="http://schemas.microsoft.com/office/drawing/2014/main" id="{8F76FBEA-8BED-4316-8627-70445F44FA2B}"/>
+              </a:ext>
+            </a:extLst>
+          </p:cNvPr>
+          <p:cNvSpPr/>
+          <p:nvPr/>
+        </p:nvSpPr>
+        <p:spPr>
+          <a:xfrm>
+            <a:off x="3616037" y="3731514"/>
+            <a:ext cx="1747320" cy="409130"/>
+          </a:xfrm>
+          <a:prstGeom prst="rightArrow">
+            <a:avLst/>
+          </a:prstGeom>
+        </p:spPr>
+        <p:style>
+          <a:lnRef idx="2">
+            <a:schemeClr val="dk1"/>
+          </a:lnRef>
+          <a:fillRef idx="1">
+            <a:schemeClr val="lt1"/>
+          </a:fillRef>
+          <a:effectRef idx="0">
+            <a:schemeClr val="dk1"/>
+          </a:effectRef>
+          <a:fontRef idx="minor">
+            <a:schemeClr val="dk1"/>
+          </a:fontRef>
+        </p:style>
+        <p:txBody>
+          <a:bodyPr rtlCol="0" anchor="ctr"/>
+          <a:lstStyle/>
+          <a:p>
+            <a:pPr algn="ctr"/>
+            <a:endParaRPr lang="LID4096"/>
+          </a:p>
+        </p:txBody>
+      </p:sp>
+      <p:sp>
+        <p:nvSpPr>
+          <p:cNvPr id="12" name="TextBox 11">
+            <a:extLst>
+              <a:ext uri="{FF2B5EF4-FFF2-40B4-BE49-F238E27FC236}">
+                <a16:creationId xmlns:a16="http://schemas.microsoft.com/office/drawing/2014/main" id="{350101FF-222A-493D-BA3D-80B603171F22}"/>
+              </a:ext>
+            </a:extLst>
+          </p:cNvPr>
+          <p:cNvSpPr txBox="1"/>
+          <p:nvPr/>
+        </p:nvSpPr>
+        <p:spPr>
+          <a:xfrm>
+            <a:off x="5347945" y="3742885"/>
+            <a:ext cx="952168" cy="369332"/>
+          </a:xfrm>
+          <a:prstGeom prst="rect">
+            <a:avLst/>
+          </a:prstGeom>
+          <a:noFill/>
+        </p:spPr>
+        <p:txBody>
+          <a:bodyPr wrap="square" rtlCol="0">
+            <a:spAutoFit/>
+          </a:bodyPr>
+          <a:lstStyle/>
+          <a:p>
+            <a:r>
+              <a:rPr lang="en-GB" dirty="0"/>
+              <a:t>“Name”</a:t>
+            </a:r>
+            <a:endParaRPr lang="LID4096" dirty="0"/>
+          </a:p>
+        </p:txBody>
+      </p:sp>
+      <p:sp>
+        <p:nvSpPr>
+          <p:cNvPr id="13" name="TextBox 12">
+            <a:extLst>
+              <a:ext uri="{FF2B5EF4-FFF2-40B4-BE49-F238E27FC236}">
+                <a16:creationId xmlns:a16="http://schemas.microsoft.com/office/drawing/2014/main" id="{0DDB6737-2ED9-4D6A-9604-15DEE6738B4E}"/>
+              </a:ext>
+            </a:extLst>
+          </p:cNvPr>
+          <p:cNvSpPr txBox="1"/>
+          <p:nvPr/>
+        </p:nvSpPr>
+        <p:spPr>
+          <a:xfrm>
+            <a:off x="2785357" y="3762203"/>
+            <a:ext cx="766438" cy="369657"/>
+          </a:xfrm>
+          <a:prstGeom prst="rect">
+            <a:avLst/>
+          </a:prstGeom>
+          <a:noFill/>
+        </p:spPr>
+        <p:txBody>
+          <a:bodyPr wrap="square" rtlCol="0">
+            <a:spAutoFit/>
+          </a:bodyPr>
+          <a:lstStyle/>
+          <a:p>
+            <a:r>
+              <a:rPr lang="en-GB" dirty="0"/>
+              <a:t>1921</a:t>
+            </a:r>
+            <a:endParaRPr lang="LID4096" dirty="0"/>
+          </a:p>
+        </p:txBody>
+      </p:sp>
+      <p:sp>
+        <p:nvSpPr>
+          <p:cNvPr id="14" name="TextBox 13">
+            <a:extLst>
+              <a:ext uri="{FF2B5EF4-FFF2-40B4-BE49-F238E27FC236}">
+                <a16:creationId xmlns:a16="http://schemas.microsoft.com/office/drawing/2014/main" id="{3F4448DB-4377-4FC2-AEB6-BF18142E007B}"/>
+              </a:ext>
+            </a:extLst>
+          </p:cNvPr>
+          <p:cNvSpPr txBox="1"/>
+          <p:nvPr/>
+        </p:nvSpPr>
+        <p:spPr>
+          <a:xfrm>
+            <a:off x="6375290" y="3742885"/>
+            <a:ext cx="938518" cy="369657"/>
+          </a:xfrm>
+          <a:prstGeom prst="rect">
+            <a:avLst/>
+          </a:prstGeom>
+          <a:noFill/>
+        </p:spPr>
+        <p:txBody>
+          <a:bodyPr wrap="square" rtlCol="0">
+            <a:spAutoFit/>
+          </a:bodyPr>
+          <a:lstStyle/>
+          <a:p>
+            <a:r>
+              <a:rPr lang="en-GB" dirty="0"/>
+              <a:t>89122</a:t>
+            </a:r>
+            <a:endParaRPr lang="LID4096" dirty="0"/>
+          </a:p>
+        </p:txBody>
+      </p:sp>
+      <p:sp>
+        <p:nvSpPr>
+          <p:cNvPr id="15" name="TextBox 14">
+            <a:extLst>
+              <a:ext uri="{FF2B5EF4-FFF2-40B4-BE49-F238E27FC236}">
+                <a16:creationId xmlns:a16="http://schemas.microsoft.com/office/drawing/2014/main" id="{84124798-7BFB-4972-A635-94E452025683}"/>
+              </a:ext>
+            </a:extLst>
+          </p:cNvPr>
+          <p:cNvSpPr txBox="1"/>
+          <p:nvPr/>
+        </p:nvSpPr>
+        <p:spPr>
+          <a:xfrm>
+            <a:off x="9997923" y="3751232"/>
+            <a:ext cx="928378" cy="369657"/>
+          </a:xfrm>
+          <a:prstGeom prst="rect">
+            <a:avLst/>
+          </a:prstGeom>
+          <a:noFill/>
+        </p:spPr>
+        <p:txBody>
+          <a:bodyPr wrap="square" rtlCol="0">
+            <a:spAutoFit/>
+          </a:bodyPr>
+          <a:lstStyle/>
+          <a:p>
+            <a:r>
+              <a:rPr lang="en-GB" dirty="0"/>
+              <a:t>172891</a:t>
+            </a:r>
+            <a:endParaRPr lang="LID4096" dirty="0"/>
+          </a:p>
+        </p:txBody>
+      </p:sp>
+      <p:sp>
+        <p:nvSpPr>
+          <p:cNvPr id="16" name="TextBox 15">
+            <a:extLst>
+              <a:ext uri="{FF2B5EF4-FFF2-40B4-BE49-F238E27FC236}">
+                <a16:creationId xmlns:a16="http://schemas.microsoft.com/office/drawing/2014/main" id="{E06CA8DA-C6B1-4237-A5CF-3A0496579748}"/>
+              </a:ext>
+            </a:extLst>
+          </p:cNvPr>
+          <p:cNvSpPr txBox="1"/>
+          <p:nvPr/>
+        </p:nvSpPr>
+        <p:spPr>
+          <a:xfrm>
+            <a:off x="9079350" y="3751232"/>
+            <a:ext cx="913464" cy="369657"/>
+          </a:xfrm>
+          <a:prstGeom prst="rect">
+            <a:avLst/>
+          </a:prstGeom>
+          <a:noFill/>
+        </p:spPr>
+        <p:txBody>
+          <a:bodyPr wrap="square" rtlCol="0">
+            <a:spAutoFit/>
+          </a:bodyPr>
+          <a:lstStyle/>
+          <a:p>
+            <a:r>
+              <a:rPr lang="en-GB" dirty="0"/>
+              <a:t>“Yanis”</a:t>
+            </a:r>
+            <a:endParaRPr lang="LID4096" dirty="0"/>
+          </a:p>
+        </p:txBody>
+      </p:sp>
+      <p:cxnSp>
+        <p:nvCxnSpPr>
+          <p:cNvPr id="17" name="Straight Arrow Connector 16">
+            <a:extLst>
+              <a:ext uri="{FF2B5EF4-FFF2-40B4-BE49-F238E27FC236}">
+                <a16:creationId xmlns:a16="http://schemas.microsoft.com/office/drawing/2014/main" id="{F1B327A4-2830-43D4-B4C8-A581E7C27A4E}"/>
+              </a:ext>
+            </a:extLst>
+          </p:cNvPr>
+          <p:cNvCxnSpPr>
+            <a:cxnSpLocks/>
+            <a:endCxn id="4" idx="1"/>
+          </p:cNvCxnSpPr>
+          <p:nvPr/>
+        </p:nvCxnSpPr>
+        <p:spPr>
+          <a:xfrm>
+            <a:off x="1304915" y="3435043"/>
+            <a:ext cx="426170" cy="501216"/>
+          </a:xfrm>
+          <a:prstGeom prst="straightConnector1">
+            <a:avLst/>
+          </a:prstGeom>
+          <a:ln>
+            <a:tailEnd type="triangle"/>
+          </a:ln>
+        </p:spPr>
+        <p:style>
+          <a:lnRef idx="1">
+            <a:schemeClr val="accent1"/>
+          </a:lnRef>
+          <a:fillRef idx="0">
+            <a:schemeClr val="accent1"/>
+          </a:fillRef>
+          <a:effectRef idx="0">
+            <a:schemeClr val="accent1"/>
+          </a:effectRef>
+          <a:fontRef idx="minor">
+            <a:schemeClr val="tx1"/>
+          </a:fontRef>
+        </p:style>
+      </p:cxnSp>
+      <p:sp>
+        <p:nvSpPr>
+          <p:cNvPr id="18" name="TextBox 17">
+            <a:extLst>
+              <a:ext uri="{FF2B5EF4-FFF2-40B4-BE49-F238E27FC236}">
+                <a16:creationId xmlns:a16="http://schemas.microsoft.com/office/drawing/2014/main" id="{729824FC-E4C8-4730-8565-B4395756526B}"/>
+              </a:ext>
+            </a:extLst>
+          </p:cNvPr>
+          <p:cNvSpPr txBox="1"/>
+          <p:nvPr/>
+        </p:nvSpPr>
+        <p:spPr>
+          <a:xfrm>
+            <a:off x="868497" y="3142763"/>
+            <a:ext cx="1386348" cy="370042"/>
+          </a:xfrm>
+          <a:prstGeom prst="rect">
+            <a:avLst/>
+          </a:prstGeom>
+          <a:noFill/>
+        </p:spPr>
+        <p:txBody>
+          <a:bodyPr wrap="square" rtlCol="0">
+            <a:spAutoFit/>
+          </a:bodyPr>
+          <a:lstStyle/>
+          <a:p>
+            <a:r>
+              <a:rPr lang="en-GB" dirty="0"/>
+              <a:t>_head</a:t>
+            </a:r>
+            <a:endParaRPr lang="LID4096" dirty="0"/>
+          </a:p>
+        </p:txBody>
+      </p:sp>
+      <p:sp>
+        <p:nvSpPr>
+          <p:cNvPr id="19" name="Arrow: Right 18">
+            <a:extLst>
+              <a:ext uri="{FF2B5EF4-FFF2-40B4-BE49-F238E27FC236}">
+                <a16:creationId xmlns:a16="http://schemas.microsoft.com/office/drawing/2014/main" id="{5E17600B-C88A-4507-A868-E74914A85ED6}"/>
+              </a:ext>
+            </a:extLst>
+          </p:cNvPr>
+          <p:cNvSpPr/>
+          <p:nvPr/>
+        </p:nvSpPr>
+        <p:spPr>
+          <a:xfrm>
+            <a:off x="7272305" y="3725468"/>
+            <a:ext cx="1778351" cy="409130"/>
+          </a:xfrm>
+          <a:prstGeom prst="rightArrow">
+            <a:avLst/>
+          </a:prstGeom>
+        </p:spPr>
+        <p:style>
+          <a:lnRef idx="2">
+            <a:schemeClr val="dk1"/>
+          </a:lnRef>
+          <a:fillRef idx="1">
+            <a:schemeClr val="lt1"/>
+          </a:fillRef>
+          <a:effectRef idx="0">
+            <a:schemeClr val="dk1"/>
+          </a:effectRef>
+          <a:fontRef idx="minor">
+            <a:schemeClr val="dk1"/>
+          </a:fontRef>
+        </p:style>
+        <p:txBody>
+          <a:bodyPr rtlCol="0" anchor="ctr"/>
+          <a:lstStyle/>
+          <a:p>
+            <a:pPr algn="ctr"/>
+            <a:endParaRPr lang="LID4096"/>
+          </a:p>
+        </p:txBody>
+      </p:sp>
+      <p:sp>
+        <p:nvSpPr>
+          <p:cNvPr id="20" name="Rectangle 19">
+            <a:extLst>
+              <a:ext uri="{FF2B5EF4-FFF2-40B4-BE49-F238E27FC236}">
+                <a16:creationId xmlns:a16="http://schemas.microsoft.com/office/drawing/2014/main" id="{7F7E0269-8D20-4F84-8C63-4B6E5D2DDEEE}"/>
+              </a:ext>
+            </a:extLst>
+          </p:cNvPr>
+          <p:cNvSpPr/>
+          <p:nvPr/>
+        </p:nvSpPr>
+        <p:spPr>
+          <a:xfrm rot="1187312">
+            <a:off x="7419014" y="3950999"/>
+            <a:ext cx="1491897" cy="45719"/>
+          </a:xfrm>
+          <a:prstGeom prst="rect">
+            <a:avLst/>
+          </a:prstGeom>
+          <a:solidFill>
+            <a:srgbClr val="FF0000"/>
+          </a:solidFill>
+        </p:spPr>
+        <p:style>
+          <a:lnRef idx="0">
+            <a:schemeClr val="accent3"/>
+          </a:lnRef>
+          <a:fillRef idx="3">
+            <a:schemeClr val="accent3"/>
+          </a:fillRef>
+          <a:effectRef idx="3">
+            <a:schemeClr val="accent3"/>
+          </a:effectRef>
+          <a:fontRef idx="minor">
+            <a:schemeClr val="lt1"/>
+          </a:fontRef>
+        </p:style>
+        <p:txBody>
+          <a:bodyPr rtlCol="0" anchor="ctr"/>
+          <a:lstStyle/>
+          <a:p>
+            <a:pPr algn="ctr"/>
+            <a:endParaRPr lang="LID4096">
+              <a:solidFill>
+                <a:srgbClr val="FF0000"/>
+              </a:solidFill>
+            </a:endParaRPr>
+          </a:p>
+        </p:txBody>
+      </p:sp>
+      <p:sp>
+        <p:nvSpPr>
+          <p:cNvPr id="21" name="Rectangle 20">
+            <a:extLst>
+              <a:ext uri="{FF2B5EF4-FFF2-40B4-BE49-F238E27FC236}">
+                <a16:creationId xmlns:a16="http://schemas.microsoft.com/office/drawing/2014/main" id="{AC639E97-5231-43FB-8505-BD40C6E28FE8}"/>
+              </a:ext>
+            </a:extLst>
+          </p:cNvPr>
+          <p:cNvSpPr/>
+          <p:nvPr/>
+        </p:nvSpPr>
+        <p:spPr>
+          <a:xfrm>
+            <a:off x="7609743" y="1914351"/>
+            <a:ext cx="1973720" cy="818282"/>
+          </a:xfrm>
+          <a:prstGeom prst="rect">
+            <a:avLst/>
+          </a:prstGeom>
+        </p:spPr>
+        <p:style>
+          <a:lnRef idx="0">
+            <a:schemeClr val="accent6"/>
+          </a:lnRef>
+          <a:fillRef idx="3">
+            <a:schemeClr val="accent6"/>
+          </a:fillRef>
+          <a:effectRef idx="3">
+            <a:schemeClr val="accent6"/>
+          </a:effectRef>
+          <a:fontRef idx="minor">
+            <a:schemeClr val="lt1"/>
+          </a:fontRef>
+        </p:style>
+        <p:txBody>
+          <a:bodyPr rtlCol="0" anchor="ctr"/>
+          <a:lstStyle/>
+          <a:p>
+            <a:pPr algn="ctr"/>
+            <a:endParaRPr lang="LID4096">
+              <a:solidFill>
+                <a:schemeClr val="tx2">
+                  <a:lumMod val="50000"/>
+                </a:schemeClr>
+              </a:solidFill>
+            </a:endParaRPr>
+          </a:p>
+        </p:txBody>
+      </p:sp>
+      <p:cxnSp>
+        <p:nvCxnSpPr>
+          <p:cNvPr id="22" name="Straight Connector 21">
+            <a:extLst>
+              <a:ext uri="{FF2B5EF4-FFF2-40B4-BE49-F238E27FC236}">
+                <a16:creationId xmlns:a16="http://schemas.microsoft.com/office/drawing/2014/main" id="{282F5BD9-90ED-4489-9253-B9FC8030D549}"/>
+              </a:ext>
+            </a:extLst>
+          </p:cNvPr>
+          <p:cNvCxnSpPr>
+            <a:cxnSpLocks/>
+            <a:stCxn id="21" idx="0"/>
+            <a:endCxn id="21" idx="2"/>
+          </p:cNvCxnSpPr>
+          <p:nvPr/>
+        </p:nvCxnSpPr>
+        <p:spPr>
+          <a:xfrm>
+            <a:off x="8596603" y="1914351"/>
+            <a:ext cx="0" cy="818282"/>
+          </a:xfrm>
+          <a:prstGeom prst="line">
+            <a:avLst/>
+          </a:prstGeom>
+        </p:spPr>
+        <p:style>
+          <a:lnRef idx="1">
+            <a:schemeClr val="dk1"/>
+          </a:lnRef>
+          <a:fillRef idx="0">
+            <a:schemeClr val="dk1"/>
+          </a:fillRef>
+          <a:effectRef idx="0">
+            <a:schemeClr val="dk1"/>
+          </a:effectRef>
+          <a:fontRef idx="minor">
+            <a:schemeClr val="tx1"/>
+          </a:fontRef>
+        </p:style>
+      </p:cxnSp>
+      <p:sp>
+        <p:nvSpPr>
+          <p:cNvPr id="23" name="TextBox 22">
+            <a:extLst>
+              <a:ext uri="{FF2B5EF4-FFF2-40B4-BE49-F238E27FC236}">
+                <a16:creationId xmlns:a16="http://schemas.microsoft.com/office/drawing/2014/main" id="{09134736-551A-4D0F-B5B1-A76E29A5488C}"/>
+              </a:ext>
+            </a:extLst>
+          </p:cNvPr>
+          <p:cNvSpPr txBox="1"/>
+          <p:nvPr/>
+        </p:nvSpPr>
+        <p:spPr>
+          <a:xfrm>
+            <a:off x="7849210" y="2139630"/>
+            <a:ext cx="952168" cy="369332"/>
+          </a:xfrm>
+          <a:prstGeom prst="rect">
+            <a:avLst/>
+          </a:prstGeom>
+          <a:noFill/>
+        </p:spPr>
+        <p:txBody>
+          <a:bodyPr wrap="square" rtlCol="0">
+            <a:spAutoFit/>
+          </a:bodyPr>
+          <a:lstStyle/>
+          <a:p>
+            <a:r>
+              <a:rPr lang="en-GB" dirty="0"/>
+              <a:t>“is”</a:t>
+            </a:r>
+            <a:endParaRPr lang="LID4096" dirty="0"/>
+          </a:p>
+        </p:txBody>
+      </p:sp>
+      <p:sp>
+        <p:nvSpPr>
+          <p:cNvPr id="24" name="TextBox 23">
+            <a:extLst>
+              <a:ext uri="{FF2B5EF4-FFF2-40B4-BE49-F238E27FC236}">
+                <a16:creationId xmlns:a16="http://schemas.microsoft.com/office/drawing/2014/main" id="{83D88607-6D14-41CA-8B29-AD0B26D71734}"/>
+              </a:ext>
+            </a:extLst>
+          </p:cNvPr>
+          <p:cNvSpPr txBox="1"/>
+          <p:nvPr/>
+        </p:nvSpPr>
+        <p:spPr>
+          <a:xfrm>
+            <a:off x="8758802" y="2139305"/>
+            <a:ext cx="938518" cy="369657"/>
+          </a:xfrm>
+          <a:prstGeom prst="rect">
+            <a:avLst/>
+          </a:prstGeom>
+          <a:noFill/>
+        </p:spPr>
+        <p:txBody>
+          <a:bodyPr wrap="square" rtlCol="0">
+            <a:spAutoFit/>
+          </a:bodyPr>
+          <a:lstStyle/>
+          <a:p>
+            <a:r>
+              <a:rPr lang="en-GB" dirty="0"/>
+              <a:t>89122</a:t>
+            </a:r>
+            <a:endParaRPr lang="LID4096" dirty="0"/>
+          </a:p>
+        </p:txBody>
+      </p:sp>
+      <p:sp>
+        <p:nvSpPr>
+          <p:cNvPr id="39" name="Arrow: Bent-Up 38">
+            <a:extLst>
+              <a:ext uri="{FF2B5EF4-FFF2-40B4-BE49-F238E27FC236}">
+                <a16:creationId xmlns:a16="http://schemas.microsoft.com/office/drawing/2014/main" id="{B434C2AD-7C97-4042-B202-6BE5EFE0EE4E}"/>
+              </a:ext>
+            </a:extLst>
+          </p:cNvPr>
+          <p:cNvSpPr/>
+          <p:nvPr/>
+        </p:nvSpPr>
+        <p:spPr>
+          <a:xfrm rot="5400000" flipH="1">
+            <a:off x="6435578" y="2343850"/>
+            <a:ext cx="1372874" cy="937371"/>
+          </a:xfrm>
+          <a:prstGeom prst="bentUpArrow">
+            <a:avLst/>
+          </a:prstGeom>
+        </p:spPr>
+        <p:style>
+          <a:lnRef idx="2">
+            <a:schemeClr val="dk1"/>
+          </a:lnRef>
+          <a:fillRef idx="1">
+            <a:schemeClr val="lt1"/>
+          </a:fillRef>
+          <a:effectRef idx="0">
+            <a:schemeClr val="dk1"/>
+          </a:effectRef>
+          <a:fontRef idx="minor">
+            <a:schemeClr val="dk1"/>
+          </a:fontRef>
+        </p:style>
+        <p:txBody>
+          <a:bodyPr rtlCol="0" anchor="ctr"/>
+          <a:lstStyle/>
+          <a:p>
+            <a:pPr algn="ctr"/>
+            <a:endParaRPr lang="LID4096" dirty="0"/>
+          </a:p>
+        </p:txBody>
+      </p:sp>
+      <p:sp>
+        <p:nvSpPr>
+          <p:cNvPr id="43" name="Arrow: Down 42">
+            <a:extLst>
+              <a:ext uri="{FF2B5EF4-FFF2-40B4-BE49-F238E27FC236}">
+                <a16:creationId xmlns:a16="http://schemas.microsoft.com/office/drawing/2014/main" id="{34280267-949E-4D35-93F2-018FECFDBFAA}"/>
+              </a:ext>
+            </a:extLst>
+          </p:cNvPr>
+          <p:cNvSpPr/>
+          <p:nvPr/>
+        </p:nvSpPr>
+        <p:spPr>
+          <a:xfrm>
+            <a:off x="9050656" y="2732633"/>
+            <a:ext cx="469250" cy="794089"/>
+          </a:xfrm>
+          <a:prstGeom prst="downArrow">
+            <a:avLst/>
+          </a:prstGeom>
+        </p:spPr>
+        <p:style>
+          <a:lnRef idx="2">
+            <a:schemeClr val="dk1"/>
+          </a:lnRef>
+          <a:fillRef idx="1">
+            <a:schemeClr val="lt1"/>
+          </a:fillRef>
+          <a:effectRef idx="0">
+            <a:schemeClr val="dk1"/>
+          </a:effectRef>
+          <a:fontRef idx="minor">
+            <a:schemeClr val="dk1"/>
+          </a:fontRef>
+        </p:style>
+        <p:txBody>
+          <a:bodyPr rtlCol="0" anchor="ctr"/>
+          <a:lstStyle/>
+          <a:p>
+            <a:pPr algn="ctr"/>
+            <a:endParaRPr lang="LID4096"/>
+          </a:p>
+        </p:txBody>
+      </p:sp>
+    </p:spTree>
+    <p:extLst>
+      <p:ext uri="{BB962C8B-B14F-4D97-AF65-F5344CB8AC3E}">
+        <p14:creationId xmlns:p14="http://schemas.microsoft.com/office/powerpoint/2010/main" val="344242264"/>
+      </p:ext>
+    </p:extLst>
+  </p:cSld>
+  <p:clrMapOvr>
+    <a:masterClrMapping/>
+  </p:clrMapOvr>
+</p:sld>
+</file>
+
+<file path=ppt/slides/slide5.xml><?xml version="1.0" encoding="utf-8"?>
+<p:sld xmlns:a="http://schemas.openxmlformats.org/drawingml/2006/main" xmlns:r="http://schemas.openxmlformats.org/officeDocument/2006/relationships" xmlns:p="http://schemas.openxmlformats.org/presentationml/2006/main">
+  <p:cSld>
+    <p:spTree>
+      <p:nvGrpSpPr>
+        <p:cNvPr id="1" name=""/>
+        <p:cNvGrpSpPr/>
+        <p:nvPr/>
+      </p:nvGrpSpPr>
+      <p:grpSpPr>
+        <a:xfrm>
+          <a:off x="0" y="0"/>
+          <a:ext cx="0" cy="0"/>
+          <a:chOff x="0" y="0"/>
+          <a:chExt cx="0" cy="0"/>
+        </a:xfrm>
+      </p:grpSpPr>
+      <p:sp>
+        <p:nvSpPr>
+          <p:cNvPr id="2" name="Title 1">
+            <a:extLst>
+              <a:ext uri="{FF2B5EF4-FFF2-40B4-BE49-F238E27FC236}">
+                <a16:creationId xmlns:a16="http://schemas.microsoft.com/office/drawing/2014/main" id="{397F9B61-FE15-4F84-A545-0E7D44C65710}"/>
+              </a:ext>
+            </a:extLst>
+          </p:cNvPr>
+          <p:cNvSpPr>
+            <a:spLocks noGrp="1"/>
+          </p:cNvSpPr>
+          <p:nvPr>
+            <p:ph type="title"/>
+          </p:nvPr>
+        </p:nvSpPr>
+        <p:spPr>
+          <a:xfrm>
+            <a:off x="838199" y="0"/>
+            <a:ext cx="10515600" cy="1325563"/>
+          </a:xfrm>
+        </p:spPr>
+        <p:txBody>
+          <a:bodyPr/>
+          <a:lstStyle/>
+          <a:p>
+            <a:r>
+              <a:rPr lang="en-GB" dirty="0"/>
+              <a:t>Linked Lists – Insert at the Beginning</a:t>
+            </a:r>
+            <a:endParaRPr lang="LID4096" dirty="0"/>
           </a:p>
         </p:txBody>
       </p:sp>
       <p:pic>
         <p:nvPicPr>
-          <p:cNvPr id="10" name="Picture 9">
-            <a:extLst>
-              <a:ext uri="{FF2B5EF4-FFF2-40B4-BE49-F238E27FC236}">
-                <a16:creationId xmlns:a16="http://schemas.microsoft.com/office/drawing/2014/main" id="{F052E9EE-6669-47D9-ABF2-F21AAD2AEFE3}"/>
+          <p:cNvPr id="5" name="Content Placeholder 4" descr="Text&#10;&#10;Description automatically generated">
+            <a:extLst>
+              <a:ext uri="{FF2B5EF4-FFF2-40B4-BE49-F238E27FC236}">
+                <a16:creationId xmlns:a16="http://schemas.microsoft.com/office/drawing/2014/main" id="{BBD62933-2C16-4E01-8766-F3620CCD488C}"/>
               </a:ext>
             </a:extLst>
           </p:cNvPr>
           <p:cNvPicPr>
-            <a:picLocks noChangeAspect="1"/>
+            <a:picLocks noGrp="1" noChangeAspect="1"/>
           </p:cNvPicPr>
-          <p:nvPr/>
+          <p:nvPr>
+            <p:ph idx="1"/>
+          </p:nvPr>
         </p:nvPicPr>
-        <p:blipFill>
-          <a:blip r:embed="rId2"/>
-          <a:stretch>
-            <a:fillRect/>
-          </a:stretch>
+        <p:blipFill rotWithShape="1">
+          <a:blip r:embed="rId2">
+            <a:extLst>
+              <a:ext uri="{28A0092B-C50C-407E-A947-70E740481C1C}">
+                <a14:useLocalDpi xmlns:a14="http://schemas.microsoft.com/office/drawing/2010/main" val="0"/>
+              </a:ext>
+            </a:extLst>
+          </a:blip>
+          <a:srcRect t="18325"/>
+          <a:stretch/>
         </p:blipFill>
         <p:spPr>
           <a:xfrm>
-            <a:off x="4047566" y="2459652"/>
-            <a:ext cx="4096867" cy="1938696"/>
-          </a:xfrm>
-          <a:prstGeom prst="rect">
-            <a:avLst/>
-          </a:prstGeom>
+            <a:off x="2951505" y="1325563"/>
+            <a:ext cx="6288987" cy="4845982"/>
+          </a:xfrm>
         </p:spPr>
       </p:pic>
     </p:spTree>
     <p:extLst>
       <p:ext uri="{BB962C8B-B14F-4D97-AF65-F5344CB8AC3E}">
-        <p14:creationId xmlns:p14="http://schemas.microsoft.com/office/powerpoint/2010/main" val="865444554"/>
+        <p14:creationId xmlns:p14="http://schemas.microsoft.com/office/powerpoint/2010/main" val="2473947929"/>
+      </p:ext>
+    </p:extLst>
+  </p:cSld>
+  <p:clrMapOvr>
+    <a:masterClrMapping/>
+  </p:clrMapOvr>
+</p:sld>
+</file>
+
+<file path=ppt/slides/slide6.xml><?xml version="1.0" encoding="utf-8"?>
+<p:sld xmlns:a="http://schemas.openxmlformats.org/drawingml/2006/main" xmlns:r="http://schemas.openxmlformats.org/officeDocument/2006/relationships" xmlns:p="http://schemas.openxmlformats.org/presentationml/2006/main">
+  <p:cSld>
+    <p:spTree>
+      <p:nvGrpSpPr>
+        <p:cNvPr id="1" name=""/>
+        <p:cNvGrpSpPr/>
+        <p:nvPr/>
+      </p:nvGrpSpPr>
+      <p:grpSpPr>
+        <a:xfrm>
+          <a:off x="0" y="0"/>
+          <a:ext cx="0" cy="0"/>
+          <a:chOff x="0" y="0"/>
+          <a:chExt cx="0" cy="0"/>
+        </a:xfrm>
+      </p:grpSpPr>
+      <p:sp>
+        <p:nvSpPr>
+          <p:cNvPr id="2" name="Title 1">
+            <a:extLst>
+              <a:ext uri="{FF2B5EF4-FFF2-40B4-BE49-F238E27FC236}">
+                <a16:creationId xmlns:a16="http://schemas.microsoft.com/office/drawing/2014/main" id="{8DAD2FEE-4AD2-420A-90AB-581BED8E748C}"/>
+              </a:ext>
+            </a:extLst>
+          </p:cNvPr>
+          <p:cNvSpPr>
+            <a:spLocks noGrp="1"/>
+          </p:cNvSpPr>
+          <p:nvPr>
+            <p:ph type="title"/>
+          </p:nvPr>
+        </p:nvSpPr>
+        <p:spPr>
+          <a:xfrm>
+            <a:off x="838200" y="209261"/>
+            <a:ext cx="10515600" cy="1325563"/>
+          </a:xfrm>
+        </p:spPr>
+        <p:txBody>
+          <a:bodyPr/>
+          <a:lstStyle/>
+          <a:p>
+            <a:r>
+              <a:rPr lang="en-GB" dirty="0"/>
+              <a:t>Linked Lists – Insert at the end</a:t>
+            </a:r>
+            <a:endParaRPr lang="LID4096" dirty="0"/>
+          </a:p>
+        </p:txBody>
+      </p:sp>
+      <p:pic>
+        <p:nvPicPr>
+          <p:cNvPr id="5" name="Content Placeholder 4" descr="Text&#10;&#10;Description automatically generated">
+            <a:extLst>
+              <a:ext uri="{FF2B5EF4-FFF2-40B4-BE49-F238E27FC236}">
+                <a16:creationId xmlns:a16="http://schemas.microsoft.com/office/drawing/2014/main" id="{239BF6C6-02B4-475F-AD93-8DAE8F6A02D0}"/>
+              </a:ext>
+            </a:extLst>
+          </p:cNvPr>
+          <p:cNvPicPr>
+            <a:picLocks noGrp="1" noChangeAspect="1"/>
+          </p:cNvPicPr>
+          <p:nvPr>
+            <p:ph idx="1"/>
+          </p:nvPr>
+        </p:nvPicPr>
+        <p:blipFill rotWithShape="1">
+          <a:blip r:embed="rId2">
+            <a:extLst>
+              <a:ext uri="{28A0092B-C50C-407E-A947-70E740481C1C}">
+                <a14:useLocalDpi xmlns:a14="http://schemas.microsoft.com/office/drawing/2010/main" val="0"/>
+              </a:ext>
+            </a:extLst>
+          </a:blip>
+          <a:srcRect t="15757"/>
+          <a:stretch/>
+        </p:blipFill>
+        <p:spPr>
+          <a:xfrm>
+            <a:off x="3667991" y="1252975"/>
+            <a:ext cx="4856018" cy="4793432"/>
+          </a:xfrm>
+        </p:spPr>
+      </p:pic>
+    </p:spTree>
+    <p:extLst>
+      <p:ext uri="{BB962C8B-B14F-4D97-AF65-F5344CB8AC3E}">
+        <p14:creationId xmlns:p14="http://schemas.microsoft.com/office/powerpoint/2010/main" val="3566056963"/>
+      </p:ext>
+    </p:extLst>
+  </p:cSld>
+  <p:clrMapOvr>
+    <a:masterClrMapping/>
+  </p:clrMapOvr>
+</p:sld>
+</file>
+
+<file path=ppt/slides/slide7.xml><?xml version="1.0" encoding="utf-8"?>
+<p:sld xmlns:a="http://schemas.openxmlformats.org/drawingml/2006/main" xmlns:r="http://schemas.openxmlformats.org/officeDocument/2006/relationships" xmlns:p="http://schemas.openxmlformats.org/presentationml/2006/main">
+  <p:cSld>
+    <p:spTree>
+      <p:nvGrpSpPr>
+        <p:cNvPr id="1" name=""/>
+        <p:cNvGrpSpPr/>
+        <p:nvPr/>
+      </p:nvGrpSpPr>
+      <p:grpSpPr>
+        <a:xfrm>
+          <a:off x="0" y="0"/>
+          <a:ext cx="0" cy="0"/>
+          <a:chOff x="0" y="0"/>
+          <a:chExt cx="0" cy="0"/>
+        </a:xfrm>
+      </p:grpSpPr>
+      <p:sp>
+        <p:nvSpPr>
+          <p:cNvPr id="2" name="Title 1">
+            <a:extLst>
+              <a:ext uri="{FF2B5EF4-FFF2-40B4-BE49-F238E27FC236}">
+                <a16:creationId xmlns:a16="http://schemas.microsoft.com/office/drawing/2014/main" id="{F96CA9B4-3B60-41C5-879D-13DC7C9853D0}"/>
+              </a:ext>
+            </a:extLst>
+          </p:cNvPr>
+          <p:cNvSpPr>
+            <a:spLocks noGrp="1"/>
+          </p:cNvSpPr>
+          <p:nvPr>
+            <p:ph type="title"/>
+          </p:nvPr>
+        </p:nvSpPr>
+        <p:spPr>
+          <a:xfrm>
+            <a:off x="838199" y="52418"/>
+            <a:ext cx="10515600" cy="1325563"/>
+          </a:xfrm>
+        </p:spPr>
+        <p:txBody>
+          <a:bodyPr/>
+          <a:lstStyle/>
+          <a:p>
+            <a:r>
+              <a:rPr lang="en-GB" dirty="0"/>
+              <a:t>Linked Lists – Insert at a position</a:t>
+            </a:r>
+            <a:endParaRPr lang="LID4096" dirty="0"/>
+          </a:p>
+        </p:txBody>
+      </p:sp>
+      <p:pic>
+        <p:nvPicPr>
+          <p:cNvPr id="5" name="Content Placeholder 4" descr="Text&#10;&#10;Description automatically generated">
+            <a:extLst>
+              <a:ext uri="{FF2B5EF4-FFF2-40B4-BE49-F238E27FC236}">
+                <a16:creationId xmlns:a16="http://schemas.microsoft.com/office/drawing/2014/main" id="{924017E1-9772-4628-B0BE-882CC65C77C3}"/>
+              </a:ext>
+            </a:extLst>
+          </p:cNvPr>
+          <p:cNvPicPr>
+            <a:picLocks noGrp="1" noChangeAspect="1"/>
+          </p:cNvPicPr>
+          <p:nvPr>
+            <p:ph idx="1"/>
+          </p:nvPr>
+        </p:nvPicPr>
+        <p:blipFill rotWithShape="1">
+          <a:blip r:embed="rId2">
+            <a:extLst>
+              <a:ext uri="{28A0092B-C50C-407E-A947-70E740481C1C}">
+                <a14:useLocalDpi xmlns:a14="http://schemas.microsoft.com/office/drawing/2010/main" val="0"/>
+              </a:ext>
+            </a:extLst>
+          </a:blip>
+          <a:srcRect t="13032"/>
+          <a:stretch/>
+        </p:blipFill>
+        <p:spPr>
+          <a:xfrm>
+            <a:off x="3177827" y="1167094"/>
+            <a:ext cx="5836343" cy="4882188"/>
+          </a:xfrm>
+        </p:spPr>
+      </p:pic>
+    </p:spTree>
+    <p:extLst>
+      <p:ext uri="{BB962C8B-B14F-4D97-AF65-F5344CB8AC3E}">
+        <p14:creationId xmlns:p14="http://schemas.microsoft.com/office/powerpoint/2010/main" val="1272541068"/>
       </p:ext>
     </p:extLst>
   </p:cSld>

</xml_diff>

<commit_message>
added the delete slide
</commit_message>
<xml_diff>
--- a/Linked_List.pptx
+++ b/Linked_List.pptx
@@ -9,9 +9,13 @@
     <p:sldId id="257" r:id="rId3"/>
     <p:sldId id="258" r:id="rId4"/>
     <p:sldId id="259" r:id="rId5"/>
-    <p:sldId id="260" r:id="rId6"/>
-    <p:sldId id="261" r:id="rId7"/>
-    <p:sldId id="262" r:id="rId8"/>
+    <p:sldId id="266" r:id="rId6"/>
+    <p:sldId id="260" r:id="rId7"/>
+    <p:sldId id="261" r:id="rId8"/>
+    <p:sldId id="262" r:id="rId9"/>
+    <p:sldId id="263" r:id="rId10"/>
+    <p:sldId id="264" r:id="rId11"/>
+    <p:sldId id="265" r:id="rId12"/>
   </p:sldIdLst>
   <p:sldSz cx="12192000" cy="6858000"/>
   <p:notesSz cx="6858000" cy="9144000"/>
@@ -321,7 +325,7 @@
           <a:p>
             <a:fld id="{2D2E3C72-60F0-4B29-9473-543FD151B733}" type="slidenum">
               <a:rPr lang="de-AT" smtClean="0"/>
-              <a:t>‹#›</a:t>
+              <a:t>‹Nr.›</a:t>
             </a:fld>
             <a:endParaRPr lang="de-AT"/>
           </a:p>
@@ -521,7 +525,7 @@
           <a:p>
             <a:fld id="{2D2E3C72-60F0-4B29-9473-543FD151B733}" type="slidenum">
               <a:rPr lang="de-AT" smtClean="0"/>
-              <a:t>‹#›</a:t>
+              <a:t>‹Nr.›</a:t>
             </a:fld>
             <a:endParaRPr lang="de-AT"/>
           </a:p>
@@ -731,7 +735,7 @@
           <a:p>
             <a:fld id="{2D2E3C72-60F0-4B29-9473-543FD151B733}" type="slidenum">
               <a:rPr lang="de-AT" smtClean="0"/>
-              <a:t>‹#›</a:t>
+              <a:t>‹Nr.›</a:t>
             </a:fld>
             <a:endParaRPr lang="de-AT"/>
           </a:p>
@@ -931,7 +935,7 @@
           <a:p>
             <a:fld id="{2D2E3C72-60F0-4B29-9473-543FD151B733}" type="slidenum">
               <a:rPr lang="de-AT" smtClean="0"/>
-              <a:t>‹#›</a:t>
+              <a:t>‹Nr.›</a:t>
             </a:fld>
             <a:endParaRPr lang="de-AT"/>
           </a:p>
@@ -1207,7 +1211,7 @@
           <a:p>
             <a:fld id="{2D2E3C72-60F0-4B29-9473-543FD151B733}" type="slidenum">
               <a:rPr lang="de-AT" smtClean="0"/>
-              <a:t>‹#›</a:t>
+              <a:t>‹Nr.›</a:t>
             </a:fld>
             <a:endParaRPr lang="de-AT"/>
           </a:p>
@@ -1475,7 +1479,7 @@
           <a:p>
             <a:fld id="{2D2E3C72-60F0-4B29-9473-543FD151B733}" type="slidenum">
               <a:rPr lang="de-AT" smtClean="0"/>
-              <a:t>‹#›</a:t>
+              <a:t>‹Nr.›</a:t>
             </a:fld>
             <a:endParaRPr lang="de-AT"/>
           </a:p>
@@ -1890,7 +1894,7 @@
           <a:p>
             <a:fld id="{2D2E3C72-60F0-4B29-9473-543FD151B733}" type="slidenum">
               <a:rPr lang="de-AT" smtClean="0"/>
-              <a:t>‹#›</a:t>
+              <a:t>‹Nr.›</a:t>
             </a:fld>
             <a:endParaRPr lang="de-AT"/>
           </a:p>
@@ -2032,7 +2036,7 @@
           <a:p>
             <a:fld id="{2D2E3C72-60F0-4B29-9473-543FD151B733}" type="slidenum">
               <a:rPr lang="de-AT" smtClean="0"/>
-              <a:t>‹#›</a:t>
+              <a:t>‹Nr.›</a:t>
             </a:fld>
             <a:endParaRPr lang="de-AT"/>
           </a:p>
@@ -2145,7 +2149,7 @@
           <a:p>
             <a:fld id="{2D2E3C72-60F0-4B29-9473-543FD151B733}" type="slidenum">
               <a:rPr lang="de-AT" smtClean="0"/>
-              <a:t>‹#›</a:t>
+              <a:t>‹Nr.›</a:t>
             </a:fld>
             <a:endParaRPr lang="de-AT"/>
           </a:p>
@@ -2458,7 +2462,7 @@
           <a:p>
             <a:fld id="{2D2E3C72-60F0-4B29-9473-543FD151B733}" type="slidenum">
               <a:rPr lang="de-AT" smtClean="0"/>
-              <a:t>‹#›</a:t>
+              <a:t>‹Nr.›</a:t>
             </a:fld>
             <a:endParaRPr lang="de-AT"/>
           </a:p>
@@ -2747,7 +2751,7 @@
           <a:p>
             <a:fld id="{2D2E3C72-60F0-4B29-9473-543FD151B733}" type="slidenum">
               <a:rPr lang="de-AT" smtClean="0"/>
-              <a:t>‹#›</a:t>
+              <a:t>‹Nr.›</a:t>
             </a:fld>
             <a:endParaRPr lang="de-AT"/>
           </a:p>
@@ -3026,7 +3030,7 @@
           <a:p>
             <a:fld id="{2D2E3C72-60F0-4B29-9473-543FD151B733}" type="slidenum">
               <a:rPr lang="de-AT" smtClean="0"/>
-              <a:t>‹#›</a:t>
+              <a:t>‹Nr.›</a:t>
             </a:fld>
             <a:endParaRPr lang="de-AT"/>
           </a:p>
@@ -4134,6 +4138,238 @@
 </p:sld>
 </file>
 
+<file path=ppt/slides/slide10.xml><?xml version="1.0" encoding="utf-8"?>
+<p:sld xmlns:a="http://schemas.openxmlformats.org/drawingml/2006/main" xmlns:r="http://schemas.openxmlformats.org/officeDocument/2006/relationships" xmlns:p="http://schemas.openxmlformats.org/presentationml/2006/main">
+  <p:cSld>
+    <p:spTree>
+      <p:nvGrpSpPr>
+        <p:cNvPr id="1" name=""/>
+        <p:cNvGrpSpPr/>
+        <p:nvPr/>
+      </p:nvGrpSpPr>
+      <p:grpSpPr>
+        <a:xfrm>
+          <a:off x="0" y="0"/>
+          <a:ext cx="0" cy="0"/>
+          <a:chOff x="0" y="0"/>
+          <a:chExt cx="0" cy="0"/>
+        </a:xfrm>
+      </p:grpSpPr>
+      <p:sp>
+        <p:nvSpPr>
+          <p:cNvPr id="2" name="Titel 1">
+            <a:extLst>
+              <a:ext uri="{FF2B5EF4-FFF2-40B4-BE49-F238E27FC236}">
+                <a16:creationId xmlns:a16="http://schemas.microsoft.com/office/drawing/2014/main" id="{6455F2AA-D393-47F6-AF54-B27C486AE424}"/>
+              </a:ext>
+            </a:extLst>
+          </p:cNvPr>
+          <p:cNvSpPr>
+            <a:spLocks noGrp="1"/>
+          </p:cNvSpPr>
+          <p:nvPr>
+            <p:ph type="title"/>
+          </p:nvPr>
+        </p:nvSpPr>
+        <p:spPr/>
+        <p:txBody>
+          <a:bodyPr/>
+          <a:lstStyle/>
+          <a:p>
+            <a:r>
+              <a:rPr lang="de-DE" dirty="0" err="1"/>
+              <a:t>Linked</a:t>
+            </a:r>
+            <a:r>
+              <a:rPr lang="de-DE" dirty="0"/>
+              <a:t> Lists – </a:t>
+            </a:r>
+            <a:r>
+              <a:rPr lang="de-DE" dirty="0" err="1"/>
+              <a:t>delete</a:t>
+            </a:r>
+            <a:r>
+              <a:rPr lang="de-DE" dirty="0"/>
+              <a:t> at </a:t>
+            </a:r>
+            <a:r>
+              <a:rPr lang="de-DE" dirty="0" err="1"/>
+              <a:t>the</a:t>
+            </a:r>
+            <a:r>
+              <a:rPr lang="de-DE" dirty="0"/>
+              <a:t> end</a:t>
+            </a:r>
+            <a:endParaRPr lang="de-AT" dirty="0"/>
+          </a:p>
+        </p:txBody>
+      </p:sp>
+      <p:pic>
+        <p:nvPicPr>
+          <p:cNvPr id="5" name="Inhaltsplatzhalter 4">
+            <a:extLst>
+              <a:ext uri="{FF2B5EF4-FFF2-40B4-BE49-F238E27FC236}">
+                <a16:creationId xmlns:a16="http://schemas.microsoft.com/office/drawing/2014/main" id="{AAAC3A9B-876B-481C-99CB-A69B5D9483E5}"/>
+              </a:ext>
+            </a:extLst>
+          </p:cNvPr>
+          <p:cNvPicPr>
+            <a:picLocks noGrp="1" noChangeAspect="1"/>
+          </p:cNvPicPr>
+          <p:nvPr>
+            <p:ph idx="1"/>
+          </p:nvPr>
+        </p:nvPicPr>
+        <p:blipFill>
+          <a:blip r:embed="rId2">
+            <a:extLst>
+              <a:ext uri="{28A0092B-C50C-407E-A947-70E740481C1C}">
+                <a14:useLocalDpi xmlns:a14="http://schemas.microsoft.com/office/drawing/2010/main" val="0"/>
+              </a:ext>
+            </a:extLst>
+          </a:blip>
+          <a:stretch>
+            <a:fillRect/>
+          </a:stretch>
+        </p:blipFill>
+        <p:spPr>
+          <a:xfrm>
+            <a:off x="3643635" y="1690688"/>
+            <a:ext cx="4071609" cy="4351338"/>
+          </a:xfrm>
+        </p:spPr>
+      </p:pic>
+    </p:spTree>
+    <p:extLst>
+      <p:ext uri="{BB962C8B-B14F-4D97-AF65-F5344CB8AC3E}">
+        <p14:creationId xmlns:p14="http://schemas.microsoft.com/office/powerpoint/2010/main" val="1544771272"/>
+      </p:ext>
+    </p:extLst>
+  </p:cSld>
+  <p:clrMapOvr>
+    <a:masterClrMapping/>
+  </p:clrMapOvr>
+</p:sld>
+</file>
+
+<file path=ppt/slides/slide11.xml><?xml version="1.0" encoding="utf-8"?>
+<p:sld xmlns:a="http://schemas.openxmlformats.org/drawingml/2006/main" xmlns:r="http://schemas.openxmlformats.org/officeDocument/2006/relationships" xmlns:p="http://schemas.openxmlformats.org/presentationml/2006/main">
+  <p:cSld>
+    <p:spTree>
+      <p:nvGrpSpPr>
+        <p:cNvPr id="1" name=""/>
+        <p:cNvGrpSpPr/>
+        <p:nvPr/>
+      </p:nvGrpSpPr>
+      <p:grpSpPr>
+        <a:xfrm>
+          <a:off x="0" y="0"/>
+          <a:ext cx="0" cy="0"/>
+          <a:chOff x="0" y="0"/>
+          <a:chExt cx="0" cy="0"/>
+        </a:xfrm>
+      </p:grpSpPr>
+      <p:sp>
+        <p:nvSpPr>
+          <p:cNvPr id="2" name="Titel 1">
+            <a:extLst>
+              <a:ext uri="{FF2B5EF4-FFF2-40B4-BE49-F238E27FC236}">
+                <a16:creationId xmlns:a16="http://schemas.microsoft.com/office/drawing/2014/main" id="{33CFE444-AD52-455B-8DB0-4D910C67931E}"/>
+              </a:ext>
+            </a:extLst>
+          </p:cNvPr>
+          <p:cNvSpPr>
+            <a:spLocks noGrp="1"/>
+          </p:cNvSpPr>
+          <p:nvPr>
+            <p:ph type="title"/>
+          </p:nvPr>
+        </p:nvSpPr>
+        <p:spPr/>
+        <p:txBody>
+          <a:bodyPr/>
+          <a:lstStyle/>
+          <a:p>
+            <a:r>
+              <a:rPr lang="de-DE" dirty="0" err="1"/>
+              <a:t>Linked</a:t>
+            </a:r>
+            <a:r>
+              <a:rPr lang="de-DE" dirty="0"/>
+              <a:t> Lists – </a:t>
+            </a:r>
+            <a:r>
+              <a:rPr lang="de-DE" dirty="0" err="1"/>
+              <a:t>delete</a:t>
+            </a:r>
+            <a:r>
+              <a:rPr lang="de-DE" dirty="0"/>
+              <a:t> at </a:t>
+            </a:r>
+            <a:r>
+              <a:rPr lang="de-DE" dirty="0" err="1"/>
+              <a:t>the</a:t>
+            </a:r>
+            <a:r>
+              <a:rPr lang="de-DE" dirty="0"/>
+              <a:t> </a:t>
+            </a:r>
+            <a:r>
+              <a:rPr lang="de-DE" dirty="0" err="1"/>
+              <a:t>position</a:t>
+            </a:r>
+            <a:endParaRPr lang="de-AT" dirty="0"/>
+          </a:p>
+        </p:txBody>
+      </p:sp>
+      <p:pic>
+        <p:nvPicPr>
+          <p:cNvPr id="5" name="Inhaltsplatzhalter 4">
+            <a:extLst>
+              <a:ext uri="{FF2B5EF4-FFF2-40B4-BE49-F238E27FC236}">
+                <a16:creationId xmlns:a16="http://schemas.microsoft.com/office/drawing/2014/main" id="{5B1180B3-FD03-4774-B9B0-3D20799189DA}"/>
+              </a:ext>
+            </a:extLst>
+          </p:cNvPr>
+          <p:cNvPicPr>
+            <a:picLocks noGrp="1" noChangeAspect="1"/>
+          </p:cNvPicPr>
+          <p:nvPr>
+            <p:ph idx="1"/>
+          </p:nvPr>
+        </p:nvPicPr>
+        <p:blipFill>
+          <a:blip r:embed="rId2">
+            <a:extLst>
+              <a:ext uri="{28A0092B-C50C-407E-A947-70E740481C1C}">
+                <a14:useLocalDpi xmlns:a14="http://schemas.microsoft.com/office/drawing/2010/main" val="0"/>
+              </a:ext>
+            </a:extLst>
+          </a:blip>
+          <a:stretch>
+            <a:fillRect/>
+          </a:stretch>
+        </p:blipFill>
+        <p:spPr>
+          <a:xfrm>
+            <a:off x="3474720" y="1330365"/>
+            <a:ext cx="3634201" cy="3892469"/>
+          </a:xfrm>
+        </p:spPr>
+      </p:pic>
+    </p:spTree>
+    <p:extLst>
+      <p:ext uri="{BB962C8B-B14F-4D97-AF65-F5344CB8AC3E}">
+        <p14:creationId xmlns:p14="http://schemas.microsoft.com/office/powerpoint/2010/main" val="1040623017"/>
+      </p:ext>
+    </p:extLst>
+  </p:cSld>
+  <p:clrMapOvr>
+    <a:masterClrMapping/>
+  </p:clrMapOvr>
+</p:sld>
+</file>
+
 <file path=ppt/slides/slide2.xml><?xml version="1.0" encoding="utf-8"?>
 <p:sld xmlns:a="http://schemas.openxmlformats.org/drawingml/2006/main" xmlns:r="http://schemas.openxmlformats.org/officeDocument/2006/relationships" xmlns:p="http://schemas.openxmlformats.org/presentationml/2006/main">
   <p:cSld>
@@ -6737,10 +6973,10 @@
       </p:grpSpPr>
       <p:sp>
         <p:nvSpPr>
-          <p:cNvPr id="2" name="Title 1">
-            <a:extLst>
-              <a:ext uri="{FF2B5EF4-FFF2-40B4-BE49-F238E27FC236}">
-                <a16:creationId xmlns:a16="http://schemas.microsoft.com/office/drawing/2014/main" id="{397F9B61-FE15-4F84-A545-0E7D44C65710}"/>
+          <p:cNvPr id="2" name="Titel 1">
+            <a:extLst>
+              <a:ext uri="{FF2B5EF4-FFF2-40B4-BE49-F238E27FC236}">
+                <a16:creationId xmlns:a16="http://schemas.microsoft.com/office/drawing/2014/main" id="{08AC0537-CDD0-4A08-B010-10A48AF8A067}"/>
               </a:ext>
             </a:extLst>
           </p:cNvPr>
@@ -6751,62 +6987,772 @@
             <p:ph type="title"/>
           </p:nvPr>
         </p:nvSpPr>
-        <p:spPr>
-          <a:xfrm>
-            <a:off x="838199" y="0"/>
-            <a:ext cx="10515600" cy="1325563"/>
-          </a:xfrm>
-        </p:spPr>
+        <p:spPr/>
         <p:txBody>
           <a:bodyPr/>
           <a:lstStyle/>
           <a:p>
             <a:r>
-              <a:rPr lang="en-GB" dirty="0"/>
-              <a:t>Linked Lists – Insert at the Beginning</a:t>
-            </a:r>
-            <a:endParaRPr lang="LID4096" dirty="0"/>
-          </a:p>
-        </p:txBody>
-      </p:sp>
-      <p:pic>
-        <p:nvPicPr>
-          <p:cNvPr id="5" name="Content Placeholder 4" descr="Text&#10;&#10;Description automatically generated">
-            <a:extLst>
-              <a:ext uri="{FF2B5EF4-FFF2-40B4-BE49-F238E27FC236}">
-                <a16:creationId xmlns:a16="http://schemas.microsoft.com/office/drawing/2014/main" id="{BBD62933-2C16-4E01-8766-F3620CCD488C}"/>
-              </a:ext>
-            </a:extLst>
-          </p:cNvPr>
-          <p:cNvPicPr>
-            <a:picLocks noGrp="1" noChangeAspect="1"/>
-          </p:cNvPicPr>
+              <a:rPr lang="de-DE" dirty="0" err="1"/>
+              <a:t>Linked</a:t>
+            </a:r>
+            <a:r>
+              <a:rPr lang="de-DE" dirty="0"/>
+              <a:t> Lists - Delete</a:t>
+            </a:r>
+            <a:endParaRPr lang="de-AT" dirty="0"/>
+          </a:p>
+        </p:txBody>
+      </p:sp>
+      <p:sp>
+        <p:nvSpPr>
+          <p:cNvPr id="3" name="Inhaltsplatzhalter 2">
+            <a:extLst>
+              <a:ext uri="{FF2B5EF4-FFF2-40B4-BE49-F238E27FC236}">
+                <a16:creationId xmlns:a16="http://schemas.microsoft.com/office/drawing/2014/main" id="{EAD06E14-75D5-4196-A6D8-8C6A76256922}"/>
+              </a:ext>
+            </a:extLst>
+          </p:cNvPr>
+          <p:cNvSpPr>
+            <a:spLocks noGrp="1"/>
+          </p:cNvSpPr>
           <p:nvPr>
             <p:ph idx="1"/>
           </p:nvPr>
-        </p:nvPicPr>
-        <p:blipFill rotWithShape="1">
-          <a:blip r:embed="rId2">
-            <a:extLst>
-              <a:ext uri="{28A0092B-C50C-407E-A947-70E740481C1C}">
-                <a14:useLocalDpi xmlns:a14="http://schemas.microsoft.com/office/drawing/2010/main" val="0"/>
-              </a:ext>
-            </a:extLst>
-          </a:blip>
-          <a:srcRect t="18325"/>
-          <a:stretch/>
-        </p:blipFill>
-        <p:spPr>
-          <a:xfrm>
-            <a:off x="2951505" y="1325563"/>
-            <a:ext cx="6288987" cy="4845982"/>
-          </a:xfrm>
-        </p:spPr>
-      </p:pic>
+        </p:nvSpPr>
+        <p:spPr/>
+        <p:txBody>
+          <a:bodyPr/>
+          <a:lstStyle/>
+          <a:p>
+            <a:endParaRPr lang="de-AT" dirty="0"/>
+          </a:p>
+        </p:txBody>
+      </p:sp>
+      <p:sp>
+        <p:nvSpPr>
+          <p:cNvPr id="20" name="Rectangle 3">
+            <a:extLst>
+              <a:ext uri="{FF2B5EF4-FFF2-40B4-BE49-F238E27FC236}">
+                <a16:creationId xmlns:a16="http://schemas.microsoft.com/office/drawing/2014/main" id="{C841C110-4C5F-49AC-90C5-58B5DC1CAF3F}"/>
+              </a:ext>
+            </a:extLst>
+          </p:cNvPr>
+          <p:cNvSpPr/>
+          <p:nvPr/>
+        </p:nvSpPr>
+        <p:spPr>
+          <a:xfrm>
+            <a:off x="1778000" y="3636953"/>
+            <a:ext cx="1858297" cy="817563"/>
+          </a:xfrm>
+          <a:prstGeom prst="rect">
+            <a:avLst/>
+          </a:prstGeom>
+        </p:spPr>
+        <p:style>
+          <a:lnRef idx="0">
+            <a:schemeClr val="accent3"/>
+          </a:lnRef>
+          <a:fillRef idx="3">
+            <a:schemeClr val="accent3"/>
+          </a:fillRef>
+          <a:effectRef idx="3">
+            <a:schemeClr val="accent3"/>
+          </a:effectRef>
+          <a:fontRef idx="minor">
+            <a:schemeClr val="lt1"/>
+          </a:fontRef>
+        </p:style>
+        <p:txBody>
+          <a:bodyPr rtlCol="0" anchor="ctr"/>
+          <a:lstStyle/>
+          <a:p>
+            <a:pPr algn="ctr"/>
+            <a:endParaRPr lang="LID4096"/>
+          </a:p>
+        </p:txBody>
+      </p:sp>
+      <p:sp>
+        <p:nvSpPr>
+          <p:cNvPr id="21" name="Rectangle 6">
+            <a:extLst>
+              <a:ext uri="{FF2B5EF4-FFF2-40B4-BE49-F238E27FC236}">
+                <a16:creationId xmlns:a16="http://schemas.microsoft.com/office/drawing/2014/main" id="{91EB1657-FC13-4375-8D5B-B3E512C994AE}"/>
+              </a:ext>
+            </a:extLst>
+          </p:cNvPr>
+          <p:cNvSpPr/>
+          <p:nvPr/>
+        </p:nvSpPr>
+        <p:spPr>
+          <a:xfrm>
+            <a:off x="5396271" y="3636953"/>
+            <a:ext cx="1936955" cy="817563"/>
+          </a:xfrm>
+          <a:prstGeom prst="rect">
+            <a:avLst/>
+          </a:prstGeom>
+        </p:spPr>
+        <p:style>
+          <a:lnRef idx="0">
+            <a:schemeClr val="accent3"/>
+          </a:lnRef>
+          <a:fillRef idx="3">
+            <a:schemeClr val="accent3"/>
+          </a:fillRef>
+          <a:effectRef idx="3">
+            <a:schemeClr val="accent3"/>
+          </a:effectRef>
+          <a:fontRef idx="minor">
+            <a:schemeClr val="lt1"/>
+          </a:fontRef>
+        </p:style>
+        <p:txBody>
+          <a:bodyPr rtlCol="0" anchor="ctr"/>
+          <a:lstStyle/>
+          <a:p>
+            <a:pPr algn="ctr"/>
+            <a:endParaRPr lang="LID4096"/>
+          </a:p>
+        </p:txBody>
+      </p:sp>
+      <p:sp>
+        <p:nvSpPr>
+          <p:cNvPr id="22" name="Rectangle 9">
+            <a:extLst>
+              <a:ext uri="{FF2B5EF4-FFF2-40B4-BE49-F238E27FC236}">
+                <a16:creationId xmlns:a16="http://schemas.microsoft.com/office/drawing/2014/main" id="{788EF3D6-A675-4E90-93B0-D415A8C87D42}"/>
+              </a:ext>
+            </a:extLst>
+          </p:cNvPr>
+          <p:cNvSpPr/>
+          <p:nvPr/>
+        </p:nvSpPr>
+        <p:spPr>
+          <a:xfrm>
+            <a:off x="9078454" y="3636976"/>
+            <a:ext cx="1877961" cy="817540"/>
+          </a:xfrm>
+          <a:prstGeom prst="rect">
+            <a:avLst/>
+          </a:prstGeom>
+        </p:spPr>
+        <p:style>
+          <a:lnRef idx="0">
+            <a:schemeClr val="accent3"/>
+          </a:lnRef>
+          <a:fillRef idx="3">
+            <a:schemeClr val="accent3"/>
+          </a:fillRef>
+          <a:effectRef idx="3">
+            <a:schemeClr val="accent3"/>
+          </a:effectRef>
+          <a:fontRef idx="minor">
+            <a:schemeClr val="lt1"/>
+          </a:fontRef>
+        </p:style>
+        <p:txBody>
+          <a:bodyPr rtlCol="0" anchor="ctr"/>
+          <a:lstStyle/>
+          <a:p>
+            <a:pPr algn="ctr"/>
+            <a:endParaRPr lang="LID4096"/>
+          </a:p>
+        </p:txBody>
+      </p:sp>
+      <p:cxnSp>
+        <p:nvCxnSpPr>
+          <p:cNvPr id="23" name="Straight Connector 13">
+            <a:extLst>
+              <a:ext uri="{FF2B5EF4-FFF2-40B4-BE49-F238E27FC236}">
+                <a16:creationId xmlns:a16="http://schemas.microsoft.com/office/drawing/2014/main" id="{371D3601-E064-4BAE-B2B2-9C5E0D4C4C62}"/>
+              </a:ext>
+            </a:extLst>
+          </p:cNvPr>
+          <p:cNvCxnSpPr>
+            <a:stCxn id="20" idx="0"/>
+            <a:endCxn id="20" idx="2"/>
+          </p:cNvCxnSpPr>
+          <p:nvPr/>
+        </p:nvCxnSpPr>
+        <p:spPr>
+          <a:xfrm>
+            <a:off x="2707149" y="3636953"/>
+            <a:ext cx="0" cy="817563"/>
+          </a:xfrm>
+          <a:prstGeom prst="line">
+            <a:avLst/>
+          </a:prstGeom>
+        </p:spPr>
+        <p:style>
+          <a:lnRef idx="1">
+            <a:schemeClr val="dk1"/>
+          </a:lnRef>
+          <a:fillRef idx="0">
+            <a:schemeClr val="dk1"/>
+          </a:fillRef>
+          <a:effectRef idx="0">
+            <a:schemeClr val="dk1"/>
+          </a:effectRef>
+          <a:fontRef idx="minor">
+            <a:schemeClr val="tx1"/>
+          </a:fontRef>
+        </p:style>
+      </p:cxnSp>
+      <p:cxnSp>
+        <p:nvCxnSpPr>
+          <p:cNvPr id="24" name="Straight Connector 15">
+            <a:extLst>
+              <a:ext uri="{FF2B5EF4-FFF2-40B4-BE49-F238E27FC236}">
+                <a16:creationId xmlns:a16="http://schemas.microsoft.com/office/drawing/2014/main" id="{BA442A89-C503-42F0-98FF-27FB9340483B}"/>
+              </a:ext>
+            </a:extLst>
+          </p:cNvPr>
+          <p:cNvCxnSpPr>
+            <a:stCxn id="21" idx="0"/>
+            <a:endCxn id="21" idx="2"/>
+          </p:cNvCxnSpPr>
+          <p:nvPr/>
+        </p:nvCxnSpPr>
+        <p:spPr>
+          <a:xfrm>
+            <a:off x="6364749" y="3636953"/>
+            <a:ext cx="0" cy="817563"/>
+          </a:xfrm>
+          <a:prstGeom prst="line">
+            <a:avLst/>
+          </a:prstGeom>
+        </p:spPr>
+        <p:style>
+          <a:lnRef idx="1">
+            <a:schemeClr val="dk1"/>
+          </a:lnRef>
+          <a:fillRef idx="0">
+            <a:schemeClr val="dk1"/>
+          </a:fillRef>
+          <a:effectRef idx="0">
+            <a:schemeClr val="dk1"/>
+          </a:effectRef>
+          <a:fontRef idx="minor">
+            <a:schemeClr val="tx1"/>
+          </a:fontRef>
+        </p:style>
+      </p:cxnSp>
+      <p:cxnSp>
+        <p:nvCxnSpPr>
+          <p:cNvPr id="25" name="Straight Connector 17">
+            <a:extLst>
+              <a:ext uri="{FF2B5EF4-FFF2-40B4-BE49-F238E27FC236}">
+                <a16:creationId xmlns:a16="http://schemas.microsoft.com/office/drawing/2014/main" id="{85F30A94-4960-4A3A-B6EF-765AE220076D}"/>
+              </a:ext>
+            </a:extLst>
+          </p:cNvPr>
+          <p:cNvCxnSpPr>
+            <a:stCxn id="22" idx="0"/>
+            <a:endCxn id="22" idx="2"/>
+          </p:cNvCxnSpPr>
+          <p:nvPr/>
+        </p:nvCxnSpPr>
+        <p:spPr>
+          <a:xfrm>
+            <a:off x="10017435" y="3636976"/>
+            <a:ext cx="0" cy="817540"/>
+          </a:xfrm>
+          <a:prstGeom prst="line">
+            <a:avLst/>
+          </a:prstGeom>
+        </p:spPr>
+        <p:style>
+          <a:lnRef idx="1">
+            <a:schemeClr val="dk1"/>
+          </a:lnRef>
+          <a:fillRef idx="0">
+            <a:schemeClr val="dk1"/>
+          </a:fillRef>
+          <a:effectRef idx="0">
+            <a:schemeClr val="dk1"/>
+          </a:effectRef>
+          <a:fontRef idx="minor">
+            <a:schemeClr val="tx1"/>
+          </a:fontRef>
+        </p:style>
+      </p:cxnSp>
+      <p:sp>
+        <p:nvSpPr>
+          <p:cNvPr id="26" name="TextBox 4">
+            <a:extLst>
+              <a:ext uri="{FF2B5EF4-FFF2-40B4-BE49-F238E27FC236}">
+                <a16:creationId xmlns:a16="http://schemas.microsoft.com/office/drawing/2014/main" id="{FA7F1F6D-3CD1-4D3B-BAF8-F404BA867AC9}"/>
+              </a:ext>
+            </a:extLst>
+          </p:cNvPr>
+          <p:cNvSpPr txBox="1"/>
+          <p:nvPr/>
+        </p:nvSpPr>
+        <p:spPr>
+          <a:xfrm>
+            <a:off x="1861576" y="3861057"/>
+            <a:ext cx="938979" cy="369332"/>
+          </a:xfrm>
+          <a:prstGeom prst="rect">
+            <a:avLst/>
+          </a:prstGeom>
+          <a:noFill/>
+        </p:spPr>
+        <p:txBody>
+          <a:bodyPr wrap="square" rtlCol="0">
+            <a:spAutoFit/>
+          </a:bodyPr>
+          <a:lstStyle/>
+          <a:p>
+            <a:r>
+              <a:rPr lang="en-GB" dirty="0"/>
+              <a:t>Data 1</a:t>
+            </a:r>
+            <a:endParaRPr lang="LID4096" dirty="0"/>
+          </a:p>
+        </p:txBody>
+      </p:sp>
+      <p:sp>
+        <p:nvSpPr>
+          <p:cNvPr id="27" name="Arrow: Right 7">
+            <a:extLst>
+              <a:ext uri="{FF2B5EF4-FFF2-40B4-BE49-F238E27FC236}">
+                <a16:creationId xmlns:a16="http://schemas.microsoft.com/office/drawing/2014/main" id="{A2B01AB3-D485-4E87-BF60-E850B43979AD}"/>
+              </a:ext>
+            </a:extLst>
+          </p:cNvPr>
+          <p:cNvSpPr/>
+          <p:nvPr/>
+        </p:nvSpPr>
+        <p:spPr>
+          <a:xfrm>
+            <a:off x="3643671" y="3835083"/>
+            <a:ext cx="1745225" cy="408770"/>
+          </a:xfrm>
+          <a:prstGeom prst="rightArrow">
+            <a:avLst/>
+          </a:prstGeom>
+        </p:spPr>
+        <p:style>
+          <a:lnRef idx="2">
+            <a:schemeClr val="dk1"/>
+          </a:lnRef>
+          <a:fillRef idx="1">
+            <a:schemeClr val="lt1"/>
+          </a:fillRef>
+          <a:effectRef idx="0">
+            <a:schemeClr val="dk1"/>
+          </a:effectRef>
+          <a:fontRef idx="minor">
+            <a:schemeClr val="dk1"/>
+          </a:fontRef>
+        </p:style>
+        <p:txBody>
+          <a:bodyPr rtlCol="0" anchor="ctr"/>
+          <a:lstStyle/>
+          <a:p>
+            <a:pPr algn="ctr"/>
+            <a:endParaRPr lang="LID4096"/>
+          </a:p>
+        </p:txBody>
+      </p:sp>
+      <p:sp>
+        <p:nvSpPr>
+          <p:cNvPr id="28" name="TextBox 16">
+            <a:extLst>
+              <a:ext uri="{FF2B5EF4-FFF2-40B4-BE49-F238E27FC236}">
+                <a16:creationId xmlns:a16="http://schemas.microsoft.com/office/drawing/2014/main" id="{BDB80C76-9D8A-4147-92B7-FF34F53789DE}"/>
+              </a:ext>
+            </a:extLst>
+          </p:cNvPr>
+          <p:cNvSpPr txBox="1"/>
+          <p:nvPr/>
+        </p:nvSpPr>
+        <p:spPr>
+          <a:xfrm>
+            <a:off x="5483420" y="3854802"/>
+            <a:ext cx="805501" cy="369332"/>
+          </a:xfrm>
+          <a:prstGeom prst="rect">
+            <a:avLst/>
+          </a:prstGeom>
+          <a:noFill/>
+        </p:spPr>
+        <p:txBody>
+          <a:bodyPr wrap="square" rtlCol="0">
+            <a:spAutoFit/>
+          </a:bodyPr>
+          <a:lstStyle/>
+          <a:p>
+            <a:r>
+              <a:rPr lang="en-GB" dirty="0"/>
+              <a:t>Data 2</a:t>
+            </a:r>
+            <a:endParaRPr lang="LID4096" dirty="0"/>
+          </a:p>
+        </p:txBody>
+      </p:sp>
+      <p:sp>
+        <p:nvSpPr>
+          <p:cNvPr id="29" name="TextBox 18">
+            <a:extLst>
+              <a:ext uri="{FF2B5EF4-FFF2-40B4-BE49-F238E27FC236}">
+                <a16:creationId xmlns:a16="http://schemas.microsoft.com/office/drawing/2014/main" id="{A8C34C39-1798-49A5-995F-540C8857F3F6}"/>
+              </a:ext>
+            </a:extLst>
+          </p:cNvPr>
+          <p:cNvSpPr txBox="1"/>
+          <p:nvPr/>
+        </p:nvSpPr>
+        <p:spPr>
+          <a:xfrm>
+            <a:off x="2807074" y="3716302"/>
+            <a:ext cx="752161" cy="646331"/>
+          </a:xfrm>
+          <a:prstGeom prst="rect">
+            <a:avLst/>
+          </a:prstGeom>
+          <a:noFill/>
+        </p:spPr>
+        <p:txBody>
+          <a:bodyPr wrap="square" rtlCol="0">
+            <a:spAutoFit/>
+          </a:bodyPr>
+          <a:lstStyle/>
+          <a:p>
+            <a:r>
+              <a:rPr lang="en-GB" dirty="0"/>
+              <a:t>Next Node</a:t>
+            </a:r>
+            <a:endParaRPr lang="LID4096" dirty="0"/>
+          </a:p>
+        </p:txBody>
+      </p:sp>
+      <p:sp>
+        <p:nvSpPr>
+          <p:cNvPr id="30" name="TextBox 19">
+            <a:extLst>
+              <a:ext uri="{FF2B5EF4-FFF2-40B4-BE49-F238E27FC236}">
+                <a16:creationId xmlns:a16="http://schemas.microsoft.com/office/drawing/2014/main" id="{2F08F005-1AC5-4E0C-ADF4-6D6CE007EAB4}"/>
+              </a:ext>
+            </a:extLst>
+          </p:cNvPr>
+          <p:cNvSpPr txBox="1"/>
+          <p:nvPr/>
+        </p:nvSpPr>
+        <p:spPr>
+          <a:xfrm>
+            <a:off x="6499339" y="3716302"/>
+            <a:ext cx="921036" cy="646331"/>
+          </a:xfrm>
+          <a:prstGeom prst="rect">
+            <a:avLst/>
+          </a:prstGeom>
+          <a:noFill/>
+        </p:spPr>
+        <p:txBody>
+          <a:bodyPr wrap="square" rtlCol="0">
+            <a:spAutoFit/>
+          </a:bodyPr>
+          <a:lstStyle/>
+          <a:p>
+            <a:r>
+              <a:rPr lang="en-GB" dirty="0"/>
+              <a:t>Next Node</a:t>
+            </a:r>
+            <a:endParaRPr lang="LID4096" dirty="0"/>
+          </a:p>
+        </p:txBody>
+      </p:sp>
+      <p:sp>
+        <p:nvSpPr>
+          <p:cNvPr id="31" name="TextBox 20">
+            <a:extLst>
+              <a:ext uri="{FF2B5EF4-FFF2-40B4-BE49-F238E27FC236}">
+                <a16:creationId xmlns:a16="http://schemas.microsoft.com/office/drawing/2014/main" id="{1F6A4CD0-30D5-4FC1-9CA9-E8846C4D5ECF}"/>
+              </a:ext>
+            </a:extLst>
+          </p:cNvPr>
+          <p:cNvSpPr txBox="1"/>
+          <p:nvPr/>
+        </p:nvSpPr>
+        <p:spPr>
+          <a:xfrm>
+            <a:off x="10086743" y="3725064"/>
+            <a:ext cx="911085" cy="646331"/>
+          </a:xfrm>
+          <a:prstGeom prst="rect">
+            <a:avLst/>
+          </a:prstGeom>
+          <a:noFill/>
+        </p:spPr>
+        <p:txBody>
+          <a:bodyPr wrap="square" rtlCol="0">
+            <a:spAutoFit/>
+          </a:bodyPr>
+          <a:lstStyle/>
+          <a:p>
+            <a:r>
+              <a:rPr lang="en-GB" dirty="0"/>
+              <a:t>Next Node</a:t>
+            </a:r>
+            <a:endParaRPr lang="LID4096" dirty="0"/>
+          </a:p>
+        </p:txBody>
+      </p:sp>
+      <p:sp>
+        <p:nvSpPr>
+          <p:cNvPr id="32" name="TextBox 21">
+            <a:extLst>
+              <a:ext uri="{FF2B5EF4-FFF2-40B4-BE49-F238E27FC236}">
+                <a16:creationId xmlns:a16="http://schemas.microsoft.com/office/drawing/2014/main" id="{B2DBA6E8-84E7-47D4-855E-E66D00130298}"/>
+              </a:ext>
+            </a:extLst>
+          </p:cNvPr>
+          <p:cNvSpPr txBox="1"/>
+          <p:nvPr/>
+        </p:nvSpPr>
+        <p:spPr>
+          <a:xfrm>
+            <a:off x="9155640" y="3854801"/>
+            <a:ext cx="896449" cy="369332"/>
+          </a:xfrm>
+          <a:prstGeom prst="rect">
+            <a:avLst/>
+          </a:prstGeom>
+          <a:noFill/>
+        </p:spPr>
+        <p:txBody>
+          <a:bodyPr wrap="square" rtlCol="0">
+            <a:spAutoFit/>
+          </a:bodyPr>
+          <a:lstStyle/>
+          <a:p>
+            <a:r>
+              <a:rPr lang="en-GB" dirty="0"/>
+              <a:t>Data 3</a:t>
+            </a:r>
+            <a:endParaRPr lang="LID4096" dirty="0"/>
+          </a:p>
+        </p:txBody>
+      </p:sp>
+      <p:cxnSp>
+        <p:nvCxnSpPr>
+          <p:cNvPr id="33" name="Straight Arrow Connector 23">
+            <a:extLst>
+              <a:ext uri="{FF2B5EF4-FFF2-40B4-BE49-F238E27FC236}">
+                <a16:creationId xmlns:a16="http://schemas.microsoft.com/office/drawing/2014/main" id="{BE744AE2-E29E-48F6-9789-B55C4294178F}"/>
+              </a:ext>
+            </a:extLst>
+          </p:cNvPr>
+          <p:cNvCxnSpPr>
+            <a:cxnSpLocks/>
+            <a:endCxn id="20" idx="1"/>
+          </p:cNvCxnSpPr>
+          <p:nvPr/>
+        </p:nvCxnSpPr>
+        <p:spPr>
+          <a:xfrm>
+            <a:off x="1351830" y="3544878"/>
+            <a:ext cx="426170" cy="500857"/>
+          </a:xfrm>
+          <a:prstGeom prst="straightConnector1">
+            <a:avLst/>
+          </a:prstGeom>
+          <a:ln>
+            <a:tailEnd type="triangle"/>
+          </a:ln>
+        </p:spPr>
+        <p:style>
+          <a:lnRef idx="1">
+            <a:schemeClr val="accent1"/>
+          </a:lnRef>
+          <a:fillRef idx="0">
+            <a:schemeClr val="accent1"/>
+          </a:fillRef>
+          <a:effectRef idx="0">
+            <a:schemeClr val="accent1"/>
+          </a:effectRef>
+          <a:fontRef idx="minor">
+            <a:schemeClr val="tx1"/>
+          </a:fontRef>
+        </p:style>
+      </p:cxnSp>
+      <p:sp>
+        <p:nvSpPr>
+          <p:cNvPr id="34" name="TextBox 25">
+            <a:extLst>
+              <a:ext uri="{FF2B5EF4-FFF2-40B4-BE49-F238E27FC236}">
+                <a16:creationId xmlns:a16="http://schemas.microsoft.com/office/drawing/2014/main" id="{EC0A8C95-0EE1-4931-BA0A-C6F73A1E9777}"/>
+              </a:ext>
+            </a:extLst>
+          </p:cNvPr>
+          <p:cNvSpPr txBox="1"/>
+          <p:nvPr/>
+        </p:nvSpPr>
+        <p:spPr>
+          <a:xfrm>
+            <a:off x="944717" y="3206382"/>
+            <a:ext cx="1386348" cy="370042"/>
+          </a:xfrm>
+          <a:prstGeom prst="rect">
+            <a:avLst/>
+          </a:prstGeom>
+          <a:noFill/>
+        </p:spPr>
+        <p:txBody>
+          <a:bodyPr wrap="square" rtlCol="0">
+            <a:spAutoFit/>
+          </a:bodyPr>
+          <a:lstStyle/>
+          <a:p>
+            <a:r>
+              <a:rPr lang="en-GB" dirty="0"/>
+              <a:t>_head</a:t>
+            </a:r>
+            <a:endParaRPr lang="LID4096" dirty="0"/>
+          </a:p>
+        </p:txBody>
+      </p:sp>
+      <p:sp>
+        <p:nvSpPr>
+          <p:cNvPr id="35" name="Arrow: Right 31">
+            <a:extLst>
+              <a:ext uri="{FF2B5EF4-FFF2-40B4-BE49-F238E27FC236}">
+                <a16:creationId xmlns:a16="http://schemas.microsoft.com/office/drawing/2014/main" id="{88D1FF46-4EB7-42D4-A9DC-566D21ECC89E}"/>
+              </a:ext>
+            </a:extLst>
+          </p:cNvPr>
+          <p:cNvSpPr/>
+          <p:nvPr/>
+        </p:nvSpPr>
+        <p:spPr>
+          <a:xfrm>
+            <a:off x="7338985" y="3843844"/>
+            <a:ext cx="1745225" cy="408770"/>
+          </a:xfrm>
+          <a:prstGeom prst="rightArrow">
+            <a:avLst/>
+          </a:prstGeom>
+        </p:spPr>
+        <p:style>
+          <a:lnRef idx="2">
+            <a:schemeClr val="dk1"/>
+          </a:lnRef>
+          <a:fillRef idx="1">
+            <a:schemeClr val="lt1"/>
+          </a:fillRef>
+          <a:effectRef idx="0">
+            <a:schemeClr val="dk1"/>
+          </a:effectRef>
+          <a:fontRef idx="minor">
+            <a:schemeClr val="dk1"/>
+          </a:fontRef>
+        </p:style>
+        <p:txBody>
+          <a:bodyPr rtlCol="0" anchor="ctr"/>
+          <a:lstStyle/>
+          <a:p>
+            <a:pPr algn="ctr"/>
+            <a:endParaRPr lang="LID4096"/>
+          </a:p>
+        </p:txBody>
+      </p:sp>
+      <p:cxnSp>
+        <p:nvCxnSpPr>
+          <p:cNvPr id="37" name="Gerader Verbinder 36">
+            <a:extLst>
+              <a:ext uri="{FF2B5EF4-FFF2-40B4-BE49-F238E27FC236}">
+                <a16:creationId xmlns:a16="http://schemas.microsoft.com/office/drawing/2014/main" id="{A2A5A66C-2321-492C-A5BB-B31D5BFD7AE7}"/>
+              </a:ext>
+            </a:extLst>
+          </p:cNvPr>
+          <p:cNvCxnSpPr/>
+          <p:nvPr/>
+        </p:nvCxnSpPr>
+        <p:spPr>
+          <a:xfrm>
+            <a:off x="4622800" y="3206382"/>
+            <a:ext cx="3159760" cy="1507858"/>
+          </a:xfrm>
+          <a:prstGeom prst="line">
+            <a:avLst/>
+          </a:prstGeom>
+          <a:ln>
+            <a:solidFill>
+              <a:srgbClr val="FF0000"/>
+            </a:solidFill>
+          </a:ln>
+        </p:spPr>
+        <p:style>
+          <a:lnRef idx="3">
+            <a:schemeClr val="accent2"/>
+          </a:lnRef>
+          <a:fillRef idx="0">
+            <a:schemeClr val="accent2"/>
+          </a:fillRef>
+          <a:effectRef idx="2">
+            <a:schemeClr val="accent2"/>
+          </a:effectRef>
+          <a:fontRef idx="minor">
+            <a:schemeClr val="tx1"/>
+          </a:fontRef>
+        </p:style>
+      </p:cxnSp>
+      <p:sp>
+        <p:nvSpPr>
+          <p:cNvPr id="41" name="Pfeil: 180-Grad 40">
+            <a:extLst>
+              <a:ext uri="{FF2B5EF4-FFF2-40B4-BE49-F238E27FC236}">
+                <a16:creationId xmlns:a16="http://schemas.microsoft.com/office/drawing/2014/main" id="{C94F01EC-23AC-4660-8EA2-536062FCA173}"/>
+              </a:ext>
+            </a:extLst>
+          </p:cNvPr>
+          <p:cNvSpPr/>
+          <p:nvPr/>
+        </p:nvSpPr>
+        <p:spPr>
+          <a:xfrm>
+            <a:off x="3108960" y="2758861"/>
+            <a:ext cx="6522720" cy="817563"/>
+          </a:xfrm>
+          <a:prstGeom prst="uturnArrow">
+            <a:avLst/>
+          </a:prstGeom>
+        </p:spPr>
+        <p:style>
+          <a:lnRef idx="0">
+            <a:schemeClr val="accent3"/>
+          </a:lnRef>
+          <a:fillRef idx="3">
+            <a:schemeClr val="accent3"/>
+          </a:fillRef>
+          <a:effectRef idx="3">
+            <a:schemeClr val="accent3"/>
+          </a:effectRef>
+          <a:fontRef idx="minor">
+            <a:schemeClr val="lt1"/>
+          </a:fontRef>
+        </p:style>
+        <p:txBody>
+          <a:bodyPr rtlCol="0" anchor="ctr"/>
+          <a:lstStyle/>
+          <a:p>
+            <a:pPr algn="ctr"/>
+            <a:endParaRPr lang="de-AT">
+              <a:solidFill>
+                <a:schemeClr val="tx1"/>
+              </a:solidFill>
+            </a:endParaRPr>
+          </a:p>
+        </p:txBody>
+      </p:sp>
     </p:spTree>
     <p:extLst>
       <p:ext uri="{BB962C8B-B14F-4D97-AF65-F5344CB8AC3E}">
-        <p14:creationId xmlns:p14="http://schemas.microsoft.com/office/powerpoint/2010/main" val="2473947929"/>
+        <p14:creationId xmlns:p14="http://schemas.microsoft.com/office/powerpoint/2010/main" val="3013868465"/>
       </p:ext>
     </p:extLst>
   </p:cSld>
@@ -6838,7 +7784,7 @@
           <p:cNvPr id="2" name="Title 1">
             <a:extLst>
               <a:ext uri="{FF2B5EF4-FFF2-40B4-BE49-F238E27FC236}">
-                <a16:creationId xmlns:a16="http://schemas.microsoft.com/office/drawing/2014/main" id="{8DAD2FEE-4AD2-420A-90AB-581BED8E748C}"/>
+                <a16:creationId xmlns:a16="http://schemas.microsoft.com/office/drawing/2014/main" id="{397F9B61-FE15-4F84-A545-0E7D44C65710}"/>
               </a:ext>
             </a:extLst>
           </p:cNvPr>
@@ -6851,7 +7797,7 @@
         </p:nvSpPr>
         <p:spPr>
           <a:xfrm>
-            <a:off x="838200" y="209261"/>
+            <a:off x="838199" y="0"/>
             <a:ext cx="10515600" cy="1325563"/>
           </a:xfrm>
         </p:spPr>
@@ -6861,7 +7807,7 @@
           <a:p>
             <a:r>
               <a:rPr lang="en-GB" dirty="0"/>
-              <a:t>Linked Lists – Insert at the end</a:t>
+              <a:t>Linked Lists – Insert at the Beginning</a:t>
             </a:r>
             <a:endParaRPr lang="LID4096" dirty="0"/>
           </a:p>
@@ -6872,7 +7818,7 @@
           <p:cNvPr id="5" name="Content Placeholder 4" descr="Text&#10;&#10;Description automatically generated">
             <a:extLst>
               <a:ext uri="{FF2B5EF4-FFF2-40B4-BE49-F238E27FC236}">
-                <a16:creationId xmlns:a16="http://schemas.microsoft.com/office/drawing/2014/main" id="{239BF6C6-02B4-475F-AD93-8DAE8F6A02D0}"/>
+                <a16:creationId xmlns:a16="http://schemas.microsoft.com/office/drawing/2014/main" id="{BBD62933-2C16-4E01-8766-F3620CCD488C}"/>
               </a:ext>
             </a:extLst>
           </p:cNvPr>
@@ -6891,20 +7837,20 @@
               </a:ext>
             </a:extLst>
           </a:blip>
-          <a:srcRect t="15757"/>
+          <a:srcRect t="18325"/>
           <a:stretch/>
         </p:blipFill>
         <p:spPr>
           <a:xfrm>
-            <a:off x="3667991" y="1252975"/>
-            <a:ext cx="4856018" cy="4793432"/>
+            <a:off x="2951505" y="1325563"/>
+            <a:ext cx="6288987" cy="4845982"/>
           </a:xfrm>
         </p:spPr>
       </p:pic>
     </p:spTree>
     <p:extLst>
       <p:ext uri="{BB962C8B-B14F-4D97-AF65-F5344CB8AC3E}">
-        <p14:creationId xmlns:p14="http://schemas.microsoft.com/office/powerpoint/2010/main" val="3566056963"/>
+        <p14:creationId xmlns:p14="http://schemas.microsoft.com/office/powerpoint/2010/main" val="2473947929"/>
       </p:ext>
     </p:extLst>
   </p:cSld>
@@ -6936,7 +7882,7 @@
           <p:cNvPr id="2" name="Title 1">
             <a:extLst>
               <a:ext uri="{FF2B5EF4-FFF2-40B4-BE49-F238E27FC236}">
-                <a16:creationId xmlns:a16="http://schemas.microsoft.com/office/drawing/2014/main" id="{F96CA9B4-3B60-41C5-879D-13DC7C9853D0}"/>
+                <a16:creationId xmlns:a16="http://schemas.microsoft.com/office/drawing/2014/main" id="{8DAD2FEE-4AD2-420A-90AB-581BED8E748C}"/>
               </a:ext>
             </a:extLst>
           </p:cNvPr>
@@ -6949,7 +7895,7 @@
         </p:nvSpPr>
         <p:spPr>
           <a:xfrm>
-            <a:off x="838199" y="52418"/>
+            <a:off x="838200" y="209261"/>
             <a:ext cx="10515600" cy="1325563"/>
           </a:xfrm>
         </p:spPr>
@@ -6959,7 +7905,7 @@
           <a:p>
             <a:r>
               <a:rPr lang="en-GB" dirty="0"/>
-              <a:t>Linked Lists – Insert at a position</a:t>
+              <a:t>Linked Lists – Insert at the end</a:t>
             </a:r>
             <a:endParaRPr lang="LID4096" dirty="0"/>
           </a:p>
@@ -6970,7 +7916,7 @@
           <p:cNvPr id="5" name="Content Placeholder 4" descr="Text&#10;&#10;Description automatically generated">
             <a:extLst>
               <a:ext uri="{FF2B5EF4-FFF2-40B4-BE49-F238E27FC236}">
-                <a16:creationId xmlns:a16="http://schemas.microsoft.com/office/drawing/2014/main" id="{924017E1-9772-4628-B0BE-882CC65C77C3}"/>
+                <a16:creationId xmlns:a16="http://schemas.microsoft.com/office/drawing/2014/main" id="{239BF6C6-02B4-475F-AD93-8DAE8F6A02D0}"/>
               </a:ext>
             </a:extLst>
           </p:cNvPr>
@@ -6989,6 +7935,104 @@
               </a:ext>
             </a:extLst>
           </a:blip>
+          <a:srcRect t="15757"/>
+          <a:stretch/>
+        </p:blipFill>
+        <p:spPr>
+          <a:xfrm>
+            <a:off x="3667991" y="1252975"/>
+            <a:ext cx="4856018" cy="4793432"/>
+          </a:xfrm>
+        </p:spPr>
+      </p:pic>
+    </p:spTree>
+    <p:extLst>
+      <p:ext uri="{BB962C8B-B14F-4D97-AF65-F5344CB8AC3E}">
+        <p14:creationId xmlns:p14="http://schemas.microsoft.com/office/powerpoint/2010/main" val="3566056963"/>
+      </p:ext>
+    </p:extLst>
+  </p:cSld>
+  <p:clrMapOvr>
+    <a:masterClrMapping/>
+  </p:clrMapOvr>
+</p:sld>
+</file>
+
+<file path=ppt/slides/slide8.xml><?xml version="1.0" encoding="utf-8"?>
+<p:sld xmlns:a="http://schemas.openxmlformats.org/drawingml/2006/main" xmlns:r="http://schemas.openxmlformats.org/officeDocument/2006/relationships" xmlns:p="http://schemas.openxmlformats.org/presentationml/2006/main">
+  <p:cSld>
+    <p:spTree>
+      <p:nvGrpSpPr>
+        <p:cNvPr id="1" name=""/>
+        <p:cNvGrpSpPr/>
+        <p:nvPr/>
+      </p:nvGrpSpPr>
+      <p:grpSpPr>
+        <a:xfrm>
+          <a:off x="0" y="0"/>
+          <a:ext cx="0" cy="0"/>
+          <a:chOff x="0" y="0"/>
+          <a:chExt cx="0" cy="0"/>
+        </a:xfrm>
+      </p:grpSpPr>
+      <p:sp>
+        <p:nvSpPr>
+          <p:cNvPr id="2" name="Title 1">
+            <a:extLst>
+              <a:ext uri="{FF2B5EF4-FFF2-40B4-BE49-F238E27FC236}">
+                <a16:creationId xmlns:a16="http://schemas.microsoft.com/office/drawing/2014/main" id="{F96CA9B4-3B60-41C5-879D-13DC7C9853D0}"/>
+              </a:ext>
+            </a:extLst>
+          </p:cNvPr>
+          <p:cNvSpPr>
+            <a:spLocks noGrp="1"/>
+          </p:cNvSpPr>
+          <p:nvPr>
+            <p:ph type="title"/>
+          </p:nvPr>
+        </p:nvSpPr>
+        <p:spPr>
+          <a:xfrm>
+            <a:off x="838199" y="52418"/>
+            <a:ext cx="10515600" cy="1325563"/>
+          </a:xfrm>
+        </p:spPr>
+        <p:txBody>
+          <a:bodyPr/>
+          <a:lstStyle/>
+          <a:p>
+            <a:r>
+              <a:rPr lang="en-GB" dirty="0"/>
+              <a:t>Linked Lists – Insert at a position</a:t>
+            </a:r>
+            <a:endParaRPr lang="LID4096" dirty="0"/>
+          </a:p>
+        </p:txBody>
+      </p:sp>
+      <p:pic>
+        <p:nvPicPr>
+          <p:cNvPr id="5" name="Content Placeholder 4" descr="Text&#10;&#10;Description automatically generated">
+            <a:extLst>
+              <a:ext uri="{FF2B5EF4-FFF2-40B4-BE49-F238E27FC236}">
+                <a16:creationId xmlns:a16="http://schemas.microsoft.com/office/drawing/2014/main" id="{924017E1-9772-4628-B0BE-882CC65C77C3}"/>
+              </a:ext>
+            </a:extLst>
+          </p:cNvPr>
+          <p:cNvPicPr>
+            <a:picLocks noGrp="1" noChangeAspect="1"/>
+          </p:cNvPicPr>
+          <p:nvPr>
+            <p:ph idx="1"/>
+          </p:nvPr>
+        </p:nvPicPr>
+        <p:blipFill rotWithShape="1">
+          <a:blip r:embed="rId2">
+            <a:extLst>
+              <a:ext uri="{28A0092B-C50C-407E-A947-70E740481C1C}">
+                <a14:useLocalDpi xmlns:a14="http://schemas.microsoft.com/office/drawing/2010/main" val="0"/>
+              </a:ext>
+            </a:extLst>
+          </a:blip>
           <a:srcRect t="13032"/>
           <a:stretch/>
         </p:blipFill>
@@ -7003,6 +8047,128 @@
     <p:extLst>
       <p:ext uri="{BB962C8B-B14F-4D97-AF65-F5344CB8AC3E}">
         <p14:creationId xmlns:p14="http://schemas.microsoft.com/office/powerpoint/2010/main" val="1272541068"/>
+      </p:ext>
+    </p:extLst>
+  </p:cSld>
+  <p:clrMapOvr>
+    <a:masterClrMapping/>
+  </p:clrMapOvr>
+</p:sld>
+</file>
+
+<file path=ppt/slides/slide9.xml><?xml version="1.0" encoding="utf-8"?>
+<p:sld xmlns:a="http://schemas.openxmlformats.org/drawingml/2006/main" xmlns:r="http://schemas.openxmlformats.org/officeDocument/2006/relationships" xmlns:p="http://schemas.openxmlformats.org/presentationml/2006/main">
+  <p:cSld>
+    <p:spTree>
+      <p:nvGrpSpPr>
+        <p:cNvPr id="1" name=""/>
+        <p:cNvGrpSpPr/>
+        <p:nvPr/>
+      </p:nvGrpSpPr>
+      <p:grpSpPr>
+        <a:xfrm>
+          <a:off x="0" y="0"/>
+          <a:ext cx="0" cy="0"/>
+          <a:chOff x="0" y="0"/>
+          <a:chExt cx="0" cy="0"/>
+        </a:xfrm>
+      </p:grpSpPr>
+      <p:sp>
+        <p:nvSpPr>
+          <p:cNvPr id="2" name="Titel 1">
+            <a:extLst>
+              <a:ext uri="{FF2B5EF4-FFF2-40B4-BE49-F238E27FC236}">
+                <a16:creationId xmlns:a16="http://schemas.microsoft.com/office/drawing/2014/main" id="{7812ECCC-9563-4D49-8091-1E1DA95EAD17}"/>
+              </a:ext>
+            </a:extLst>
+          </p:cNvPr>
+          <p:cNvSpPr>
+            <a:spLocks noGrp="1"/>
+          </p:cNvSpPr>
+          <p:nvPr>
+            <p:ph type="title"/>
+          </p:nvPr>
+        </p:nvSpPr>
+        <p:spPr/>
+        <p:txBody>
+          <a:bodyPr/>
+          <a:lstStyle/>
+          <a:p>
+            <a:r>
+              <a:rPr lang="de-DE" dirty="0" err="1"/>
+              <a:t>Linked</a:t>
+            </a:r>
+            <a:r>
+              <a:rPr lang="de-DE" dirty="0"/>
+              <a:t> Lists – </a:t>
+            </a:r>
+            <a:r>
+              <a:rPr lang="de-DE" dirty="0" err="1"/>
+              <a:t>delete</a:t>
+            </a:r>
+            <a:r>
+              <a:rPr lang="de-DE" dirty="0"/>
+              <a:t> at </a:t>
+            </a:r>
+            <a:r>
+              <a:rPr lang="de-DE" dirty="0" err="1"/>
+              <a:t>the</a:t>
+            </a:r>
+            <a:r>
+              <a:rPr lang="de-DE" dirty="0"/>
+              <a:t> </a:t>
+            </a:r>
+            <a:r>
+              <a:rPr lang="de-DE" dirty="0" err="1"/>
+              <a:t>beginning</a:t>
+            </a:r>
+            <a:r>
+              <a:rPr lang="de-DE" dirty="0"/>
+              <a:t>  </a:t>
+            </a:r>
+            <a:endParaRPr lang="de-AT" dirty="0"/>
+          </a:p>
+        </p:txBody>
+      </p:sp>
+      <p:pic>
+        <p:nvPicPr>
+          <p:cNvPr id="5" name="Inhaltsplatzhalter 4">
+            <a:extLst>
+              <a:ext uri="{FF2B5EF4-FFF2-40B4-BE49-F238E27FC236}">
+                <a16:creationId xmlns:a16="http://schemas.microsoft.com/office/drawing/2014/main" id="{9815012B-D117-4F0B-94B7-DB66F6A1B39C}"/>
+              </a:ext>
+            </a:extLst>
+          </p:cNvPr>
+          <p:cNvPicPr>
+            <a:picLocks noGrp="1" noChangeAspect="1"/>
+          </p:cNvPicPr>
+          <p:nvPr>
+            <p:ph idx="1"/>
+          </p:nvPr>
+        </p:nvPicPr>
+        <p:blipFill>
+          <a:blip r:embed="rId2">
+            <a:extLst>
+              <a:ext uri="{28A0092B-C50C-407E-A947-70E740481C1C}">
+                <a14:useLocalDpi xmlns:a14="http://schemas.microsoft.com/office/drawing/2010/main" val="0"/>
+              </a:ext>
+            </a:extLst>
+          </a:blip>
+          <a:stretch>
+            <a:fillRect/>
+          </a:stretch>
+        </p:blipFill>
+        <p:spPr>
+          <a:xfrm>
+            <a:off x="2905760" y="1735640"/>
+            <a:ext cx="5622415" cy="3992943"/>
+          </a:xfrm>
+        </p:spPr>
+      </p:pic>
+    </p:spTree>
+    <p:extLst>
+      <p:ext uri="{BB962C8B-B14F-4D97-AF65-F5344CB8AC3E}">
+        <p14:creationId xmlns:p14="http://schemas.microsoft.com/office/powerpoint/2010/main" val="35557329"/>
       </p:ext>
     </p:extLst>
   </p:cSld>

</xml_diff>

<commit_message>
finished the presentation final push
</commit_message>
<xml_diff>
--- a/Linked_List.pptx
+++ b/Linked_List.pptx
@@ -9,10 +9,10 @@
     <p:sldId id="257" r:id="rId3"/>
     <p:sldId id="258" r:id="rId4"/>
     <p:sldId id="259" r:id="rId5"/>
-    <p:sldId id="266" r:id="rId6"/>
-    <p:sldId id="260" r:id="rId7"/>
-    <p:sldId id="261" r:id="rId8"/>
-    <p:sldId id="262" r:id="rId9"/>
+    <p:sldId id="260" r:id="rId6"/>
+    <p:sldId id="261" r:id="rId7"/>
+    <p:sldId id="262" r:id="rId8"/>
+    <p:sldId id="266" r:id="rId9"/>
     <p:sldId id="263" r:id="rId10"/>
     <p:sldId id="264" r:id="rId11"/>
     <p:sldId id="265" r:id="rId12"/>
@@ -271,7 +271,7 @@
           <a:p>
             <a:fld id="{259D4BC2-8679-4FD1-863A-C8C72E7822AE}" type="datetimeFigureOut">
               <a:rPr lang="de-AT" smtClean="0"/>
-              <a:t>26.04.2022</a:t>
+              <a:t>02.05.2022</a:t>
             </a:fld>
             <a:endParaRPr lang="de-AT"/>
           </a:p>
@@ -471,7 +471,7 @@
           <a:p>
             <a:fld id="{259D4BC2-8679-4FD1-863A-C8C72E7822AE}" type="datetimeFigureOut">
               <a:rPr lang="de-AT" smtClean="0"/>
-              <a:t>26.04.2022</a:t>
+              <a:t>02.05.2022</a:t>
             </a:fld>
             <a:endParaRPr lang="de-AT"/>
           </a:p>
@@ -681,7 +681,7 @@
           <a:p>
             <a:fld id="{259D4BC2-8679-4FD1-863A-C8C72E7822AE}" type="datetimeFigureOut">
               <a:rPr lang="de-AT" smtClean="0"/>
-              <a:t>26.04.2022</a:t>
+              <a:t>02.05.2022</a:t>
             </a:fld>
             <a:endParaRPr lang="de-AT"/>
           </a:p>
@@ -881,7 +881,7 @@
           <a:p>
             <a:fld id="{259D4BC2-8679-4FD1-863A-C8C72E7822AE}" type="datetimeFigureOut">
               <a:rPr lang="de-AT" smtClean="0"/>
-              <a:t>26.04.2022</a:t>
+              <a:t>02.05.2022</a:t>
             </a:fld>
             <a:endParaRPr lang="de-AT"/>
           </a:p>
@@ -1157,7 +1157,7 @@
           <a:p>
             <a:fld id="{259D4BC2-8679-4FD1-863A-C8C72E7822AE}" type="datetimeFigureOut">
               <a:rPr lang="de-AT" smtClean="0"/>
-              <a:t>26.04.2022</a:t>
+              <a:t>02.05.2022</a:t>
             </a:fld>
             <a:endParaRPr lang="de-AT"/>
           </a:p>
@@ -1425,7 +1425,7 @@
           <a:p>
             <a:fld id="{259D4BC2-8679-4FD1-863A-C8C72E7822AE}" type="datetimeFigureOut">
               <a:rPr lang="de-AT" smtClean="0"/>
-              <a:t>26.04.2022</a:t>
+              <a:t>02.05.2022</a:t>
             </a:fld>
             <a:endParaRPr lang="de-AT"/>
           </a:p>
@@ -1840,7 +1840,7 @@
           <a:p>
             <a:fld id="{259D4BC2-8679-4FD1-863A-C8C72E7822AE}" type="datetimeFigureOut">
               <a:rPr lang="de-AT" smtClean="0"/>
-              <a:t>26.04.2022</a:t>
+              <a:t>02.05.2022</a:t>
             </a:fld>
             <a:endParaRPr lang="de-AT"/>
           </a:p>
@@ -1982,7 +1982,7 @@
           <a:p>
             <a:fld id="{259D4BC2-8679-4FD1-863A-C8C72E7822AE}" type="datetimeFigureOut">
               <a:rPr lang="de-AT" smtClean="0"/>
-              <a:t>26.04.2022</a:t>
+              <a:t>02.05.2022</a:t>
             </a:fld>
             <a:endParaRPr lang="de-AT"/>
           </a:p>
@@ -2095,7 +2095,7 @@
           <a:p>
             <a:fld id="{259D4BC2-8679-4FD1-863A-C8C72E7822AE}" type="datetimeFigureOut">
               <a:rPr lang="de-AT" smtClean="0"/>
-              <a:t>26.04.2022</a:t>
+              <a:t>02.05.2022</a:t>
             </a:fld>
             <a:endParaRPr lang="de-AT"/>
           </a:p>
@@ -2408,7 +2408,7 @@
           <a:p>
             <a:fld id="{259D4BC2-8679-4FD1-863A-C8C72E7822AE}" type="datetimeFigureOut">
               <a:rPr lang="de-AT" smtClean="0"/>
-              <a:t>26.04.2022</a:t>
+              <a:t>02.05.2022</a:t>
             </a:fld>
             <a:endParaRPr lang="de-AT"/>
           </a:p>
@@ -2697,7 +2697,7 @@
           <a:p>
             <a:fld id="{259D4BC2-8679-4FD1-863A-C8C72E7822AE}" type="datetimeFigureOut">
               <a:rPr lang="de-AT" smtClean="0"/>
-              <a:t>26.04.2022</a:t>
+              <a:t>02.05.2022</a:t>
             </a:fld>
             <a:endParaRPr lang="de-AT"/>
           </a:p>
@@ -2940,7 +2940,7 @@
           <a:p>
             <a:fld id="{259D4BC2-8679-4FD1-863A-C8C72E7822AE}" type="datetimeFigureOut">
               <a:rPr lang="de-AT" smtClean="0"/>
-              <a:t>26.04.2022</a:t>
+              <a:t>02.05.2022</a:t>
             </a:fld>
             <a:endParaRPr lang="de-AT"/>
           </a:p>
@@ -4353,7 +4353,7 @@
         <p:spPr>
           <a:xfrm>
             <a:off x="3474720" y="1330365"/>
-            <a:ext cx="3634201" cy="3892469"/>
+            <a:ext cx="4511040" cy="4831621"/>
           </a:xfrm>
         </p:spPr>
       </p:pic>
@@ -6973,10 +6973,10 @@
       </p:grpSpPr>
       <p:sp>
         <p:nvSpPr>
-          <p:cNvPr id="2" name="Titel 1">
-            <a:extLst>
-              <a:ext uri="{FF2B5EF4-FFF2-40B4-BE49-F238E27FC236}">
-                <a16:creationId xmlns:a16="http://schemas.microsoft.com/office/drawing/2014/main" id="{08AC0537-CDD0-4A08-B010-10A48AF8A067}"/>
+          <p:cNvPr id="2" name="Title 1">
+            <a:extLst>
+              <a:ext uri="{FF2B5EF4-FFF2-40B4-BE49-F238E27FC236}">
+                <a16:creationId xmlns:a16="http://schemas.microsoft.com/office/drawing/2014/main" id="{397F9B61-FE15-4F84-A545-0E7D44C65710}"/>
               </a:ext>
             </a:extLst>
           </p:cNvPr>
@@ -6987,772 +6987,62 @@
             <p:ph type="title"/>
           </p:nvPr>
         </p:nvSpPr>
-        <p:spPr/>
+        <p:spPr>
+          <a:xfrm>
+            <a:off x="838199" y="0"/>
+            <a:ext cx="10515600" cy="1325563"/>
+          </a:xfrm>
+        </p:spPr>
         <p:txBody>
           <a:bodyPr/>
           <a:lstStyle/>
           <a:p>
             <a:r>
-              <a:rPr lang="de-DE" dirty="0" err="1"/>
-              <a:t>Linked</a:t>
-            </a:r>
-            <a:r>
-              <a:rPr lang="de-DE" dirty="0"/>
-              <a:t> Lists - Delete</a:t>
-            </a:r>
-            <a:endParaRPr lang="de-AT" dirty="0"/>
-          </a:p>
-        </p:txBody>
-      </p:sp>
-      <p:sp>
-        <p:nvSpPr>
-          <p:cNvPr id="3" name="Inhaltsplatzhalter 2">
-            <a:extLst>
-              <a:ext uri="{FF2B5EF4-FFF2-40B4-BE49-F238E27FC236}">
-                <a16:creationId xmlns:a16="http://schemas.microsoft.com/office/drawing/2014/main" id="{EAD06E14-75D5-4196-A6D8-8C6A76256922}"/>
-              </a:ext>
-            </a:extLst>
-          </p:cNvPr>
-          <p:cNvSpPr>
-            <a:spLocks noGrp="1"/>
-          </p:cNvSpPr>
+              <a:rPr lang="en-GB" dirty="0"/>
+              <a:t>Linked Lists – Insert at the Beginning</a:t>
+            </a:r>
+            <a:endParaRPr lang="LID4096" dirty="0"/>
+          </a:p>
+        </p:txBody>
+      </p:sp>
+      <p:pic>
+        <p:nvPicPr>
+          <p:cNvPr id="5" name="Content Placeholder 4" descr="Text&#10;&#10;Description automatically generated">
+            <a:extLst>
+              <a:ext uri="{FF2B5EF4-FFF2-40B4-BE49-F238E27FC236}">
+                <a16:creationId xmlns:a16="http://schemas.microsoft.com/office/drawing/2014/main" id="{BBD62933-2C16-4E01-8766-F3620CCD488C}"/>
+              </a:ext>
+            </a:extLst>
+          </p:cNvPr>
+          <p:cNvPicPr>
+            <a:picLocks noGrp="1" noChangeAspect="1"/>
+          </p:cNvPicPr>
           <p:nvPr>
             <p:ph idx="1"/>
           </p:nvPr>
-        </p:nvSpPr>
-        <p:spPr/>
-        <p:txBody>
-          <a:bodyPr/>
-          <a:lstStyle/>
-          <a:p>
-            <a:endParaRPr lang="de-AT" dirty="0"/>
-          </a:p>
-        </p:txBody>
-      </p:sp>
-      <p:sp>
-        <p:nvSpPr>
-          <p:cNvPr id="20" name="Rectangle 3">
-            <a:extLst>
-              <a:ext uri="{FF2B5EF4-FFF2-40B4-BE49-F238E27FC236}">
-                <a16:creationId xmlns:a16="http://schemas.microsoft.com/office/drawing/2014/main" id="{C841C110-4C5F-49AC-90C5-58B5DC1CAF3F}"/>
-              </a:ext>
-            </a:extLst>
-          </p:cNvPr>
-          <p:cNvSpPr/>
-          <p:nvPr/>
-        </p:nvSpPr>
-        <p:spPr>
-          <a:xfrm>
-            <a:off x="1778000" y="3636953"/>
-            <a:ext cx="1858297" cy="817563"/>
-          </a:xfrm>
-          <a:prstGeom prst="rect">
-            <a:avLst/>
-          </a:prstGeom>
-        </p:spPr>
-        <p:style>
-          <a:lnRef idx="0">
-            <a:schemeClr val="accent3"/>
-          </a:lnRef>
-          <a:fillRef idx="3">
-            <a:schemeClr val="accent3"/>
-          </a:fillRef>
-          <a:effectRef idx="3">
-            <a:schemeClr val="accent3"/>
-          </a:effectRef>
-          <a:fontRef idx="minor">
-            <a:schemeClr val="lt1"/>
-          </a:fontRef>
-        </p:style>
-        <p:txBody>
-          <a:bodyPr rtlCol="0" anchor="ctr"/>
-          <a:lstStyle/>
-          <a:p>
-            <a:pPr algn="ctr"/>
-            <a:endParaRPr lang="LID4096"/>
-          </a:p>
-        </p:txBody>
-      </p:sp>
-      <p:sp>
-        <p:nvSpPr>
-          <p:cNvPr id="21" name="Rectangle 6">
-            <a:extLst>
-              <a:ext uri="{FF2B5EF4-FFF2-40B4-BE49-F238E27FC236}">
-                <a16:creationId xmlns:a16="http://schemas.microsoft.com/office/drawing/2014/main" id="{91EB1657-FC13-4375-8D5B-B3E512C994AE}"/>
-              </a:ext>
-            </a:extLst>
-          </p:cNvPr>
-          <p:cNvSpPr/>
-          <p:nvPr/>
-        </p:nvSpPr>
-        <p:spPr>
-          <a:xfrm>
-            <a:off x="5396271" y="3636953"/>
-            <a:ext cx="1936955" cy="817563"/>
-          </a:xfrm>
-          <a:prstGeom prst="rect">
-            <a:avLst/>
-          </a:prstGeom>
-        </p:spPr>
-        <p:style>
-          <a:lnRef idx="0">
-            <a:schemeClr val="accent3"/>
-          </a:lnRef>
-          <a:fillRef idx="3">
-            <a:schemeClr val="accent3"/>
-          </a:fillRef>
-          <a:effectRef idx="3">
-            <a:schemeClr val="accent3"/>
-          </a:effectRef>
-          <a:fontRef idx="minor">
-            <a:schemeClr val="lt1"/>
-          </a:fontRef>
-        </p:style>
-        <p:txBody>
-          <a:bodyPr rtlCol="0" anchor="ctr"/>
-          <a:lstStyle/>
-          <a:p>
-            <a:pPr algn="ctr"/>
-            <a:endParaRPr lang="LID4096"/>
-          </a:p>
-        </p:txBody>
-      </p:sp>
-      <p:sp>
-        <p:nvSpPr>
-          <p:cNvPr id="22" name="Rectangle 9">
-            <a:extLst>
-              <a:ext uri="{FF2B5EF4-FFF2-40B4-BE49-F238E27FC236}">
-                <a16:creationId xmlns:a16="http://schemas.microsoft.com/office/drawing/2014/main" id="{788EF3D6-A675-4E90-93B0-D415A8C87D42}"/>
-              </a:ext>
-            </a:extLst>
-          </p:cNvPr>
-          <p:cNvSpPr/>
-          <p:nvPr/>
-        </p:nvSpPr>
-        <p:spPr>
-          <a:xfrm>
-            <a:off x="9078454" y="3636976"/>
-            <a:ext cx="1877961" cy="817540"/>
-          </a:xfrm>
-          <a:prstGeom prst="rect">
-            <a:avLst/>
-          </a:prstGeom>
-        </p:spPr>
-        <p:style>
-          <a:lnRef idx="0">
-            <a:schemeClr val="accent3"/>
-          </a:lnRef>
-          <a:fillRef idx="3">
-            <a:schemeClr val="accent3"/>
-          </a:fillRef>
-          <a:effectRef idx="3">
-            <a:schemeClr val="accent3"/>
-          </a:effectRef>
-          <a:fontRef idx="minor">
-            <a:schemeClr val="lt1"/>
-          </a:fontRef>
-        </p:style>
-        <p:txBody>
-          <a:bodyPr rtlCol="0" anchor="ctr"/>
-          <a:lstStyle/>
-          <a:p>
-            <a:pPr algn="ctr"/>
-            <a:endParaRPr lang="LID4096"/>
-          </a:p>
-        </p:txBody>
-      </p:sp>
-      <p:cxnSp>
-        <p:nvCxnSpPr>
-          <p:cNvPr id="23" name="Straight Connector 13">
-            <a:extLst>
-              <a:ext uri="{FF2B5EF4-FFF2-40B4-BE49-F238E27FC236}">
-                <a16:creationId xmlns:a16="http://schemas.microsoft.com/office/drawing/2014/main" id="{371D3601-E064-4BAE-B2B2-9C5E0D4C4C62}"/>
-              </a:ext>
-            </a:extLst>
-          </p:cNvPr>
-          <p:cNvCxnSpPr>
-            <a:stCxn id="20" idx="0"/>
-            <a:endCxn id="20" idx="2"/>
-          </p:cNvCxnSpPr>
-          <p:nvPr/>
-        </p:nvCxnSpPr>
-        <p:spPr>
-          <a:xfrm>
-            <a:off x="2707149" y="3636953"/>
-            <a:ext cx="0" cy="817563"/>
-          </a:xfrm>
-          <a:prstGeom prst="line">
-            <a:avLst/>
-          </a:prstGeom>
-        </p:spPr>
-        <p:style>
-          <a:lnRef idx="1">
-            <a:schemeClr val="dk1"/>
-          </a:lnRef>
-          <a:fillRef idx="0">
-            <a:schemeClr val="dk1"/>
-          </a:fillRef>
-          <a:effectRef idx="0">
-            <a:schemeClr val="dk1"/>
-          </a:effectRef>
-          <a:fontRef idx="minor">
-            <a:schemeClr val="tx1"/>
-          </a:fontRef>
-        </p:style>
-      </p:cxnSp>
-      <p:cxnSp>
-        <p:nvCxnSpPr>
-          <p:cNvPr id="24" name="Straight Connector 15">
-            <a:extLst>
-              <a:ext uri="{FF2B5EF4-FFF2-40B4-BE49-F238E27FC236}">
-                <a16:creationId xmlns:a16="http://schemas.microsoft.com/office/drawing/2014/main" id="{BA442A89-C503-42F0-98FF-27FB9340483B}"/>
-              </a:ext>
-            </a:extLst>
-          </p:cNvPr>
-          <p:cNvCxnSpPr>
-            <a:stCxn id="21" idx="0"/>
-            <a:endCxn id="21" idx="2"/>
-          </p:cNvCxnSpPr>
-          <p:nvPr/>
-        </p:nvCxnSpPr>
-        <p:spPr>
-          <a:xfrm>
-            <a:off x="6364749" y="3636953"/>
-            <a:ext cx="0" cy="817563"/>
-          </a:xfrm>
-          <a:prstGeom prst="line">
-            <a:avLst/>
-          </a:prstGeom>
-        </p:spPr>
-        <p:style>
-          <a:lnRef idx="1">
-            <a:schemeClr val="dk1"/>
-          </a:lnRef>
-          <a:fillRef idx="0">
-            <a:schemeClr val="dk1"/>
-          </a:fillRef>
-          <a:effectRef idx="0">
-            <a:schemeClr val="dk1"/>
-          </a:effectRef>
-          <a:fontRef idx="minor">
-            <a:schemeClr val="tx1"/>
-          </a:fontRef>
-        </p:style>
-      </p:cxnSp>
-      <p:cxnSp>
-        <p:nvCxnSpPr>
-          <p:cNvPr id="25" name="Straight Connector 17">
-            <a:extLst>
-              <a:ext uri="{FF2B5EF4-FFF2-40B4-BE49-F238E27FC236}">
-                <a16:creationId xmlns:a16="http://schemas.microsoft.com/office/drawing/2014/main" id="{85F30A94-4960-4A3A-B6EF-765AE220076D}"/>
-              </a:ext>
-            </a:extLst>
-          </p:cNvPr>
-          <p:cNvCxnSpPr>
-            <a:stCxn id="22" idx="0"/>
-            <a:endCxn id="22" idx="2"/>
-          </p:cNvCxnSpPr>
-          <p:nvPr/>
-        </p:nvCxnSpPr>
-        <p:spPr>
-          <a:xfrm>
-            <a:off x="10017435" y="3636976"/>
-            <a:ext cx="0" cy="817540"/>
-          </a:xfrm>
-          <a:prstGeom prst="line">
-            <a:avLst/>
-          </a:prstGeom>
-        </p:spPr>
-        <p:style>
-          <a:lnRef idx="1">
-            <a:schemeClr val="dk1"/>
-          </a:lnRef>
-          <a:fillRef idx="0">
-            <a:schemeClr val="dk1"/>
-          </a:fillRef>
-          <a:effectRef idx="0">
-            <a:schemeClr val="dk1"/>
-          </a:effectRef>
-          <a:fontRef idx="minor">
-            <a:schemeClr val="tx1"/>
-          </a:fontRef>
-        </p:style>
-      </p:cxnSp>
-      <p:sp>
-        <p:nvSpPr>
-          <p:cNvPr id="26" name="TextBox 4">
-            <a:extLst>
-              <a:ext uri="{FF2B5EF4-FFF2-40B4-BE49-F238E27FC236}">
-                <a16:creationId xmlns:a16="http://schemas.microsoft.com/office/drawing/2014/main" id="{FA7F1F6D-3CD1-4D3B-BAF8-F404BA867AC9}"/>
-              </a:ext>
-            </a:extLst>
-          </p:cNvPr>
-          <p:cNvSpPr txBox="1"/>
-          <p:nvPr/>
-        </p:nvSpPr>
-        <p:spPr>
-          <a:xfrm>
-            <a:off x="1861576" y="3861057"/>
-            <a:ext cx="938979" cy="369332"/>
-          </a:xfrm>
-          <a:prstGeom prst="rect">
-            <a:avLst/>
-          </a:prstGeom>
-          <a:noFill/>
-        </p:spPr>
-        <p:txBody>
-          <a:bodyPr wrap="square" rtlCol="0">
-            <a:spAutoFit/>
-          </a:bodyPr>
-          <a:lstStyle/>
-          <a:p>
-            <a:r>
-              <a:rPr lang="en-GB" dirty="0"/>
-              <a:t>Data 1</a:t>
-            </a:r>
-            <a:endParaRPr lang="LID4096" dirty="0"/>
-          </a:p>
-        </p:txBody>
-      </p:sp>
-      <p:sp>
-        <p:nvSpPr>
-          <p:cNvPr id="27" name="Arrow: Right 7">
-            <a:extLst>
-              <a:ext uri="{FF2B5EF4-FFF2-40B4-BE49-F238E27FC236}">
-                <a16:creationId xmlns:a16="http://schemas.microsoft.com/office/drawing/2014/main" id="{A2B01AB3-D485-4E87-BF60-E850B43979AD}"/>
-              </a:ext>
-            </a:extLst>
-          </p:cNvPr>
-          <p:cNvSpPr/>
-          <p:nvPr/>
-        </p:nvSpPr>
-        <p:spPr>
-          <a:xfrm>
-            <a:off x="3643671" y="3835083"/>
-            <a:ext cx="1745225" cy="408770"/>
-          </a:xfrm>
-          <a:prstGeom prst="rightArrow">
-            <a:avLst/>
-          </a:prstGeom>
-        </p:spPr>
-        <p:style>
-          <a:lnRef idx="2">
-            <a:schemeClr val="dk1"/>
-          </a:lnRef>
-          <a:fillRef idx="1">
-            <a:schemeClr val="lt1"/>
-          </a:fillRef>
-          <a:effectRef idx="0">
-            <a:schemeClr val="dk1"/>
-          </a:effectRef>
-          <a:fontRef idx="minor">
-            <a:schemeClr val="dk1"/>
-          </a:fontRef>
-        </p:style>
-        <p:txBody>
-          <a:bodyPr rtlCol="0" anchor="ctr"/>
-          <a:lstStyle/>
-          <a:p>
-            <a:pPr algn="ctr"/>
-            <a:endParaRPr lang="LID4096"/>
-          </a:p>
-        </p:txBody>
-      </p:sp>
-      <p:sp>
-        <p:nvSpPr>
-          <p:cNvPr id="28" name="TextBox 16">
-            <a:extLst>
-              <a:ext uri="{FF2B5EF4-FFF2-40B4-BE49-F238E27FC236}">
-                <a16:creationId xmlns:a16="http://schemas.microsoft.com/office/drawing/2014/main" id="{BDB80C76-9D8A-4147-92B7-FF34F53789DE}"/>
-              </a:ext>
-            </a:extLst>
-          </p:cNvPr>
-          <p:cNvSpPr txBox="1"/>
-          <p:nvPr/>
-        </p:nvSpPr>
-        <p:spPr>
-          <a:xfrm>
-            <a:off x="5483420" y="3854802"/>
-            <a:ext cx="805501" cy="369332"/>
-          </a:xfrm>
-          <a:prstGeom prst="rect">
-            <a:avLst/>
-          </a:prstGeom>
-          <a:noFill/>
-        </p:spPr>
-        <p:txBody>
-          <a:bodyPr wrap="square" rtlCol="0">
-            <a:spAutoFit/>
-          </a:bodyPr>
-          <a:lstStyle/>
-          <a:p>
-            <a:r>
-              <a:rPr lang="en-GB" dirty="0"/>
-              <a:t>Data 2</a:t>
-            </a:r>
-            <a:endParaRPr lang="LID4096" dirty="0"/>
-          </a:p>
-        </p:txBody>
-      </p:sp>
-      <p:sp>
-        <p:nvSpPr>
-          <p:cNvPr id="29" name="TextBox 18">
-            <a:extLst>
-              <a:ext uri="{FF2B5EF4-FFF2-40B4-BE49-F238E27FC236}">
-                <a16:creationId xmlns:a16="http://schemas.microsoft.com/office/drawing/2014/main" id="{A8C34C39-1798-49A5-995F-540C8857F3F6}"/>
-              </a:ext>
-            </a:extLst>
-          </p:cNvPr>
-          <p:cNvSpPr txBox="1"/>
-          <p:nvPr/>
-        </p:nvSpPr>
-        <p:spPr>
-          <a:xfrm>
-            <a:off x="2807074" y="3716302"/>
-            <a:ext cx="752161" cy="646331"/>
-          </a:xfrm>
-          <a:prstGeom prst="rect">
-            <a:avLst/>
-          </a:prstGeom>
-          <a:noFill/>
-        </p:spPr>
-        <p:txBody>
-          <a:bodyPr wrap="square" rtlCol="0">
-            <a:spAutoFit/>
-          </a:bodyPr>
-          <a:lstStyle/>
-          <a:p>
-            <a:r>
-              <a:rPr lang="en-GB" dirty="0"/>
-              <a:t>Next Node</a:t>
-            </a:r>
-            <a:endParaRPr lang="LID4096" dirty="0"/>
-          </a:p>
-        </p:txBody>
-      </p:sp>
-      <p:sp>
-        <p:nvSpPr>
-          <p:cNvPr id="30" name="TextBox 19">
-            <a:extLst>
-              <a:ext uri="{FF2B5EF4-FFF2-40B4-BE49-F238E27FC236}">
-                <a16:creationId xmlns:a16="http://schemas.microsoft.com/office/drawing/2014/main" id="{2F08F005-1AC5-4E0C-ADF4-6D6CE007EAB4}"/>
-              </a:ext>
-            </a:extLst>
-          </p:cNvPr>
-          <p:cNvSpPr txBox="1"/>
-          <p:nvPr/>
-        </p:nvSpPr>
-        <p:spPr>
-          <a:xfrm>
-            <a:off x="6499339" y="3716302"/>
-            <a:ext cx="921036" cy="646331"/>
-          </a:xfrm>
-          <a:prstGeom prst="rect">
-            <a:avLst/>
-          </a:prstGeom>
-          <a:noFill/>
-        </p:spPr>
-        <p:txBody>
-          <a:bodyPr wrap="square" rtlCol="0">
-            <a:spAutoFit/>
-          </a:bodyPr>
-          <a:lstStyle/>
-          <a:p>
-            <a:r>
-              <a:rPr lang="en-GB" dirty="0"/>
-              <a:t>Next Node</a:t>
-            </a:r>
-            <a:endParaRPr lang="LID4096" dirty="0"/>
-          </a:p>
-        </p:txBody>
-      </p:sp>
-      <p:sp>
-        <p:nvSpPr>
-          <p:cNvPr id="31" name="TextBox 20">
-            <a:extLst>
-              <a:ext uri="{FF2B5EF4-FFF2-40B4-BE49-F238E27FC236}">
-                <a16:creationId xmlns:a16="http://schemas.microsoft.com/office/drawing/2014/main" id="{1F6A4CD0-30D5-4FC1-9CA9-E8846C4D5ECF}"/>
-              </a:ext>
-            </a:extLst>
-          </p:cNvPr>
-          <p:cNvSpPr txBox="1"/>
-          <p:nvPr/>
-        </p:nvSpPr>
-        <p:spPr>
-          <a:xfrm>
-            <a:off x="10086743" y="3725064"/>
-            <a:ext cx="911085" cy="646331"/>
-          </a:xfrm>
-          <a:prstGeom prst="rect">
-            <a:avLst/>
-          </a:prstGeom>
-          <a:noFill/>
-        </p:spPr>
-        <p:txBody>
-          <a:bodyPr wrap="square" rtlCol="0">
-            <a:spAutoFit/>
-          </a:bodyPr>
-          <a:lstStyle/>
-          <a:p>
-            <a:r>
-              <a:rPr lang="en-GB" dirty="0"/>
-              <a:t>Next Node</a:t>
-            </a:r>
-            <a:endParaRPr lang="LID4096" dirty="0"/>
-          </a:p>
-        </p:txBody>
-      </p:sp>
-      <p:sp>
-        <p:nvSpPr>
-          <p:cNvPr id="32" name="TextBox 21">
-            <a:extLst>
-              <a:ext uri="{FF2B5EF4-FFF2-40B4-BE49-F238E27FC236}">
-                <a16:creationId xmlns:a16="http://schemas.microsoft.com/office/drawing/2014/main" id="{B2DBA6E8-84E7-47D4-855E-E66D00130298}"/>
-              </a:ext>
-            </a:extLst>
-          </p:cNvPr>
-          <p:cNvSpPr txBox="1"/>
-          <p:nvPr/>
-        </p:nvSpPr>
-        <p:spPr>
-          <a:xfrm>
-            <a:off x="9155640" y="3854801"/>
-            <a:ext cx="896449" cy="369332"/>
-          </a:xfrm>
-          <a:prstGeom prst="rect">
-            <a:avLst/>
-          </a:prstGeom>
-          <a:noFill/>
-        </p:spPr>
-        <p:txBody>
-          <a:bodyPr wrap="square" rtlCol="0">
-            <a:spAutoFit/>
-          </a:bodyPr>
-          <a:lstStyle/>
-          <a:p>
-            <a:r>
-              <a:rPr lang="en-GB" dirty="0"/>
-              <a:t>Data 3</a:t>
-            </a:r>
-            <a:endParaRPr lang="LID4096" dirty="0"/>
-          </a:p>
-        </p:txBody>
-      </p:sp>
-      <p:cxnSp>
-        <p:nvCxnSpPr>
-          <p:cNvPr id="33" name="Straight Arrow Connector 23">
-            <a:extLst>
-              <a:ext uri="{FF2B5EF4-FFF2-40B4-BE49-F238E27FC236}">
-                <a16:creationId xmlns:a16="http://schemas.microsoft.com/office/drawing/2014/main" id="{BE744AE2-E29E-48F6-9789-B55C4294178F}"/>
-              </a:ext>
-            </a:extLst>
-          </p:cNvPr>
-          <p:cNvCxnSpPr>
-            <a:cxnSpLocks/>
-            <a:endCxn id="20" idx="1"/>
-          </p:cNvCxnSpPr>
-          <p:nvPr/>
-        </p:nvCxnSpPr>
-        <p:spPr>
-          <a:xfrm>
-            <a:off x="1351830" y="3544878"/>
-            <a:ext cx="426170" cy="500857"/>
-          </a:xfrm>
-          <a:prstGeom prst="straightConnector1">
-            <a:avLst/>
-          </a:prstGeom>
-          <a:ln>
-            <a:tailEnd type="triangle"/>
-          </a:ln>
-        </p:spPr>
-        <p:style>
-          <a:lnRef idx="1">
-            <a:schemeClr val="accent1"/>
-          </a:lnRef>
-          <a:fillRef idx="0">
-            <a:schemeClr val="accent1"/>
-          </a:fillRef>
-          <a:effectRef idx="0">
-            <a:schemeClr val="accent1"/>
-          </a:effectRef>
-          <a:fontRef idx="minor">
-            <a:schemeClr val="tx1"/>
-          </a:fontRef>
-        </p:style>
-      </p:cxnSp>
-      <p:sp>
-        <p:nvSpPr>
-          <p:cNvPr id="34" name="TextBox 25">
-            <a:extLst>
-              <a:ext uri="{FF2B5EF4-FFF2-40B4-BE49-F238E27FC236}">
-                <a16:creationId xmlns:a16="http://schemas.microsoft.com/office/drawing/2014/main" id="{EC0A8C95-0EE1-4931-BA0A-C6F73A1E9777}"/>
-              </a:ext>
-            </a:extLst>
-          </p:cNvPr>
-          <p:cNvSpPr txBox="1"/>
-          <p:nvPr/>
-        </p:nvSpPr>
-        <p:spPr>
-          <a:xfrm>
-            <a:off x="944717" y="3206382"/>
-            <a:ext cx="1386348" cy="370042"/>
-          </a:xfrm>
-          <a:prstGeom prst="rect">
-            <a:avLst/>
-          </a:prstGeom>
-          <a:noFill/>
-        </p:spPr>
-        <p:txBody>
-          <a:bodyPr wrap="square" rtlCol="0">
-            <a:spAutoFit/>
-          </a:bodyPr>
-          <a:lstStyle/>
-          <a:p>
-            <a:r>
-              <a:rPr lang="en-GB" dirty="0"/>
-              <a:t>_head</a:t>
-            </a:r>
-            <a:endParaRPr lang="LID4096" dirty="0"/>
-          </a:p>
-        </p:txBody>
-      </p:sp>
-      <p:sp>
-        <p:nvSpPr>
-          <p:cNvPr id="35" name="Arrow: Right 31">
-            <a:extLst>
-              <a:ext uri="{FF2B5EF4-FFF2-40B4-BE49-F238E27FC236}">
-                <a16:creationId xmlns:a16="http://schemas.microsoft.com/office/drawing/2014/main" id="{88D1FF46-4EB7-42D4-A9DC-566D21ECC89E}"/>
-              </a:ext>
-            </a:extLst>
-          </p:cNvPr>
-          <p:cNvSpPr/>
-          <p:nvPr/>
-        </p:nvSpPr>
-        <p:spPr>
-          <a:xfrm>
-            <a:off x="7338985" y="3843844"/>
-            <a:ext cx="1745225" cy="408770"/>
-          </a:xfrm>
-          <a:prstGeom prst="rightArrow">
-            <a:avLst/>
-          </a:prstGeom>
-        </p:spPr>
-        <p:style>
-          <a:lnRef idx="2">
-            <a:schemeClr val="dk1"/>
-          </a:lnRef>
-          <a:fillRef idx="1">
-            <a:schemeClr val="lt1"/>
-          </a:fillRef>
-          <a:effectRef idx="0">
-            <a:schemeClr val="dk1"/>
-          </a:effectRef>
-          <a:fontRef idx="minor">
-            <a:schemeClr val="dk1"/>
-          </a:fontRef>
-        </p:style>
-        <p:txBody>
-          <a:bodyPr rtlCol="0" anchor="ctr"/>
-          <a:lstStyle/>
-          <a:p>
-            <a:pPr algn="ctr"/>
-            <a:endParaRPr lang="LID4096"/>
-          </a:p>
-        </p:txBody>
-      </p:sp>
-      <p:cxnSp>
-        <p:nvCxnSpPr>
-          <p:cNvPr id="37" name="Gerader Verbinder 36">
-            <a:extLst>
-              <a:ext uri="{FF2B5EF4-FFF2-40B4-BE49-F238E27FC236}">
-                <a16:creationId xmlns:a16="http://schemas.microsoft.com/office/drawing/2014/main" id="{A2A5A66C-2321-492C-A5BB-B31D5BFD7AE7}"/>
-              </a:ext>
-            </a:extLst>
-          </p:cNvPr>
-          <p:cNvCxnSpPr/>
-          <p:nvPr/>
-        </p:nvCxnSpPr>
-        <p:spPr>
-          <a:xfrm>
-            <a:off x="4622800" y="3206382"/>
-            <a:ext cx="3159760" cy="1507858"/>
-          </a:xfrm>
-          <a:prstGeom prst="line">
-            <a:avLst/>
-          </a:prstGeom>
-          <a:ln>
-            <a:solidFill>
-              <a:srgbClr val="FF0000"/>
-            </a:solidFill>
-          </a:ln>
-        </p:spPr>
-        <p:style>
-          <a:lnRef idx="3">
-            <a:schemeClr val="accent2"/>
-          </a:lnRef>
-          <a:fillRef idx="0">
-            <a:schemeClr val="accent2"/>
-          </a:fillRef>
-          <a:effectRef idx="2">
-            <a:schemeClr val="accent2"/>
-          </a:effectRef>
-          <a:fontRef idx="minor">
-            <a:schemeClr val="tx1"/>
-          </a:fontRef>
-        </p:style>
-      </p:cxnSp>
-      <p:sp>
-        <p:nvSpPr>
-          <p:cNvPr id="41" name="Pfeil: 180-Grad 40">
-            <a:extLst>
-              <a:ext uri="{FF2B5EF4-FFF2-40B4-BE49-F238E27FC236}">
-                <a16:creationId xmlns:a16="http://schemas.microsoft.com/office/drawing/2014/main" id="{C94F01EC-23AC-4660-8EA2-536062FCA173}"/>
-              </a:ext>
-            </a:extLst>
-          </p:cNvPr>
-          <p:cNvSpPr/>
-          <p:nvPr/>
-        </p:nvSpPr>
-        <p:spPr>
-          <a:xfrm>
-            <a:off x="3108960" y="2758861"/>
-            <a:ext cx="6522720" cy="817563"/>
-          </a:xfrm>
-          <a:prstGeom prst="uturnArrow">
-            <a:avLst/>
-          </a:prstGeom>
-        </p:spPr>
-        <p:style>
-          <a:lnRef idx="0">
-            <a:schemeClr val="accent3"/>
-          </a:lnRef>
-          <a:fillRef idx="3">
-            <a:schemeClr val="accent3"/>
-          </a:fillRef>
-          <a:effectRef idx="3">
-            <a:schemeClr val="accent3"/>
-          </a:effectRef>
-          <a:fontRef idx="minor">
-            <a:schemeClr val="lt1"/>
-          </a:fontRef>
-        </p:style>
-        <p:txBody>
-          <a:bodyPr rtlCol="0" anchor="ctr"/>
-          <a:lstStyle/>
-          <a:p>
-            <a:pPr algn="ctr"/>
-            <a:endParaRPr lang="de-AT">
-              <a:solidFill>
-                <a:schemeClr val="tx1"/>
-              </a:solidFill>
-            </a:endParaRPr>
-          </a:p>
-        </p:txBody>
-      </p:sp>
+        </p:nvPicPr>
+        <p:blipFill rotWithShape="1">
+          <a:blip r:embed="rId2">
+            <a:extLst>
+              <a:ext uri="{28A0092B-C50C-407E-A947-70E740481C1C}">
+                <a14:useLocalDpi xmlns:a14="http://schemas.microsoft.com/office/drawing/2010/main" val="0"/>
+              </a:ext>
+            </a:extLst>
+          </a:blip>
+          <a:srcRect t="18325"/>
+          <a:stretch/>
+        </p:blipFill>
+        <p:spPr>
+          <a:xfrm>
+            <a:off x="2951505" y="1325563"/>
+            <a:ext cx="6288987" cy="4845982"/>
+          </a:xfrm>
+        </p:spPr>
+      </p:pic>
     </p:spTree>
     <p:extLst>
       <p:ext uri="{BB962C8B-B14F-4D97-AF65-F5344CB8AC3E}">
-        <p14:creationId xmlns:p14="http://schemas.microsoft.com/office/powerpoint/2010/main" val="3013868465"/>
+        <p14:creationId xmlns:p14="http://schemas.microsoft.com/office/powerpoint/2010/main" val="2473947929"/>
       </p:ext>
     </p:extLst>
   </p:cSld>
@@ -7784,7 +7074,7 @@
           <p:cNvPr id="2" name="Title 1">
             <a:extLst>
               <a:ext uri="{FF2B5EF4-FFF2-40B4-BE49-F238E27FC236}">
-                <a16:creationId xmlns:a16="http://schemas.microsoft.com/office/drawing/2014/main" id="{397F9B61-FE15-4F84-A545-0E7D44C65710}"/>
+                <a16:creationId xmlns:a16="http://schemas.microsoft.com/office/drawing/2014/main" id="{8DAD2FEE-4AD2-420A-90AB-581BED8E748C}"/>
               </a:ext>
             </a:extLst>
           </p:cNvPr>
@@ -7797,7 +7087,7 @@
         </p:nvSpPr>
         <p:spPr>
           <a:xfrm>
-            <a:off x="838199" y="0"/>
+            <a:off x="838200" y="209261"/>
             <a:ext cx="10515600" cy="1325563"/>
           </a:xfrm>
         </p:spPr>
@@ -7807,7 +7097,7 @@
           <a:p>
             <a:r>
               <a:rPr lang="en-GB" dirty="0"/>
-              <a:t>Linked Lists – Insert at the Beginning</a:t>
+              <a:t>Linked Lists – Insert at the end</a:t>
             </a:r>
             <a:endParaRPr lang="LID4096" dirty="0"/>
           </a:p>
@@ -7818,7 +7108,7 @@
           <p:cNvPr id="5" name="Content Placeholder 4" descr="Text&#10;&#10;Description automatically generated">
             <a:extLst>
               <a:ext uri="{FF2B5EF4-FFF2-40B4-BE49-F238E27FC236}">
-                <a16:creationId xmlns:a16="http://schemas.microsoft.com/office/drawing/2014/main" id="{BBD62933-2C16-4E01-8766-F3620CCD488C}"/>
+                <a16:creationId xmlns:a16="http://schemas.microsoft.com/office/drawing/2014/main" id="{239BF6C6-02B4-475F-AD93-8DAE8F6A02D0}"/>
               </a:ext>
             </a:extLst>
           </p:cNvPr>
@@ -7837,20 +7127,20 @@
               </a:ext>
             </a:extLst>
           </a:blip>
-          <a:srcRect t="18325"/>
+          <a:srcRect t="15757"/>
           <a:stretch/>
         </p:blipFill>
         <p:spPr>
           <a:xfrm>
-            <a:off x="2951505" y="1325563"/>
-            <a:ext cx="6288987" cy="4845982"/>
+            <a:off x="3667991" y="1252975"/>
+            <a:ext cx="4856018" cy="4793432"/>
           </a:xfrm>
         </p:spPr>
       </p:pic>
     </p:spTree>
     <p:extLst>
       <p:ext uri="{BB962C8B-B14F-4D97-AF65-F5344CB8AC3E}">
-        <p14:creationId xmlns:p14="http://schemas.microsoft.com/office/powerpoint/2010/main" val="2473947929"/>
+        <p14:creationId xmlns:p14="http://schemas.microsoft.com/office/powerpoint/2010/main" val="3566056963"/>
       </p:ext>
     </p:extLst>
   </p:cSld>
@@ -7882,7 +7172,7 @@
           <p:cNvPr id="2" name="Title 1">
             <a:extLst>
               <a:ext uri="{FF2B5EF4-FFF2-40B4-BE49-F238E27FC236}">
-                <a16:creationId xmlns:a16="http://schemas.microsoft.com/office/drawing/2014/main" id="{8DAD2FEE-4AD2-420A-90AB-581BED8E748C}"/>
+                <a16:creationId xmlns:a16="http://schemas.microsoft.com/office/drawing/2014/main" id="{F96CA9B4-3B60-41C5-879D-13DC7C9853D0}"/>
               </a:ext>
             </a:extLst>
           </p:cNvPr>
@@ -7895,7 +7185,7 @@
         </p:nvSpPr>
         <p:spPr>
           <a:xfrm>
-            <a:off x="838200" y="209261"/>
+            <a:off x="838199" y="52418"/>
             <a:ext cx="10515600" cy="1325563"/>
           </a:xfrm>
         </p:spPr>
@@ -7905,7 +7195,7 @@
           <a:p>
             <a:r>
               <a:rPr lang="en-GB" dirty="0"/>
-              <a:t>Linked Lists – Insert at the end</a:t>
+              <a:t>Linked Lists – Insert at a position</a:t>
             </a:r>
             <a:endParaRPr lang="LID4096" dirty="0"/>
           </a:p>
@@ -7916,7 +7206,7 @@
           <p:cNvPr id="5" name="Content Placeholder 4" descr="Text&#10;&#10;Description automatically generated">
             <a:extLst>
               <a:ext uri="{FF2B5EF4-FFF2-40B4-BE49-F238E27FC236}">
-                <a16:creationId xmlns:a16="http://schemas.microsoft.com/office/drawing/2014/main" id="{239BF6C6-02B4-475F-AD93-8DAE8F6A02D0}"/>
+                <a16:creationId xmlns:a16="http://schemas.microsoft.com/office/drawing/2014/main" id="{924017E1-9772-4628-B0BE-882CC65C77C3}"/>
               </a:ext>
             </a:extLst>
           </p:cNvPr>
@@ -7935,20 +7225,20 @@
               </a:ext>
             </a:extLst>
           </a:blip>
-          <a:srcRect t="15757"/>
+          <a:srcRect t="13032"/>
           <a:stretch/>
         </p:blipFill>
         <p:spPr>
           <a:xfrm>
-            <a:off x="3667991" y="1252975"/>
-            <a:ext cx="4856018" cy="4793432"/>
+            <a:off x="3177827" y="1167094"/>
+            <a:ext cx="5836343" cy="4882188"/>
           </a:xfrm>
         </p:spPr>
       </p:pic>
     </p:spTree>
     <p:extLst>
       <p:ext uri="{BB962C8B-B14F-4D97-AF65-F5344CB8AC3E}">
-        <p14:creationId xmlns:p14="http://schemas.microsoft.com/office/powerpoint/2010/main" val="3566056963"/>
+        <p14:creationId xmlns:p14="http://schemas.microsoft.com/office/powerpoint/2010/main" val="1272541068"/>
       </p:ext>
     </p:extLst>
   </p:cSld>
@@ -7977,10 +7267,10 @@
       </p:grpSpPr>
       <p:sp>
         <p:nvSpPr>
-          <p:cNvPr id="2" name="Title 1">
-            <a:extLst>
-              <a:ext uri="{FF2B5EF4-FFF2-40B4-BE49-F238E27FC236}">
-                <a16:creationId xmlns:a16="http://schemas.microsoft.com/office/drawing/2014/main" id="{F96CA9B4-3B60-41C5-879D-13DC7C9853D0}"/>
+          <p:cNvPr id="2" name="Titel 1">
+            <a:extLst>
+              <a:ext uri="{FF2B5EF4-FFF2-40B4-BE49-F238E27FC236}">
+                <a16:creationId xmlns:a16="http://schemas.microsoft.com/office/drawing/2014/main" id="{08AC0537-CDD0-4A08-B010-10A48AF8A067}"/>
               </a:ext>
             </a:extLst>
           </p:cNvPr>
@@ -7993,7 +7283,7 @@
         </p:nvSpPr>
         <p:spPr>
           <a:xfrm>
-            <a:off x="838199" y="52418"/>
+            <a:off x="838200" y="354965"/>
             <a:ext cx="10515600" cy="1325563"/>
           </a:xfrm>
         </p:spPr>
@@ -8002,51 +7292,766 @@
           <a:lstStyle/>
           <a:p>
             <a:r>
-              <a:rPr lang="en-GB" dirty="0"/>
-              <a:t>Linked Lists – Insert at a position</a:t>
-            </a:r>
-            <a:endParaRPr lang="LID4096" dirty="0"/>
-          </a:p>
-        </p:txBody>
-      </p:sp>
-      <p:pic>
-        <p:nvPicPr>
-          <p:cNvPr id="5" name="Content Placeholder 4" descr="Text&#10;&#10;Description automatically generated">
-            <a:extLst>
-              <a:ext uri="{FF2B5EF4-FFF2-40B4-BE49-F238E27FC236}">
-                <a16:creationId xmlns:a16="http://schemas.microsoft.com/office/drawing/2014/main" id="{924017E1-9772-4628-B0BE-882CC65C77C3}"/>
-              </a:ext>
-            </a:extLst>
-          </p:cNvPr>
-          <p:cNvPicPr>
-            <a:picLocks noGrp="1" noChangeAspect="1"/>
-          </p:cNvPicPr>
+              <a:rPr lang="de-DE" dirty="0" err="1"/>
+              <a:t>Linked</a:t>
+            </a:r>
+            <a:r>
+              <a:rPr lang="de-DE" dirty="0"/>
+              <a:t> Lists - Delete</a:t>
+            </a:r>
+            <a:endParaRPr lang="de-AT" dirty="0"/>
+          </a:p>
+        </p:txBody>
+      </p:sp>
+      <p:sp>
+        <p:nvSpPr>
+          <p:cNvPr id="3" name="Inhaltsplatzhalter 2">
+            <a:extLst>
+              <a:ext uri="{FF2B5EF4-FFF2-40B4-BE49-F238E27FC236}">
+                <a16:creationId xmlns:a16="http://schemas.microsoft.com/office/drawing/2014/main" id="{EAD06E14-75D5-4196-A6D8-8C6A76256922}"/>
+              </a:ext>
+            </a:extLst>
+          </p:cNvPr>
+          <p:cNvSpPr>
+            <a:spLocks noGrp="1"/>
+          </p:cNvSpPr>
           <p:nvPr>
             <p:ph idx="1"/>
           </p:nvPr>
-        </p:nvPicPr>
-        <p:blipFill rotWithShape="1">
-          <a:blip r:embed="rId2">
-            <a:extLst>
-              <a:ext uri="{28A0092B-C50C-407E-A947-70E740481C1C}">
-                <a14:useLocalDpi xmlns:a14="http://schemas.microsoft.com/office/drawing/2010/main" val="0"/>
-              </a:ext>
-            </a:extLst>
-          </a:blip>
-          <a:srcRect t="13032"/>
-          <a:stretch/>
-        </p:blipFill>
-        <p:spPr>
-          <a:xfrm>
-            <a:off x="3177827" y="1167094"/>
-            <a:ext cx="5836343" cy="4882188"/>
-          </a:xfrm>
-        </p:spPr>
-      </p:pic>
+        </p:nvSpPr>
+        <p:spPr/>
+        <p:txBody>
+          <a:bodyPr/>
+          <a:lstStyle/>
+          <a:p>
+            <a:endParaRPr lang="de-AT" dirty="0"/>
+          </a:p>
+        </p:txBody>
+      </p:sp>
+      <p:sp>
+        <p:nvSpPr>
+          <p:cNvPr id="20" name="Rectangle 3">
+            <a:extLst>
+              <a:ext uri="{FF2B5EF4-FFF2-40B4-BE49-F238E27FC236}">
+                <a16:creationId xmlns:a16="http://schemas.microsoft.com/office/drawing/2014/main" id="{C841C110-4C5F-49AC-90C5-58B5DC1CAF3F}"/>
+              </a:ext>
+            </a:extLst>
+          </p:cNvPr>
+          <p:cNvSpPr/>
+          <p:nvPr/>
+        </p:nvSpPr>
+        <p:spPr>
+          <a:xfrm>
+            <a:off x="1778000" y="3636953"/>
+            <a:ext cx="1858297" cy="817563"/>
+          </a:xfrm>
+          <a:prstGeom prst="rect">
+            <a:avLst/>
+          </a:prstGeom>
+        </p:spPr>
+        <p:style>
+          <a:lnRef idx="0">
+            <a:schemeClr val="accent3"/>
+          </a:lnRef>
+          <a:fillRef idx="3">
+            <a:schemeClr val="accent3"/>
+          </a:fillRef>
+          <a:effectRef idx="3">
+            <a:schemeClr val="accent3"/>
+          </a:effectRef>
+          <a:fontRef idx="minor">
+            <a:schemeClr val="lt1"/>
+          </a:fontRef>
+        </p:style>
+        <p:txBody>
+          <a:bodyPr rtlCol="0" anchor="ctr"/>
+          <a:lstStyle/>
+          <a:p>
+            <a:pPr algn="ctr"/>
+            <a:endParaRPr lang="LID4096"/>
+          </a:p>
+        </p:txBody>
+      </p:sp>
+      <p:sp>
+        <p:nvSpPr>
+          <p:cNvPr id="21" name="Rectangle 6">
+            <a:extLst>
+              <a:ext uri="{FF2B5EF4-FFF2-40B4-BE49-F238E27FC236}">
+                <a16:creationId xmlns:a16="http://schemas.microsoft.com/office/drawing/2014/main" id="{91EB1657-FC13-4375-8D5B-B3E512C994AE}"/>
+              </a:ext>
+            </a:extLst>
+          </p:cNvPr>
+          <p:cNvSpPr/>
+          <p:nvPr/>
+        </p:nvSpPr>
+        <p:spPr>
+          <a:xfrm>
+            <a:off x="5396271" y="3626793"/>
+            <a:ext cx="1936955" cy="817563"/>
+          </a:xfrm>
+          <a:prstGeom prst="rect">
+            <a:avLst/>
+          </a:prstGeom>
+        </p:spPr>
+        <p:style>
+          <a:lnRef idx="0">
+            <a:schemeClr val="accent3"/>
+          </a:lnRef>
+          <a:fillRef idx="3">
+            <a:schemeClr val="accent3"/>
+          </a:fillRef>
+          <a:effectRef idx="3">
+            <a:schemeClr val="accent3"/>
+          </a:effectRef>
+          <a:fontRef idx="minor">
+            <a:schemeClr val="lt1"/>
+          </a:fontRef>
+        </p:style>
+        <p:txBody>
+          <a:bodyPr rtlCol="0" anchor="ctr"/>
+          <a:lstStyle/>
+          <a:p>
+            <a:pPr algn="ctr"/>
+            <a:endParaRPr lang="LID4096"/>
+          </a:p>
+        </p:txBody>
+      </p:sp>
+      <p:sp>
+        <p:nvSpPr>
+          <p:cNvPr id="22" name="Rectangle 9">
+            <a:extLst>
+              <a:ext uri="{FF2B5EF4-FFF2-40B4-BE49-F238E27FC236}">
+                <a16:creationId xmlns:a16="http://schemas.microsoft.com/office/drawing/2014/main" id="{788EF3D6-A675-4E90-93B0-D415A8C87D42}"/>
+              </a:ext>
+            </a:extLst>
+          </p:cNvPr>
+          <p:cNvSpPr/>
+          <p:nvPr/>
+        </p:nvSpPr>
+        <p:spPr>
+          <a:xfrm>
+            <a:off x="9078454" y="3636976"/>
+            <a:ext cx="1877961" cy="817540"/>
+          </a:xfrm>
+          <a:prstGeom prst="rect">
+            <a:avLst/>
+          </a:prstGeom>
+        </p:spPr>
+        <p:style>
+          <a:lnRef idx="0">
+            <a:schemeClr val="accent3"/>
+          </a:lnRef>
+          <a:fillRef idx="3">
+            <a:schemeClr val="accent3"/>
+          </a:fillRef>
+          <a:effectRef idx="3">
+            <a:schemeClr val="accent3"/>
+          </a:effectRef>
+          <a:fontRef idx="minor">
+            <a:schemeClr val="lt1"/>
+          </a:fontRef>
+        </p:style>
+        <p:txBody>
+          <a:bodyPr rtlCol="0" anchor="ctr"/>
+          <a:lstStyle/>
+          <a:p>
+            <a:pPr algn="ctr"/>
+            <a:endParaRPr lang="LID4096"/>
+          </a:p>
+        </p:txBody>
+      </p:sp>
+      <p:cxnSp>
+        <p:nvCxnSpPr>
+          <p:cNvPr id="23" name="Straight Connector 13">
+            <a:extLst>
+              <a:ext uri="{FF2B5EF4-FFF2-40B4-BE49-F238E27FC236}">
+                <a16:creationId xmlns:a16="http://schemas.microsoft.com/office/drawing/2014/main" id="{371D3601-E064-4BAE-B2B2-9C5E0D4C4C62}"/>
+              </a:ext>
+            </a:extLst>
+          </p:cNvPr>
+          <p:cNvCxnSpPr>
+            <a:stCxn id="20" idx="0"/>
+            <a:endCxn id="20" idx="2"/>
+          </p:cNvCxnSpPr>
+          <p:nvPr/>
+        </p:nvCxnSpPr>
+        <p:spPr>
+          <a:xfrm>
+            <a:off x="2707149" y="3636953"/>
+            <a:ext cx="0" cy="817563"/>
+          </a:xfrm>
+          <a:prstGeom prst="line">
+            <a:avLst/>
+          </a:prstGeom>
+        </p:spPr>
+        <p:style>
+          <a:lnRef idx="1">
+            <a:schemeClr val="dk1"/>
+          </a:lnRef>
+          <a:fillRef idx="0">
+            <a:schemeClr val="dk1"/>
+          </a:fillRef>
+          <a:effectRef idx="0">
+            <a:schemeClr val="dk1"/>
+          </a:effectRef>
+          <a:fontRef idx="minor">
+            <a:schemeClr val="tx1"/>
+          </a:fontRef>
+        </p:style>
+      </p:cxnSp>
+      <p:cxnSp>
+        <p:nvCxnSpPr>
+          <p:cNvPr id="24" name="Straight Connector 15">
+            <a:extLst>
+              <a:ext uri="{FF2B5EF4-FFF2-40B4-BE49-F238E27FC236}">
+                <a16:creationId xmlns:a16="http://schemas.microsoft.com/office/drawing/2014/main" id="{BA442A89-C503-42F0-98FF-27FB9340483B}"/>
+              </a:ext>
+            </a:extLst>
+          </p:cNvPr>
+          <p:cNvCxnSpPr>
+            <a:stCxn id="21" idx="0"/>
+            <a:endCxn id="21" idx="2"/>
+          </p:cNvCxnSpPr>
+          <p:nvPr/>
+        </p:nvCxnSpPr>
+        <p:spPr>
+          <a:xfrm>
+            <a:off x="6364749" y="3626793"/>
+            <a:ext cx="0" cy="817563"/>
+          </a:xfrm>
+          <a:prstGeom prst="line">
+            <a:avLst/>
+          </a:prstGeom>
+        </p:spPr>
+        <p:style>
+          <a:lnRef idx="1">
+            <a:schemeClr val="dk1"/>
+          </a:lnRef>
+          <a:fillRef idx="0">
+            <a:schemeClr val="dk1"/>
+          </a:fillRef>
+          <a:effectRef idx="0">
+            <a:schemeClr val="dk1"/>
+          </a:effectRef>
+          <a:fontRef idx="minor">
+            <a:schemeClr val="tx1"/>
+          </a:fontRef>
+        </p:style>
+      </p:cxnSp>
+      <p:cxnSp>
+        <p:nvCxnSpPr>
+          <p:cNvPr id="25" name="Straight Connector 17">
+            <a:extLst>
+              <a:ext uri="{FF2B5EF4-FFF2-40B4-BE49-F238E27FC236}">
+                <a16:creationId xmlns:a16="http://schemas.microsoft.com/office/drawing/2014/main" id="{85F30A94-4960-4A3A-B6EF-765AE220076D}"/>
+              </a:ext>
+            </a:extLst>
+          </p:cNvPr>
+          <p:cNvCxnSpPr>
+            <a:stCxn id="22" idx="0"/>
+            <a:endCxn id="22" idx="2"/>
+          </p:cNvCxnSpPr>
+          <p:nvPr/>
+        </p:nvCxnSpPr>
+        <p:spPr>
+          <a:xfrm>
+            <a:off x="10017435" y="3636976"/>
+            <a:ext cx="0" cy="817540"/>
+          </a:xfrm>
+          <a:prstGeom prst="line">
+            <a:avLst/>
+          </a:prstGeom>
+        </p:spPr>
+        <p:style>
+          <a:lnRef idx="1">
+            <a:schemeClr val="dk1"/>
+          </a:lnRef>
+          <a:fillRef idx="0">
+            <a:schemeClr val="dk1"/>
+          </a:fillRef>
+          <a:effectRef idx="0">
+            <a:schemeClr val="dk1"/>
+          </a:effectRef>
+          <a:fontRef idx="minor">
+            <a:schemeClr val="tx1"/>
+          </a:fontRef>
+        </p:style>
+      </p:cxnSp>
+      <p:sp>
+        <p:nvSpPr>
+          <p:cNvPr id="26" name="TextBox 4">
+            <a:extLst>
+              <a:ext uri="{FF2B5EF4-FFF2-40B4-BE49-F238E27FC236}">
+                <a16:creationId xmlns:a16="http://schemas.microsoft.com/office/drawing/2014/main" id="{FA7F1F6D-3CD1-4D3B-BAF8-F404BA867AC9}"/>
+              </a:ext>
+            </a:extLst>
+          </p:cNvPr>
+          <p:cNvSpPr txBox="1"/>
+          <p:nvPr/>
+        </p:nvSpPr>
+        <p:spPr>
+          <a:xfrm>
+            <a:off x="1861576" y="3861057"/>
+            <a:ext cx="938979" cy="369332"/>
+          </a:xfrm>
+          <a:prstGeom prst="rect">
+            <a:avLst/>
+          </a:prstGeom>
+          <a:noFill/>
+        </p:spPr>
+        <p:txBody>
+          <a:bodyPr wrap="square" rtlCol="0">
+            <a:spAutoFit/>
+          </a:bodyPr>
+          <a:lstStyle/>
+          <a:p>
+            <a:r>
+              <a:rPr lang="en-GB" dirty="0"/>
+              <a:t>Data 1</a:t>
+            </a:r>
+            <a:endParaRPr lang="LID4096" dirty="0"/>
+          </a:p>
+        </p:txBody>
+      </p:sp>
+      <p:sp>
+        <p:nvSpPr>
+          <p:cNvPr id="27" name="Arrow: Right 7">
+            <a:extLst>
+              <a:ext uri="{FF2B5EF4-FFF2-40B4-BE49-F238E27FC236}">
+                <a16:creationId xmlns:a16="http://schemas.microsoft.com/office/drawing/2014/main" id="{A2B01AB3-D485-4E87-BF60-E850B43979AD}"/>
+              </a:ext>
+            </a:extLst>
+          </p:cNvPr>
+          <p:cNvSpPr/>
+          <p:nvPr/>
+        </p:nvSpPr>
+        <p:spPr>
+          <a:xfrm>
+            <a:off x="3643671" y="3835083"/>
+            <a:ext cx="1745225" cy="408770"/>
+          </a:xfrm>
+          <a:prstGeom prst="rightArrow">
+            <a:avLst/>
+          </a:prstGeom>
+        </p:spPr>
+        <p:style>
+          <a:lnRef idx="2">
+            <a:schemeClr val="dk1"/>
+          </a:lnRef>
+          <a:fillRef idx="1">
+            <a:schemeClr val="lt1"/>
+          </a:fillRef>
+          <a:effectRef idx="0">
+            <a:schemeClr val="dk1"/>
+          </a:effectRef>
+          <a:fontRef idx="minor">
+            <a:schemeClr val="dk1"/>
+          </a:fontRef>
+        </p:style>
+        <p:txBody>
+          <a:bodyPr rtlCol="0" anchor="ctr"/>
+          <a:lstStyle/>
+          <a:p>
+            <a:pPr algn="ctr"/>
+            <a:endParaRPr lang="LID4096"/>
+          </a:p>
+        </p:txBody>
+      </p:sp>
+      <p:sp>
+        <p:nvSpPr>
+          <p:cNvPr id="28" name="TextBox 16">
+            <a:extLst>
+              <a:ext uri="{FF2B5EF4-FFF2-40B4-BE49-F238E27FC236}">
+                <a16:creationId xmlns:a16="http://schemas.microsoft.com/office/drawing/2014/main" id="{BDB80C76-9D8A-4147-92B7-FF34F53789DE}"/>
+              </a:ext>
+            </a:extLst>
+          </p:cNvPr>
+          <p:cNvSpPr txBox="1"/>
+          <p:nvPr/>
+        </p:nvSpPr>
+        <p:spPr>
+          <a:xfrm>
+            <a:off x="5483420" y="3854802"/>
+            <a:ext cx="805501" cy="369332"/>
+          </a:xfrm>
+          <a:prstGeom prst="rect">
+            <a:avLst/>
+          </a:prstGeom>
+          <a:noFill/>
+        </p:spPr>
+        <p:txBody>
+          <a:bodyPr wrap="square" rtlCol="0">
+            <a:spAutoFit/>
+          </a:bodyPr>
+          <a:lstStyle/>
+          <a:p>
+            <a:r>
+              <a:rPr lang="en-GB" dirty="0"/>
+              <a:t>Data 2</a:t>
+            </a:r>
+            <a:endParaRPr lang="LID4096" dirty="0"/>
+          </a:p>
+        </p:txBody>
+      </p:sp>
+      <p:sp>
+        <p:nvSpPr>
+          <p:cNvPr id="29" name="TextBox 18">
+            <a:extLst>
+              <a:ext uri="{FF2B5EF4-FFF2-40B4-BE49-F238E27FC236}">
+                <a16:creationId xmlns:a16="http://schemas.microsoft.com/office/drawing/2014/main" id="{A8C34C39-1798-49A5-995F-540C8857F3F6}"/>
+              </a:ext>
+            </a:extLst>
+          </p:cNvPr>
+          <p:cNvSpPr txBox="1"/>
+          <p:nvPr/>
+        </p:nvSpPr>
+        <p:spPr>
+          <a:xfrm>
+            <a:off x="2807074" y="3716302"/>
+            <a:ext cx="752161" cy="646331"/>
+          </a:xfrm>
+          <a:prstGeom prst="rect">
+            <a:avLst/>
+          </a:prstGeom>
+          <a:noFill/>
+        </p:spPr>
+        <p:txBody>
+          <a:bodyPr wrap="square" rtlCol="0">
+            <a:spAutoFit/>
+          </a:bodyPr>
+          <a:lstStyle/>
+          <a:p>
+            <a:r>
+              <a:rPr lang="en-GB" dirty="0"/>
+              <a:t>Next Node</a:t>
+            </a:r>
+            <a:endParaRPr lang="LID4096" dirty="0"/>
+          </a:p>
+        </p:txBody>
+      </p:sp>
+      <p:sp>
+        <p:nvSpPr>
+          <p:cNvPr id="30" name="TextBox 19">
+            <a:extLst>
+              <a:ext uri="{FF2B5EF4-FFF2-40B4-BE49-F238E27FC236}">
+                <a16:creationId xmlns:a16="http://schemas.microsoft.com/office/drawing/2014/main" id="{2F08F005-1AC5-4E0C-ADF4-6D6CE007EAB4}"/>
+              </a:ext>
+            </a:extLst>
+          </p:cNvPr>
+          <p:cNvSpPr txBox="1"/>
+          <p:nvPr/>
+        </p:nvSpPr>
+        <p:spPr>
+          <a:xfrm>
+            <a:off x="6499339" y="3716302"/>
+            <a:ext cx="921036" cy="646331"/>
+          </a:xfrm>
+          <a:prstGeom prst="rect">
+            <a:avLst/>
+          </a:prstGeom>
+          <a:noFill/>
+        </p:spPr>
+        <p:txBody>
+          <a:bodyPr wrap="square" rtlCol="0">
+            <a:spAutoFit/>
+          </a:bodyPr>
+          <a:lstStyle/>
+          <a:p>
+            <a:r>
+              <a:rPr lang="en-GB" dirty="0"/>
+              <a:t>Next Node</a:t>
+            </a:r>
+            <a:endParaRPr lang="LID4096" dirty="0"/>
+          </a:p>
+        </p:txBody>
+      </p:sp>
+      <p:sp>
+        <p:nvSpPr>
+          <p:cNvPr id="31" name="TextBox 20">
+            <a:extLst>
+              <a:ext uri="{FF2B5EF4-FFF2-40B4-BE49-F238E27FC236}">
+                <a16:creationId xmlns:a16="http://schemas.microsoft.com/office/drawing/2014/main" id="{1F6A4CD0-30D5-4FC1-9CA9-E8846C4D5ECF}"/>
+              </a:ext>
+            </a:extLst>
+          </p:cNvPr>
+          <p:cNvSpPr txBox="1"/>
+          <p:nvPr/>
+        </p:nvSpPr>
+        <p:spPr>
+          <a:xfrm>
+            <a:off x="10086743" y="3725064"/>
+            <a:ext cx="911085" cy="646331"/>
+          </a:xfrm>
+          <a:prstGeom prst="rect">
+            <a:avLst/>
+          </a:prstGeom>
+          <a:noFill/>
+        </p:spPr>
+        <p:txBody>
+          <a:bodyPr wrap="square" rtlCol="0">
+            <a:spAutoFit/>
+          </a:bodyPr>
+          <a:lstStyle/>
+          <a:p>
+            <a:r>
+              <a:rPr lang="en-GB" dirty="0"/>
+              <a:t>Next Node</a:t>
+            </a:r>
+            <a:endParaRPr lang="LID4096" dirty="0"/>
+          </a:p>
+        </p:txBody>
+      </p:sp>
+      <p:sp>
+        <p:nvSpPr>
+          <p:cNvPr id="32" name="TextBox 21">
+            <a:extLst>
+              <a:ext uri="{FF2B5EF4-FFF2-40B4-BE49-F238E27FC236}">
+                <a16:creationId xmlns:a16="http://schemas.microsoft.com/office/drawing/2014/main" id="{B2DBA6E8-84E7-47D4-855E-E66D00130298}"/>
+              </a:ext>
+            </a:extLst>
+          </p:cNvPr>
+          <p:cNvSpPr txBox="1"/>
+          <p:nvPr/>
+        </p:nvSpPr>
+        <p:spPr>
+          <a:xfrm>
+            <a:off x="9155640" y="3854801"/>
+            <a:ext cx="896449" cy="369332"/>
+          </a:xfrm>
+          <a:prstGeom prst="rect">
+            <a:avLst/>
+          </a:prstGeom>
+          <a:noFill/>
+        </p:spPr>
+        <p:txBody>
+          <a:bodyPr wrap="square" rtlCol="0">
+            <a:spAutoFit/>
+          </a:bodyPr>
+          <a:lstStyle/>
+          <a:p>
+            <a:r>
+              <a:rPr lang="en-GB" dirty="0"/>
+              <a:t>Data 3</a:t>
+            </a:r>
+            <a:endParaRPr lang="LID4096" dirty="0"/>
+          </a:p>
+        </p:txBody>
+      </p:sp>
+      <p:cxnSp>
+        <p:nvCxnSpPr>
+          <p:cNvPr id="33" name="Straight Arrow Connector 23">
+            <a:extLst>
+              <a:ext uri="{FF2B5EF4-FFF2-40B4-BE49-F238E27FC236}">
+                <a16:creationId xmlns:a16="http://schemas.microsoft.com/office/drawing/2014/main" id="{BE744AE2-E29E-48F6-9789-B55C4294178F}"/>
+              </a:ext>
+            </a:extLst>
+          </p:cNvPr>
+          <p:cNvCxnSpPr>
+            <a:cxnSpLocks/>
+            <a:endCxn id="20" idx="1"/>
+          </p:cNvCxnSpPr>
+          <p:nvPr/>
+        </p:nvCxnSpPr>
+        <p:spPr>
+          <a:xfrm>
+            <a:off x="1351830" y="3544878"/>
+            <a:ext cx="426170" cy="500857"/>
+          </a:xfrm>
+          <a:prstGeom prst="straightConnector1">
+            <a:avLst/>
+          </a:prstGeom>
+          <a:ln>
+            <a:tailEnd type="triangle"/>
+          </a:ln>
+        </p:spPr>
+        <p:style>
+          <a:lnRef idx="1">
+            <a:schemeClr val="accent1"/>
+          </a:lnRef>
+          <a:fillRef idx="0">
+            <a:schemeClr val="accent1"/>
+          </a:fillRef>
+          <a:effectRef idx="0">
+            <a:schemeClr val="accent1"/>
+          </a:effectRef>
+          <a:fontRef idx="minor">
+            <a:schemeClr val="tx1"/>
+          </a:fontRef>
+        </p:style>
+      </p:cxnSp>
+      <p:sp>
+        <p:nvSpPr>
+          <p:cNvPr id="34" name="TextBox 25">
+            <a:extLst>
+              <a:ext uri="{FF2B5EF4-FFF2-40B4-BE49-F238E27FC236}">
+                <a16:creationId xmlns:a16="http://schemas.microsoft.com/office/drawing/2014/main" id="{EC0A8C95-0EE1-4931-BA0A-C6F73A1E9777}"/>
+              </a:ext>
+            </a:extLst>
+          </p:cNvPr>
+          <p:cNvSpPr txBox="1"/>
+          <p:nvPr/>
+        </p:nvSpPr>
+        <p:spPr>
+          <a:xfrm>
+            <a:off x="944717" y="3206382"/>
+            <a:ext cx="1386348" cy="370042"/>
+          </a:xfrm>
+          <a:prstGeom prst="rect">
+            <a:avLst/>
+          </a:prstGeom>
+          <a:noFill/>
+        </p:spPr>
+        <p:txBody>
+          <a:bodyPr wrap="square" rtlCol="0">
+            <a:spAutoFit/>
+          </a:bodyPr>
+          <a:lstStyle/>
+          <a:p>
+            <a:r>
+              <a:rPr lang="en-GB" dirty="0"/>
+              <a:t>_head</a:t>
+            </a:r>
+            <a:endParaRPr lang="LID4096" dirty="0"/>
+          </a:p>
+        </p:txBody>
+      </p:sp>
+      <p:sp>
+        <p:nvSpPr>
+          <p:cNvPr id="35" name="Arrow: Right 31">
+            <a:extLst>
+              <a:ext uri="{FF2B5EF4-FFF2-40B4-BE49-F238E27FC236}">
+                <a16:creationId xmlns:a16="http://schemas.microsoft.com/office/drawing/2014/main" id="{88D1FF46-4EB7-42D4-A9DC-566D21ECC89E}"/>
+              </a:ext>
+            </a:extLst>
+          </p:cNvPr>
+          <p:cNvSpPr/>
+          <p:nvPr/>
+        </p:nvSpPr>
+        <p:spPr>
+          <a:xfrm>
+            <a:off x="7338985" y="3843844"/>
+            <a:ext cx="1745225" cy="408770"/>
+          </a:xfrm>
+          <a:prstGeom prst="rightArrow">
+            <a:avLst/>
+          </a:prstGeom>
+        </p:spPr>
+        <p:style>
+          <a:lnRef idx="2">
+            <a:schemeClr val="dk1"/>
+          </a:lnRef>
+          <a:fillRef idx="1">
+            <a:schemeClr val="lt1"/>
+          </a:fillRef>
+          <a:effectRef idx="0">
+            <a:schemeClr val="dk1"/>
+          </a:effectRef>
+          <a:fontRef idx="minor">
+            <a:schemeClr val="dk1"/>
+          </a:fontRef>
+        </p:style>
+        <p:txBody>
+          <a:bodyPr rtlCol="0" anchor="ctr"/>
+          <a:lstStyle/>
+          <a:p>
+            <a:pPr algn="ctr"/>
+            <a:endParaRPr lang="LID4096"/>
+          </a:p>
+        </p:txBody>
+      </p:sp>
+      <p:cxnSp>
+        <p:nvCxnSpPr>
+          <p:cNvPr id="37" name="Gerader Verbinder 36">
+            <a:extLst>
+              <a:ext uri="{FF2B5EF4-FFF2-40B4-BE49-F238E27FC236}">
+                <a16:creationId xmlns:a16="http://schemas.microsoft.com/office/drawing/2014/main" id="{A2A5A66C-2321-492C-A5BB-B31D5BFD7AE7}"/>
+              </a:ext>
+            </a:extLst>
+          </p:cNvPr>
+          <p:cNvCxnSpPr/>
+          <p:nvPr/>
+        </p:nvCxnSpPr>
+        <p:spPr>
+          <a:xfrm>
+            <a:off x="4622800" y="3206382"/>
+            <a:ext cx="3159760" cy="1507858"/>
+          </a:xfrm>
+          <a:prstGeom prst="line">
+            <a:avLst/>
+          </a:prstGeom>
+          <a:ln>
+            <a:solidFill>
+              <a:srgbClr val="FF0000"/>
+            </a:solidFill>
+          </a:ln>
+        </p:spPr>
+        <p:style>
+          <a:lnRef idx="3">
+            <a:schemeClr val="accent2"/>
+          </a:lnRef>
+          <a:fillRef idx="0">
+            <a:schemeClr val="accent2"/>
+          </a:fillRef>
+          <a:effectRef idx="2">
+            <a:schemeClr val="accent2"/>
+          </a:effectRef>
+          <a:fontRef idx="minor">
+            <a:schemeClr val="tx1"/>
+          </a:fontRef>
+        </p:style>
+      </p:cxnSp>
+      <p:sp>
+        <p:nvSpPr>
+          <p:cNvPr id="41" name="Pfeil: 180-Grad 40">
+            <a:extLst>
+              <a:ext uri="{FF2B5EF4-FFF2-40B4-BE49-F238E27FC236}">
+                <a16:creationId xmlns:a16="http://schemas.microsoft.com/office/drawing/2014/main" id="{C94F01EC-23AC-4660-8EA2-536062FCA173}"/>
+              </a:ext>
+            </a:extLst>
+          </p:cNvPr>
+          <p:cNvSpPr/>
+          <p:nvPr/>
+        </p:nvSpPr>
+        <p:spPr>
+          <a:xfrm>
+            <a:off x="3108960" y="2758861"/>
+            <a:ext cx="6522720" cy="817563"/>
+          </a:xfrm>
+          <a:prstGeom prst="uturnArrow">
+            <a:avLst/>
+          </a:prstGeom>
+        </p:spPr>
+        <p:style>
+          <a:lnRef idx="2">
+            <a:schemeClr val="dk1"/>
+          </a:lnRef>
+          <a:fillRef idx="1">
+            <a:schemeClr val="lt1"/>
+          </a:fillRef>
+          <a:effectRef idx="0">
+            <a:schemeClr val="dk1"/>
+          </a:effectRef>
+          <a:fontRef idx="minor">
+            <a:schemeClr val="dk1"/>
+          </a:fontRef>
+        </p:style>
+        <p:txBody>
+          <a:bodyPr rtlCol="0" anchor="ctr"/>
+          <a:lstStyle/>
+          <a:p>
+            <a:pPr algn="ctr"/>
+            <a:endParaRPr lang="de-AT">
+              <a:solidFill>
+                <a:schemeClr val="tx1"/>
+              </a:solidFill>
+            </a:endParaRPr>
+          </a:p>
+        </p:txBody>
+      </p:sp>
     </p:spTree>
     <p:extLst>
       <p:ext uri="{BB962C8B-B14F-4D97-AF65-F5344CB8AC3E}">
-        <p14:creationId xmlns:p14="http://schemas.microsoft.com/office/powerpoint/2010/main" val="1272541068"/>
+        <p14:creationId xmlns:p14="http://schemas.microsoft.com/office/powerpoint/2010/main" val="3013868465"/>
       </p:ext>
     </p:extLst>
   </p:cSld>

</xml_diff>

<commit_message>
added the theory of the double linked list
</commit_message>
<xml_diff>
--- a/Linked_List.pptx
+++ b/Linked_List.pptx
@@ -4,14 +4,18 @@
   <p:sldMasterIdLst>
     <p:sldMasterId id="2147483648" r:id="rId1"/>
   </p:sldMasterIdLst>
+  <p:notesMasterIdLst>
+    <p:notesMasterId r:id="rId10"/>
+  </p:notesMasterIdLst>
   <p:sldIdLst>
     <p:sldId id="256" r:id="rId2"/>
     <p:sldId id="257" r:id="rId3"/>
     <p:sldId id="258" r:id="rId4"/>
     <p:sldId id="259" r:id="rId5"/>
-    <p:sldId id="260" r:id="rId6"/>
-    <p:sldId id="261" r:id="rId7"/>
-    <p:sldId id="262" r:id="rId8"/>
+    <p:sldId id="263" r:id="rId6"/>
+    <p:sldId id="260" r:id="rId7"/>
+    <p:sldId id="261" r:id="rId8"/>
+    <p:sldId id="262" r:id="rId9"/>
   </p:sldIdLst>
   <p:sldSz cx="12192000" cy="6858000"/>
   <p:notesSz cx="6858000" cy="9144000"/>
@@ -118,6 +122,356 @@
 </p:presentation>
 </file>
 
+<file path=ppt/notesMasters/notesMaster1.xml><?xml version="1.0" encoding="utf-8"?>
+<p:notesMaster xmlns:a="http://schemas.openxmlformats.org/drawingml/2006/main" xmlns:r="http://schemas.openxmlformats.org/officeDocument/2006/relationships" xmlns:p="http://schemas.openxmlformats.org/presentationml/2006/main">
+  <p:cSld>
+    <p:bg>
+      <p:bgRef idx="1001">
+        <a:schemeClr val="bg1"/>
+      </p:bgRef>
+    </p:bg>
+    <p:spTree>
+      <p:nvGrpSpPr>
+        <p:cNvPr id="1" name=""/>
+        <p:cNvGrpSpPr/>
+        <p:nvPr/>
+      </p:nvGrpSpPr>
+      <p:grpSpPr>
+        <a:xfrm>
+          <a:off x="0" y="0"/>
+          <a:ext cx="0" cy="0"/>
+          <a:chOff x="0" y="0"/>
+          <a:chExt cx="0" cy="0"/>
+        </a:xfrm>
+      </p:grpSpPr>
+      <p:sp>
+        <p:nvSpPr>
+          <p:cNvPr id="2" name="Header Placeholder 1"/>
+          <p:cNvSpPr>
+            <a:spLocks noGrp="1"/>
+          </p:cNvSpPr>
+          <p:nvPr>
+            <p:ph type="hdr" sz="quarter"/>
+          </p:nvPr>
+        </p:nvSpPr>
+        <p:spPr>
+          <a:xfrm>
+            <a:off x="0" y="0"/>
+            <a:ext cx="2971800" cy="458788"/>
+          </a:xfrm>
+          <a:prstGeom prst="rect">
+            <a:avLst/>
+          </a:prstGeom>
+        </p:spPr>
+        <p:txBody>
+          <a:bodyPr vert="horz" lIns="91440" tIns="45720" rIns="91440" bIns="45720" rtlCol="0"/>
+          <a:lstStyle>
+            <a:lvl1pPr algn="l">
+              <a:defRPr sz="1200"/>
+            </a:lvl1pPr>
+          </a:lstStyle>
+          <a:p>
+            <a:endParaRPr lang="LID4096"/>
+          </a:p>
+        </p:txBody>
+      </p:sp>
+      <p:sp>
+        <p:nvSpPr>
+          <p:cNvPr id="3" name="Date Placeholder 2"/>
+          <p:cNvSpPr>
+            <a:spLocks noGrp="1"/>
+          </p:cNvSpPr>
+          <p:nvPr>
+            <p:ph type="dt" idx="1"/>
+          </p:nvPr>
+        </p:nvSpPr>
+        <p:spPr>
+          <a:xfrm>
+            <a:off x="3884613" y="0"/>
+            <a:ext cx="2971800" cy="458788"/>
+          </a:xfrm>
+          <a:prstGeom prst="rect">
+            <a:avLst/>
+          </a:prstGeom>
+        </p:spPr>
+        <p:txBody>
+          <a:bodyPr vert="horz" lIns="91440" tIns="45720" rIns="91440" bIns="45720" rtlCol="0"/>
+          <a:lstStyle>
+            <a:lvl1pPr algn="r">
+              <a:defRPr sz="1200"/>
+            </a:lvl1pPr>
+          </a:lstStyle>
+          <a:p>
+            <a:fld id="{B30942F4-63F0-43CD-84DB-A72C53BC81A7}" type="datetimeFigureOut">
+              <a:rPr lang="LID4096" smtClean="0"/>
+              <a:t>05/02/2022</a:t>
+            </a:fld>
+            <a:endParaRPr lang="LID4096"/>
+          </a:p>
+        </p:txBody>
+      </p:sp>
+      <p:sp>
+        <p:nvSpPr>
+          <p:cNvPr id="4" name="Slide Image Placeholder 3"/>
+          <p:cNvSpPr>
+            <a:spLocks noGrp="1" noRot="1" noChangeAspect="1"/>
+          </p:cNvSpPr>
+          <p:nvPr>
+            <p:ph type="sldImg" idx="2"/>
+          </p:nvPr>
+        </p:nvSpPr>
+        <p:spPr>
+          <a:xfrm>
+            <a:off x="685800" y="1143000"/>
+            <a:ext cx="5486400" cy="3086100"/>
+          </a:xfrm>
+          <a:prstGeom prst="rect">
+            <a:avLst/>
+          </a:prstGeom>
+          <a:noFill/>
+          <a:ln w="12700">
+            <a:solidFill>
+              <a:prstClr val="black"/>
+            </a:solidFill>
+          </a:ln>
+        </p:spPr>
+        <p:txBody>
+          <a:bodyPr vert="horz" lIns="91440" tIns="45720" rIns="91440" bIns="45720" rtlCol="0" anchor="ctr"/>
+          <a:lstStyle/>
+          <a:p>
+            <a:endParaRPr lang="LID4096"/>
+          </a:p>
+        </p:txBody>
+      </p:sp>
+      <p:sp>
+        <p:nvSpPr>
+          <p:cNvPr id="5" name="Notes Placeholder 4"/>
+          <p:cNvSpPr>
+            <a:spLocks noGrp="1"/>
+          </p:cNvSpPr>
+          <p:nvPr>
+            <p:ph type="body" sz="quarter" idx="3"/>
+          </p:nvPr>
+        </p:nvSpPr>
+        <p:spPr>
+          <a:xfrm>
+            <a:off x="685800" y="4400550"/>
+            <a:ext cx="5486400" cy="3600450"/>
+          </a:xfrm>
+          <a:prstGeom prst="rect">
+            <a:avLst/>
+          </a:prstGeom>
+        </p:spPr>
+        <p:txBody>
+          <a:bodyPr vert="horz" lIns="91440" tIns="45720" rIns="91440" bIns="45720" rtlCol="0"/>
+          <a:lstStyle/>
+          <a:p>
+            <a:pPr lvl="0"/>
+            <a:r>
+              <a:rPr lang="en-US"/>
+              <a:t>Click to edit Master text styles</a:t>
+            </a:r>
+          </a:p>
+          <a:p>
+            <a:pPr lvl="1"/>
+            <a:r>
+              <a:rPr lang="en-US"/>
+              <a:t>Second level</a:t>
+            </a:r>
+          </a:p>
+          <a:p>
+            <a:pPr lvl="2"/>
+            <a:r>
+              <a:rPr lang="en-US"/>
+              <a:t>Third level</a:t>
+            </a:r>
+          </a:p>
+          <a:p>
+            <a:pPr lvl="3"/>
+            <a:r>
+              <a:rPr lang="en-US"/>
+              <a:t>Fourth level</a:t>
+            </a:r>
+          </a:p>
+          <a:p>
+            <a:pPr lvl="4"/>
+            <a:r>
+              <a:rPr lang="en-US"/>
+              <a:t>Fifth level</a:t>
+            </a:r>
+            <a:endParaRPr lang="LID4096"/>
+          </a:p>
+        </p:txBody>
+      </p:sp>
+      <p:sp>
+        <p:nvSpPr>
+          <p:cNvPr id="6" name="Footer Placeholder 5"/>
+          <p:cNvSpPr>
+            <a:spLocks noGrp="1"/>
+          </p:cNvSpPr>
+          <p:nvPr>
+            <p:ph type="ftr" sz="quarter" idx="4"/>
+          </p:nvPr>
+        </p:nvSpPr>
+        <p:spPr>
+          <a:xfrm>
+            <a:off x="0" y="8685213"/>
+            <a:ext cx="2971800" cy="458787"/>
+          </a:xfrm>
+          <a:prstGeom prst="rect">
+            <a:avLst/>
+          </a:prstGeom>
+        </p:spPr>
+        <p:txBody>
+          <a:bodyPr vert="horz" lIns="91440" tIns="45720" rIns="91440" bIns="45720" rtlCol="0" anchor="b"/>
+          <a:lstStyle>
+            <a:lvl1pPr algn="l">
+              <a:defRPr sz="1200"/>
+            </a:lvl1pPr>
+          </a:lstStyle>
+          <a:p>
+            <a:endParaRPr lang="LID4096"/>
+          </a:p>
+        </p:txBody>
+      </p:sp>
+      <p:sp>
+        <p:nvSpPr>
+          <p:cNvPr id="7" name="Slide Number Placeholder 6"/>
+          <p:cNvSpPr>
+            <a:spLocks noGrp="1"/>
+          </p:cNvSpPr>
+          <p:nvPr>
+            <p:ph type="sldNum" sz="quarter" idx="5"/>
+          </p:nvPr>
+        </p:nvSpPr>
+        <p:spPr>
+          <a:xfrm>
+            <a:off x="3884613" y="8685213"/>
+            <a:ext cx="2971800" cy="458787"/>
+          </a:xfrm>
+          <a:prstGeom prst="rect">
+            <a:avLst/>
+          </a:prstGeom>
+        </p:spPr>
+        <p:txBody>
+          <a:bodyPr vert="horz" lIns="91440" tIns="45720" rIns="91440" bIns="45720" rtlCol="0" anchor="b"/>
+          <a:lstStyle>
+            <a:lvl1pPr algn="r">
+              <a:defRPr sz="1200"/>
+            </a:lvl1pPr>
+          </a:lstStyle>
+          <a:p>
+            <a:fld id="{1D5F117D-6EF6-4702-849B-6A427234F652}" type="slidenum">
+              <a:rPr lang="LID4096" smtClean="0"/>
+              <a:t>‹#›</a:t>
+            </a:fld>
+            <a:endParaRPr lang="LID4096"/>
+          </a:p>
+        </p:txBody>
+      </p:sp>
+    </p:spTree>
+    <p:extLst>
+      <p:ext uri="{BB962C8B-B14F-4D97-AF65-F5344CB8AC3E}">
+        <p14:creationId xmlns:p14="http://schemas.microsoft.com/office/powerpoint/2010/main" val="4129330143"/>
+      </p:ext>
+    </p:extLst>
+  </p:cSld>
+  <p:clrMap bg1="lt1" tx1="dk1" bg2="lt2" tx2="dk2" accent1="accent1" accent2="accent2" accent3="accent3" accent4="accent4" accent5="accent5" accent6="accent6" hlink="hlink" folHlink="folHlink"/>
+  <p:notesStyle>
+    <a:lvl1pPr marL="0" algn="l" defTabSz="914400" rtl="0" eaLnBrk="1" latinLnBrk="0" hangingPunct="1">
+      <a:defRPr sz="1200" kern="1200">
+        <a:solidFill>
+          <a:schemeClr val="tx1"/>
+        </a:solidFill>
+        <a:latin typeface="+mn-lt"/>
+        <a:ea typeface="+mn-ea"/>
+        <a:cs typeface="+mn-cs"/>
+      </a:defRPr>
+    </a:lvl1pPr>
+    <a:lvl2pPr marL="457200" algn="l" defTabSz="914400" rtl="0" eaLnBrk="1" latinLnBrk="0" hangingPunct="1">
+      <a:defRPr sz="1200" kern="1200">
+        <a:solidFill>
+          <a:schemeClr val="tx1"/>
+        </a:solidFill>
+        <a:latin typeface="+mn-lt"/>
+        <a:ea typeface="+mn-ea"/>
+        <a:cs typeface="+mn-cs"/>
+      </a:defRPr>
+    </a:lvl2pPr>
+    <a:lvl3pPr marL="914400" algn="l" defTabSz="914400" rtl="0" eaLnBrk="1" latinLnBrk="0" hangingPunct="1">
+      <a:defRPr sz="1200" kern="1200">
+        <a:solidFill>
+          <a:schemeClr val="tx1"/>
+        </a:solidFill>
+        <a:latin typeface="+mn-lt"/>
+        <a:ea typeface="+mn-ea"/>
+        <a:cs typeface="+mn-cs"/>
+      </a:defRPr>
+    </a:lvl3pPr>
+    <a:lvl4pPr marL="1371600" algn="l" defTabSz="914400" rtl="0" eaLnBrk="1" latinLnBrk="0" hangingPunct="1">
+      <a:defRPr sz="1200" kern="1200">
+        <a:solidFill>
+          <a:schemeClr val="tx1"/>
+        </a:solidFill>
+        <a:latin typeface="+mn-lt"/>
+        <a:ea typeface="+mn-ea"/>
+        <a:cs typeface="+mn-cs"/>
+      </a:defRPr>
+    </a:lvl4pPr>
+    <a:lvl5pPr marL="1828800" algn="l" defTabSz="914400" rtl="0" eaLnBrk="1" latinLnBrk="0" hangingPunct="1">
+      <a:defRPr sz="1200" kern="1200">
+        <a:solidFill>
+          <a:schemeClr val="tx1"/>
+        </a:solidFill>
+        <a:latin typeface="+mn-lt"/>
+        <a:ea typeface="+mn-ea"/>
+        <a:cs typeface="+mn-cs"/>
+      </a:defRPr>
+    </a:lvl5pPr>
+    <a:lvl6pPr marL="2286000" algn="l" defTabSz="914400" rtl="0" eaLnBrk="1" latinLnBrk="0" hangingPunct="1">
+      <a:defRPr sz="1200" kern="1200">
+        <a:solidFill>
+          <a:schemeClr val="tx1"/>
+        </a:solidFill>
+        <a:latin typeface="+mn-lt"/>
+        <a:ea typeface="+mn-ea"/>
+        <a:cs typeface="+mn-cs"/>
+      </a:defRPr>
+    </a:lvl6pPr>
+    <a:lvl7pPr marL="2743200" algn="l" defTabSz="914400" rtl="0" eaLnBrk="1" latinLnBrk="0" hangingPunct="1">
+      <a:defRPr sz="1200" kern="1200">
+        <a:solidFill>
+          <a:schemeClr val="tx1"/>
+        </a:solidFill>
+        <a:latin typeface="+mn-lt"/>
+        <a:ea typeface="+mn-ea"/>
+        <a:cs typeface="+mn-cs"/>
+      </a:defRPr>
+    </a:lvl7pPr>
+    <a:lvl8pPr marL="3200400" algn="l" defTabSz="914400" rtl="0" eaLnBrk="1" latinLnBrk="0" hangingPunct="1">
+      <a:defRPr sz="1200" kern="1200">
+        <a:solidFill>
+          <a:schemeClr val="tx1"/>
+        </a:solidFill>
+        <a:latin typeface="+mn-lt"/>
+        <a:ea typeface="+mn-ea"/>
+        <a:cs typeface="+mn-cs"/>
+      </a:defRPr>
+    </a:lvl8pPr>
+    <a:lvl9pPr marL="3657600" algn="l" defTabSz="914400" rtl="0" eaLnBrk="1" latinLnBrk="0" hangingPunct="1">
+      <a:defRPr sz="1200" kern="1200">
+        <a:solidFill>
+          <a:schemeClr val="tx1"/>
+        </a:solidFill>
+        <a:latin typeface="+mn-lt"/>
+        <a:ea typeface="+mn-ea"/>
+        <a:cs typeface="+mn-cs"/>
+      </a:defRPr>
+    </a:lvl9pPr>
+  </p:notesStyle>
+</p:notesMaster>
+</file>
+
 <file path=ppt/slideLayouts/slideLayout1.xml><?xml version="1.0" encoding="utf-8"?>
 <p:sldLayout xmlns:a="http://schemas.openxmlformats.org/drawingml/2006/main" xmlns:r="http://schemas.openxmlformats.org/officeDocument/2006/relationships" xmlns:p="http://schemas.openxmlformats.org/presentationml/2006/main" type="title" preserve="1">
   <p:cSld name="Titelfolie">
@@ -267,7 +621,7 @@
           <a:p>
             <a:fld id="{259D4BC2-8679-4FD1-863A-C8C72E7822AE}" type="datetimeFigureOut">
               <a:rPr lang="de-AT" smtClean="0"/>
-              <a:t>26.04.2022</a:t>
+              <a:t>02.05.2022</a:t>
             </a:fld>
             <a:endParaRPr lang="de-AT"/>
           </a:p>
@@ -467,7 +821,7 @@
           <a:p>
             <a:fld id="{259D4BC2-8679-4FD1-863A-C8C72E7822AE}" type="datetimeFigureOut">
               <a:rPr lang="de-AT" smtClean="0"/>
-              <a:t>26.04.2022</a:t>
+              <a:t>02.05.2022</a:t>
             </a:fld>
             <a:endParaRPr lang="de-AT"/>
           </a:p>
@@ -677,7 +1031,7 @@
           <a:p>
             <a:fld id="{259D4BC2-8679-4FD1-863A-C8C72E7822AE}" type="datetimeFigureOut">
               <a:rPr lang="de-AT" smtClean="0"/>
-              <a:t>26.04.2022</a:t>
+              <a:t>02.05.2022</a:t>
             </a:fld>
             <a:endParaRPr lang="de-AT"/>
           </a:p>
@@ -877,7 +1231,7 @@
           <a:p>
             <a:fld id="{259D4BC2-8679-4FD1-863A-C8C72E7822AE}" type="datetimeFigureOut">
               <a:rPr lang="de-AT" smtClean="0"/>
-              <a:t>26.04.2022</a:t>
+              <a:t>02.05.2022</a:t>
             </a:fld>
             <a:endParaRPr lang="de-AT"/>
           </a:p>
@@ -1153,7 +1507,7 @@
           <a:p>
             <a:fld id="{259D4BC2-8679-4FD1-863A-C8C72E7822AE}" type="datetimeFigureOut">
               <a:rPr lang="de-AT" smtClean="0"/>
-              <a:t>26.04.2022</a:t>
+              <a:t>02.05.2022</a:t>
             </a:fld>
             <a:endParaRPr lang="de-AT"/>
           </a:p>
@@ -1421,7 +1775,7 @@
           <a:p>
             <a:fld id="{259D4BC2-8679-4FD1-863A-C8C72E7822AE}" type="datetimeFigureOut">
               <a:rPr lang="de-AT" smtClean="0"/>
-              <a:t>26.04.2022</a:t>
+              <a:t>02.05.2022</a:t>
             </a:fld>
             <a:endParaRPr lang="de-AT"/>
           </a:p>
@@ -1836,7 +2190,7 @@
           <a:p>
             <a:fld id="{259D4BC2-8679-4FD1-863A-C8C72E7822AE}" type="datetimeFigureOut">
               <a:rPr lang="de-AT" smtClean="0"/>
-              <a:t>26.04.2022</a:t>
+              <a:t>02.05.2022</a:t>
             </a:fld>
             <a:endParaRPr lang="de-AT"/>
           </a:p>
@@ -1978,7 +2332,7 @@
           <a:p>
             <a:fld id="{259D4BC2-8679-4FD1-863A-C8C72E7822AE}" type="datetimeFigureOut">
               <a:rPr lang="de-AT" smtClean="0"/>
-              <a:t>26.04.2022</a:t>
+              <a:t>02.05.2022</a:t>
             </a:fld>
             <a:endParaRPr lang="de-AT"/>
           </a:p>
@@ -2091,7 +2445,7 @@
           <a:p>
             <a:fld id="{259D4BC2-8679-4FD1-863A-C8C72E7822AE}" type="datetimeFigureOut">
               <a:rPr lang="de-AT" smtClean="0"/>
-              <a:t>26.04.2022</a:t>
+              <a:t>02.05.2022</a:t>
             </a:fld>
             <a:endParaRPr lang="de-AT"/>
           </a:p>
@@ -2404,7 +2758,7 @@
           <a:p>
             <a:fld id="{259D4BC2-8679-4FD1-863A-C8C72E7822AE}" type="datetimeFigureOut">
               <a:rPr lang="de-AT" smtClean="0"/>
-              <a:t>26.04.2022</a:t>
+              <a:t>02.05.2022</a:t>
             </a:fld>
             <a:endParaRPr lang="de-AT"/>
           </a:p>
@@ -2693,7 +3047,7 @@
           <a:p>
             <a:fld id="{259D4BC2-8679-4FD1-863A-C8C72E7822AE}" type="datetimeFigureOut">
               <a:rPr lang="de-AT" smtClean="0"/>
-              <a:t>26.04.2022</a:t>
+              <a:t>02.05.2022</a:t>
             </a:fld>
             <a:endParaRPr lang="de-AT"/>
           </a:p>
@@ -2936,7 +3290,7 @@
           <a:p>
             <a:fld id="{259D4BC2-8679-4FD1-863A-C8C72E7822AE}" type="datetimeFigureOut">
               <a:rPr lang="de-AT" smtClean="0"/>
-              <a:t>26.04.2022</a:t>
+              <a:t>02.05.2022</a:t>
             </a:fld>
             <a:endParaRPr lang="de-AT"/>
           </a:p>
@@ -6740,7 +7094,7 @@
           <p:cNvPr id="2" name="Title 1">
             <a:extLst>
               <a:ext uri="{FF2B5EF4-FFF2-40B4-BE49-F238E27FC236}">
-                <a16:creationId xmlns:a16="http://schemas.microsoft.com/office/drawing/2014/main" id="{397F9B61-FE15-4F84-A545-0E7D44C65710}"/>
+                <a16:creationId xmlns:a16="http://schemas.microsoft.com/office/drawing/2014/main" id="{C93051BF-279E-496A-02B0-E8EDEDDB8AEC}"/>
               </a:ext>
             </a:extLst>
           </p:cNvPr>
@@ -6751,62 +7105,1064 @@
             <p:ph type="title"/>
           </p:nvPr>
         </p:nvSpPr>
-        <p:spPr>
-          <a:xfrm>
-            <a:off x="838199" y="0"/>
-            <a:ext cx="10515600" cy="1325563"/>
-          </a:xfrm>
-        </p:spPr>
+        <p:spPr/>
         <p:txBody>
           <a:bodyPr/>
           <a:lstStyle/>
           <a:p>
             <a:r>
               <a:rPr lang="en-GB" dirty="0"/>
-              <a:t>Linked Lists – Insert at the Beginning</a:t>
+              <a:t>Double-Linked-Lists</a:t>
             </a:r>
             <a:endParaRPr lang="LID4096" dirty="0"/>
           </a:p>
         </p:txBody>
       </p:sp>
-      <p:pic>
-        <p:nvPicPr>
-          <p:cNvPr id="5" name="Content Placeholder 4" descr="Text&#10;&#10;Description automatically generated">
-            <a:extLst>
-              <a:ext uri="{FF2B5EF4-FFF2-40B4-BE49-F238E27FC236}">
-                <a16:creationId xmlns:a16="http://schemas.microsoft.com/office/drawing/2014/main" id="{BBD62933-2C16-4E01-8766-F3620CCD488C}"/>
-              </a:ext>
-            </a:extLst>
-          </p:cNvPr>
-          <p:cNvPicPr>
-            <a:picLocks noGrp="1" noChangeAspect="1"/>
-          </p:cNvPicPr>
+      <p:sp>
+        <p:nvSpPr>
+          <p:cNvPr id="3" name="Content Placeholder 2">
+            <a:extLst>
+              <a:ext uri="{FF2B5EF4-FFF2-40B4-BE49-F238E27FC236}">
+                <a16:creationId xmlns:a16="http://schemas.microsoft.com/office/drawing/2014/main" id="{901862AE-C929-3F79-2BAF-C22833EA23EE}"/>
+              </a:ext>
+            </a:extLst>
+          </p:cNvPr>
+          <p:cNvSpPr>
+            <a:spLocks noGrp="1"/>
+          </p:cNvSpPr>
           <p:nvPr>
             <p:ph idx="1"/>
           </p:nvPr>
-        </p:nvPicPr>
-        <p:blipFill rotWithShape="1">
-          <a:blip r:embed="rId2">
-            <a:extLst>
-              <a:ext uri="{28A0092B-C50C-407E-A947-70E740481C1C}">
-                <a14:useLocalDpi xmlns:a14="http://schemas.microsoft.com/office/drawing/2010/main" val="0"/>
-              </a:ext>
-            </a:extLst>
-          </a:blip>
-          <a:srcRect t="18325"/>
-          <a:stretch/>
-        </p:blipFill>
-        <p:spPr>
-          <a:xfrm>
-            <a:off x="2951505" y="1325563"/>
-            <a:ext cx="6288987" cy="4845982"/>
-          </a:xfrm>
-        </p:spPr>
-      </p:pic>
+        </p:nvSpPr>
+        <p:spPr/>
+        <p:txBody>
+          <a:bodyPr/>
+          <a:lstStyle/>
+          <a:p>
+            <a:r>
+              <a:rPr lang="en-GB" dirty="0"/>
+              <a:t>Each Node contains the address of the next node and the address of the previous node</a:t>
+            </a:r>
+          </a:p>
+          <a:p>
+            <a:r>
+              <a:rPr lang="en-GB" dirty="0"/>
+              <a:t>The head doesn’t have a previous Node</a:t>
+            </a:r>
+          </a:p>
+          <a:p>
+            <a:endParaRPr lang="LID4096" dirty="0"/>
+          </a:p>
+        </p:txBody>
+      </p:sp>
+      <p:sp>
+        <p:nvSpPr>
+          <p:cNvPr id="4" name="Rectangle 3">
+            <a:extLst>
+              <a:ext uri="{FF2B5EF4-FFF2-40B4-BE49-F238E27FC236}">
+                <a16:creationId xmlns:a16="http://schemas.microsoft.com/office/drawing/2014/main" id="{20D446C2-9357-E002-5325-539BCD7FD469}"/>
+              </a:ext>
+            </a:extLst>
+          </p:cNvPr>
+          <p:cNvSpPr/>
+          <p:nvPr/>
+        </p:nvSpPr>
+        <p:spPr>
+          <a:xfrm>
+            <a:off x="1671483" y="4442256"/>
+            <a:ext cx="1858297" cy="817563"/>
+          </a:xfrm>
+          <a:prstGeom prst="rect">
+            <a:avLst/>
+          </a:prstGeom>
+        </p:spPr>
+        <p:style>
+          <a:lnRef idx="0">
+            <a:schemeClr val="accent3"/>
+          </a:lnRef>
+          <a:fillRef idx="3">
+            <a:schemeClr val="accent3"/>
+          </a:fillRef>
+          <a:effectRef idx="3">
+            <a:schemeClr val="accent3"/>
+          </a:effectRef>
+          <a:fontRef idx="minor">
+            <a:schemeClr val="lt1"/>
+          </a:fontRef>
+        </p:style>
+        <p:txBody>
+          <a:bodyPr rtlCol="0" anchor="ctr"/>
+          <a:lstStyle/>
+          <a:p>
+            <a:pPr algn="ctr"/>
+            <a:endParaRPr lang="LID4096"/>
+          </a:p>
+        </p:txBody>
+      </p:sp>
+      <p:sp>
+        <p:nvSpPr>
+          <p:cNvPr id="5" name="Rectangle 4">
+            <a:extLst>
+              <a:ext uri="{FF2B5EF4-FFF2-40B4-BE49-F238E27FC236}">
+                <a16:creationId xmlns:a16="http://schemas.microsoft.com/office/drawing/2014/main" id="{D56B0093-931A-D9B7-4EEA-E1FB100E3DA6}"/>
+              </a:ext>
+            </a:extLst>
+          </p:cNvPr>
+          <p:cNvSpPr/>
+          <p:nvPr/>
+        </p:nvSpPr>
+        <p:spPr>
+          <a:xfrm>
+            <a:off x="5289754" y="4442256"/>
+            <a:ext cx="1936955" cy="817563"/>
+          </a:xfrm>
+          <a:prstGeom prst="rect">
+            <a:avLst/>
+          </a:prstGeom>
+        </p:spPr>
+        <p:style>
+          <a:lnRef idx="0">
+            <a:schemeClr val="accent3"/>
+          </a:lnRef>
+          <a:fillRef idx="3">
+            <a:schemeClr val="accent3"/>
+          </a:fillRef>
+          <a:effectRef idx="3">
+            <a:schemeClr val="accent3"/>
+          </a:effectRef>
+          <a:fontRef idx="minor">
+            <a:schemeClr val="lt1"/>
+          </a:fontRef>
+        </p:style>
+        <p:txBody>
+          <a:bodyPr rtlCol="0" anchor="ctr"/>
+          <a:lstStyle/>
+          <a:p>
+            <a:pPr algn="ctr"/>
+            <a:endParaRPr lang="LID4096"/>
+          </a:p>
+        </p:txBody>
+      </p:sp>
+      <p:sp>
+        <p:nvSpPr>
+          <p:cNvPr id="6" name="Rectangle 5">
+            <a:extLst>
+              <a:ext uri="{FF2B5EF4-FFF2-40B4-BE49-F238E27FC236}">
+                <a16:creationId xmlns:a16="http://schemas.microsoft.com/office/drawing/2014/main" id="{DF18CB8A-8CD8-D8AC-3110-13E24C7AEA78}"/>
+              </a:ext>
+            </a:extLst>
+          </p:cNvPr>
+          <p:cNvSpPr/>
+          <p:nvPr/>
+        </p:nvSpPr>
+        <p:spPr>
+          <a:xfrm>
+            <a:off x="8971937" y="4442279"/>
+            <a:ext cx="1877961" cy="817540"/>
+          </a:xfrm>
+          <a:prstGeom prst="rect">
+            <a:avLst/>
+          </a:prstGeom>
+        </p:spPr>
+        <p:style>
+          <a:lnRef idx="0">
+            <a:schemeClr val="accent3"/>
+          </a:lnRef>
+          <a:fillRef idx="3">
+            <a:schemeClr val="accent3"/>
+          </a:fillRef>
+          <a:effectRef idx="3">
+            <a:schemeClr val="accent3"/>
+          </a:effectRef>
+          <a:fontRef idx="minor">
+            <a:schemeClr val="lt1"/>
+          </a:fontRef>
+        </p:style>
+        <p:txBody>
+          <a:bodyPr rtlCol="0" anchor="ctr"/>
+          <a:lstStyle/>
+          <a:p>
+            <a:pPr algn="ctr"/>
+            <a:endParaRPr lang="LID4096"/>
+          </a:p>
+        </p:txBody>
+      </p:sp>
+      <p:cxnSp>
+        <p:nvCxnSpPr>
+          <p:cNvPr id="7" name="Straight Connector 6">
+            <a:extLst>
+              <a:ext uri="{FF2B5EF4-FFF2-40B4-BE49-F238E27FC236}">
+                <a16:creationId xmlns:a16="http://schemas.microsoft.com/office/drawing/2014/main" id="{588BB643-C7F7-60E8-4B2E-FEFAFF9FF898}"/>
+              </a:ext>
+            </a:extLst>
+          </p:cNvPr>
+          <p:cNvCxnSpPr>
+            <a:stCxn id="4" idx="0"/>
+            <a:endCxn id="4" idx="2"/>
+          </p:cNvCxnSpPr>
+          <p:nvPr/>
+        </p:nvCxnSpPr>
+        <p:spPr>
+          <a:xfrm>
+            <a:off x="2600632" y="4442256"/>
+            <a:ext cx="0" cy="817563"/>
+          </a:xfrm>
+          <a:prstGeom prst="line">
+            <a:avLst/>
+          </a:prstGeom>
+        </p:spPr>
+        <p:style>
+          <a:lnRef idx="1">
+            <a:schemeClr val="dk1"/>
+          </a:lnRef>
+          <a:fillRef idx="0">
+            <a:schemeClr val="dk1"/>
+          </a:fillRef>
+          <a:effectRef idx="0">
+            <a:schemeClr val="dk1"/>
+          </a:effectRef>
+          <a:fontRef idx="minor">
+            <a:schemeClr val="tx1"/>
+          </a:fontRef>
+        </p:style>
+      </p:cxnSp>
+      <p:cxnSp>
+        <p:nvCxnSpPr>
+          <p:cNvPr id="8" name="Straight Connector 7">
+            <a:extLst>
+              <a:ext uri="{FF2B5EF4-FFF2-40B4-BE49-F238E27FC236}">
+                <a16:creationId xmlns:a16="http://schemas.microsoft.com/office/drawing/2014/main" id="{35B971A3-8A0E-78F8-9C8F-0F93DD1DE1A0}"/>
+              </a:ext>
+            </a:extLst>
+          </p:cNvPr>
+          <p:cNvCxnSpPr>
+            <a:stCxn id="5" idx="0"/>
+            <a:endCxn id="5" idx="2"/>
+          </p:cNvCxnSpPr>
+          <p:nvPr/>
+        </p:nvCxnSpPr>
+        <p:spPr>
+          <a:xfrm>
+            <a:off x="6258232" y="4442256"/>
+            <a:ext cx="0" cy="817563"/>
+          </a:xfrm>
+          <a:prstGeom prst="line">
+            <a:avLst/>
+          </a:prstGeom>
+        </p:spPr>
+        <p:style>
+          <a:lnRef idx="1">
+            <a:schemeClr val="dk1"/>
+          </a:lnRef>
+          <a:fillRef idx="0">
+            <a:schemeClr val="dk1"/>
+          </a:fillRef>
+          <a:effectRef idx="0">
+            <a:schemeClr val="dk1"/>
+          </a:effectRef>
+          <a:fontRef idx="minor">
+            <a:schemeClr val="tx1"/>
+          </a:fontRef>
+        </p:style>
+      </p:cxnSp>
+      <p:cxnSp>
+        <p:nvCxnSpPr>
+          <p:cNvPr id="9" name="Straight Connector 8">
+            <a:extLst>
+              <a:ext uri="{FF2B5EF4-FFF2-40B4-BE49-F238E27FC236}">
+                <a16:creationId xmlns:a16="http://schemas.microsoft.com/office/drawing/2014/main" id="{BB3F8697-FBEC-77FC-723C-BFCBD855D75A}"/>
+              </a:ext>
+            </a:extLst>
+          </p:cNvPr>
+          <p:cNvCxnSpPr>
+            <a:stCxn id="6" idx="0"/>
+            <a:endCxn id="6" idx="2"/>
+          </p:cNvCxnSpPr>
+          <p:nvPr/>
+        </p:nvCxnSpPr>
+        <p:spPr>
+          <a:xfrm>
+            <a:off x="9910918" y="4442279"/>
+            <a:ext cx="0" cy="817540"/>
+          </a:xfrm>
+          <a:prstGeom prst="line">
+            <a:avLst/>
+          </a:prstGeom>
+        </p:spPr>
+        <p:style>
+          <a:lnRef idx="1">
+            <a:schemeClr val="dk1"/>
+          </a:lnRef>
+          <a:fillRef idx="0">
+            <a:schemeClr val="dk1"/>
+          </a:fillRef>
+          <a:effectRef idx="0">
+            <a:schemeClr val="dk1"/>
+          </a:effectRef>
+          <a:fontRef idx="minor">
+            <a:schemeClr val="tx1"/>
+          </a:fontRef>
+        </p:style>
+      </p:cxnSp>
+      <p:sp>
+        <p:nvSpPr>
+          <p:cNvPr id="10" name="TextBox 9">
+            <a:extLst>
+              <a:ext uri="{FF2B5EF4-FFF2-40B4-BE49-F238E27FC236}">
+                <a16:creationId xmlns:a16="http://schemas.microsoft.com/office/drawing/2014/main" id="{5B3DD23E-DC12-1DCD-201E-1F9D32794FC0}"/>
+              </a:ext>
+            </a:extLst>
+          </p:cNvPr>
+          <p:cNvSpPr txBox="1"/>
+          <p:nvPr/>
+        </p:nvSpPr>
+        <p:spPr>
+          <a:xfrm>
+            <a:off x="1755059" y="4666360"/>
+            <a:ext cx="938979" cy="369332"/>
+          </a:xfrm>
+          <a:prstGeom prst="rect">
+            <a:avLst/>
+          </a:prstGeom>
+          <a:noFill/>
+        </p:spPr>
+        <p:txBody>
+          <a:bodyPr wrap="square" rtlCol="0">
+            <a:spAutoFit/>
+          </a:bodyPr>
+          <a:lstStyle/>
+          <a:p>
+            <a:r>
+              <a:rPr lang="en-GB" dirty="0"/>
+              <a:t>Data 1</a:t>
+            </a:r>
+            <a:endParaRPr lang="LID4096" dirty="0"/>
+          </a:p>
+        </p:txBody>
+      </p:sp>
+      <p:sp>
+        <p:nvSpPr>
+          <p:cNvPr id="11" name="Arrow: Right 10">
+            <a:extLst>
+              <a:ext uri="{FF2B5EF4-FFF2-40B4-BE49-F238E27FC236}">
+                <a16:creationId xmlns:a16="http://schemas.microsoft.com/office/drawing/2014/main" id="{3C6EAAAC-4C41-3955-36C4-5878EDB162DC}"/>
+              </a:ext>
+            </a:extLst>
+          </p:cNvPr>
+          <p:cNvSpPr/>
+          <p:nvPr/>
+        </p:nvSpPr>
+        <p:spPr>
+          <a:xfrm>
+            <a:off x="3547483" y="4363178"/>
+            <a:ext cx="1745225" cy="408770"/>
+          </a:xfrm>
+          <a:prstGeom prst="rightArrow">
+            <a:avLst/>
+          </a:prstGeom>
+        </p:spPr>
+        <p:style>
+          <a:lnRef idx="2">
+            <a:schemeClr val="dk1"/>
+          </a:lnRef>
+          <a:fillRef idx="1">
+            <a:schemeClr val="lt1"/>
+          </a:fillRef>
+          <a:effectRef idx="0">
+            <a:schemeClr val="dk1"/>
+          </a:effectRef>
+          <a:fontRef idx="minor">
+            <a:schemeClr val="dk1"/>
+          </a:fontRef>
+        </p:style>
+        <p:txBody>
+          <a:bodyPr rtlCol="0" anchor="ctr"/>
+          <a:lstStyle/>
+          <a:p>
+            <a:pPr algn="ctr"/>
+            <a:endParaRPr lang="LID4096"/>
+          </a:p>
+        </p:txBody>
+      </p:sp>
+      <p:sp>
+        <p:nvSpPr>
+          <p:cNvPr id="12" name="TextBox 11">
+            <a:extLst>
+              <a:ext uri="{FF2B5EF4-FFF2-40B4-BE49-F238E27FC236}">
+                <a16:creationId xmlns:a16="http://schemas.microsoft.com/office/drawing/2014/main" id="{376E01A4-B2A0-E88B-4A97-1CF8ABD61E66}"/>
+              </a:ext>
+            </a:extLst>
+          </p:cNvPr>
+          <p:cNvSpPr txBox="1"/>
+          <p:nvPr/>
+        </p:nvSpPr>
+        <p:spPr>
+          <a:xfrm>
+            <a:off x="5376903" y="4660105"/>
+            <a:ext cx="805501" cy="369332"/>
+          </a:xfrm>
+          <a:prstGeom prst="rect">
+            <a:avLst/>
+          </a:prstGeom>
+          <a:noFill/>
+        </p:spPr>
+        <p:txBody>
+          <a:bodyPr wrap="square" rtlCol="0">
+            <a:spAutoFit/>
+          </a:bodyPr>
+          <a:lstStyle/>
+          <a:p>
+            <a:r>
+              <a:rPr lang="en-GB" dirty="0"/>
+              <a:t>Data 2</a:t>
+            </a:r>
+            <a:endParaRPr lang="LID4096" dirty="0"/>
+          </a:p>
+        </p:txBody>
+      </p:sp>
+      <p:sp>
+        <p:nvSpPr>
+          <p:cNvPr id="13" name="TextBox 12">
+            <a:extLst>
+              <a:ext uri="{FF2B5EF4-FFF2-40B4-BE49-F238E27FC236}">
+                <a16:creationId xmlns:a16="http://schemas.microsoft.com/office/drawing/2014/main" id="{57169E9B-B1B5-357D-6B0B-B843D26ACCE8}"/>
+              </a:ext>
+            </a:extLst>
+          </p:cNvPr>
+          <p:cNvSpPr txBox="1"/>
+          <p:nvPr/>
+        </p:nvSpPr>
+        <p:spPr>
+          <a:xfrm>
+            <a:off x="2700143" y="4496150"/>
+            <a:ext cx="752161" cy="369332"/>
+          </a:xfrm>
+          <a:prstGeom prst="rect">
+            <a:avLst/>
+          </a:prstGeom>
+          <a:noFill/>
+        </p:spPr>
+        <p:txBody>
+          <a:bodyPr wrap="square" rtlCol="0">
+            <a:spAutoFit/>
+          </a:bodyPr>
+          <a:lstStyle/>
+          <a:p>
+            <a:r>
+              <a:rPr lang="en-GB" dirty="0"/>
+              <a:t>Next </a:t>
+            </a:r>
+            <a:endParaRPr lang="LID4096" dirty="0"/>
+          </a:p>
+        </p:txBody>
+      </p:sp>
+      <p:sp>
+        <p:nvSpPr>
+          <p:cNvPr id="14" name="TextBox 13">
+            <a:extLst>
+              <a:ext uri="{FF2B5EF4-FFF2-40B4-BE49-F238E27FC236}">
+                <a16:creationId xmlns:a16="http://schemas.microsoft.com/office/drawing/2014/main" id="{16207E3C-21AD-DF9A-C4C1-5D1711A89312}"/>
+              </a:ext>
+            </a:extLst>
+          </p:cNvPr>
+          <p:cNvSpPr txBox="1"/>
+          <p:nvPr/>
+        </p:nvSpPr>
+        <p:spPr>
+          <a:xfrm>
+            <a:off x="6359536" y="4479993"/>
+            <a:ext cx="921036" cy="369332"/>
+          </a:xfrm>
+          <a:prstGeom prst="rect">
+            <a:avLst/>
+          </a:prstGeom>
+          <a:noFill/>
+        </p:spPr>
+        <p:txBody>
+          <a:bodyPr wrap="square" rtlCol="0">
+            <a:spAutoFit/>
+          </a:bodyPr>
+          <a:lstStyle/>
+          <a:p>
+            <a:r>
+              <a:rPr lang="en-GB" dirty="0"/>
+              <a:t>Next</a:t>
+            </a:r>
+            <a:endParaRPr lang="LID4096" dirty="0"/>
+          </a:p>
+        </p:txBody>
+      </p:sp>
+      <p:sp>
+        <p:nvSpPr>
+          <p:cNvPr id="15" name="TextBox 14">
+            <a:extLst>
+              <a:ext uri="{FF2B5EF4-FFF2-40B4-BE49-F238E27FC236}">
+                <a16:creationId xmlns:a16="http://schemas.microsoft.com/office/drawing/2014/main" id="{8147D665-5390-F066-7990-930A5620423A}"/>
+              </a:ext>
+            </a:extLst>
+          </p:cNvPr>
+          <p:cNvSpPr txBox="1"/>
+          <p:nvPr/>
+        </p:nvSpPr>
+        <p:spPr>
+          <a:xfrm>
+            <a:off x="9980226" y="4530367"/>
+            <a:ext cx="911085" cy="369332"/>
+          </a:xfrm>
+          <a:prstGeom prst="rect">
+            <a:avLst/>
+          </a:prstGeom>
+          <a:noFill/>
+        </p:spPr>
+        <p:txBody>
+          <a:bodyPr wrap="square" rtlCol="0">
+            <a:spAutoFit/>
+          </a:bodyPr>
+          <a:lstStyle/>
+          <a:p>
+            <a:r>
+              <a:rPr lang="en-GB" dirty="0"/>
+              <a:t>Next</a:t>
+            </a:r>
+            <a:endParaRPr lang="LID4096" dirty="0"/>
+          </a:p>
+        </p:txBody>
+      </p:sp>
+      <p:sp>
+        <p:nvSpPr>
+          <p:cNvPr id="16" name="TextBox 15">
+            <a:extLst>
+              <a:ext uri="{FF2B5EF4-FFF2-40B4-BE49-F238E27FC236}">
+                <a16:creationId xmlns:a16="http://schemas.microsoft.com/office/drawing/2014/main" id="{11B0EA59-0E91-2A4E-F40D-1AB19BDA32EE}"/>
+              </a:ext>
+            </a:extLst>
+          </p:cNvPr>
+          <p:cNvSpPr txBox="1"/>
+          <p:nvPr/>
+        </p:nvSpPr>
+        <p:spPr>
+          <a:xfrm>
+            <a:off x="9049123" y="4660104"/>
+            <a:ext cx="896449" cy="369332"/>
+          </a:xfrm>
+          <a:prstGeom prst="rect">
+            <a:avLst/>
+          </a:prstGeom>
+          <a:noFill/>
+        </p:spPr>
+        <p:txBody>
+          <a:bodyPr wrap="square" rtlCol="0">
+            <a:spAutoFit/>
+          </a:bodyPr>
+          <a:lstStyle/>
+          <a:p>
+            <a:r>
+              <a:rPr lang="en-GB" dirty="0"/>
+              <a:t>Data 3</a:t>
+            </a:r>
+            <a:endParaRPr lang="LID4096" dirty="0"/>
+          </a:p>
+        </p:txBody>
+      </p:sp>
+      <p:cxnSp>
+        <p:nvCxnSpPr>
+          <p:cNvPr id="17" name="Straight Arrow Connector 16">
+            <a:extLst>
+              <a:ext uri="{FF2B5EF4-FFF2-40B4-BE49-F238E27FC236}">
+                <a16:creationId xmlns:a16="http://schemas.microsoft.com/office/drawing/2014/main" id="{F53F75A8-D782-CC00-D6D9-A9F0E7C7D66C}"/>
+              </a:ext>
+            </a:extLst>
+          </p:cNvPr>
+          <p:cNvCxnSpPr>
+            <a:cxnSpLocks/>
+            <a:endCxn id="4" idx="1"/>
+          </p:cNvCxnSpPr>
+          <p:nvPr/>
+        </p:nvCxnSpPr>
+        <p:spPr>
+          <a:xfrm>
+            <a:off x="1245313" y="4350181"/>
+            <a:ext cx="426170" cy="500857"/>
+          </a:xfrm>
+          <a:prstGeom prst="straightConnector1">
+            <a:avLst/>
+          </a:prstGeom>
+          <a:ln>
+            <a:tailEnd type="triangle"/>
+          </a:ln>
+        </p:spPr>
+        <p:style>
+          <a:lnRef idx="1">
+            <a:schemeClr val="accent1"/>
+          </a:lnRef>
+          <a:fillRef idx="0">
+            <a:schemeClr val="accent1"/>
+          </a:fillRef>
+          <a:effectRef idx="0">
+            <a:schemeClr val="accent1"/>
+          </a:effectRef>
+          <a:fontRef idx="minor">
+            <a:schemeClr val="tx1"/>
+          </a:fontRef>
+        </p:style>
+      </p:cxnSp>
+      <p:sp>
+        <p:nvSpPr>
+          <p:cNvPr id="18" name="TextBox 17">
+            <a:extLst>
+              <a:ext uri="{FF2B5EF4-FFF2-40B4-BE49-F238E27FC236}">
+                <a16:creationId xmlns:a16="http://schemas.microsoft.com/office/drawing/2014/main" id="{62C913E3-183B-4CBC-8306-4C5DBE174195}"/>
+              </a:ext>
+            </a:extLst>
+          </p:cNvPr>
+          <p:cNvSpPr txBox="1"/>
+          <p:nvPr/>
+        </p:nvSpPr>
+        <p:spPr>
+          <a:xfrm>
+            <a:off x="838200" y="4011685"/>
+            <a:ext cx="1386348" cy="370042"/>
+          </a:xfrm>
+          <a:prstGeom prst="rect">
+            <a:avLst/>
+          </a:prstGeom>
+          <a:noFill/>
+        </p:spPr>
+        <p:txBody>
+          <a:bodyPr wrap="square" rtlCol="0">
+            <a:spAutoFit/>
+          </a:bodyPr>
+          <a:lstStyle/>
+          <a:p>
+            <a:r>
+              <a:rPr lang="en-GB" dirty="0"/>
+              <a:t>_head</a:t>
+            </a:r>
+            <a:endParaRPr lang="LID4096" dirty="0"/>
+          </a:p>
+        </p:txBody>
+      </p:sp>
+      <p:sp>
+        <p:nvSpPr>
+          <p:cNvPr id="19" name="Arrow: Right 18">
+            <a:extLst>
+              <a:ext uri="{FF2B5EF4-FFF2-40B4-BE49-F238E27FC236}">
+                <a16:creationId xmlns:a16="http://schemas.microsoft.com/office/drawing/2014/main" id="{C8B6A109-6BC9-72EA-D135-258769EA10F9}"/>
+              </a:ext>
+            </a:extLst>
+          </p:cNvPr>
+          <p:cNvSpPr/>
+          <p:nvPr/>
+        </p:nvSpPr>
+        <p:spPr>
+          <a:xfrm>
+            <a:off x="7232468" y="4649147"/>
+            <a:ext cx="1745225" cy="408770"/>
+          </a:xfrm>
+          <a:prstGeom prst="rightArrow">
+            <a:avLst/>
+          </a:prstGeom>
+        </p:spPr>
+        <p:style>
+          <a:lnRef idx="2">
+            <a:schemeClr val="dk1"/>
+          </a:lnRef>
+          <a:fillRef idx="1">
+            <a:schemeClr val="lt1"/>
+          </a:fillRef>
+          <a:effectRef idx="0">
+            <a:schemeClr val="dk1"/>
+          </a:effectRef>
+          <a:fontRef idx="minor">
+            <a:schemeClr val="dk1"/>
+          </a:fontRef>
+        </p:style>
+        <p:txBody>
+          <a:bodyPr rtlCol="0" anchor="ctr"/>
+          <a:lstStyle/>
+          <a:p>
+            <a:pPr algn="ctr"/>
+            <a:endParaRPr lang="LID4096"/>
+          </a:p>
+        </p:txBody>
+      </p:sp>
+      <p:cxnSp>
+        <p:nvCxnSpPr>
+          <p:cNvPr id="23" name="Straight Connector 22">
+            <a:extLst>
+              <a:ext uri="{FF2B5EF4-FFF2-40B4-BE49-F238E27FC236}">
+                <a16:creationId xmlns:a16="http://schemas.microsoft.com/office/drawing/2014/main" id="{90687156-B9D3-BFAE-F31E-D78D347E6C51}"/>
+              </a:ext>
+            </a:extLst>
+          </p:cNvPr>
+          <p:cNvCxnSpPr>
+            <a:cxnSpLocks/>
+          </p:cNvCxnSpPr>
+          <p:nvPr/>
+        </p:nvCxnSpPr>
+        <p:spPr>
+          <a:xfrm flipV="1">
+            <a:off x="2602689" y="4850237"/>
+            <a:ext cx="948144" cy="6590"/>
+          </a:xfrm>
+          <a:prstGeom prst="line">
+            <a:avLst/>
+          </a:prstGeom>
+        </p:spPr>
+        <p:style>
+          <a:lnRef idx="1">
+            <a:schemeClr val="dk1"/>
+          </a:lnRef>
+          <a:fillRef idx="0">
+            <a:schemeClr val="dk1"/>
+          </a:fillRef>
+          <a:effectRef idx="0">
+            <a:schemeClr val="dk1"/>
+          </a:effectRef>
+          <a:fontRef idx="minor">
+            <a:schemeClr val="tx1"/>
+          </a:fontRef>
+        </p:style>
+      </p:cxnSp>
+      <p:cxnSp>
+        <p:nvCxnSpPr>
+          <p:cNvPr id="27" name="Straight Connector 26">
+            <a:extLst>
+              <a:ext uri="{FF2B5EF4-FFF2-40B4-BE49-F238E27FC236}">
+                <a16:creationId xmlns:a16="http://schemas.microsoft.com/office/drawing/2014/main" id="{35F71CAF-6872-D24D-05BE-9D37E2E7274C}"/>
+              </a:ext>
+            </a:extLst>
+          </p:cNvPr>
+          <p:cNvCxnSpPr>
+            <a:cxnSpLocks/>
+          </p:cNvCxnSpPr>
+          <p:nvPr/>
+        </p:nvCxnSpPr>
+        <p:spPr>
+          <a:xfrm>
+            <a:off x="6258232" y="4865482"/>
+            <a:ext cx="965526" cy="0"/>
+          </a:xfrm>
+          <a:prstGeom prst="line">
+            <a:avLst/>
+          </a:prstGeom>
+        </p:spPr>
+        <p:style>
+          <a:lnRef idx="1">
+            <a:schemeClr val="dk1"/>
+          </a:lnRef>
+          <a:fillRef idx="0">
+            <a:schemeClr val="dk1"/>
+          </a:fillRef>
+          <a:effectRef idx="0">
+            <a:schemeClr val="dk1"/>
+          </a:effectRef>
+          <a:fontRef idx="minor">
+            <a:schemeClr val="tx1"/>
+          </a:fontRef>
+        </p:style>
+      </p:cxnSp>
+      <p:cxnSp>
+        <p:nvCxnSpPr>
+          <p:cNvPr id="30" name="Straight Connector 29">
+            <a:extLst>
+              <a:ext uri="{FF2B5EF4-FFF2-40B4-BE49-F238E27FC236}">
+                <a16:creationId xmlns:a16="http://schemas.microsoft.com/office/drawing/2014/main" id="{CF1F0805-93D0-0D1A-E7AE-9914777E06A5}"/>
+              </a:ext>
+            </a:extLst>
+          </p:cNvPr>
+          <p:cNvCxnSpPr>
+            <a:cxnSpLocks/>
+          </p:cNvCxnSpPr>
+          <p:nvPr/>
+        </p:nvCxnSpPr>
+        <p:spPr>
+          <a:xfrm>
+            <a:off x="9914250" y="4844770"/>
+            <a:ext cx="945739" cy="8763"/>
+          </a:xfrm>
+          <a:prstGeom prst="line">
+            <a:avLst/>
+          </a:prstGeom>
+        </p:spPr>
+        <p:style>
+          <a:lnRef idx="1">
+            <a:schemeClr val="dk1"/>
+          </a:lnRef>
+          <a:fillRef idx="0">
+            <a:schemeClr val="dk1"/>
+          </a:fillRef>
+          <a:effectRef idx="0">
+            <a:schemeClr val="dk1"/>
+          </a:effectRef>
+          <a:fontRef idx="minor">
+            <a:schemeClr val="tx1"/>
+          </a:fontRef>
+        </p:style>
+      </p:cxnSp>
+      <p:sp>
+        <p:nvSpPr>
+          <p:cNvPr id="31" name="TextBox 30">
+            <a:extLst>
+              <a:ext uri="{FF2B5EF4-FFF2-40B4-BE49-F238E27FC236}">
+                <a16:creationId xmlns:a16="http://schemas.microsoft.com/office/drawing/2014/main" id="{336F2917-9118-6E75-D6A5-50B3E23E0495}"/>
+              </a:ext>
+            </a:extLst>
+          </p:cNvPr>
+          <p:cNvSpPr txBox="1"/>
+          <p:nvPr/>
+        </p:nvSpPr>
+        <p:spPr>
+          <a:xfrm>
+            <a:off x="2694039" y="4899699"/>
+            <a:ext cx="631052" cy="369332"/>
+          </a:xfrm>
+          <a:prstGeom prst="rect">
+            <a:avLst/>
+          </a:prstGeom>
+          <a:noFill/>
+        </p:spPr>
+        <p:txBody>
+          <a:bodyPr wrap="square" rtlCol="0">
+            <a:spAutoFit/>
+          </a:bodyPr>
+          <a:lstStyle/>
+          <a:p>
+            <a:r>
+              <a:rPr lang="en-GB" dirty="0" err="1"/>
+              <a:t>Prev</a:t>
+            </a:r>
+            <a:endParaRPr lang="LID4096" dirty="0"/>
+          </a:p>
+        </p:txBody>
+      </p:sp>
+      <p:sp>
+        <p:nvSpPr>
+          <p:cNvPr id="48" name="TextBox 47">
+            <a:extLst>
+              <a:ext uri="{FF2B5EF4-FFF2-40B4-BE49-F238E27FC236}">
+                <a16:creationId xmlns:a16="http://schemas.microsoft.com/office/drawing/2014/main" id="{370E1AFF-5AC8-57B3-9450-39A45AC5E938}"/>
+              </a:ext>
+            </a:extLst>
+          </p:cNvPr>
+          <p:cNvSpPr txBox="1"/>
+          <p:nvPr/>
+        </p:nvSpPr>
+        <p:spPr>
+          <a:xfrm>
+            <a:off x="6359536" y="4899699"/>
+            <a:ext cx="801502" cy="369332"/>
+          </a:xfrm>
+          <a:prstGeom prst="rect">
+            <a:avLst/>
+          </a:prstGeom>
+          <a:noFill/>
+        </p:spPr>
+        <p:txBody>
+          <a:bodyPr wrap="square" rtlCol="0">
+            <a:spAutoFit/>
+          </a:bodyPr>
+          <a:lstStyle/>
+          <a:p>
+            <a:r>
+              <a:rPr lang="en-GB" dirty="0" err="1"/>
+              <a:t>Prev</a:t>
+            </a:r>
+            <a:endParaRPr lang="LID4096" dirty="0"/>
+          </a:p>
+        </p:txBody>
+      </p:sp>
+      <p:sp>
+        <p:nvSpPr>
+          <p:cNvPr id="49" name="TextBox 48">
+            <a:extLst>
+              <a:ext uri="{FF2B5EF4-FFF2-40B4-BE49-F238E27FC236}">
+                <a16:creationId xmlns:a16="http://schemas.microsoft.com/office/drawing/2014/main" id="{44C940D2-1791-1366-F5D0-403C067D768B}"/>
+              </a:ext>
+            </a:extLst>
+          </p:cNvPr>
+          <p:cNvSpPr txBox="1"/>
+          <p:nvPr/>
+        </p:nvSpPr>
+        <p:spPr>
+          <a:xfrm>
+            <a:off x="9990794" y="4881640"/>
+            <a:ext cx="816573" cy="369332"/>
+          </a:xfrm>
+          <a:prstGeom prst="rect">
+            <a:avLst/>
+          </a:prstGeom>
+          <a:noFill/>
+        </p:spPr>
+        <p:txBody>
+          <a:bodyPr wrap="square" rtlCol="0">
+            <a:spAutoFit/>
+          </a:bodyPr>
+          <a:lstStyle/>
+          <a:p>
+            <a:r>
+              <a:rPr lang="en-GB" dirty="0" err="1"/>
+              <a:t>Prev</a:t>
+            </a:r>
+            <a:endParaRPr lang="LID4096" dirty="0"/>
+          </a:p>
+        </p:txBody>
+      </p:sp>
+      <p:cxnSp>
+        <p:nvCxnSpPr>
+          <p:cNvPr id="51" name="Straight Connector 50">
+            <a:extLst>
+              <a:ext uri="{FF2B5EF4-FFF2-40B4-BE49-F238E27FC236}">
+                <a16:creationId xmlns:a16="http://schemas.microsoft.com/office/drawing/2014/main" id="{D781956A-4904-6DD2-9F4E-50F820FF8B15}"/>
+              </a:ext>
+            </a:extLst>
+          </p:cNvPr>
+          <p:cNvCxnSpPr>
+            <a:cxnSpLocks/>
+          </p:cNvCxnSpPr>
+          <p:nvPr/>
+        </p:nvCxnSpPr>
+        <p:spPr>
+          <a:xfrm>
+            <a:off x="2672063" y="4913767"/>
+            <a:ext cx="724460" cy="355264"/>
+          </a:xfrm>
+          <a:prstGeom prst="line">
+            <a:avLst/>
+          </a:prstGeom>
+          <a:ln>
+            <a:solidFill>
+              <a:srgbClr val="FF0000"/>
+            </a:solidFill>
+          </a:ln>
+        </p:spPr>
+        <p:style>
+          <a:lnRef idx="1">
+            <a:schemeClr val="accent2"/>
+          </a:lnRef>
+          <a:fillRef idx="0">
+            <a:schemeClr val="accent2"/>
+          </a:fillRef>
+          <a:effectRef idx="0">
+            <a:schemeClr val="accent2"/>
+          </a:effectRef>
+          <a:fontRef idx="minor">
+            <a:schemeClr val="tx1"/>
+          </a:fontRef>
+        </p:style>
+      </p:cxnSp>
+      <p:sp>
+        <p:nvSpPr>
+          <p:cNvPr id="54" name="Arrow: U-Turn 53">
+            <a:extLst>
+              <a:ext uri="{FF2B5EF4-FFF2-40B4-BE49-F238E27FC236}">
+                <a16:creationId xmlns:a16="http://schemas.microsoft.com/office/drawing/2014/main" id="{B6D423FC-5B14-60B9-014A-14D7A935D89E}"/>
+              </a:ext>
+            </a:extLst>
+          </p:cNvPr>
+          <p:cNvSpPr/>
+          <p:nvPr/>
+        </p:nvSpPr>
+        <p:spPr>
+          <a:xfrm flipH="1" flipV="1">
+            <a:off x="2461436" y="5264808"/>
+            <a:ext cx="3881916" cy="605360"/>
+          </a:xfrm>
+          <a:prstGeom prst="uturnArrow">
+            <a:avLst>
+              <a:gd name="adj1" fmla="val 25000"/>
+              <a:gd name="adj2" fmla="val 22425"/>
+              <a:gd name="adj3" fmla="val 25000"/>
+              <a:gd name="adj4" fmla="val 43750"/>
+              <a:gd name="adj5" fmla="val 100000"/>
+            </a:avLst>
+          </a:prstGeom>
+        </p:spPr>
+        <p:style>
+          <a:lnRef idx="2">
+            <a:schemeClr val="dk1"/>
+          </a:lnRef>
+          <a:fillRef idx="1">
+            <a:schemeClr val="lt1"/>
+          </a:fillRef>
+          <a:effectRef idx="0">
+            <a:schemeClr val="dk1"/>
+          </a:effectRef>
+          <a:fontRef idx="minor">
+            <a:schemeClr val="dk1"/>
+          </a:fontRef>
+        </p:style>
+        <p:txBody>
+          <a:bodyPr rtlCol="0" anchor="ctr"/>
+          <a:lstStyle/>
+          <a:p>
+            <a:pPr algn="ctr"/>
+            <a:endParaRPr lang="LID4096">
+              <a:solidFill>
+                <a:schemeClr val="tx1"/>
+              </a:solidFill>
+            </a:endParaRPr>
+          </a:p>
+        </p:txBody>
+      </p:sp>
+      <p:sp>
+        <p:nvSpPr>
+          <p:cNvPr id="55" name="Arrow: U-Turn 54">
+            <a:extLst>
+              <a:ext uri="{FF2B5EF4-FFF2-40B4-BE49-F238E27FC236}">
+                <a16:creationId xmlns:a16="http://schemas.microsoft.com/office/drawing/2014/main" id="{C31F36D3-D62E-41B9-39D3-25F3249B8A52}"/>
+              </a:ext>
+            </a:extLst>
+          </p:cNvPr>
+          <p:cNvSpPr/>
+          <p:nvPr/>
+        </p:nvSpPr>
+        <p:spPr>
+          <a:xfrm flipH="1" flipV="1">
+            <a:off x="6595020" y="5264808"/>
+            <a:ext cx="3881916" cy="605360"/>
+          </a:xfrm>
+          <a:prstGeom prst="uturnArrow">
+            <a:avLst>
+              <a:gd name="adj1" fmla="val 25000"/>
+              <a:gd name="adj2" fmla="val 22425"/>
+              <a:gd name="adj3" fmla="val 25000"/>
+              <a:gd name="adj4" fmla="val 43750"/>
+              <a:gd name="adj5" fmla="val 100000"/>
+            </a:avLst>
+          </a:prstGeom>
+        </p:spPr>
+        <p:style>
+          <a:lnRef idx="2">
+            <a:schemeClr val="dk1"/>
+          </a:lnRef>
+          <a:fillRef idx="1">
+            <a:schemeClr val="lt1"/>
+          </a:fillRef>
+          <a:effectRef idx="0">
+            <a:schemeClr val="dk1"/>
+          </a:effectRef>
+          <a:fontRef idx="minor">
+            <a:schemeClr val="dk1"/>
+          </a:fontRef>
+        </p:style>
+        <p:txBody>
+          <a:bodyPr rtlCol="0" anchor="ctr"/>
+          <a:lstStyle/>
+          <a:p>
+            <a:pPr algn="ctr"/>
+            <a:endParaRPr lang="LID4096">
+              <a:solidFill>
+                <a:schemeClr val="tx1"/>
+              </a:solidFill>
+            </a:endParaRPr>
+          </a:p>
+        </p:txBody>
+      </p:sp>
     </p:spTree>
     <p:extLst>
       <p:ext uri="{BB962C8B-B14F-4D97-AF65-F5344CB8AC3E}">
-        <p14:creationId xmlns:p14="http://schemas.microsoft.com/office/powerpoint/2010/main" val="2473947929"/>
+        <p14:creationId xmlns:p14="http://schemas.microsoft.com/office/powerpoint/2010/main" val="1612538745"/>
       </p:ext>
     </p:extLst>
   </p:cSld>
@@ -6838,6 +8194,104 @@
           <p:cNvPr id="2" name="Title 1">
             <a:extLst>
               <a:ext uri="{FF2B5EF4-FFF2-40B4-BE49-F238E27FC236}">
+                <a16:creationId xmlns:a16="http://schemas.microsoft.com/office/drawing/2014/main" id="{397F9B61-FE15-4F84-A545-0E7D44C65710}"/>
+              </a:ext>
+            </a:extLst>
+          </p:cNvPr>
+          <p:cNvSpPr>
+            <a:spLocks noGrp="1"/>
+          </p:cNvSpPr>
+          <p:nvPr>
+            <p:ph type="title"/>
+          </p:nvPr>
+        </p:nvSpPr>
+        <p:spPr>
+          <a:xfrm>
+            <a:off x="838199" y="0"/>
+            <a:ext cx="10515600" cy="1325563"/>
+          </a:xfrm>
+        </p:spPr>
+        <p:txBody>
+          <a:bodyPr/>
+          <a:lstStyle/>
+          <a:p>
+            <a:r>
+              <a:rPr lang="en-GB" dirty="0"/>
+              <a:t>Linked Lists – Insert at the Beginning</a:t>
+            </a:r>
+            <a:endParaRPr lang="LID4096" dirty="0"/>
+          </a:p>
+        </p:txBody>
+      </p:sp>
+      <p:pic>
+        <p:nvPicPr>
+          <p:cNvPr id="5" name="Content Placeholder 4" descr="Text&#10;&#10;Description automatically generated">
+            <a:extLst>
+              <a:ext uri="{FF2B5EF4-FFF2-40B4-BE49-F238E27FC236}">
+                <a16:creationId xmlns:a16="http://schemas.microsoft.com/office/drawing/2014/main" id="{BBD62933-2C16-4E01-8766-F3620CCD488C}"/>
+              </a:ext>
+            </a:extLst>
+          </p:cNvPr>
+          <p:cNvPicPr>
+            <a:picLocks noGrp="1" noChangeAspect="1"/>
+          </p:cNvPicPr>
+          <p:nvPr>
+            <p:ph idx="1"/>
+          </p:nvPr>
+        </p:nvPicPr>
+        <p:blipFill rotWithShape="1">
+          <a:blip r:embed="rId2">
+            <a:extLst>
+              <a:ext uri="{28A0092B-C50C-407E-A947-70E740481C1C}">
+                <a14:useLocalDpi xmlns:a14="http://schemas.microsoft.com/office/drawing/2010/main" val="0"/>
+              </a:ext>
+            </a:extLst>
+          </a:blip>
+          <a:srcRect t="18325"/>
+          <a:stretch/>
+        </p:blipFill>
+        <p:spPr>
+          <a:xfrm>
+            <a:off x="2951505" y="1325563"/>
+            <a:ext cx="6288987" cy="4845982"/>
+          </a:xfrm>
+        </p:spPr>
+      </p:pic>
+    </p:spTree>
+    <p:extLst>
+      <p:ext uri="{BB962C8B-B14F-4D97-AF65-F5344CB8AC3E}">
+        <p14:creationId xmlns:p14="http://schemas.microsoft.com/office/powerpoint/2010/main" val="2473947929"/>
+      </p:ext>
+    </p:extLst>
+  </p:cSld>
+  <p:clrMapOvr>
+    <a:masterClrMapping/>
+  </p:clrMapOvr>
+</p:sld>
+</file>
+
+<file path=ppt/slides/slide7.xml><?xml version="1.0" encoding="utf-8"?>
+<p:sld xmlns:a="http://schemas.openxmlformats.org/drawingml/2006/main" xmlns:r="http://schemas.openxmlformats.org/officeDocument/2006/relationships" xmlns:p="http://schemas.openxmlformats.org/presentationml/2006/main">
+  <p:cSld>
+    <p:spTree>
+      <p:nvGrpSpPr>
+        <p:cNvPr id="1" name=""/>
+        <p:cNvGrpSpPr/>
+        <p:nvPr/>
+      </p:nvGrpSpPr>
+      <p:grpSpPr>
+        <a:xfrm>
+          <a:off x="0" y="0"/>
+          <a:ext cx="0" cy="0"/>
+          <a:chOff x="0" y="0"/>
+          <a:chExt cx="0" cy="0"/>
+        </a:xfrm>
+      </p:grpSpPr>
+      <p:sp>
+        <p:nvSpPr>
+          <p:cNvPr id="2" name="Title 1">
+            <a:extLst>
+              <a:ext uri="{FF2B5EF4-FFF2-40B4-BE49-F238E27FC236}">
                 <a16:creationId xmlns:a16="http://schemas.microsoft.com/office/drawing/2014/main" id="{8DAD2FEE-4AD2-420A-90AB-581BED8E748C}"/>
               </a:ext>
             </a:extLst>
@@ -6914,7 +8368,7 @@
 </p:sld>
 </file>
 
-<file path=ppt/slides/slide7.xml><?xml version="1.0" encoding="utf-8"?>
+<file path=ppt/slides/slide8.xml><?xml version="1.0" encoding="utf-8"?>
 <p:sld xmlns:a="http://schemas.openxmlformats.org/drawingml/2006/main" xmlns:r="http://schemas.openxmlformats.org/officeDocument/2006/relationships" xmlns:p="http://schemas.openxmlformats.org/presentationml/2006/main">
   <p:cSld>
     <p:spTree>
@@ -7325,4 +8779,299 @@
     </a:ext>
   </a:extLst>
 </a:theme>
+</file>
+
+<file path=ppt/theme/theme2.xml><?xml version="1.0" encoding="utf-8"?>
+<a:theme xmlns:a="http://schemas.openxmlformats.org/drawingml/2006/main" name="Office Theme">
+  <a:themeElements>
+    <a:clrScheme name="Office">
+      <a:dk1>
+        <a:sysClr val="windowText" lastClr="000000"/>
+      </a:dk1>
+      <a:lt1>
+        <a:sysClr val="window" lastClr="FFFFFF"/>
+      </a:lt1>
+      <a:dk2>
+        <a:srgbClr val="44546A"/>
+      </a:dk2>
+      <a:lt2>
+        <a:srgbClr val="E7E6E6"/>
+      </a:lt2>
+      <a:accent1>
+        <a:srgbClr val="4472C4"/>
+      </a:accent1>
+      <a:accent2>
+        <a:srgbClr val="ED7D31"/>
+      </a:accent2>
+      <a:accent3>
+        <a:srgbClr val="A5A5A5"/>
+      </a:accent3>
+      <a:accent4>
+        <a:srgbClr val="FFC000"/>
+      </a:accent4>
+      <a:accent5>
+        <a:srgbClr val="5B9BD5"/>
+      </a:accent5>
+      <a:accent6>
+        <a:srgbClr val="70AD47"/>
+      </a:accent6>
+      <a:hlink>
+        <a:srgbClr val="0563C1"/>
+      </a:hlink>
+      <a:folHlink>
+        <a:srgbClr val="954F72"/>
+      </a:folHlink>
+    </a:clrScheme>
+    <a:fontScheme name="Office">
+      <a:majorFont>
+        <a:latin typeface="Calibri Light" panose="020F0302020204030204"/>
+        <a:ea typeface=""/>
+        <a:cs typeface=""/>
+        <a:font script="Jpan" typeface="游ゴシック Light"/>
+        <a:font script="Hang" typeface="맑은 고딕"/>
+        <a:font script="Hans" typeface="等线 Light"/>
+        <a:font script="Hant" typeface="新細明體"/>
+        <a:font script="Arab" typeface="Times New Roman"/>
+        <a:font script="Hebr" typeface="Times New Roman"/>
+        <a:font script="Thai" typeface="Angsana New"/>
+        <a:font script="Ethi" typeface="Nyala"/>
+        <a:font script="Beng" typeface="Vrinda"/>
+        <a:font script="Gujr" typeface="Shruti"/>
+        <a:font script="Khmr" typeface="MoolBoran"/>
+        <a:font script="Knda" typeface="Tunga"/>
+        <a:font script="Guru" typeface="Raavi"/>
+        <a:font script="Cans" typeface="Euphemia"/>
+        <a:font script="Cher" typeface="Plantagenet Cherokee"/>
+        <a:font script="Yiii" typeface="Microsoft Yi Baiti"/>
+        <a:font script="Tibt" typeface="Microsoft Himalaya"/>
+        <a:font script="Thaa" typeface="MV Boli"/>
+        <a:font script="Deva" typeface="Mangal"/>
+        <a:font script="Telu" typeface="Gautami"/>
+        <a:font script="Taml" typeface="Latha"/>
+        <a:font script="Syrc" typeface="Estrangelo Edessa"/>
+        <a:font script="Orya" typeface="Kalinga"/>
+        <a:font script="Mlym" typeface="Kartika"/>
+        <a:font script="Laoo" typeface="DokChampa"/>
+        <a:font script="Sinh" typeface="Iskoola Pota"/>
+        <a:font script="Mong" typeface="Mongolian Baiti"/>
+        <a:font script="Viet" typeface="Times New Roman"/>
+        <a:font script="Uigh" typeface="Microsoft Uighur"/>
+        <a:font script="Geor" typeface="Sylfaen"/>
+        <a:font script="Armn" typeface="Arial"/>
+        <a:font script="Bugi" typeface="Leelawadee UI"/>
+        <a:font script="Bopo" typeface="Microsoft JhengHei"/>
+        <a:font script="Java" typeface="Javanese Text"/>
+        <a:font script="Lisu" typeface="Segoe UI"/>
+        <a:font script="Mymr" typeface="Myanmar Text"/>
+        <a:font script="Nkoo" typeface="Ebrima"/>
+        <a:font script="Olck" typeface="Nirmala UI"/>
+        <a:font script="Osma" typeface="Ebrima"/>
+        <a:font script="Phag" typeface="Phagspa"/>
+        <a:font script="Syrn" typeface="Estrangelo Edessa"/>
+        <a:font script="Syrj" typeface="Estrangelo Edessa"/>
+        <a:font script="Syre" typeface="Estrangelo Edessa"/>
+        <a:font script="Sora" typeface="Nirmala UI"/>
+        <a:font script="Tale" typeface="Microsoft Tai Le"/>
+        <a:font script="Talu" typeface="Microsoft New Tai Lue"/>
+        <a:font script="Tfng" typeface="Ebrima"/>
+      </a:majorFont>
+      <a:minorFont>
+        <a:latin typeface="Calibri" panose="020F0502020204030204"/>
+        <a:ea typeface=""/>
+        <a:cs typeface=""/>
+        <a:font script="Jpan" typeface="游ゴシック"/>
+        <a:font script="Hang" typeface="맑은 고딕"/>
+        <a:font script="Hans" typeface="等线"/>
+        <a:font script="Hant" typeface="新細明體"/>
+        <a:font script="Arab" typeface="Arial"/>
+        <a:font script="Hebr" typeface="Arial"/>
+        <a:font script="Thai" typeface="Cordia New"/>
+        <a:font script="Ethi" typeface="Nyala"/>
+        <a:font script="Beng" typeface="Vrinda"/>
+        <a:font script="Gujr" typeface="Shruti"/>
+        <a:font script="Khmr" typeface="DaunPenh"/>
+        <a:font script="Knda" typeface="Tunga"/>
+        <a:font script="Guru" typeface="Raavi"/>
+        <a:font script="Cans" typeface="Euphemia"/>
+        <a:font script="Cher" typeface="Plantagenet Cherokee"/>
+        <a:font script="Yiii" typeface="Microsoft Yi Baiti"/>
+        <a:font script="Tibt" typeface="Microsoft Himalaya"/>
+        <a:font script="Thaa" typeface="MV Boli"/>
+        <a:font script="Deva" typeface="Mangal"/>
+        <a:font script="Telu" typeface="Gautami"/>
+        <a:font script="Taml" typeface="Latha"/>
+        <a:font script="Syrc" typeface="Estrangelo Edessa"/>
+        <a:font script="Orya" typeface="Kalinga"/>
+        <a:font script="Mlym" typeface="Kartika"/>
+        <a:font script="Laoo" typeface="DokChampa"/>
+        <a:font script="Sinh" typeface="Iskoola Pota"/>
+        <a:font script="Mong" typeface="Mongolian Baiti"/>
+        <a:font script="Viet" typeface="Arial"/>
+        <a:font script="Uigh" typeface="Microsoft Uighur"/>
+        <a:font script="Geor" typeface="Sylfaen"/>
+        <a:font script="Armn" typeface="Arial"/>
+        <a:font script="Bugi" typeface="Leelawadee UI"/>
+        <a:font script="Bopo" typeface="Microsoft JhengHei"/>
+        <a:font script="Java" typeface="Javanese Text"/>
+        <a:font script="Lisu" typeface="Segoe UI"/>
+        <a:font script="Mymr" typeface="Myanmar Text"/>
+        <a:font script="Nkoo" typeface="Ebrima"/>
+        <a:font script="Olck" typeface="Nirmala UI"/>
+        <a:font script="Osma" typeface="Ebrima"/>
+        <a:font script="Phag" typeface="Phagspa"/>
+        <a:font script="Syrn" typeface="Estrangelo Edessa"/>
+        <a:font script="Syrj" typeface="Estrangelo Edessa"/>
+        <a:font script="Syre" typeface="Estrangelo Edessa"/>
+        <a:font script="Sora" typeface="Nirmala UI"/>
+        <a:font script="Tale" typeface="Microsoft Tai Le"/>
+        <a:font script="Talu" typeface="Microsoft New Tai Lue"/>
+        <a:font script="Tfng" typeface="Ebrima"/>
+      </a:minorFont>
+    </a:fontScheme>
+    <a:fmtScheme name="Office">
+      <a:fillStyleLst>
+        <a:solidFill>
+          <a:schemeClr val="phClr"/>
+        </a:solidFill>
+        <a:gradFill rotWithShape="1">
+          <a:gsLst>
+            <a:gs pos="0">
+              <a:schemeClr val="phClr">
+                <a:lumMod val="110000"/>
+                <a:satMod val="105000"/>
+                <a:tint val="67000"/>
+              </a:schemeClr>
+            </a:gs>
+            <a:gs pos="50000">
+              <a:schemeClr val="phClr">
+                <a:lumMod val="105000"/>
+                <a:satMod val="103000"/>
+                <a:tint val="73000"/>
+              </a:schemeClr>
+            </a:gs>
+            <a:gs pos="100000">
+              <a:schemeClr val="phClr">
+                <a:lumMod val="105000"/>
+                <a:satMod val="109000"/>
+                <a:tint val="81000"/>
+              </a:schemeClr>
+            </a:gs>
+          </a:gsLst>
+          <a:lin ang="5400000" scaled="0"/>
+        </a:gradFill>
+        <a:gradFill rotWithShape="1">
+          <a:gsLst>
+            <a:gs pos="0">
+              <a:schemeClr val="phClr">
+                <a:satMod val="103000"/>
+                <a:lumMod val="102000"/>
+                <a:tint val="94000"/>
+              </a:schemeClr>
+            </a:gs>
+            <a:gs pos="50000">
+              <a:schemeClr val="phClr">
+                <a:satMod val="110000"/>
+                <a:lumMod val="100000"/>
+                <a:shade val="100000"/>
+              </a:schemeClr>
+            </a:gs>
+            <a:gs pos="100000">
+              <a:schemeClr val="phClr">
+                <a:lumMod val="99000"/>
+                <a:satMod val="120000"/>
+                <a:shade val="78000"/>
+              </a:schemeClr>
+            </a:gs>
+          </a:gsLst>
+          <a:lin ang="5400000" scaled="0"/>
+        </a:gradFill>
+      </a:fillStyleLst>
+      <a:lnStyleLst>
+        <a:ln w="6350" cap="flat" cmpd="sng" algn="ctr">
+          <a:solidFill>
+            <a:schemeClr val="phClr"/>
+          </a:solidFill>
+          <a:prstDash val="solid"/>
+          <a:miter lim="800000"/>
+        </a:ln>
+        <a:ln w="12700" cap="flat" cmpd="sng" algn="ctr">
+          <a:solidFill>
+            <a:schemeClr val="phClr"/>
+          </a:solidFill>
+          <a:prstDash val="solid"/>
+          <a:miter lim="800000"/>
+        </a:ln>
+        <a:ln w="19050" cap="flat" cmpd="sng" algn="ctr">
+          <a:solidFill>
+            <a:schemeClr val="phClr"/>
+          </a:solidFill>
+          <a:prstDash val="solid"/>
+          <a:miter lim="800000"/>
+        </a:ln>
+      </a:lnStyleLst>
+      <a:effectStyleLst>
+        <a:effectStyle>
+          <a:effectLst/>
+        </a:effectStyle>
+        <a:effectStyle>
+          <a:effectLst/>
+        </a:effectStyle>
+        <a:effectStyle>
+          <a:effectLst>
+            <a:outerShdw blurRad="57150" dist="19050" dir="5400000" algn="ctr" rotWithShape="0">
+              <a:srgbClr val="000000">
+                <a:alpha val="63000"/>
+              </a:srgbClr>
+            </a:outerShdw>
+          </a:effectLst>
+        </a:effectStyle>
+      </a:effectStyleLst>
+      <a:bgFillStyleLst>
+        <a:solidFill>
+          <a:schemeClr val="phClr"/>
+        </a:solidFill>
+        <a:solidFill>
+          <a:schemeClr val="phClr">
+            <a:tint val="95000"/>
+            <a:satMod val="170000"/>
+          </a:schemeClr>
+        </a:solidFill>
+        <a:gradFill rotWithShape="1">
+          <a:gsLst>
+            <a:gs pos="0">
+              <a:schemeClr val="phClr">
+                <a:tint val="93000"/>
+                <a:satMod val="150000"/>
+                <a:shade val="98000"/>
+                <a:lumMod val="102000"/>
+              </a:schemeClr>
+            </a:gs>
+            <a:gs pos="50000">
+              <a:schemeClr val="phClr">
+                <a:tint val="98000"/>
+                <a:satMod val="130000"/>
+                <a:shade val="90000"/>
+                <a:lumMod val="103000"/>
+              </a:schemeClr>
+            </a:gs>
+            <a:gs pos="100000">
+              <a:schemeClr val="phClr">
+                <a:shade val="63000"/>
+                <a:satMod val="120000"/>
+              </a:schemeClr>
+            </a:gs>
+          </a:gsLst>
+          <a:lin ang="5400000" scaled="0"/>
+        </a:gradFill>
+      </a:bgFillStyleLst>
+    </a:fmtScheme>
+  </a:themeElements>
+  <a:objectDefaults/>
+  <a:extraClrSchemeLst/>
+  <a:extLst>
+    <a:ext uri="{05A4C25C-085E-4340-85A3-A5531E510DB2}">
+      <thm15:themeFamily xmlns:thm15="http://schemas.microsoft.com/office/thememl/2012/main" name="Office Theme" id="{62F939B6-93AF-4DB8-9C6B-D6C7DFDC589F}" vid="{4A3C46E8-61CC-4603-A589-7422A47A8E4A}"/>
+    </a:ext>
+  </a:extLst>
+</a:theme>
 </file>
</xml_diff>